<commit_message>
Added CART images to bootstrap talk
</commit_message>
<xml_diff>
--- a/bootstrap/src/bootstrap-slides.pptx
+++ b/bootstrap/src/bootstrap-slides.pptx
@@ -5,7 +5,7 @@
     <p:sldMasterId id="2147483648" r:id="rId1"/>
   </p:sldMasterIdLst>
   <p:notesMasterIdLst>
-    <p:notesMasterId r:id="rId23"/>
+    <p:notesMasterId r:id="rId30"/>
   </p:notesMasterIdLst>
   <p:sldIdLst>
     <p:sldId id="256" r:id="rId2"/>
@@ -29,6 +29,13 @@
     <p:sldId id="274" r:id="rId20"/>
     <p:sldId id="275" r:id="rId21"/>
     <p:sldId id="276" r:id="rId22"/>
+    <p:sldId id="277" r:id="rId23"/>
+    <p:sldId id="278" r:id="rId24"/>
+    <p:sldId id="279" r:id="rId25"/>
+    <p:sldId id="280" r:id="rId26"/>
+    <p:sldId id="281" r:id="rId27"/>
+    <p:sldId id="282" r:id="rId28"/>
+    <p:sldId id="283" r:id="rId29"/>
   </p:sldIdLst>
   <p:sldSz cx="9144000" cy="5143500" type="screen16x9"/>
   <p:notesSz cx="6858000" cy="9144000"/>
@@ -864,21 +871,103 @@
             </a:pPr>
             <a:r>
               <a:rPr/>
-              <a:t>The jackknife, as called the “leave-one-out” method was proposed in 1949 as a method for estimating bias and calculating standard errors by Quenouille. It got the name “jackknife” by John Tukey because he felt it was a useful tool for a variety of settings.</a:t>
-            </a:r>
-          </a:p>
-          <a:p>
-            <a:pPr lvl="0" indent="0" marL="0">
-              <a:buNone/>
-            </a:pPr>
-          </a:p>
-          <a:p>
-            <a:pPr lvl="0" indent="0" marL="0">
-              <a:buNone/>
-            </a:pPr>
-            <a:r>
-              <a:rPr/>
-              <a:t>You create subsamples by leaving one data point out. With five data points, you have five subsamples.</a:t>
+              <a:t>I want to provide a bit of historical context. Before the bootstrap came along, researchers relied on a variety of mathematical theorems like the Central Limit Theorem and extensions to the Central Limit Theorem to estimate bias, calculate standard errors, produce confidence intervals, and test hypotheses.</a:t>
+            </a:r>
+          </a:p>
+          <a:p>
+            <a:pPr lvl="0" indent="0" marL="0">
+              <a:buNone/>
+            </a:pPr>
+          </a:p>
+          <a:p>
+            <a:pPr lvl="0" indent="0" marL="0">
+              <a:buNone/>
+            </a:pPr>
+            <a:r>
+              <a:rPr/>
+              <a:t>The bootstrap represents an early attempt to use the power of computer simulation to estimate bias, calculate standard errors, produce confidence intervals, and test hypotheses. The bootstrap provides these answers in many settings where you can’t find a variation on the Central Limit Theorem that would apply or when you don’t trust the approximation. I’ll provide a brief overview of the jackknife, an earlier approach that the bootstrap was based on. Then I’ll talk about Bradley Efron’s work in the 1970’s and 1980’s to develop the bootstrap and to establish the mathematical principles that make the bootstrap work in so many different areas. Finally, I will talk about how bootstrapping came to be relied on in various machine learning algorithms.</a:t>
+            </a:r>
+          </a:p>
+        </p:txBody>
+      </p:sp>
+      <p:sp>
+        <p:nvSpPr>
+          <p:cNvPr id="4" name="Slide Number Placeholder 3"/>
+          <p:cNvSpPr>
+            <a:spLocks noGrp="1"/>
+          </p:cNvSpPr>
+          <p:nvPr>
+            <p:ph type="sldNum" sz="quarter" idx="10"/>
+          </p:nvPr>
+        </p:nvSpPr>
+        <p:spPr/>
+        <p:txBody>
+          <a:bodyPr/>
+          <a:lstStyle/>
+          <a:p>
+            <a:fld id="{18BDFEC3-8487-43E8-A154-7C12CBC1FFF2}" type="slidenum">
+              <a:rPr lang="en-US"/>
+              <a:t>3</a:t>
+            </a:fld>
+            <a:endParaRPr lang="en-US"/>
+          </a:p>
+        </p:txBody>
+      </p:sp>
+    </p:spTree>
+  </p:cSld>
+</p:notes>
+</file>
+
+<file path=ppt/notesSlides/notesSlide3.xml><?xml version="1.0" encoding="utf-8"?>
+<p:notes xmlns:a="http://schemas.openxmlformats.org/drawingml/2006/main" xmlns:r="http://schemas.openxmlformats.org/officeDocument/2006/relationships" xmlns:p="http://schemas.openxmlformats.org/presentationml/2006/main">
+  <p:cSld>
+    <p:spTree>
+      <p:nvGrpSpPr>
+        <p:cNvPr id="1" name=""/>
+        <p:cNvGrpSpPr/>
+        <p:nvPr/>
+      </p:nvGrpSpPr>
+      <p:grpSpPr>
+        <a:xfrm>
+          <a:off x="0" y="0"/>
+          <a:ext cx="0" cy="0"/>
+          <a:chOff x="0" y="0"/>
+          <a:chExt cx="0" cy="0"/>
+        </a:xfrm>
+      </p:grpSpPr>
+      <p:sp>
+        <p:nvSpPr>
+          <p:cNvPr id="2" name="Slide Image Placeholder 1"/>
+          <p:cNvSpPr>
+            <a:spLocks noGrp="1" noRot="1" noChangeAspect="1"/>
+          </p:cNvSpPr>
+          <p:nvPr>
+            <p:ph type="sldImg"/>
+          </p:nvPr>
+        </p:nvSpPr>
+        <p:spPr/>
+      </p:sp>
+      <p:sp>
+        <p:nvSpPr>
+          <p:cNvPr id="3" name="Notes Placeholder 2"/>
+          <p:cNvSpPr>
+            <a:spLocks noGrp="1"/>
+          </p:cNvSpPr>
+          <p:nvPr>
+            <p:ph type="body" idx="1"/>
+          </p:nvPr>
+        </p:nvSpPr>
+        <p:spPr/>
+        <p:txBody>
+          <a:bodyPr/>
+          <a:lstStyle/>
+          <a:p>
+            <a:pPr lvl="0" indent="0" marL="0">
+              <a:buNone/>
+            </a:pPr>
+            <a:r>
+              <a:rPr/>
+              <a:t>I need to start with a book that I used when I was in graduate school. The title is “Approximation Theorems in Mathematical Statistics” by Rboery Serfling. It was all about the variety of ways to show that some statistic followed an asymptotic normal distribution.</a:t>
             </a:r>
           </a:p>
         </p:txBody>
@@ -901,6 +990,638 @@
             <a:fld id="{18BDFEC3-8487-43E8-A154-7C12CBC1FFF2}" type="slidenum">
               <a:rPr lang="en-US"/>
               <a:t>4</a:t>
+            </a:fld>
+            <a:endParaRPr lang="en-US"/>
+          </a:p>
+        </p:txBody>
+      </p:sp>
+    </p:spTree>
+  </p:cSld>
+</p:notes>
+</file>
+
+<file path=ppt/notesSlides/notesSlide4.xml><?xml version="1.0" encoding="utf-8"?>
+<p:notes xmlns:a="http://schemas.openxmlformats.org/drawingml/2006/main" xmlns:r="http://schemas.openxmlformats.org/officeDocument/2006/relationships" xmlns:p="http://schemas.openxmlformats.org/presentationml/2006/main">
+  <p:cSld>
+    <p:spTree>
+      <p:nvGrpSpPr>
+        <p:cNvPr id="1" name=""/>
+        <p:cNvGrpSpPr/>
+        <p:nvPr/>
+      </p:nvGrpSpPr>
+      <p:grpSpPr>
+        <a:xfrm>
+          <a:off x="0" y="0"/>
+          <a:ext cx="0" cy="0"/>
+          <a:chOff x="0" y="0"/>
+          <a:chExt cx="0" cy="0"/>
+        </a:xfrm>
+      </p:grpSpPr>
+      <p:sp>
+        <p:nvSpPr>
+          <p:cNvPr id="2" name="Slide Image Placeholder 1"/>
+          <p:cNvSpPr>
+            <a:spLocks noGrp="1" noRot="1" noChangeAspect="1"/>
+          </p:cNvSpPr>
+          <p:nvPr>
+            <p:ph type="sldImg"/>
+          </p:nvPr>
+        </p:nvSpPr>
+        <p:spPr/>
+      </p:sp>
+      <p:sp>
+        <p:nvSpPr>
+          <p:cNvPr id="3" name="Notes Placeholder 2"/>
+          <p:cNvSpPr>
+            <a:spLocks noGrp="1"/>
+          </p:cNvSpPr>
+          <p:nvPr>
+            <p:ph type="body" idx="1"/>
+          </p:nvPr>
+        </p:nvSpPr>
+        <p:spPr/>
+        <p:txBody>
+          <a:bodyPr/>
+          <a:lstStyle/>
+          <a:p>
+            <a:pPr lvl="0" indent="0" marL="0">
+              <a:buNone/>
+            </a:pPr>
+            <a:r>
+              <a:rPr/>
+              <a:t>I’m sure you’re all familiar with the Central Limit Theorem. It states that the average of independent identically distributed random variables is approximately normal.</a:t>
+            </a:r>
+          </a:p>
+          <a:p>
+            <a:pPr lvl="0" indent="0" marL="0">
+              <a:buNone/>
+            </a:pPr>
+          </a:p>
+          <a:p>
+            <a:pPr lvl="0" indent="0" marL="0">
+              <a:buNone/>
+            </a:pPr>
+            <a:r>
+              <a:rPr/>
+              <a:t>The rule of thumb is that you can trust the normal approximation when the sample size is greater than 30. There is a lot that you can quibble about with respect to the cut-off of 30, but we’re not going to get too fussy about this.</a:t>
+            </a:r>
+          </a:p>
+        </p:txBody>
+      </p:sp>
+      <p:sp>
+        <p:nvSpPr>
+          <p:cNvPr id="4" name="Slide Number Placeholder 3"/>
+          <p:cNvSpPr>
+            <a:spLocks noGrp="1"/>
+          </p:cNvSpPr>
+          <p:nvPr>
+            <p:ph type="sldNum" sz="quarter" idx="10"/>
+          </p:nvPr>
+        </p:nvSpPr>
+        <p:spPr/>
+        <p:txBody>
+          <a:bodyPr/>
+          <a:lstStyle/>
+          <a:p>
+            <a:fld id="{18BDFEC3-8487-43E8-A154-7C12CBC1FFF2}" type="slidenum">
+              <a:rPr lang="en-US"/>
+              <a:t>5</a:t>
+            </a:fld>
+            <a:endParaRPr lang="en-US"/>
+          </a:p>
+        </p:txBody>
+      </p:sp>
+    </p:spTree>
+  </p:cSld>
+</p:notes>
+</file>
+
+<file path=ppt/notesSlides/notesSlide5.xml><?xml version="1.0" encoding="utf-8"?>
+<p:notes xmlns:a="http://schemas.openxmlformats.org/drawingml/2006/main" xmlns:r="http://schemas.openxmlformats.org/officeDocument/2006/relationships" xmlns:p="http://schemas.openxmlformats.org/presentationml/2006/main">
+  <p:cSld>
+    <p:spTree>
+      <p:nvGrpSpPr>
+        <p:cNvPr id="1" name=""/>
+        <p:cNvGrpSpPr/>
+        <p:nvPr/>
+      </p:nvGrpSpPr>
+      <p:grpSpPr>
+        <a:xfrm>
+          <a:off x="0" y="0"/>
+          <a:ext cx="0" cy="0"/>
+          <a:chOff x="0" y="0"/>
+          <a:chExt cx="0" cy="0"/>
+        </a:xfrm>
+      </p:grpSpPr>
+      <p:sp>
+        <p:nvSpPr>
+          <p:cNvPr id="2" name="Slide Image Placeholder 1"/>
+          <p:cNvSpPr>
+            <a:spLocks noGrp="1" noRot="1" noChangeAspect="1"/>
+          </p:cNvSpPr>
+          <p:nvPr>
+            <p:ph type="sldImg"/>
+          </p:nvPr>
+        </p:nvSpPr>
+        <p:spPr/>
+      </p:sp>
+      <p:sp>
+        <p:nvSpPr>
+          <p:cNvPr id="3" name="Notes Placeholder 2"/>
+          <p:cNvSpPr>
+            <a:spLocks noGrp="1"/>
+          </p:cNvSpPr>
+          <p:nvPr>
+            <p:ph type="body" idx="1"/>
+          </p:nvPr>
+        </p:nvSpPr>
+        <p:spPr/>
+        <p:txBody>
+          <a:bodyPr/>
+          <a:lstStyle/>
+          <a:p>
+            <a:pPr lvl="0" indent="0" marL="0">
+              <a:buNone/>
+            </a:pPr>
+            <a:r>
+              <a:rPr/>
+              <a:t>You can also show easily that the expected value of the sample mean is mu (the sample mean is an unbiased estimate of the population mean) and that the variance of the sample mean is the variance of an individual X value divided by the sample size n.</a:t>
+            </a:r>
+          </a:p>
+        </p:txBody>
+      </p:sp>
+      <p:sp>
+        <p:nvSpPr>
+          <p:cNvPr id="4" name="Slide Number Placeholder 3"/>
+          <p:cNvSpPr>
+            <a:spLocks noGrp="1"/>
+          </p:cNvSpPr>
+          <p:nvPr>
+            <p:ph type="sldNum" sz="quarter" idx="10"/>
+          </p:nvPr>
+        </p:nvSpPr>
+        <p:spPr/>
+        <p:txBody>
+          <a:bodyPr/>
+          <a:lstStyle/>
+          <a:p>
+            <a:fld id="{18BDFEC3-8487-43E8-A154-7C12CBC1FFF2}" type="slidenum">
+              <a:rPr lang="en-US"/>
+              <a:t>6</a:t>
+            </a:fld>
+            <a:endParaRPr lang="en-US"/>
+          </a:p>
+        </p:txBody>
+      </p:sp>
+    </p:spTree>
+  </p:cSld>
+</p:notes>
+</file>
+
+<file path=ppt/notesSlides/notesSlide6.xml><?xml version="1.0" encoding="utf-8"?>
+<p:notes xmlns:a="http://schemas.openxmlformats.org/drawingml/2006/main" xmlns:r="http://schemas.openxmlformats.org/officeDocument/2006/relationships" xmlns:p="http://schemas.openxmlformats.org/presentationml/2006/main">
+  <p:cSld>
+    <p:spTree>
+      <p:nvGrpSpPr>
+        <p:cNvPr id="1" name=""/>
+        <p:cNvGrpSpPr/>
+        <p:nvPr/>
+      </p:nvGrpSpPr>
+      <p:grpSpPr>
+        <a:xfrm>
+          <a:off x="0" y="0"/>
+          <a:ext cx="0" cy="0"/>
+          <a:chOff x="0" y="0"/>
+          <a:chExt cx="0" cy="0"/>
+        </a:xfrm>
+      </p:grpSpPr>
+      <p:sp>
+        <p:nvSpPr>
+          <p:cNvPr id="2" name="Slide Image Placeholder 1"/>
+          <p:cNvSpPr>
+            <a:spLocks noGrp="1" noRot="1" noChangeAspect="1"/>
+          </p:cNvSpPr>
+          <p:nvPr>
+            <p:ph type="sldImg"/>
+          </p:nvPr>
+        </p:nvSpPr>
+        <p:spPr/>
+      </p:sp>
+      <p:sp>
+        <p:nvSpPr>
+          <p:cNvPr id="3" name="Notes Placeholder 2"/>
+          <p:cNvSpPr>
+            <a:spLocks noGrp="1"/>
+          </p:cNvSpPr>
+          <p:nvPr>
+            <p:ph type="body" idx="1"/>
+          </p:nvPr>
+        </p:nvSpPr>
+        <p:spPr/>
+        <p:txBody>
+          <a:bodyPr/>
+          <a:lstStyle/>
+          <a:p>
+            <a:pPr lvl="0" indent="0" marL="0">
+              <a:buNone/>
+            </a:pPr>
+            <a:r>
+              <a:rPr/>
+              <a:t>What about more complex settings?</a:t>
+            </a:r>
+          </a:p>
+          <a:p>
+            <a:pPr lvl="0" indent="0" marL="0">
+              <a:buNone/>
+            </a:pPr>
+          </a:p>
+          <a:p>
+            <a:pPr lvl="0" indent="0" marL="0">
+              <a:buNone/>
+            </a:pPr>
+            <a:r>
+              <a:rPr/>
+              <a:t>What if the sample size is not large enough to rely on the Central Limit Theorem?</a:t>
+            </a:r>
+          </a:p>
+          <a:p>
+            <a:pPr lvl="0" indent="0" marL="0">
+              <a:buNone/>
+            </a:pPr>
+          </a:p>
+          <a:p>
+            <a:pPr lvl="0" indent="0" marL="0">
+              <a:buNone/>
+            </a:pPr>
+            <a:r>
+              <a:rPr/>
+              <a:t>What if you are measuring the mean absolute deviation (the average of the absolute values of each individual value minus the sample mean) or the interquartile range (the difference between the 75th percentile and the 25th percentile).</a:t>
+            </a:r>
+          </a:p>
+          <a:p>
+            <a:pPr lvl="0" indent="0" marL="0">
+              <a:buNone/>
+            </a:pPr>
+          </a:p>
+          <a:p>
+            <a:pPr lvl="0" indent="0" marL="0">
+              <a:buNone/>
+            </a:pPr>
+            <a:r>
+              <a:rPr/>
+              <a:t>If you are really clever and if you understand all the approximation theorems in Robert Serfling’s book, you will know how to establish an approximation to these statistics (usually a normal approximation, but sometimes there are other distributions like the chi-square distribution that represent a good approximation).</a:t>
+            </a:r>
+          </a:p>
+          <a:p>
+            <a:pPr lvl="0" indent="0" marL="0">
+              <a:buNone/>
+            </a:pPr>
+          </a:p>
+          <a:p>
+            <a:pPr lvl="0" indent="0" marL="0">
+              <a:buNone/>
+            </a:pPr>
+            <a:r>
+              <a:rPr/>
+              <a:t>But an even more fundamental question is what do you do when the sample size is not large enough to justify the use of the Central Limit Theorem? I put down n&lt;30 here, but in some settings (well behaved distributions without much skewness and only a weak tendency to produce outliers), you might get by with only 10 observations. Other times (extremely skewed distributions and/or a strong tendency to produce outliers), even a sample size of 300 is inadequate to assume an approximately normal distribution.</a:t>
+            </a:r>
+          </a:p>
+          <a:p>
+            <a:pPr lvl="0" indent="0" marL="0">
+              <a:buNone/>
+            </a:pPr>
+          </a:p>
+          <a:p>
+            <a:pPr lvl="0" indent="0" marL="0">
+              <a:buNone/>
+            </a:pPr>
+            <a:r>
+              <a:rPr/>
+              <a:t>It turns out that you can use simulations involving the data itself to establish an underlying distribution.</a:t>
+            </a:r>
+          </a:p>
+        </p:txBody>
+      </p:sp>
+      <p:sp>
+        <p:nvSpPr>
+          <p:cNvPr id="4" name="Slide Number Placeholder 3"/>
+          <p:cNvSpPr>
+            <a:spLocks noGrp="1"/>
+          </p:cNvSpPr>
+          <p:nvPr>
+            <p:ph type="sldNum" sz="quarter" idx="10"/>
+          </p:nvPr>
+        </p:nvSpPr>
+        <p:spPr/>
+        <p:txBody>
+          <a:bodyPr/>
+          <a:lstStyle/>
+          <a:p>
+            <a:fld id="{18BDFEC3-8487-43E8-A154-7C12CBC1FFF2}" type="slidenum">
+              <a:rPr lang="en-US"/>
+              <a:t>7</a:t>
+            </a:fld>
+            <a:endParaRPr lang="en-US"/>
+          </a:p>
+        </p:txBody>
+      </p:sp>
+    </p:spTree>
+  </p:cSld>
+</p:notes>
+</file>
+
+<file path=ppt/notesSlides/notesSlide7.xml><?xml version="1.0" encoding="utf-8"?>
+<p:notes xmlns:a="http://schemas.openxmlformats.org/drawingml/2006/main" xmlns:r="http://schemas.openxmlformats.org/officeDocument/2006/relationships" xmlns:p="http://schemas.openxmlformats.org/presentationml/2006/main">
+  <p:cSld>
+    <p:spTree>
+      <p:nvGrpSpPr>
+        <p:cNvPr id="1" name=""/>
+        <p:cNvGrpSpPr/>
+        <p:nvPr/>
+      </p:nvGrpSpPr>
+      <p:grpSpPr>
+        <a:xfrm>
+          <a:off x="0" y="0"/>
+          <a:ext cx="0" cy="0"/>
+          <a:chOff x="0" y="0"/>
+          <a:chExt cx="0" cy="0"/>
+        </a:xfrm>
+      </p:grpSpPr>
+      <p:sp>
+        <p:nvSpPr>
+          <p:cNvPr id="2" name="Slide Image Placeholder 1"/>
+          <p:cNvSpPr>
+            <a:spLocks noGrp="1" noRot="1" noChangeAspect="1"/>
+          </p:cNvSpPr>
+          <p:nvPr>
+            <p:ph type="sldImg"/>
+          </p:nvPr>
+        </p:nvSpPr>
+        <p:spPr/>
+      </p:sp>
+      <p:sp>
+        <p:nvSpPr>
+          <p:cNvPr id="3" name="Notes Placeholder 2"/>
+          <p:cNvSpPr>
+            <a:spLocks noGrp="1"/>
+          </p:cNvSpPr>
+          <p:nvPr>
+            <p:ph type="body" idx="1"/>
+          </p:nvPr>
+        </p:nvSpPr>
+        <p:spPr/>
+        <p:txBody>
+          <a:bodyPr/>
+          <a:lstStyle/>
+          <a:p>
+            <a:pPr lvl="0" indent="0" marL="0">
+              <a:buNone/>
+            </a:pPr>
+            <a:r>
+              <a:rPr/>
+              <a:t>The jackknife, as called the “leave-one-out” method was proposed in 1949 as a method for estimating bias and calculating standard errors by Quenouille. It got the name “jackknife” by John Tukey because he felt it was a useful tool for a variety of settings.</a:t>
+            </a:r>
+          </a:p>
+          <a:p>
+            <a:pPr lvl="0" indent="0" marL="0">
+              <a:buNone/>
+            </a:pPr>
+          </a:p>
+          <a:p>
+            <a:pPr lvl="0" indent="0" marL="0">
+              <a:buNone/>
+            </a:pPr>
+            <a:r>
+              <a:rPr/>
+              <a:t>You create subsamples by leaving one data point out. With five data points, you have five subsamples.</a:t>
+            </a:r>
+          </a:p>
+        </p:txBody>
+      </p:sp>
+      <p:sp>
+        <p:nvSpPr>
+          <p:cNvPr id="4" name="Slide Number Placeholder 3"/>
+          <p:cNvSpPr>
+            <a:spLocks noGrp="1"/>
+          </p:cNvSpPr>
+          <p:nvPr>
+            <p:ph type="sldNum" sz="quarter" idx="10"/>
+          </p:nvPr>
+        </p:nvSpPr>
+        <p:spPr/>
+        <p:txBody>
+          <a:bodyPr/>
+          <a:lstStyle/>
+          <a:p>
+            <a:fld id="{18BDFEC3-8487-43E8-A154-7C12CBC1FFF2}" type="slidenum">
+              <a:rPr lang="en-US"/>
+              <a:t>8</a:t>
+            </a:fld>
+            <a:endParaRPr lang="en-US"/>
+          </a:p>
+        </p:txBody>
+      </p:sp>
+    </p:spTree>
+  </p:cSld>
+</p:notes>
+</file>
+
+<file path=ppt/notesSlides/notesSlide8.xml><?xml version="1.0" encoding="utf-8"?>
+<p:notes xmlns:a="http://schemas.openxmlformats.org/drawingml/2006/main" xmlns:r="http://schemas.openxmlformats.org/officeDocument/2006/relationships" xmlns:p="http://schemas.openxmlformats.org/presentationml/2006/main">
+  <p:cSld>
+    <p:spTree>
+      <p:nvGrpSpPr>
+        <p:cNvPr id="1" name=""/>
+        <p:cNvGrpSpPr/>
+        <p:nvPr/>
+      </p:nvGrpSpPr>
+      <p:grpSpPr>
+        <a:xfrm>
+          <a:off x="0" y="0"/>
+          <a:ext cx="0" cy="0"/>
+          <a:chOff x="0" y="0"/>
+          <a:chExt cx="0" cy="0"/>
+        </a:xfrm>
+      </p:grpSpPr>
+      <p:sp>
+        <p:nvSpPr>
+          <p:cNvPr id="2" name="Slide Image Placeholder 1"/>
+          <p:cNvSpPr>
+            <a:spLocks noGrp="1" noRot="1" noChangeAspect="1"/>
+          </p:cNvSpPr>
+          <p:nvPr>
+            <p:ph type="sldImg"/>
+          </p:nvPr>
+        </p:nvSpPr>
+        <p:spPr/>
+      </p:sp>
+      <p:sp>
+        <p:nvSpPr>
+          <p:cNvPr id="3" name="Notes Placeholder 2"/>
+          <p:cNvSpPr>
+            <a:spLocks noGrp="1"/>
+          </p:cNvSpPr>
+          <p:nvPr>
+            <p:ph type="body" idx="1"/>
+          </p:nvPr>
+        </p:nvSpPr>
+        <p:spPr/>
+        <p:txBody>
+          <a:bodyPr/>
+          <a:lstStyle/>
+          <a:p>
+            <a:pPr lvl="0" indent="0" marL="0">
+              <a:buNone/>
+            </a:pPr>
+            <a:r>
+              <a:rPr/>
+              <a:t>This image is from a White House ceremony where Bradley Efron received the President’s National Medal of Science. I was quite shocked when I found this picture a few days ago, and I’ve been trying to call Joe Biden ever since to see where my medal is. Seriously, you have to be a really special statistician to deserve an honor like this.</a:t>
+            </a:r>
+          </a:p>
+          <a:p>
+            <a:pPr lvl="0" indent="0" marL="0">
+              <a:buNone/>
+            </a:pPr>
+          </a:p>
+          <a:p>
+            <a:pPr lvl="0" indent="0" marL="0">
+              <a:buNone/>
+            </a:pPr>
+            <a:r>
+              <a:rPr/>
+              <a:t>Most of the information about Bradley Efron comes from</a:t>
+            </a:r>
+          </a:p>
+          <a:p>
+            <a:pPr lvl="0" indent="0" marL="0">
+              <a:buNone/>
+            </a:pPr>
+          </a:p>
+          <a:p>
+            <a:pPr lvl="0" indent="0" marL="0">
+              <a:buNone/>
+            </a:pPr>
+            <a:r>
+              <a:rPr/>
+              <a:t>Denise LaFontaine. The History of Bootstrapping: Tracing the Development of Resampling With Replacement. The Mathematics Enthusiast 2021, 18(1). Available in pdf format.</a:t>
+            </a:r>
+          </a:p>
+          <a:p>
+            <a:pPr lvl="0" indent="0" marL="0">
+              <a:buNone/>
+            </a:pPr>
+          </a:p>
+          <a:p>
+            <a:pPr lvl="0" indent="0" marL="0">
+              <a:buNone/>
+            </a:pPr>
+            <a:r>
+              <a:rPr/>
+              <a:t>Bradley Efron entered the PhD program in Statistics at Stanford University in 1960. He was influenced by one of the faculty at Stanford, Rupert Miller, who was working on establishing conditions under which the jackknife did or did not perform well. Shortly after graduating, Dr. Efron started working on an approach that would fix some of the shortcomings of the jackknife.</a:t>
+            </a:r>
+          </a:p>
+        </p:txBody>
+      </p:sp>
+      <p:sp>
+        <p:nvSpPr>
+          <p:cNvPr id="4" name="Slide Number Placeholder 3"/>
+          <p:cNvSpPr>
+            <a:spLocks noGrp="1"/>
+          </p:cNvSpPr>
+          <p:nvPr>
+            <p:ph type="sldNum" sz="quarter" idx="10"/>
+          </p:nvPr>
+        </p:nvSpPr>
+        <p:spPr/>
+        <p:txBody>
+          <a:bodyPr/>
+          <a:lstStyle/>
+          <a:p>
+            <a:fld id="{18BDFEC3-8487-43E8-A154-7C12CBC1FFF2}" type="slidenum">
+              <a:rPr lang="en-US"/>
+              <a:t>11</a:t>
+            </a:fld>
+            <a:endParaRPr lang="en-US"/>
+          </a:p>
+        </p:txBody>
+      </p:sp>
+    </p:spTree>
+  </p:cSld>
+</p:notes>
+</file>
+
+<file path=ppt/notesSlides/notesSlide9.xml><?xml version="1.0" encoding="utf-8"?>
+<p:notes xmlns:a="http://schemas.openxmlformats.org/drawingml/2006/main" xmlns:r="http://schemas.openxmlformats.org/officeDocument/2006/relationships" xmlns:p="http://schemas.openxmlformats.org/presentationml/2006/main">
+  <p:cSld>
+    <p:spTree>
+      <p:nvGrpSpPr>
+        <p:cNvPr id="1" name=""/>
+        <p:cNvGrpSpPr/>
+        <p:nvPr/>
+      </p:nvGrpSpPr>
+      <p:grpSpPr>
+        <a:xfrm>
+          <a:off x="0" y="0"/>
+          <a:ext cx="0" cy="0"/>
+          <a:chOff x="0" y="0"/>
+          <a:chExt cx="0" cy="0"/>
+        </a:xfrm>
+      </p:grpSpPr>
+      <p:sp>
+        <p:nvSpPr>
+          <p:cNvPr id="2" name="Slide Image Placeholder 1"/>
+          <p:cNvSpPr>
+            <a:spLocks noGrp="1" noRot="1" noChangeAspect="1"/>
+          </p:cNvSpPr>
+          <p:nvPr>
+            <p:ph type="sldImg"/>
+          </p:nvPr>
+        </p:nvSpPr>
+        <p:spPr/>
+      </p:sp>
+      <p:sp>
+        <p:nvSpPr>
+          <p:cNvPr id="3" name="Notes Placeholder 2"/>
+          <p:cNvSpPr>
+            <a:spLocks noGrp="1"/>
+          </p:cNvSpPr>
+          <p:nvPr>
+            <p:ph type="body" idx="1"/>
+          </p:nvPr>
+        </p:nvSpPr>
+        <p:spPr/>
+        <p:txBody>
+          <a:bodyPr/>
+          <a:lstStyle/>
+          <a:p>
+            <a:pPr lvl="0" indent="0" marL="0">
+              <a:buNone/>
+            </a:pPr>
+            <a:r>
+              <a:rPr/>
+              <a:t>This is a histogram of the 500 bootstrapped estimates of the mean absolute deviation. Notice that it is “patchy” and does not follow a smooth bell shaped curve. This is an important issue that we will address when computing confidence intervals.</a:t>
+            </a:r>
+          </a:p>
+        </p:txBody>
+      </p:sp>
+      <p:sp>
+        <p:nvSpPr>
+          <p:cNvPr id="4" name="Slide Number Placeholder 3"/>
+          <p:cNvSpPr>
+            <a:spLocks noGrp="1"/>
+          </p:cNvSpPr>
+          <p:nvPr>
+            <p:ph type="sldNum" sz="quarter" idx="10"/>
+          </p:nvPr>
+        </p:nvSpPr>
+        <p:spPr/>
+        <p:txBody>
+          <a:bodyPr/>
+          <a:lstStyle/>
+          <a:p>
+            <a:fld id="{18BDFEC3-8487-43E8-A154-7C12CBC1FFF2}" type="slidenum">
+              <a:rPr lang="en-US"/>
+              <a:t>15</a:t>
             </a:fld>
             <a:endParaRPr lang="en-US"/>
           </a:p>
@@ -4007,7 +4728,7 @@
             </a:pPr>
             <a:r>
               <a:rPr/>
-              <a:t>Break #1</a:t>
+              <a:t>The jackknife (3/3)</a:t>
             </a:r>
           </a:p>
         </p:txBody>
@@ -4030,28 +4751,21 @@
             <a:pPr lvl="0"/>
             <a:r>
               <a:rPr/>
-              <a:t>What have you learned</a:t>
-            </a:r>
-          </a:p>
-          <a:p>
-            <a:pPr lvl="1"/>
-            <a:r>
-              <a:rPr/>
-              <a:t>History of the bootstrap</a:t>
+              <a:t>MAD (Full sample) = 1.68</a:t>
             </a:r>
           </a:p>
           <a:p>
             <a:pPr lvl="0"/>
             <a:r>
               <a:rPr/>
-              <a:t>What’s coming next</a:t>
-            </a:r>
-          </a:p>
-          <a:p>
-            <a:pPr lvl="1"/>
-            <a:r>
-              <a:rPr/>
-              <a:t>Reasons for using the bootstrap</a:t>
+              <a:t>Average MAD (Jackknife subsamples) = 1.6</a:t>
+            </a:r>
+          </a:p>
+          <a:p>
+            <a:pPr lvl="0"/>
+            <a:r>
+              <a:rPr/>
+              <a:t>Standard deviation MAD (Jackknife subsamples) = 0.285</a:t>
             </a:r>
           </a:p>
         </p:txBody>
@@ -4098,51 +4812,67 @@
             </a:pPr>
             <a:r>
               <a:rPr/>
-              <a:t>Reasons for using the bootstrap</a:t>
-            </a:r>
-          </a:p>
-        </p:txBody>
-      </p:sp>
-      <p:sp>
-        <p:nvSpPr>
-          <p:cNvPr id="3" name="Content Placeholder 2"/>
-          <p:cNvSpPr>
-            <a:spLocks noGrp="1"/>
-          </p:cNvSpPr>
-          <p:nvPr>
-            <p:ph idx="1"/>
-          </p:nvPr>
-        </p:nvSpPr>
-        <p:spPr/>
-        <p:txBody>
-          <a:bodyPr/>
-          <a:lstStyle/>
-          <a:p>
-            <a:pPr lvl="0"/>
-            <a:r>
-              <a:rPr/>
-              <a:t>Estimate bias</a:t>
-            </a:r>
-          </a:p>
-          <a:p>
-            <a:pPr lvl="0"/>
-            <a:r>
-              <a:rPr/>
-              <a:t>Calculate standard errors</a:t>
-            </a:r>
-          </a:p>
-          <a:p>
-            <a:pPr lvl="0"/>
-            <a:r>
-              <a:rPr/>
-              <a:t>Compute confidence intervals</a:t>
-            </a:r>
-          </a:p>
-          <a:p>
-            <a:pPr lvl="0"/>
-            <a:r>
-              <a:rPr/>
-              <a:t>Test hypotheses</a:t>
+              <a:t>Bradley Efron’s contribution (1/5)</a:t>
+            </a:r>
+          </a:p>
+        </p:txBody>
+      </p:sp>
+      <p:pic>
+        <p:nvPicPr>
+          <p:cNvPr descr="fig:  ../images/bradley-efron-02.jpg" id="0" name="Picture 1"/>
+          <p:cNvPicPr>
+            <a:picLocks noGrp="1" noChangeAspect="1"/>
+          </p:cNvPicPr>
+          <p:nvPr/>
+        </p:nvPicPr>
+        <p:blipFill>
+          <a:blip r:embed="rId3"/>
+          <a:stretch>
+            <a:fillRect/>
+          </a:stretch>
+        </p:blipFill>
+        <p:spPr bwMode="auto">
+          <a:xfrm>
+            <a:off x="2273300" y="1193800"/>
+            <a:ext cx="4584700" cy="2882900"/>
+          </a:xfrm>
+          <a:prstGeom prst="rect">
+            <a:avLst/>
+          </a:prstGeom>
+          <a:noFill/>
+          <a:ln w="9525">
+            <a:noFill/>
+            <a:headEnd/>
+            <a:tailEnd/>
+          </a:ln>
+        </p:spPr>
+      </p:pic>
+      <p:sp>
+        <p:nvSpPr>
+          <p:cNvPr id="1" name="TextBox 3"/>
+          <p:cNvSpPr txBox="1"/>
+          <p:nvPr/>
+        </p:nvSpPr>
+        <p:spPr>
+          <a:xfrm>
+            <a:off x="457200" y="4076700"/>
+            <a:ext cx="8229600" cy="508000"/>
+          </a:xfrm>
+          <a:prstGeom prst="rect">
+            <a:avLst/>
+          </a:prstGeom>
+          <a:noFill/>
+        </p:spPr>
+        <p:txBody>
+          <a:bodyPr/>
+          <a:lstStyle/>
+          <a:p>
+            <a:pPr lvl="0" indent="0" marL="0" algn="ctr">
+              <a:buNone/>
+            </a:pPr>
+            <a:r>
+              <a:rPr/>
+              <a:t>Figure 1. Photograph of Bradley Efron with President Bush</a:t>
             </a:r>
           </a:p>
         </p:txBody>
@@ -4189,7 +4919,77 @@
             </a:pPr>
             <a:r>
               <a:rPr/>
-              <a:t>Estimate bias</a:t>
+              <a:t>Bradley Efron’s contribution (2/5)</a:t>
+            </a:r>
+          </a:p>
+        </p:txBody>
+      </p:sp>
+      <p:sp>
+        <p:nvSpPr>
+          <p:cNvPr id="3" name="Content Placeholder 2"/>
+          <p:cNvSpPr>
+            <a:spLocks noGrp="1"/>
+          </p:cNvSpPr>
+          <p:nvPr>
+            <p:ph idx="1"/>
+          </p:nvPr>
+        </p:nvSpPr>
+        <p:spPr/>
+        <p:txBody>
+          <a:bodyPr/>
+          <a:lstStyle/>
+          <a:p>
+            <a:pPr lvl="0" indent="0" marL="0">
+              <a:buNone/>
+            </a:pPr>
+            <a:r>
+              <a:rPr/>
+              <a:t>The bootstrap sample=sampling with replacement.</a:t>
+            </a:r>
+          </a:p>
+          <a:p>
+            <a:pPr lvl="0" indent="0" marL="0">
+              <a:buNone/>
+            </a:pPr>
+            <a:r>
+              <a:rPr/>
+              <a:t>Bootstrap sample #1: (7, 2, 5, 3, 5)</a:t>
+            </a:r>
+          </a:p>
+          <a:p>
+            <a:pPr lvl="0" indent="0" marL="0">
+              <a:buNone/>
+            </a:pPr>
+            <a:r>
+              <a:rPr/>
+              <a:t>Bootstrap sample #2: (5, 7, 3, 5, 7)</a:t>
+            </a:r>
+          </a:p>
+          <a:p>
+            <a:pPr lvl="0" indent="0" marL="0">
+              <a:buNone/>
+            </a:pPr>
+            <a:r>
+              <a:rPr/>
+              <a:t>Bootstrap sample #3: (7, 2, 2, 2, 2)</a:t>
+            </a:r>
+          </a:p>
+          <a:p>
+            <a:pPr lvl="0" indent="0" marL="0">
+              <a:buNone/>
+            </a:pPr>
+            <a:r>
+              <a:rPr/>
+              <a:t>…</a:t>
+            </a:r>
+          </a:p>
+          <a:p>
+            <a:pPr lvl="0" indent="0" marL="0">
+              <a:buNone/>
+            </a:pPr>
+            <a:r>
+              <a:rPr/>
+              <a:t>Bootstrap sample #500: (7, 7, 3, 2, 7)</a:t>
             </a:r>
           </a:p>
         </p:txBody>
@@ -4236,7 +5036,68 @@
             </a:pPr>
             <a:r>
               <a:rPr/>
-              <a:t>Calculate standard errors</a:t>
+              <a:t>Bradley Efron’s contribution (3/5)</a:t>
+            </a:r>
+          </a:p>
+        </p:txBody>
+      </p:sp>
+      <p:sp>
+        <p:nvSpPr>
+          <p:cNvPr id="3" name="Content Placeholder 2"/>
+          <p:cNvSpPr>
+            <a:spLocks noGrp="1"/>
+          </p:cNvSpPr>
+          <p:nvPr>
+            <p:ph idx="1"/>
+          </p:nvPr>
+        </p:nvSpPr>
+        <p:spPr/>
+        <p:txBody>
+          <a:bodyPr/>
+          <a:lstStyle/>
+          <a:p>
+            <a:pPr lvl="0" indent="0" marL="0">
+              <a:buNone/>
+            </a:pPr>
+            <a:r>
+              <a:rPr/>
+              <a:t>MAD(7, 2, 5, 3, 5) = 1.52</a:t>
+            </a:r>
+          </a:p>
+          <a:p>
+            <a:pPr lvl="0" indent="0" marL="0">
+              <a:buNone/>
+            </a:pPr>
+            <a:r>
+              <a:rPr/>
+              <a:t>MAD(5, 7, 3, 5, 7) = 1.28</a:t>
+            </a:r>
+          </a:p>
+          <a:p>
+            <a:pPr lvl="0" indent="0" marL="0">
+              <a:buNone/>
+            </a:pPr>
+            <a:r>
+              <a:rPr/>
+              <a:t>MAD(7, 2, 2, 2, 2) = 1.6</a:t>
+            </a:r>
+          </a:p>
+          <a:p>
+            <a:pPr lvl="0" indent="0" marL="0">
+              <a:buNone/>
+            </a:pPr>
+            <a:r>
+              <a:rPr/>
+              <a:t>…</a:t>
+            </a:r>
+          </a:p>
+          <a:p>
+            <a:pPr lvl="0" indent="0" marL="0">
+              <a:buNone/>
+            </a:pPr>
+            <a:r>
+              <a:rPr/>
+              <a:t>MAD(7, 7, 3, 2, 7) = 2.16</a:t>
             </a:r>
           </a:p>
         </p:txBody>
@@ -4283,7 +5144,44 @@
             </a:pPr>
             <a:r>
               <a:rPr/>
-              <a:t>Compute confidence intervals</a:t>
+              <a:t>Bradley Efron’s contribution (4/5)</a:t>
+            </a:r>
+          </a:p>
+        </p:txBody>
+      </p:sp>
+      <p:sp>
+        <p:nvSpPr>
+          <p:cNvPr id="3" name="Content Placeholder 2"/>
+          <p:cNvSpPr>
+            <a:spLocks noGrp="1"/>
+          </p:cNvSpPr>
+          <p:nvPr>
+            <p:ph idx="1"/>
+          </p:nvPr>
+        </p:nvSpPr>
+        <p:spPr/>
+        <p:txBody>
+          <a:bodyPr/>
+          <a:lstStyle/>
+          <a:p>
+            <a:pPr lvl="0"/>
+            <a:r>
+              <a:rPr/>
+              <a:t>MAD (Full sample) = 1.68</a:t>
+            </a:r>
+          </a:p>
+          <a:p>
+            <a:pPr lvl="0"/>
+            <a:r>
+              <a:rPr/>
+              <a:t>Average MAD (Bootstrap samples) = 1.405</a:t>
+            </a:r>
+          </a:p>
+          <a:p>
+            <a:pPr lvl="0"/>
+            <a:r>
+              <a:rPr/>
+              <a:t>Standard deviation MAD (Bootstrap samples) = 0.461</a:t>
             </a:r>
           </a:p>
         </p:txBody>
@@ -4330,7 +5228,67 @@
             </a:pPr>
             <a:r>
               <a:rPr/>
-              <a:t>Test hypotheses</a:t>
+              <a:t>Bradley Efron’s contribution (5/5)</a:t>
+            </a:r>
+          </a:p>
+        </p:txBody>
+      </p:sp>
+      <p:pic>
+        <p:nvPicPr>
+          <p:cNvPr descr="fig:  ../images/histogram01.png" id="0" name="Picture 1"/>
+          <p:cNvPicPr>
+            <a:picLocks noGrp="1" noChangeAspect="1"/>
+          </p:cNvPicPr>
+          <p:nvPr/>
+        </p:nvPicPr>
+        <p:blipFill>
+          <a:blip r:embed="rId3"/>
+          <a:stretch>
+            <a:fillRect/>
+          </a:stretch>
+        </p:blipFill>
+        <p:spPr bwMode="auto">
+          <a:xfrm>
+            <a:off x="3124200" y="1193800"/>
+            <a:ext cx="2882900" cy="2882900"/>
+          </a:xfrm>
+          <a:prstGeom prst="rect">
+            <a:avLst/>
+          </a:prstGeom>
+          <a:noFill/>
+          <a:ln w="9525">
+            <a:noFill/>
+            <a:headEnd/>
+            <a:tailEnd/>
+          </a:ln>
+        </p:spPr>
+      </p:pic>
+      <p:sp>
+        <p:nvSpPr>
+          <p:cNvPr id="1" name="TextBox 3"/>
+          <p:cNvSpPr txBox="1"/>
+          <p:nvPr/>
+        </p:nvSpPr>
+        <p:spPr>
+          <a:xfrm>
+            <a:off x="457200" y="4076700"/>
+            <a:ext cx="8229600" cy="508000"/>
+          </a:xfrm>
+          <a:prstGeom prst="rect">
+            <a:avLst/>
+          </a:prstGeom>
+          <a:noFill/>
+        </p:spPr>
+        <p:txBody>
+          <a:bodyPr/>
+          <a:lstStyle/>
+          <a:p>
+            <a:pPr lvl="0" indent="0" marL="0" algn="ctr">
+              <a:buNone/>
+            </a:pPr>
+            <a:r>
+              <a:rPr/>
+              <a:t>Figure 1. Histogram of bootstrapped estimates</a:t>
             </a:r>
           </a:p>
         </p:txBody>
@@ -4377,51 +5335,7 @@
             </a:pPr>
             <a:r>
               <a:rPr/>
-              <a:t>Break #2</a:t>
-            </a:r>
-          </a:p>
-        </p:txBody>
-      </p:sp>
-      <p:sp>
-        <p:nvSpPr>
-          <p:cNvPr id="3" name="Content Placeholder 2"/>
-          <p:cNvSpPr>
-            <a:spLocks noGrp="1"/>
-          </p:cNvSpPr>
-          <p:nvPr>
-            <p:ph idx="1"/>
-          </p:nvPr>
-        </p:nvSpPr>
-        <p:spPr/>
-        <p:txBody>
-          <a:bodyPr/>
-          <a:lstStyle/>
-          <a:p>
-            <a:pPr lvl="0"/>
-            <a:r>
-              <a:rPr/>
-              <a:t>What you have learned</a:t>
-            </a:r>
-          </a:p>
-          <a:p>
-            <a:pPr lvl="1"/>
-            <a:r>
-              <a:rPr/>
-              <a:t>Purposes of the bootstrap</a:t>
-            </a:r>
-          </a:p>
-          <a:p>
-            <a:pPr lvl="0"/>
-            <a:r>
-              <a:rPr/>
-              <a:t>What’s coming next</a:t>
-            </a:r>
-          </a:p>
-          <a:p>
-            <a:pPr lvl="1"/>
-            <a:r>
-              <a:rPr/>
-              <a:t>Mechanics</a:t>
+              <a:t>Bagging</a:t>
             </a:r>
           </a:p>
         </p:txBody>
@@ -4468,7 +5382,7 @@
             </a:pPr>
             <a:r>
               <a:rPr/>
-              <a:t>Mechanics</a:t>
+              <a:t>Break #1</a:t>
             </a:r>
           </a:p>
         </p:txBody>
@@ -4491,56 +5405,28 @@
             <a:pPr lvl="0"/>
             <a:r>
               <a:rPr/>
-              <a:t>Resampling</a:t>
+              <a:t>What have you learned</a:t>
+            </a:r>
+          </a:p>
+          <a:p>
+            <a:pPr lvl="1"/>
+            <a:r>
+              <a:rPr/>
+              <a:t>History of the bootstrap</a:t>
             </a:r>
           </a:p>
           <a:p>
             <a:pPr lvl="0"/>
             <a:r>
               <a:rPr/>
-              <a:t>Bootstrap estimates</a:t>
-            </a:r>
-          </a:p>
-          <a:p>
-            <a:pPr lvl="0"/>
-            <a:r>
-              <a:rPr/>
-              <a:t>Bias calculation</a:t>
-            </a:r>
-          </a:p>
-          <a:p>
-            <a:pPr lvl="0"/>
-            <a:r>
-              <a:rPr/>
-              <a:t>Standard error calculation</a:t>
-            </a:r>
-          </a:p>
-          <a:p>
-            <a:pPr lvl="0"/>
-            <a:r>
-              <a:rPr/>
-              <a:t>Confidence interval</a:t>
+              <a:t>What’s coming next</a:t>
             </a:r>
           </a:p>
           <a:p>
             <a:pPr lvl="1"/>
             <a:r>
               <a:rPr/>
-              <a:t>Percentile method</a:t>
-            </a:r>
-          </a:p>
-          <a:p>
-            <a:pPr lvl="1"/>
-            <a:r>
-              <a:rPr/>
-              <a:t>Bias corrected and adjusted method</a:t>
-            </a:r>
-          </a:p>
-          <a:p>
-            <a:pPr lvl="0"/>
-            <a:r>
-              <a:rPr/>
-              <a:t>Hypothesis tests</a:t>
+              <a:t>Reasons for using the bootstrap</a:t>
             </a:r>
           </a:p>
         </p:txBody>
@@ -4587,7 +5473,7 @@
             </a:pPr>
             <a:r>
               <a:rPr/>
-              <a:t>Break #3</a:t>
+              <a:t>Reasons for using the bootstrap</a:t>
             </a:r>
           </a:p>
         </p:txBody>
@@ -4610,28 +5496,28 @@
             <a:pPr lvl="0"/>
             <a:r>
               <a:rPr/>
-              <a:t>What have you learned</a:t>
-            </a:r>
-          </a:p>
-          <a:p>
-            <a:pPr lvl="1"/>
-            <a:r>
-              <a:rPr/>
-              <a:t>Mechanics</a:t>
+              <a:t>Estimate bias</a:t>
             </a:r>
           </a:p>
           <a:p>
             <a:pPr lvl="0"/>
             <a:r>
               <a:rPr/>
-              <a:t>What’s coming next</a:t>
-            </a:r>
-          </a:p>
-          <a:p>
-            <a:pPr lvl="1"/>
-            <a:r>
-              <a:rPr/>
-              <a:t>Software</a:t>
+              <a:t>Calculate standard errors</a:t>
+            </a:r>
+          </a:p>
+          <a:p>
+            <a:pPr lvl="0"/>
+            <a:r>
+              <a:rPr/>
+              <a:t>Compute confidence intervals</a:t>
+            </a:r>
+          </a:p>
+          <a:p>
+            <a:pPr lvl="0"/>
+            <a:r>
+              <a:rPr/>
+              <a:t>Test hypotheses</a:t>
             </a:r>
           </a:p>
         </p:txBody>
@@ -4678,7 +5564,7 @@
             </a:pPr>
             <a:r>
               <a:rPr/>
-              <a:t>Software</a:t>
+              <a:t>Estimate bias</a:t>
             </a:r>
           </a:p>
         </p:txBody>
@@ -4921,37 +5807,7 @@
             </a:pPr>
             <a:r>
               <a:rPr/>
-              <a:t>Special issues</a:t>
-            </a:r>
-          </a:p>
-        </p:txBody>
-      </p:sp>
-      <p:sp>
-        <p:nvSpPr>
-          <p:cNvPr id="3" name="Content Placeholder 2"/>
-          <p:cNvSpPr>
-            <a:spLocks noGrp="1"/>
-          </p:cNvSpPr>
-          <p:nvPr>
-            <p:ph idx="1"/>
-          </p:nvPr>
-        </p:nvSpPr>
-        <p:spPr/>
-        <p:txBody>
-          <a:bodyPr/>
-          <a:lstStyle/>
-          <a:p>
-            <a:pPr lvl="0"/>
-            <a:r>
-              <a:rPr/>
-              <a:t>Time series</a:t>
-            </a:r>
-          </a:p>
-          <a:p>
-            <a:pPr lvl="0"/>
-            <a:r>
-              <a:rPr/>
-              <a:t>Regression models</a:t>
+              <a:t>Calculate standard errors</a:t>
             </a:r>
           </a:p>
         </p:txBody>
@@ -4998,6 +5854,525 @@
             </a:pPr>
             <a:r>
               <a:rPr/>
+              <a:t>Compute confidence intervals</a:t>
+            </a:r>
+          </a:p>
+        </p:txBody>
+      </p:sp>
+    </p:spTree>
+  </p:cSld>
+</p:sld>
+</file>
+
+<file path=ppt/slides/slide22.xml><?xml version="1.0" encoding="utf-8"?>
+<p:sld xmlns:a="http://schemas.openxmlformats.org/drawingml/2006/main" xmlns:r="http://schemas.openxmlformats.org/officeDocument/2006/relationships" xmlns:p="http://schemas.openxmlformats.org/presentationml/2006/main">
+  <p:cSld>
+    <p:spTree>
+      <p:nvGrpSpPr>
+        <p:cNvPr id="1" name=""/>
+        <p:cNvGrpSpPr/>
+        <p:nvPr/>
+      </p:nvGrpSpPr>
+      <p:grpSpPr>
+        <a:xfrm>
+          <a:off x="0" y="0"/>
+          <a:ext cx="0" cy="0"/>
+          <a:chOff x="0" y="0"/>
+          <a:chExt cx="0" cy="0"/>
+        </a:xfrm>
+      </p:grpSpPr>
+      <p:sp>
+        <p:nvSpPr>
+          <p:cNvPr id="2" name="Title 1"/>
+          <p:cNvSpPr>
+            <a:spLocks noGrp="1"/>
+          </p:cNvSpPr>
+          <p:nvPr>
+            <p:ph type="title"/>
+          </p:nvPr>
+        </p:nvSpPr>
+        <p:spPr/>
+        <p:txBody>
+          <a:bodyPr/>
+          <a:lstStyle/>
+          <a:p>
+            <a:pPr lvl="0" indent="0" marL="0">
+              <a:buNone/>
+            </a:pPr>
+            <a:r>
+              <a:rPr/>
+              <a:t>Test hypotheses</a:t>
+            </a:r>
+          </a:p>
+        </p:txBody>
+      </p:sp>
+    </p:spTree>
+  </p:cSld>
+</p:sld>
+</file>
+
+<file path=ppt/slides/slide23.xml><?xml version="1.0" encoding="utf-8"?>
+<p:sld xmlns:a="http://schemas.openxmlformats.org/drawingml/2006/main" xmlns:r="http://schemas.openxmlformats.org/officeDocument/2006/relationships" xmlns:p="http://schemas.openxmlformats.org/presentationml/2006/main">
+  <p:cSld>
+    <p:spTree>
+      <p:nvGrpSpPr>
+        <p:cNvPr id="1" name=""/>
+        <p:cNvGrpSpPr/>
+        <p:nvPr/>
+      </p:nvGrpSpPr>
+      <p:grpSpPr>
+        <a:xfrm>
+          <a:off x="0" y="0"/>
+          <a:ext cx="0" cy="0"/>
+          <a:chOff x="0" y="0"/>
+          <a:chExt cx="0" cy="0"/>
+        </a:xfrm>
+      </p:grpSpPr>
+      <p:sp>
+        <p:nvSpPr>
+          <p:cNvPr id="2" name="Title 1"/>
+          <p:cNvSpPr>
+            <a:spLocks noGrp="1"/>
+          </p:cNvSpPr>
+          <p:nvPr>
+            <p:ph type="title"/>
+          </p:nvPr>
+        </p:nvSpPr>
+        <p:spPr/>
+        <p:txBody>
+          <a:bodyPr/>
+          <a:lstStyle/>
+          <a:p>
+            <a:pPr lvl="0" indent="0" marL="0">
+              <a:buNone/>
+            </a:pPr>
+            <a:r>
+              <a:rPr/>
+              <a:t>Break #2</a:t>
+            </a:r>
+          </a:p>
+        </p:txBody>
+      </p:sp>
+      <p:sp>
+        <p:nvSpPr>
+          <p:cNvPr id="3" name="Content Placeholder 2"/>
+          <p:cNvSpPr>
+            <a:spLocks noGrp="1"/>
+          </p:cNvSpPr>
+          <p:nvPr>
+            <p:ph idx="1"/>
+          </p:nvPr>
+        </p:nvSpPr>
+        <p:spPr/>
+        <p:txBody>
+          <a:bodyPr/>
+          <a:lstStyle/>
+          <a:p>
+            <a:pPr lvl="0"/>
+            <a:r>
+              <a:rPr/>
+              <a:t>What you have learned</a:t>
+            </a:r>
+          </a:p>
+          <a:p>
+            <a:pPr lvl="1"/>
+            <a:r>
+              <a:rPr/>
+              <a:t>Purposes of the bootstrap</a:t>
+            </a:r>
+          </a:p>
+          <a:p>
+            <a:pPr lvl="0"/>
+            <a:r>
+              <a:rPr/>
+              <a:t>What’s coming next</a:t>
+            </a:r>
+          </a:p>
+          <a:p>
+            <a:pPr lvl="1"/>
+            <a:r>
+              <a:rPr/>
+              <a:t>Mechanics</a:t>
+            </a:r>
+          </a:p>
+        </p:txBody>
+      </p:sp>
+    </p:spTree>
+  </p:cSld>
+</p:sld>
+</file>
+
+<file path=ppt/slides/slide24.xml><?xml version="1.0" encoding="utf-8"?>
+<p:sld xmlns:a="http://schemas.openxmlformats.org/drawingml/2006/main" xmlns:r="http://schemas.openxmlformats.org/officeDocument/2006/relationships" xmlns:p="http://schemas.openxmlformats.org/presentationml/2006/main">
+  <p:cSld>
+    <p:spTree>
+      <p:nvGrpSpPr>
+        <p:cNvPr id="1" name=""/>
+        <p:cNvGrpSpPr/>
+        <p:nvPr/>
+      </p:nvGrpSpPr>
+      <p:grpSpPr>
+        <a:xfrm>
+          <a:off x="0" y="0"/>
+          <a:ext cx="0" cy="0"/>
+          <a:chOff x="0" y="0"/>
+          <a:chExt cx="0" cy="0"/>
+        </a:xfrm>
+      </p:grpSpPr>
+      <p:sp>
+        <p:nvSpPr>
+          <p:cNvPr id="2" name="Title 1"/>
+          <p:cNvSpPr>
+            <a:spLocks noGrp="1"/>
+          </p:cNvSpPr>
+          <p:nvPr>
+            <p:ph type="title"/>
+          </p:nvPr>
+        </p:nvSpPr>
+        <p:spPr/>
+        <p:txBody>
+          <a:bodyPr/>
+          <a:lstStyle/>
+          <a:p>
+            <a:pPr lvl="0" indent="0" marL="0">
+              <a:buNone/>
+            </a:pPr>
+            <a:r>
+              <a:rPr/>
+              <a:t>Mechanics</a:t>
+            </a:r>
+          </a:p>
+        </p:txBody>
+      </p:sp>
+      <p:sp>
+        <p:nvSpPr>
+          <p:cNvPr id="3" name="Content Placeholder 2"/>
+          <p:cNvSpPr>
+            <a:spLocks noGrp="1"/>
+          </p:cNvSpPr>
+          <p:nvPr>
+            <p:ph idx="1"/>
+          </p:nvPr>
+        </p:nvSpPr>
+        <p:spPr/>
+        <p:txBody>
+          <a:bodyPr/>
+          <a:lstStyle/>
+          <a:p>
+            <a:pPr lvl="0"/>
+            <a:r>
+              <a:rPr/>
+              <a:t>Resampling</a:t>
+            </a:r>
+          </a:p>
+          <a:p>
+            <a:pPr lvl="0"/>
+            <a:r>
+              <a:rPr/>
+              <a:t>Bootstrap estimates</a:t>
+            </a:r>
+          </a:p>
+          <a:p>
+            <a:pPr lvl="0"/>
+            <a:r>
+              <a:rPr/>
+              <a:t>Bias calculation</a:t>
+            </a:r>
+          </a:p>
+          <a:p>
+            <a:pPr lvl="0"/>
+            <a:r>
+              <a:rPr/>
+              <a:t>Standard error calculation</a:t>
+            </a:r>
+          </a:p>
+          <a:p>
+            <a:pPr lvl="0"/>
+            <a:r>
+              <a:rPr/>
+              <a:t>Confidence interval</a:t>
+            </a:r>
+          </a:p>
+          <a:p>
+            <a:pPr lvl="1"/>
+            <a:r>
+              <a:rPr/>
+              <a:t>Percentile method</a:t>
+            </a:r>
+          </a:p>
+          <a:p>
+            <a:pPr lvl="1"/>
+            <a:r>
+              <a:rPr/>
+              <a:t>Bias corrected and adjusted method</a:t>
+            </a:r>
+          </a:p>
+          <a:p>
+            <a:pPr lvl="0"/>
+            <a:r>
+              <a:rPr/>
+              <a:t>Hypothesis tests</a:t>
+            </a:r>
+          </a:p>
+        </p:txBody>
+      </p:sp>
+    </p:spTree>
+  </p:cSld>
+</p:sld>
+</file>
+
+<file path=ppt/slides/slide25.xml><?xml version="1.0" encoding="utf-8"?>
+<p:sld xmlns:a="http://schemas.openxmlformats.org/drawingml/2006/main" xmlns:r="http://schemas.openxmlformats.org/officeDocument/2006/relationships" xmlns:p="http://schemas.openxmlformats.org/presentationml/2006/main">
+  <p:cSld>
+    <p:spTree>
+      <p:nvGrpSpPr>
+        <p:cNvPr id="1" name=""/>
+        <p:cNvGrpSpPr/>
+        <p:nvPr/>
+      </p:nvGrpSpPr>
+      <p:grpSpPr>
+        <a:xfrm>
+          <a:off x="0" y="0"/>
+          <a:ext cx="0" cy="0"/>
+          <a:chOff x="0" y="0"/>
+          <a:chExt cx="0" cy="0"/>
+        </a:xfrm>
+      </p:grpSpPr>
+      <p:sp>
+        <p:nvSpPr>
+          <p:cNvPr id="2" name="Title 1"/>
+          <p:cNvSpPr>
+            <a:spLocks noGrp="1"/>
+          </p:cNvSpPr>
+          <p:nvPr>
+            <p:ph type="title"/>
+          </p:nvPr>
+        </p:nvSpPr>
+        <p:spPr/>
+        <p:txBody>
+          <a:bodyPr/>
+          <a:lstStyle/>
+          <a:p>
+            <a:pPr lvl="0" indent="0" marL="0">
+              <a:buNone/>
+            </a:pPr>
+            <a:r>
+              <a:rPr/>
+              <a:t>Break #3</a:t>
+            </a:r>
+          </a:p>
+        </p:txBody>
+      </p:sp>
+      <p:sp>
+        <p:nvSpPr>
+          <p:cNvPr id="3" name="Content Placeholder 2"/>
+          <p:cNvSpPr>
+            <a:spLocks noGrp="1"/>
+          </p:cNvSpPr>
+          <p:nvPr>
+            <p:ph idx="1"/>
+          </p:nvPr>
+        </p:nvSpPr>
+        <p:spPr/>
+        <p:txBody>
+          <a:bodyPr/>
+          <a:lstStyle/>
+          <a:p>
+            <a:pPr lvl="0"/>
+            <a:r>
+              <a:rPr/>
+              <a:t>What have you learned</a:t>
+            </a:r>
+          </a:p>
+          <a:p>
+            <a:pPr lvl="1"/>
+            <a:r>
+              <a:rPr/>
+              <a:t>Mechanics</a:t>
+            </a:r>
+          </a:p>
+          <a:p>
+            <a:pPr lvl="0"/>
+            <a:r>
+              <a:rPr/>
+              <a:t>What’s coming next</a:t>
+            </a:r>
+          </a:p>
+          <a:p>
+            <a:pPr lvl="1"/>
+            <a:r>
+              <a:rPr/>
+              <a:t>Software</a:t>
+            </a:r>
+          </a:p>
+        </p:txBody>
+      </p:sp>
+    </p:spTree>
+  </p:cSld>
+</p:sld>
+</file>
+
+<file path=ppt/slides/slide26.xml><?xml version="1.0" encoding="utf-8"?>
+<p:sld xmlns:a="http://schemas.openxmlformats.org/drawingml/2006/main" xmlns:r="http://schemas.openxmlformats.org/officeDocument/2006/relationships" xmlns:p="http://schemas.openxmlformats.org/presentationml/2006/main">
+  <p:cSld>
+    <p:spTree>
+      <p:nvGrpSpPr>
+        <p:cNvPr id="1" name=""/>
+        <p:cNvGrpSpPr/>
+        <p:nvPr/>
+      </p:nvGrpSpPr>
+      <p:grpSpPr>
+        <a:xfrm>
+          <a:off x="0" y="0"/>
+          <a:ext cx="0" cy="0"/>
+          <a:chOff x="0" y="0"/>
+          <a:chExt cx="0" cy="0"/>
+        </a:xfrm>
+      </p:grpSpPr>
+      <p:sp>
+        <p:nvSpPr>
+          <p:cNvPr id="2" name="Title 1"/>
+          <p:cNvSpPr>
+            <a:spLocks noGrp="1"/>
+          </p:cNvSpPr>
+          <p:nvPr>
+            <p:ph type="title"/>
+          </p:nvPr>
+        </p:nvSpPr>
+        <p:spPr/>
+        <p:txBody>
+          <a:bodyPr/>
+          <a:lstStyle/>
+          <a:p>
+            <a:pPr lvl="0" indent="0" marL="0">
+              <a:buNone/>
+            </a:pPr>
+            <a:r>
+              <a:rPr/>
+              <a:t>Software</a:t>
+            </a:r>
+          </a:p>
+        </p:txBody>
+      </p:sp>
+    </p:spTree>
+  </p:cSld>
+</p:sld>
+</file>
+
+<file path=ppt/slides/slide27.xml><?xml version="1.0" encoding="utf-8"?>
+<p:sld xmlns:a="http://schemas.openxmlformats.org/drawingml/2006/main" xmlns:r="http://schemas.openxmlformats.org/officeDocument/2006/relationships" xmlns:p="http://schemas.openxmlformats.org/presentationml/2006/main">
+  <p:cSld>
+    <p:spTree>
+      <p:nvGrpSpPr>
+        <p:cNvPr id="1" name=""/>
+        <p:cNvGrpSpPr/>
+        <p:nvPr/>
+      </p:nvGrpSpPr>
+      <p:grpSpPr>
+        <a:xfrm>
+          <a:off x="0" y="0"/>
+          <a:ext cx="0" cy="0"/>
+          <a:chOff x="0" y="0"/>
+          <a:chExt cx="0" cy="0"/>
+        </a:xfrm>
+      </p:grpSpPr>
+      <p:sp>
+        <p:nvSpPr>
+          <p:cNvPr id="2" name="Title 1"/>
+          <p:cNvSpPr>
+            <a:spLocks noGrp="1"/>
+          </p:cNvSpPr>
+          <p:nvPr>
+            <p:ph type="title"/>
+          </p:nvPr>
+        </p:nvSpPr>
+        <p:spPr/>
+        <p:txBody>
+          <a:bodyPr/>
+          <a:lstStyle/>
+          <a:p>
+            <a:pPr lvl="0" indent="0" marL="0">
+              <a:buNone/>
+            </a:pPr>
+            <a:r>
+              <a:rPr/>
+              <a:t>Special issues</a:t>
+            </a:r>
+          </a:p>
+        </p:txBody>
+      </p:sp>
+      <p:sp>
+        <p:nvSpPr>
+          <p:cNvPr id="3" name="Content Placeholder 2"/>
+          <p:cNvSpPr>
+            <a:spLocks noGrp="1"/>
+          </p:cNvSpPr>
+          <p:nvPr>
+            <p:ph idx="1"/>
+          </p:nvPr>
+        </p:nvSpPr>
+        <p:spPr/>
+        <p:txBody>
+          <a:bodyPr/>
+          <a:lstStyle/>
+          <a:p>
+            <a:pPr lvl="0"/>
+            <a:r>
+              <a:rPr/>
+              <a:t>Time series</a:t>
+            </a:r>
+          </a:p>
+          <a:p>
+            <a:pPr lvl="0"/>
+            <a:r>
+              <a:rPr/>
+              <a:t>Regression models</a:t>
+            </a:r>
+          </a:p>
+        </p:txBody>
+      </p:sp>
+    </p:spTree>
+  </p:cSld>
+</p:sld>
+</file>
+
+<file path=ppt/slides/slide28.xml><?xml version="1.0" encoding="utf-8"?>
+<p:sld xmlns:a="http://schemas.openxmlformats.org/drawingml/2006/main" xmlns:r="http://schemas.openxmlformats.org/officeDocument/2006/relationships" xmlns:p="http://schemas.openxmlformats.org/presentationml/2006/main">
+  <p:cSld>
+    <p:spTree>
+      <p:nvGrpSpPr>
+        <p:cNvPr id="1" name=""/>
+        <p:cNvGrpSpPr/>
+        <p:nvPr/>
+      </p:nvGrpSpPr>
+      <p:grpSpPr>
+        <a:xfrm>
+          <a:off x="0" y="0"/>
+          <a:ext cx="0" cy="0"/>
+          <a:chOff x="0" y="0"/>
+          <a:chExt cx="0" cy="0"/>
+        </a:xfrm>
+      </p:grpSpPr>
+      <p:sp>
+        <p:nvSpPr>
+          <p:cNvPr id="2" name="Title 1"/>
+          <p:cNvSpPr>
+            <a:spLocks noGrp="1"/>
+          </p:cNvSpPr>
+          <p:nvPr>
+            <p:ph type="title"/>
+          </p:nvPr>
+        </p:nvSpPr>
+        <p:spPr/>
+        <p:txBody>
+          <a:bodyPr/>
+          <a:lstStyle/>
+          <a:p>
+            <a:pPr lvl="0" indent="0" marL="0">
+              <a:buNone/>
+            </a:pPr>
+            <a:r>
+              <a:rPr/>
               <a:t>Summary</a:t>
             </a:r>
           </a:p>
@@ -5112,6 +6487,13 @@
             <a:pPr lvl="0"/>
             <a:r>
               <a:rPr/>
+              <a:t>Can you rely on asymptotic normality?</a:t>
+            </a:r>
+          </a:p>
+          <a:p>
+            <a:pPr lvl="0"/>
+            <a:r>
+              <a:rPr/>
               <a:t>The jackknife</a:t>
             </a:r>
           </a:p>
@@ -5137,6 +6519,877 @@
 </file>
 
 <file path=ppt/slides/slide4.xml><?xml version="1.0" encoding="utf-8"?>
+<p:sld xmlns:a="http://schemas.openxmlformats.org/drawingml/2006/main" xmlns:r="http://schemas.openxmlformats.org/officeDocument/2006/relationships" xmlns:p="http://schemas.openxmlformats.org/presentationml/2006/main">
+  <p:cSld>
+    <p:spTree>
+      <p:nvGrpSpPr>
+        <p:cNvPr id="1" name=""/>
+        <p:cNvGrpSpPr/>
+        <p:nvPr/>
+      </p:nvGrpSpPr>
+      <p:grpSpPr>
+        <a:xfrm>
+          <a:off x="0" y="0"/>
+          <a:ext cx="0" cy="0"/>
+          <a:chOff x="0" y="0"/>
+          <a:chExt cx="0" cy="0"/>
+        </a:xfrm>
+      </p:grpSpPr>
+      <p:sp>
+        <p:nvSpPr>
+          <p:cNvPr id="2" name="Title 1"/>
+          <p:cNvSpPr>
+            <a:spLocks noGrp="1"/>
+          </p:cNvSpPr>
+          <p:nvPr>
+            <p:ph type="title"/>
+          </p:nvPr>
+        </p:nvSpPr>
+        <p:spPr/>
+        <p:txBody>
+          <a:bodyPr/>
+          <a:lstStyle/>
+          <a:p>
+            <a:pPr lvl="0" indent="0" marL="0">
+              <a:buNone/>
+            </a:pPr>
+            <a:r>
+              <a:rPr/>
+              <a:t>Can we rely on asymptotic normality? (1/4)</a:t>
+            </a:r>
+          </a:p>
+        </p:txBody>
+      </p:sp>
+      <p:pic>
+        <p:nvPicPr>
+          <p:cNvPr descr="fig:  ../images/serfling-book-cover.jpg" id="0" name="Picture 1"/>
+          <p:cNvPicPr>
+            <a:picLocks noGrp="1" noChangeAspect="1"/>
+          </p:cNvPicPr>
+          <p:nvPr/>
+        </p:nvPicPr>
+        <p:blipFill>
+          <a:blip r:embed="rId3"/>
+          <a:stretch>
+            <a:fillRect/>
+          </a:stretch>
+        </p:blipFill>
+        <p:spPr bwMode="auto">
+          <a:xfrm>
+            <a:off x="3619500" y="1193800"/>
+            <a:ext cx="1905000" cy="2882900"/>
+          </a:xfrm>
+          <a:prstGeom prst="rect">
+            <a:avLst/>
+          </a:prstGeom>
+          <a:noFill/>
+          <a:ln w="9525">
+            <a:noFill/>
+            <a:headEnd/>
+            <a:tailEnd/>
+          </a:ln>
+        </p:spPr>
+      </p:pic>
+      <p:sp>
+        <p:nvSpPr>
+          <p:cNvPr id="1" name="TextBox 3"/>
+          <p:cNvSpPr txBox="1"/>
+          <p:nvPr/>
+        </p:nvSpPr>
+        <p:spPr>
+          <a:xfrm>
+            <a:off x="457200" y="4076700"/>
+            <a:ext cx="8229600" cy="508000"/>
+          </a:xfrm>
+          <a:prstGeom prst="rect">
+            <a:avLst/>
+          </a:prstGeom>
+          <a:noFill/>
+        </p:spPr>
+        <p:txBody>
+          <a:bodyPr/>
+          <a:lstStyle/>
+          <a:p>
+            <a:pPr lvl="0" indent="0" marL="0" algn="ctr">
+              <a:buNone/>
+            </a:pPr>
+            <a:r>
+              <a:rPr/>
+              <a:t>Figure 1. Cover of book by Robert Serfling</a:t>
+            </a:r>
+          </a:p>
+        </p:txBody>
+      </p:sp>
+    </p:spTree>
+  </p:cSld>
+</p:sld>
+</file>
+
+<file path=ppt/slides/slide5.xml><?xml version="1.0" encoding="utf-8"?>
+<p:sld xmlns:a="http://schemas.openxmlformats.org/drawingml/2006/main" xmlns:r="http://schemas.openxmlformats.org/officeDocument/2006/relationships" xmlns:p="http://schemas.openxmlformats.org/presentationml/2006/main">
+  <p:cSld>
+    <p:spTree>
+      <p:nvGrpSpPr>
+        <p:cNvPr id="1" name=""/>
+        <p:cNvGrpSpPr/>
+        <p:nvPr/>
+      </p:nvGrpSpPr>
+      <p:grpSpPr>
+        <a:xfrm>
+          <a:off x="0" y="0"/>
+          <a:ext cx="0" cy="0"/>
+          <a:chOff x="0" y="0"/>
+          <a:chExt cx="0" cy="0"/>
+        </a:xfrm>
+      </p:grpSpPr>
+      <p:sp>
+        <p:nvSpPr>
+          <p:cNvPr id="2" name="Title 1"/>
+          <p:cNvSpPr>
+            <a:spLocks noGrp="1"/>
+          </p:cNvSpPr>
+          <p:nvPr>
+            <p:ph type="title"/>
+          </p:nvPr>
+        </p:nvSpPr>
+        <p:spPr/>
+        <p:txBody>
+          <a:bodyPr/>
+          <a:lstStyle/>
+          <a:p>
+            <a:pPr lvl="0" indent="0" marL="0">
+              <a:buNone/>
+            </a:pPr>
+            <a:r>
+              <a:rPr/>
+              <a:t>Can we rely on asymptotic normality? (2/4)</a:t>
+            </a:r>
+          </a:p>
+        </p:txBody>
+      </p:sp>
+      <mc:AlternateContent xmlns:mc="http://schemas.openxmlformats.org/markup-compatibility/2006">
+        <mc:Choice xmlns:a14="http://schemas.microsoft.com/office/drawing/2010/main" Requires="a14">
+          <p:sp>
+            <p:nvSpPr>
+              <p:cNvPr id="3" name="Content Placeholder 2"/>
+              <p:cNvSpPr>
+                <a:spLocks noGrp="1"/>
+              </p:cNvSpPr>
+              <p:nvPr>
+                <p:ph idx="1"/>
+              </p:nvPr>
+            </p:nvSpPr>
+            <p:spPr/>
+            <p:txBody>
+              <a:bodyPr/>
+              <a:lstStyle/>
+              <a:p>
+                <a:pPr lvl="0" indent="0" marL="0">
+                  <a:buNone/>
+                </a:pPr>
+                <a14:m>
+                  <m:oMath xmlns:m="http://schemas.openxmlformats.org/officeDocument/2006/math">
+                    <m:acc>
+                      <m:accPr>
+                        <m:chr m:val="‾"/>
+                      </m:accPr>
+                      <m:e>
+                        <m:r>
+                          <m:t>X</m:t>
+                        </m:r>
+                      </m:e>
+                    </m:acc>
+                    <m:r>
+                      <m:rPr>
+                        <m:sty m:val="p"/>
+                      </m:rPr>
+                      <m:t>=</m:t>
+                    </m:r>
+                    <m:f>
+                      <m:fPr>
+                        <m:type m:val="bar"/>
+                      </m:fPr>
+                      <m:num>
+                        <m:r>
+                          <m:t>1</m:t>
+                        </m:r>
+                      </m:num>
+                      <m:den>
+                        <m:r>
+                          <m:t>n</m:t>
+                        </m:r>
+                      </m:den>
+                    </m:f>
+                    <m:r>
+                      <m:t>Σ</m:t>
+                    </m:r>
+                    <m:sSub>
+                      <m:e>
+                        <m:r>
+                          <m:t>X</m:t>
+                        </m:r>
+                      </m:e>
+                      <m:sub>
+                        <m:r>
+                          <m:t>i</m:t>
+                        </m:r>
+                      </m:sub>
+                    </m:sSub>
+                  </m:oMath>
+                </a14:m>
+                <a:r>
+                  <a:rPr/>
+                  <a:t> is approximately normal if</a:t>
+                </a:r>
+              </a:p>
+              <a:p>
+                <a:pPr lvl="0"/>
+                <a:r>
+                  <a:rPr/>
+                  <a:t>The </a:t>
+                </a:r>
+                <a14:m>
+                  <m:oMath xmlns:m="http://schemas.openxmlformats.org/officeDocument/2006/math">
+                    <m:sSub>
+                      <m:e>
+                        <m:r>
+                          <m:t>X</m:t>
+                        </m:r>
+                      </m:e>
+                      <m:sub>
+                        <m:r>
+                          <m:t>i</m:t>
+                        </m:r>
+                      </m:sub>
+                    </m:sSub>
+                  </m:oMath>
+                </a14:m>
+                <a:r>
+                  <a:rPr/>
+                  <a:t> all come from the same distribution</a:t>
+                </a:r>
+              </a:p>
+              <a:p>
+                <a:pPr lvl="0"/>
+                <a:r>
+                  <a:rPr/>
+                  <a:t>The </a:t>
+                </a:r>
+                <a14:m>
+                  <m:oMath xmlns:m="http://schemas.openxmlformats.org/officeDocument/2006/math">
+                    <m:sSub>
+                      <m:e>
+                        <m:r>
+                          <m:t>X</m:t>
+                        </m:r>
+                      </m:e>
+                      <m:sub>
+                        <m:r>
+                          <m:t>i</m:t>
+                        </m:r>
+                      </m:sub>
+                    </m:sSub>
+                  </m:oMath>
+                </a14:m>
+                <a:r>
+                  <a:rPr/>
+                  <a:t>’s are all independent</a:t>
+                </a:r>
+              </a:p>
+              <a:p>
+                <a:pPr lvl="0"/>
+                <a:r>
+                  <a:rPr/>
+                  <a:t>The </a:t>
+                </a:r>
+                <a14:m>
+                  <m:oMath xmlns:m="http://schemas.openxmlformats.org/officeDocument/2006/math">
+                    <m:sSub>
+                      <m:e>
+                        <m:r>
+                          <m:t>X</m:t>
+                        </m:r>
+                      </m:e>
+                      <m:sub>
+                        <m:r>
+                          <m:t>i</m:t>
+                        </m:r>
+                      </m:sub>
+                    </m:sSub>
+                  </m:oMath>
+                </a14:m>
+                <a:r>
+                  <a:rPr/>
+                  <a:t> have a finite second moment</a:t>
+                </a:r>
+              </a:p>
+              <a:p>
+                <a:pPr lvl="0" indent="0" marL="0">
+                  <a:buNone/>
+                </a:pPr>
+                <a:r>
+                  <a:rPr/>
+                  <a:t>A more precise statement</a:t>
+                </a:r>
+              </a:p>
+              <a:p>
+                <a:pPr lvl="0"/>
+                <a14:m>
+                  <m:oMath xmlns:m="http://schemas.openxmlformats.org/officeDocument/2006/math">
+                    <m:r>
+                      <m:t>l</m:t>
+                    </m:r>
+                    <m:r>
+                      <m:t>i</m:t>
+                    </m:r>
+                    <m:sSub>
+                      <m:e>
+                        <m:r>
+                          <m:t>m</m:t>
+                        </m:r>
+                      </m:e>
+                      <m:sub>
+                        <m:r>
+                          <m:t>n</m:t>
+                        </m:r>
+                        <m:r>
+                          <m:rPr>
+                            <m:sty m:val="p"/>
+                          </m:rPr>
+                          <m:t>→</m:t>
+                        </m:r>
+                        <m:r>
+                          <m:rPr>
+                            <m:sty m:val="p"/>
+                          </m:rPr>
+                          <m:t>∞</m:t>
+                        </m:r>
+                      </m:sub>
+                    </m:sSub>
+                    <m:r>
+                      <m:t> </m:t>
+                    </m:r>
+                    <m:f>
+                      <m:fPr>
+                        <m:type m:val="bar"/>
+                      </m:fPr>
+                      <m:num>
+                        <m:acc>
+                          <m:accPr>
+                            <m:chr m:val="‾"/>
+                          </m:accPr>
+                          <m:e>
+                            <m:r>
+                              <m:t>X</m:t>
+                            </m:r>
+                          </m:e>
+                        </m:acc>
+                        <m:r>
+                          <m:rPr>
+                            <m:sty m:val="p"/>
+                          </m:rPr>
+                          <m:t>−</m:t>
+                        </m:r>
+                        <m:r>
+                          <m:t>μ</m:t>
+                        </m:r>
+                      </m:num>
+                      <m:den>
+                        <m:r>
+                          <m:t>σ</m:t>
+                        </m:r>
+                        <m:r>
+                          <m:rPr>
+                            <m:sty m:val="p"/>
+                          </m:rPr>
+                          <m:t>/</m:t>
+                        </m:r>
+                        <m:rad>
+                          <m:radPr>
+                            <m:degHide m:val="1"/>
+                          </m:radPr>
+                          <m:deg/>
+                          <m:e>
+                            <m:r>
+                              <m:t>n</m:t>
+                            </m:r>
+                          </m:e>
+                        </m:rad>
+                      </m:den>
+                    </m:f>
+                    <m:r>
+                      <m:rPr>
+                        <m:sty m:val="p"/>
+                      </m:rPr>
+                      <m:t>=</m:t>
+                    </m:r>
+                    <m:r>
+                      <m:t>N</m:t>
+                    </m:r>
+                    <m:d>
+                      <m:dPr>
+                        <m:begChr m:val="("/>
+                        <m:endChr m:val=")"/>
+                        <m:sepChr m:val=""/>
+                        <m:grow/>
+                      </m:dPr>
+                      <m:e>
+                        <m:r>
+                          <m:t>0</m:t>
+                        </m:r>
+                        <m:r>
+                          <m:rPr>
+                            <m:sty m:val="p"/>
+                          </m:rPr>
+                          <m:t>,</m:t>
+                        </m:r>
+                        <m:r>
+                          <m:t>1</m:t>
+                        </m:r>
+                      </m:e>
+                    </m:d>
+                  </m:oMath>
+                </a14:m>
+              </a:p>
+            </p:txBody>
+          </p:sp>
+        </mc:Choice>
+      </mc:AlternateContent>
+    </p:spTree>
+  </p:cSld>
+</p:sld>
+</file>
+
+<file path=ppt/slides/slide6.xml><?xml version="1.0" encoding="utf-8"?>
+<p:sld xmlns:a="http://schemas.openxmlformats.org/drawingml/2006/main" xmlns:r="http://schemas.openxmlformats.org/officeDocument/2006/relationships" xmlns:p="http://schemas.openxmlformats.org/presentationml/2006/main">
+  <p:cSld>
+    <p:spTree>
+      <p:nvGrpSpPr>
+        <p:cNvPr id="1" name=""/>
+        <p:cNvGrpSpPr/>
+        <p:nvPr/>
+      </p:nvGrpSpPr>
+      <p:grpSpPr>
+        <a:xfrm>
+          <a:off x="0" y="0"/>
+          <a:ext cx="0" cy="0"/>
+          <a:chOff x="0" y="0"/>
+          <a:chExt cx="0" cy="0"/>
+        </a:xfrm>
+      </p:grpSpPr>
+      <p:sp>
+        <p:nvSpPr>
+          <p:cNvPr id="2" name="Title 1"/>
+          <p:cNvSpPr>
+            <a:spLocks noGrp="1"/>
+          </p:cNvSpPr>
+          <p:nvPr>
+            <p:ph type="title"/>
+          </p:nvPr>
+        </p:nvSpPr>
+        <p:spPr/>
+        <p:txBody>
+          <a:bodyPr/>
+          <a:lstStyle/>
+          <a:p>
+            <a:pPr lvl="0" indent="0" marL="0">
+              <a:buNone/>
+            </a:pPr>
+            <a:r>
+              <a:rPr/>
+              <a:t>Can we rely on asymptotic normality? (3/4)</a:t>
+            </a:r>
+          </a:p>
+        </p:txBody>
+      </p:sp>
+      <mc:AlternateContent xmlns:mc="http://schemas.openxmlformats.org/markup-compatibility/2006">
+        <mc:Choice xmlns:a14="http://schemas.microsoft.com/office/drawing/2010/main" Requires="a14">
+          <p:sp>
+            <p:nvSpPr>
+              <p:cNvPr id="3" name="Content Placeholder 2"/>
+              <p:cNvSpPr>
+                <a:spLocks noGrp="1"/>
+              </p:cNvSpPr>
+              <p:nvPr>
+                <p:ph idx="1"/>
+              </p:nvPr>
+            </p:nvSpPr>
+            <p:spPr/>
+            <p:txBody>
+              <a:bodyPr/>
+              <a:lstStyle/>
+              <a:p>
+                <a:pPr lvl="0" indent="0" marL="0">
+                  <a:buNone/>
+                </a:pPr>
+                <a:r>
+                  <a:rPr/>
+                  <a:t>Furthermore,</a:t>
+                </a:r>
+              </a:p>
+              <a:p>
+                <a:pPr lvl="0" indent="0" marL="0">
+                  <a:buNone/>
+                </a:pPr>
+                <a14:m>
+                  <m:oMath xmlns:m="http://schemas.openxmlformats.org/officeDocument/2006/math">
+                    <m:r>
+                      <m:t>E</m:t>
+                    </m:r>
+                    <m:d>
+                      <m:dPr>
+                        <m:begChr m:val="["/>
+                        <m:endChr m:val="]"/>
+                        <m:sepChr m:val=""/>
+                        <m:grow/>
+                      </m:dPr>
+                      <m:e>
+                        <m:acc>
+                          <m:accPr>
+                            <m:chr m:val="‾"/>
+                          </m:accPr>
+                          <m:e>
+                            <m:r>
+                              <m:t>X</m:t>
+                            </m:r>
+                          </m:e>
+                        </m:acc>
+                      </m:e>
+                    </m:d>
+                    <m:r>
+                      <m:rPr>
+                        <m:sty m:val="p"/>
+                      </m:rPr>
+                      <m:t>=</m:t>
+                    </m:r>
+                    <m:r>
+                      <m:t>μ</m:t>
+                    </m:r>
+                  </m:oMath>
+                </a14:m>
+              </a:p>
+              <a:p>
+                <a:pPr lvl="0" indent="0" marL="0">
+                  <a:buNone/>
+                </a:pPr>
+                <a14:m>
+                  <m:oMath xmlns:m="http://schemas.openxmlformats.org/officeDocument/2006/math">
+                    <m:r>
+                      <m:t>V</m:t>
+                    </m:r>
+                    <m:r>
+                      <m:t>a</m:t>
+                    </m:r>
+                    <m:r>
+                      <m:t>r</m:t>
+                    </m:r>
+                    <m:d>
+                      <m:dPr>
+                        <m:begChr m:val="("/>
+                        <m:endChr m:val=")"/>
+                        <m:sepChr m:val=""/>
+                        <m:grow/>
+                      </m:dPr>
+                      <m:e>
+                        <m:acc>
+                          <m:accPr>
+                            <m:chr m:val="‾"/>
+                          </m:accPr>
+                          <m:e>
+                            <m:r>
+                              <m:t>X</m:t>
+                            </m:r>
+                          </m:e>
+                        </m:acc>
+                      </m:e>
+                    </m:d>
+                    <m:r>
+                      <m:rPr>
+                        <m:sty m:val="p"/>
+                      </m:rPr>
+                      <m:t>=</m:t>
+                    </m:r>
+                    <m:f>
+                      <m:fPr>
+                        <m:type m:val="bar"/>
+                      </m:fPr>
+                      <m:num>
+                        <m:sSup>
+                          <m:e>
+                            <m:r>
+                              <m:t>σ</m:t>
+                            </m:r>
+                          </m:e>
+                          <m:sup>
+                            <m:r>
+                              <m:t>2</m:t>
+                            </m:r>
+                          </m:sup>
+                        </m:sSup>
+                      </m:num>
+                      <m:den>
+                        <m:r>
+                          <m:t>n</m:t>
+                        </m:r>
+                      </m:den>
+                    </m:f>
+                  </m:oMath>
+                </a14:m>
+              </a:p>
+            </p:txBody>
+          </p:sp>
+        </mc:Choice>
+      </mc:AlternateContent>
+    </p:spTree>
+  </p:cSld>
+</p:sld>
+</file>
+
+<file path=ppt/slides/slide7.xml><?xml version="1.0" encoding="utf-8"?>
+<p:sld xmlns:a="http://schemas.openxmlformats.org/drawingml/2006/main" xmlns:r="http://schemas.openxmlformats.org/officeDocument/2006/relationships" xmlns:p="http://schemas.openxmlformats.org/presentationml/2006/main">
+  <p:cSld>
+    <p:spTree>
+      <p:nvGrpSpPr>
+        <p:cNvPr id="1" name=""/>
+        <p:cNvGrpSpPr/>
+        <p:nvPr/>
+      </p:nvGrpSpPr>
+      <p:grpSpPr>
+        <a:xfrm>
+          <a:off x="0" y="0"/>
+          <a:ext cx="0" cy="0"/>
+          <a:chOff x="0" y="0"/>
+          <a:chExt cx="0" cy="0"/>
+        </a:xfrm>
+      </p:grpSpPr>
+      <p:sp>
+        <p:nvSpPr>
+          <p:cNvPr id="2" name="Title 1"/>
+          <p:cNvSpPr>
+            <a:spLocks noGrp="1"/>
+          </p:cNvSpPr>
+          <p:nvPr>
+            <p:ph type="title"/>
+          </p:nvPr>
+        </p:nvSpPr>
+        <p:spPr/>
+        <p:txBody>
+          <a:bodyPr/>
+          <a:lstStyle/>
+          <a:p>
+            <a:pPr lvl="0" indent="0" marL="0">
+              <a:buNone/>
+            </a:pPr>
+            <a:r>
+              <a:rPr/>
+              <a:t>Can we rely on asymptotic normality? (4/4)</a:t>
+            </a:r>
+          </a:p>
+        </p:txBody>
+      </p:sp>
+      <mc:AlternateContent xmlns:mc="http://schemas.openxmlformats.org/markup-compatibility/2006">
+        <mc:Choice xmlns:a14="http://schemas.microsoft.com/office/drawing/2010/main" Requires="a14">
+          <p:sp>
+            <p:nvSpPr>
+              <p:cNvPr id="3" name="Content Placeholder 2"/>
+              <p:cNvSpPr>
+                <a:spLocks noGrp="1"/>
+              </p:cNvSpPr>
+              <p:nvPr>
+                <p:ph idx="1"/>
+              </p:nvPr>
+            </p:nvSpPr>
+            <p:spPr/>
+            <p:txBody>
+              <a:bodyPr/>
+              <a:lstStyle/>
+              <a:p>
+                <a:pPr lvl="0" indent="0" marL="0">
+                  <a:buNone/>
+                </a:pPr>
+                <a:r>
+                  <a:rPr/>
+                  <a:t>What about:</a:t>
+                </a:r>
+              </a:p>
+              <a:p>
+                <a:pPr lvl="0" indent="0" marL="0">
+                  <a:buNone/>
+                </a:pPr>
+                <a14:m>
+                  <m:oMath xmlns:m="http://schemas.openxmlformats.org/officeDocument/2006/math">
+                    <m:r>
+                      <m:t>M</m:t>
+                    </m:r>
+                    <m:r>
+                      <m:t>A</m:t>
+                    </m:r>
+                    <m:r>
+                      <m:t>D</m:t>
+                    </m:r>
+                    <m:d>
+                      <m:dPr>
+                        <m:begChr m:val="("/>
+                        <m:endChr m:val=")"/>
+                        <m:sepChr m:val=""/>
+                        <m:grow/>
+                      </m:dPr>
+                      <m:e>
+                        <m:r>
+                          <m:t>X</m:t>
+                        </m:r>
+                      </m:e>
+                    </m:d>
+                    <m:r>
+                      <m:rPr>
+                        <m:sty m:val="p"/>
+                      </m:rPr>
+                      <m:t>=</m:t>
+                    </m:r>
+                    <m:f>
+                      <m:fPr>
+                        <m:type m:val="bar"/>
+                      </m:fPr>
+                      <m:num>
+                        <m:r>
+                          <m:t>1</m:t>
+                        </m:r>
+                      </m:num>
+                      <m:den>
+                        <m:r>
+                          <m:t>n</m:t>
+                        </m:r>
+                      </m:den>
+                    </m:f>
+                    <m:r>
+                      <m:t>Σ</m:t>
+                    </m:r>
+                    <m:d>
+                      <m:dPr>
+                        <m:begChr m:val="|"/>
+                        <m:endChr m:val="|"/>
+                        <m:sepChr m:val=""/>
+                        <m:grow/>
+                      </m:dPr>
+                      <m:e>
+                        <m:sSub>
+                          <m:e>
+                            <m:r>
+                              <m:t>X</m:t>
+                            </m:r>
+                          </m:e>
+                          <m:sub>
+                            <m:r>
+                              <m:t>i</m:t>
+                            </m:r>
+                          </m:sub>
+                        </m:sSub>
+                        <m:r>
+                          <m:rPr>
+                            <m:sty m:val="p"/>
+                          </m:rPr>
+                          <m:t>−</m:t>
+                        </m:r>
+                        <m:acc>
+                          <m:accPr>
+                            <m:chr m:val="‾"/>
+                          </m:accPr>
+                          <m:e>
+                            <m:r>
+                              <m:t>X</m:t>
+                            </m:r>
+                          </m:e>
+                        </m:acc>
+                      </m:e>
+                    </m:d>
+                  </m:oMath>
+                </a14:m>
+              </a:p>
+              <a:p>
+                <a:pPr lvl="0" indent="0" marL="0">
+                  <a:buNone/>
+                </a:pPr>
+                <a14:m>
+                  <m:oMath xmlns:m="http://schemas.openxmlformats.org/officeDocument/2006/math">
+                    <m:r>
+                      <m:t>I</m:t>
+                    </m:r>
+                    <m:r>
+                      <m:t>Q</m:t>
+                    </m:r>
+                    <m:r>
+                      <m:t>R</m:t>
+                    </m:r>
+                    <m:r>
+                      <m:rPr>
+                        <m:sty m:val="p"/>
+                      </m:rPr>
+                      <m:t>=</m:t>
+                    </m:r>
+                    <m:sSub>
+                      <m:e>
+                        <m:r>
+                          <m:t>X</m:t>
+                        </m:r>
+                      </m:e>
+                      <m:sub>
+                        <m:r>
+                          <m:t>.75</m:t>
+                        </m:r>
+                      </m:sub>
+                    </m:sSub>
+                    <m:r>
+                      <m:rPr>
+                        <m:sty m:val="p"/>
+                      </m:rPr>
+                      <m:t>−</m:t>
+                    </m:r>
+                    <m:sSub>
+                      <m:e>
+                        <m:r>
+                          <m:t>X</m:t>
+                        </m:r>
+                      </m:e>
+                      <m:sub>
+                        <m:r>
+                          <m:t>.25</m:t>
+                        </m:r>
+                      </m:sub>
+                    </m:sSub>
+                  </m:oMath>
+                </a14:m>
+              </a:p>
+              <a:p>
+                <a:pPr lvl="0" indent="0" marL="0">
+                  <a:buNone/>
+                </a:pPr>
+                <a14:m>
+                  <m:oMath xmlns:m="http://schemas.openxmlformats.org/officeDocument/2006/math">
+                    <m:r>
+                      <m:t>n</m:t>
+                    </m:r>
+                    <m:r>
+                      <m:rPr>
+                        <m:sty m:val="p"/>
+                      </m:rPr>
+                      <m:t>&lt;</m:t>
+                    </m:r>
+                    <m:r>
+                      <m:t>30</m:t>
+                    </m:r>
+                  </m:oMath>
+                </a14:m>
+              </a:p>
+            </p:txBody>
+          </p:sp>
+        </mc:Choice>
+      </mc:AlternateContent>
+    </p:spTree>
+  </p:cSld>
+</p:sld>
+</file>
+
+<file path=ppt/slides/slide8.xml><?xml version="1.0" encoding="utf-8"?>
 <p:sld xmlns:a="http://schemas.openxmlformats.org/drawingml/2006/main" xmlns:r="http://schemas.openxmlformats.org/officeDocument/2006/relationships" xmlns:p="http://schemas.openxmlformats.org/presentationml/2006/main">
   <p:cSld>
     <p:spTree>
@@ -5775,7 +8028,7 @@
 </p:sld>
 </file>
 
-<file path=ppt/slides/slide5.xml><?xml version="1.0" encoding="utf-8"?>
+<file path=ppt/slides/slide9.xml><?xml version="1.0" encoding="utf-8"?>
 <p:sld xmlns:a="http://schemas.openxmlformats.org/drawingml/2006/main" xmlns:r="http://schemas.openxmlformats.org/officeDocument/2006/relationships" xmlns:p="http://schemas.openxmlformats.org/presentationml/2006/main">
   <p:cSld>
     <p:spTree>
@@ -5848,111 +8101,6 @@
                     <m:r>
                       <m:t>D</m:t>
                     </m:r>
-                    <m:d>
-                      <m:dPr>
-                        <m:begChr m:val="("/>
-                        <m:endChr m:val=")"/>
-                        <m:sepChr m:val=""/>
-                        <m:grow/>
-                      </m:dPr>
-                      <m:e>
-                        <m:r>
-                          <m:t>X</m:t>
-                        </m:r>
-                      </m:e>
-                    </m:d>
-                    <m:r>
-                      <m:rPr>
-                        <m:sty m:val="p"/>
-                      </m:rPr>
-                      <m:t>=</m:t>
-                    </m:r>
-                    <m:f>
-                      <m:fPr>
-                        <m:type m:val="bar"/>
-                      </m:fPr>
-                      <m:num>
-                        <m:r>
-                          <m:t>1</m:t>
-                        </m:r>
-                      </m:num>
-                      <m:den>
-                        <m:r>
-                          <m:t>n</m:t>
-                        </m:r>
-                      </m:den>
-                    </m:f>
-                    <m:r>
-                      <m:t>Σ</m:t>
-                    </m:r>
-                    <m:d>
-                      <m:dPr>
-                        <m:begChr m:val="|"/>
-                        <m:endChr m:val="|"/>
-                        <m:sepChr m:val=""/>
-                        <m:grow/>
-                      </m:dPr>
-                      <m:e>
-                        <m:sSub>
-                          <m:e>
-                            <m:r>
-                              <m:t>X</m:t>
-                            </m:r>
-                          </m:e>
-                          <m:sub>
-                            <m:r>
-                              <m:t>i</m:t>
-                            </m:r>
-                          </m:sub>
-                        </m:sSub>
-                        <m:r>
-                          <m:rPr>
-                            <m:sty m:val="p"/>
-                          </m:rPr>
-                          <m:t>−</m:t>
-                        </m:r>
-                        <m:acc>
-                          <m:accPr>
-                            <m:chr m:val="‾"/>
-                          </m:accPr>
-                          <m:e>
-                            <m:r>
-                              <m:t>X</m:t>
-                            </m:r>
-                          </m:e>
-                        </m:acc>
-                      </m:e>
-                    </m:d>
-                  </m:oMath>
-                </a14:m>
-              </a:p>
-              <a:p>
-                <a:pPr lvl="0" indent="0" marL="0">
-                  <a:buNone/>
-                </a:pPr>
-                <a14:m>
-                  <m:oMath xmlns:m="http://schemas.openxmlformats.org/officeDocument/2006/math">
-                    <m:r>
-                      <m:t> </m:t>
-                    </m:r>
-                  </m:oMath>
-                </a14:m>
-              </a:p>
-              <a:p>
-                <a:pPr lvl="0" indent="0" marL="0">
-                  <a:buNone/>
-                </a:pPr>
-                <a14:m>
-                  <m:oMath xmlns:m="http://schemas.openxmlformats.org/officeDocument/2006/math">
-                    <m:r>
-                      <m:t>M</m:t>
-                    </m:r>
-                    <m:r>
-                      <m:t>A</m:t>
-                    </m:r>
-                    <m:r>
-                      <m:t>D</m:t>
-                    </m:r>
                   </m:oMath>
                 </a14:m>
                 <a:r>
@@ -5960,73 +8108,6 @@
                   <a:t> (2, 3, 7, 5, 6) = 1.68</a:t>
                 </a:r>
               </a:p>
-            </p:txBody>
-          </p:sp>
-        </mc:Choice>
-      </mc:AlternateContent>
-    </p:spTree>
-  </p:cSld>
-</p:sld>
-</file>
-
-<file path=ppt/slides/slide6.xml><?xml version="1.0" encoding="utf-8"?>
-<p:sld xmlns:a="http://schemas.openxmlformats.org/drawingml/2006/main" xmlns:r="http://schemas.openxmlformats.org/officeDocument/2006/relationships" xmlns:p="http://schemas.openxmlformats.org/presentationml/2006/main">
-  <p:cSld>
-    <p:spTree>
-      <p:nvGrpSpPr>
-        <p:cNvPr id="1" name=""/>
-        <p:cNvGrpSpPr/>
-        <p:nvPr/>
-      </p:nvGrpSpPr>
-      <p:grpSpPr>
-        <a:xfrm>
-          <a:off x="0" y="0"/>
-          <a:ext cx="0" cy="0"/>
-          <a:chOff x="0" y="0"/>
-          <a:chExt cx="0" cy="0"/>
-        </a:xfrm>
-      </p:grpSpPr>
-      <p:sp>
-        <p:nvSpPr>
-          <p:cNvPr id="2" name="Title 1"/>
-          <p:cNvSpPr>
-            <a:spLocks noGrp="1"/>
-          </p:cNvSpPr>
-          <p:nvPr>
-            <p:ph type="title"/>
-          </p:nvPr>
-        </p:nvSpPr>
-        <p:spPr/>
-        <p:txBody>
-          <a:bodyPr/>
-          <a:lstStyle/>
-          <a:p>
-            <a:pPr lvl="0" indent="0" marL="0">
-              <a:buNone/>
-            </a:pPr>
-            <a:r>
-              <a:rPr/>
-              <a:t>The jackknife (3/3)</a:t>
-            </a:r>
-          </a:p>
-        </p:txBody>
-      </p:sp>
-      <mc:AlternateContent xmlns:mc="http://schemas.openxmlformats.org/markup-compatibility/2006">
-        <mc:Choice xmlns:a14="http://schemas.microsoft.com/office/drawing/2010/main" Requires="a14">
-          <p:sp>
-            <p:nvSpPr>
-              <p:cNvPr id="3" name="Content Placeholder 2"/>
-              <p:cNvSpPr>
-                <a:spLocks noGrp="1"/>
-              </p:cNvSpPr>
-              <p:nvPr>
-                <p:ph idx="1"/>
-              </p:nvPr>
-            </p:nvSpPr>
-            <p:spPr/>
-            <p:txBody>
-              <a:bodyPr/>
-              <a:lstStyle/>
               <a:p>
                 <a:pPr lvl="0" indent="0" marL="0">
                   <a:buNone/>
@@ -6153,251 +8234,6 @@
           </p:sp>
         </mc:Choice>
       </mc:AlternateContent>
-    </p:spTree>
-  </p:cSld>
-</p:sld>
-</file>
-
-<file path=ppt/slides/slide7.xml><?xml version="1.0" encoding="utf-8"?>
-<p:sld xmlns:a="http://schemas.openxmlformats.org/drawingml/2006/main" xmlns:r="http://schemas.openxmlformats.org/officeDocument/2006/relationships" xmlns:p="http://schemas.openxmlformats.org/presentationml/2006/main">
-  <p:cSld>
-    <p:spTree>
-      <p:nvGrpSpPr>
-        <p:cNvPr id="1" name=""/>
-        <p:cNvGrpSpPr/>
-        <p:nvPr/>
-      </p:nvGrpSpPr>
-      <p:grpSpPr>
-        <a:xfrm>
-          <a:off x="0" y="0"/>
-          <a:ext cx="0" cy="0"/>
-          <a:chOff x="0" y="0"/>
-          <a:chExt cx="0" cy="0"/>
-        </a:xfrm>
-      </p:grpSpPr>
-      <p:sp>
-        <p:nvSpPr>
-          <p:cNvPr id="2" name="Title 1"/>
-          <p:cNvSpPr>
-            <a:spLocks noGrp="1"/>
-          </p:cNvSpPr>
-          <p:nvPr>
-            <p:ph type="title"/>
-          </p:nvPr>
-        </p:nvSpPr>
-        <p:spPr/>
-        <p:txBody>
-          <a:bodyPr/>
-          <a:lstStyle/>
-          <a:p>
-            <a:pPr lvl="0" indent="0" marL="0">
-              <a:buNone/>
-            </a:pPr>
-            <a:r>
-              <a:rPr/>
-              <a:t>The jackknife (4/4)</a:t>
-            </a:r>
-          </a:p>
-        </p:txBody>
-      </p:sp>
-      <p:sp>
-        <p:nvSpPr>
-          <p:cNvPr id="3" name="Content Placeholder 2"/>
-          <p:cNvSpPr>
-            <a:spLocks noGrp="1"/>
-          </p:cNvSpPr>
-          <p:nvPr>
-            <p:ph idx="1"/>
-          </p:nvPr>
-        </p:nvSpPr>
-        <p:spPr/>
-        <p:txBody>
-          <a:bodyPr/>
-          <a:lstStyle/>
-          <a:p>
-            <a:pPr lvl="0"/>
-            <a:r>
-              <a:rPr/>
-              <a:t>MAD (Full sample) = 1.68</a:t>
-            </a:r>
-          </a:p>
-          <a:p>
-            <a:pPr lvl="0"/>
-            <a:r>
-              <a:rPr/>
-              <a:t>Average MAD (Jackknife subsamples) = 1.6</a:t>
-            </a:r>
-          </a:p>
-          <a:p>
-            <a:pPr lvl="0"/>
-            <a:r>
-              <a:rPr/>
-              <a:t>Estimated bias = 0.08</a:t>
-            </a:r>
-          </a:p>
-          <a:p>
-            <a:pPr lvl="0"/>
-            <a:r>
-              <a:rPr/>
-              <a:t>Standard deviation MAD (Jackknife subsamples) = 0.285</a:t>
-            </a:r>
-          </a:p>
-        </p:txBody>
-      </p:sp>
-    </p:spTree>
-  </p:cSld>
-</p:sld>
-</file>
-
-<file path=ppt/slides/slide8.xml><?xml version="1.0" encoding="utf-8"?>
-<p:sld xmlns:a="http://schemas.openxmlformats.org/drawingml/2006/main" xmlns:r="http://schemas.openxmlformats.org/officeDocument/2006/relationships" xmlns:p="http://schemas.openxmlformats.org/presentationml/2006/main">
-  <p:cSld>
-    <p:spTree>
-      <p:nvGrpSpPr>
-        <p:cNvPr id="1" name=""/>
-        <p:cNvGrpSpPr/>
-        <p:nvPr/>
-      </p:nvGrpSpPr>
-      <p:grpSpPr>
-        <a:xfrm>
-          <a:off x="0" y="0"/>
-          <a:ext cx="0" cy="0"/>
-          <a:chOff x="0" y="0"/>
-          <a:chExt cx="0" cy="0"/>
-        </a:xfrm>
-      </p:grpSpPr>
-      <p:sp>
-        <p:nvSpPr>
-          <p:cNvPr id="2" name="Title 1"/>
-          <p:cNvSpPr>
-            <a:spLocks noGrp="1"/>
-          </p:cNvSpPr>
-          <p:nvPr>
-            <p:ph type="title"/>
-          </p:nvPr>
-        </p:nvSpPr>
-        <p:spPr/>
-        <p:txBody>
-          <a:bodyPr/>
-          <a:lstStyle/>
-          <a:p>
-            <a:pPr lvl="0" indent="0" marL="0">
-              <a:buNone/>
-            </a:pPr>
-            <a:r>
-              <a:rPr/>
-              <a:t>Bradley Efron</a:t>
-            </a:r>
-          </a:p>
-        </p:txBody>
-      </p:sp>
-      <p:pic>
-        <p:nvPicPr>
-          <p:cNvPr descr="fig:  ../images/bradley-efron-02.jpg" id="0" name="Picture 1"/>
-          <p:cNvPicPr>
-            <a:picLocks noGrp="1" noChangeAspect="1"/>
-          </p:cNvPicPr>
-          <p:nvPr/>
-        </p:nvPicPr>
-        <p:blipFill>
-          <a:blip r:embed="rId2"/>
-          <a:stretch>
-            <a:fillRect/>
-          </a:stretch>
-        </p:blipFill>
-        <p:spPr bwMode="auto">
-          <a:xfrm>
-            <a:off x="2273300" y="1193800"/>
-            <a:ext cx="4584700" cy="2882900"/>
-          </a:xfrm>
-          <a:prstGeom prst="rect">
-            <a:avLst/>
-          </a:prstGeom>
-          <a:noFill/>
-          <a:ln w="9525">
-            <a:noFill/>
-            <a:headEnd/>
-            <a:tailEnd/>
-          </a:ln>
-        </p:spPr>
-      </p:pic>
-      <p:sp>
-        <p:nvSpPr>
-          <p:cNvPr id="1" name="TextBox 3"/>
-          <p:cNvSpPr txBox="1"/>
-          <p:nvPr/>
-        </p:nvSpPr>
-        <p:spPr>
-          <a:xfrm>
-            <a:off x="457200" y="4076700"/>
-            <a:ext cx="8229600" cy="508000"/>
-          </a:xfrm>
-          <a:prstGeom prst="rect">
-            <a:avLst/>
-          </a:prstGeom>
-          <a:noFill/>
-        </p:spPr>
-        <p:txBody>
-          <a:bodyPr/>
-          <a:lstStyle/>
-          <a:p>
-            <a:pPr lvl="0" indent="0" marL="0" algn="ctr">
-              <a:buNone/>
-            </a:pPr>
-            <a:r>
-              <a:rPr/>
-              <a:t>Figure 1. Photograph of Bradley Efron from Wikipedia</a:t>
-            </a:r>
-          </a:p>
-        </p:txBody>
-      </p:sp>
-    </p:spTree>
-  </p:cSld>
-</p:sld>
-</file>
-
-<file path=ppt/slides/slide9.xml><?xml version="1.0" encoding="utf-8"?>
-<p:sld xmlns:a="http://schemas.openxmlformats.org/drawingml/2006/main" xmlns:r="http://schemas.openxmlformats.org/officeDocument/2006/relationships" xmlns:p="http://schemas.openxmlformats.org/presentationml/2006/main">
-  <p:cSld>
-    <p:spTree>
-      <p:nvGrpSpPr>
-        <p:cNvPr id="1" name=""/>
-        <p:cNvGrpSpPr/>
-        <p:nvPr/>
-      </p:nvGrpSpPr>
-      <p:grpSpPr>
-        <a:xfrm>
-          <a:off x="0" y="0"/>
-          <a:ext cx="0" cy="0"/>
-          <a:chOff x="0" y="0"/>
-          <a:chExt cx="0" cy="0"/>
-        </a:xfrm>
-      </p:grpSpPr>
-      <p:sp>
-        <p:nvSpPr>
-          <p:cNvPr id="2" name="Title 1"/>
-          <p:cNvSpPr>
-            <a:spLocks noGrp="1"/>
-          </p:cNvSpPr>
-          <p:nvPr>
-            <p:ph type="title"/>
-          </p:nvPr>
-        </p:nvSpPr>
-        <p:spPr/>
-        <p:txBody>
-          <a:bodyPr/>
-          <a:lstStyle/>
-          <a:p>
-            <a:pPr lvl="0" indent="0" marL="0">
-              <a:buNone/>
-            </a:pPr>
-            <a:r>
-              <a:rPr/>
-              <a:t>Bagging</a:t>
-            </a:r>
-          </a:p>
-        </p:txBody>
-      </p:sp>
     </p:spTree>
   </p:cSld>
 </p:sld>

</xml_diff>

<commit_message>
Added bias correction and acceleration plots to bootstrap talk
</commit_message>
<xml_diff>
--- a/bootstrap/src/bootstrap-slides.pptx
+++ b/bootstrap/src/bootstrap-slides.pptx
@@ -5,7 +5,7 @@
     <p:sldMasterId id="2147483648" r:id="rId1"/>
   </p:sldMasterIdLst>
   <p:notesMasterIdLst>
-    <p:notesMasterId r:id="rId34"/>
+    <p:notesMasterId r:id="rId42"/>
   </p:notesMasterIdLst>
   <p:sldIdLst>
     <p:sldId id="256" r:id="rId2"/>
@@ -40,6 +40,14 @@
     <p:sldId id="285" r:id="rId31"/>
     <p:sldId id="286" r:id="rId32"/>
     <p:sldId id="287" r:id="rId33"/>
+    <p:sldId id="288" r:id="rId34"/>
+    <p:sldId id="289" r:id="rId35"/>
+    <p:sldId id="290" r:id="rId36"/>
+    <p:sldId id="291" r:id="rId37"/>
+    <p:sldId id="292" r:id="rId38"/>
+    <p:sldId id="293" r:id="rId39"/>
+    <p:sldId id="294" r:id="rId40"/>
+    <p:sldId id="295" r:id="rId41"/>
   </p:sldIdLst>
   <p:sldSz cx="9144000" cy="5143500" type="screen16x9"/>
   <p:notesSz cx="6858000" cy="9144000"/>
@@ -597,7 +605,7 @@
             </a:pPr>
             <a:r>
               <a:rPr/>
-              <a:t>First, I will provide a historical overview, starting with a simpler method that the bootstrap was based on called the jackknife. Then I will talk about Bradlet Efron’s work to develop the bootstrap and establish its theoretical foundations. Then I will mention how bootstrapping has developed into a methodology used in machine learning called bagging.</a:t>
+              <a:t>First, I will provide a historical overview, starting with a simpler method that the bootstrap was based on called the jackknife. Then I will talk about Bradley Efron’s work to develop the bootstrap and establish its theoretical foundations. Then I will mention how bootstrapping has developed into a methodology used in machine learning called bagging.</a:t>
             </a:r>
           </a:p>
           <a:p>
@@ -634,166 +642,12 @@
             </a:pPr>
           </a:p>
           <a:p>
-            <a:pPr lvl="0"/>
-            <a:r>
-              <a:rPr/>
-              <a:t>Purpose</a:t>
-            </a:r>
-          </a:p>
-          <a:p>
-            <a:pPr lvl="0" indent="0" marL="0">
-              <a:buNone/>
-            </a:pPr>
-          </a:p>
-          <a:p>
-            <a:pPr lvl="1"/>
-            <a:r>
-              <a:rPr/>
-              <a:t>Estimate bias</a:t>
-            </a:r>
-          </a:p>
-          <a:p>
-            <a:pPr lvl="0" indent="0" marL="0">
-              <a:buNone/>
-            </a:pPr>
-          </a:p>
-          <a:p>
-            <a:pPr lvl="1"/>
-            <a:r>
-              <a:rPr/>
-              <a:t>Calculate standard errors</a:t>
-            </a:r>
-          </a:p>
-          <a:p>
-            <a:pPr lvl="0" indent="0" marL="0">
-              <a:buNone/>
-            </a:pPr>
-          </a:p>
-          <a:p>
-            <a:pPr lvl="1"/>
-            <a:r>
-              <a:rPr/>
-              <a:t>Compute confidence intervals</a:t>
-            </a:r>
-          </a:p>
-          <a:p>
-            <a:pPr lvl="0" indent="0" marL="0">
-              <a:buNone/>
-            </a:pPr>
-          </a:p>
-          <a:p>
-            <a:pPr lvl="1"/>
-            <a:r>
-              <a:rPr/>
-              <a:t>Test hypotheses</a:t>
-            </a:r>
-          </a:p>
-          <a:p>
-            <a:pPr lvl="0" indent="0" marL="0">
-              <a:buNone/>
-            </a:pPr>
-          </a:p>
-          <a:p>
-            <a:pPr lvl="0"/>
-            <a:r>
-              <a:rPr/>
-              <a:t>Calculations</a:t>
-            </a:r>
-          </a:p>
-          <a:p>
-            <a:pPr lvl="0" indent="0" marL="0">
-              <a:buNone/>
-            </a:pPr>
-          </a:p>
-          <a:p>
-            <a:pPr lvl="1"/>
-            <a:r>
-              <a:rPr/>
-              <a:t>Bias</a:t>
-            </a:r>
-          </a:p>
-          <a:p>
-            <a:pPr lvl="0" indent="0" marL="0">
-              <a:buNone/>
-            </a:pPr>
-          </a:p>
-          <a:p>
-            <a:pPr lvl="1"/>
-            <a:r>
-              <a:rPr/>
-              <a:t>Standard error</a:t>
-            </a:r>
-          </a:p>
-          <a:p>
-            <a:pPr lvl="0" indent="0" marL="0">
-              <a:buNone/>
-            </a:pPr>
-          </a:p>
-          <a:p>
-            <a:pPr lvl="1"/>
-            <a:r>
-              <a:rPr/>
-              <a:t>Percentile confidence interval</a:t>
-            </a:r>
-          </a:p>
-          <a:p>
-            <a:pPr lvl="0" indent="0" marL="0">
-              <a:buNone/>
-            </a:pPr>
-          </a:p>
-          <a:p>
-            <a:pPr lvl="1"/>
-            <a:r>
-              <a:rPr/>
-              <a:t>Bias corrected intervals</a:t>
-            </a:r>
-          </a:p>
-          <a:p>
-            <a:pPr lvl="0" indent="0" marL="0">
-              <a:buNone/>
-            </a:pPr>
-          </a:p>
-          <a:p>
-            <a:pPr lvl="0"/>
-            <a:r>
-              <a:rPr/>
-              <a:t>Software</a:t>
-            </a:r>
-          </a:p>
-          <a:p>
-            <a:pPr lvl="0" indent="0" marL="0">
-              <a:buNone/>
-            </a:pPr>
-          </a:p>
-          <a:p>
-            <a:pPr lvl="1"/>
-            <a:r>
-              <a:rPr/>
-              <a:t>SAS</a:t>
-            </a:r>
-          </a:p>
-          <a:p>
-            <a:pPr lvl="0" indent="0" marL="0">
-              <a:buNone/>
-            </a:pPr>
-          </a:p>
-          <a:p>
-            <a:pPr lvl="1"/>
-            <a:r>
-              <a:rPr/>
-              <a:t>Stata</a:t>
-            </a:r>
-          </a:p>
-          <a:p>
-            <a:pPr lvl="0" indent="0" marL="0">
-              <a:buNone/>
-            </a:pPr>
-          </a:p>
-          <a:p>
-            <a:pPr lvl="1"/>
-            <a:r>
-              <a:rPr/>
-              <a:t>R</a:t>
+            <a:pPr lvl="0" indent="0" marL="0">
+              <a:buNone/>
+            </a:pPr>
+            <a:r>
+              <a:rPr/>
+              <a:t>Then I will show two simple examples.</a:t>
             </a:r>
           </a:p>
         </p:txBody>
@@ -1338,6 +1192,556 @@
             <a:fld id="{18BDFEC3-8487-43E8-A154-7C12CBC1FFF2}" type="slidenum">
               <a:rPr lang="en-US"/>
               <a:t>20</a:t>
+            </a:fld>
+            <a:endParaRPr lang="en-US"/>
+          </a:p>
+        </p:txBody>
+      </p:sp>
+    </p:spTree>
+  </p:cSld>
+</p:notes>
+</file>
+
+<file path=ppt/notesSlides/notesSlide15.xml><?xml version="1.0" encoding="utf-8"?>
+<p:notes xmlns:a="http://schemas.openxmlformats.org/drawingml/2006/main" xmlns:r="http://schemas.openxmlformats.org/officeDocument/2006/relationships" xmlns:p="http://schemas.openxmlformats.org/presentationml/2006/main">
+  <p:cSld>
+    <p:spTree>
+      <p:nvGrpSpPr>
+        <p:cNvPr id="1" name=""/>
+        <p:cNvGrpSpPr/>
+        <p:nvPr/>
+      </p:nvGrpSpPr>
+      <p:grpSpPr>
+        <a:xfrm>
+          <a:off x="0" y="0"/>
+          <a:ext cx="0" cy="0"/>
+          <a:chOff x="0" y="0"/>
+          <a:chExt cx="0" cy="0"/>
+        </a:xfrm>
+      </p:grpSpPr>
+      <p:sp>
+        <p:nvSpPr>
+          <p:cNvPr id="2" name="Slide Image Placeholder 1"/>
+          <p:cNvSpPr>
+            <a:spLocks noGrp="1" noRot="1" noChangeAspect="1"/>
+          </p:cNvSpPr>
+          <p:nvPr>
+            <p:ph type="sldImg"/>
+          </p:nvPr>
+        </p:nvSpPr>
+        <p:spPr/>
+      </p:sp>
+      <p:sp>
+        <p:nvSpPr>
+          <p:cNvPr id="3" name="Notes Placeholder 2"/>
+          <p:cNvSpPr>
+            <a:spLocks noGrp="1"/>
+          </p:cNvSpPr>
+          <p:nvPr>
+            <p:ph type="body" idx="1"/>
+          </p:nvPr>
+        </p:nvSpPr>
+        <p:spPr/>
+        <p:txBody>
+          <a:bodyPr/>
+          <a:lstStyle/>
+          <a:p>
+            <a:pPr lvl="0" indent="0" marL="0">
+              <a:buNone/>
+            </a:pPr>
+            <a:r>
+              <a:rPr/>
+              <a:t>For all of the proposed uses of the bootstrap, you start with an estimate based on the full dataset. Call that estimate theta-hat.</a:t>
+            </a:r>
+          </a:p>
+          <a:p>
+            <a:pPr lvl="0" indent="0" marL="0">
+              <a:buNone/>
+            </a:pPr>
+          </a:p>
+          <a:p>
+            <a:pPr lvl="0" indent="0" marL="0">
+              <a:buNone/>
+            </a:pPr>
+            <a:r>
+              <a:rPr/>
+              <a:t>Then for each bootstrap sample, you calculate the same estimate.</a:t>
+            </a:r>
+          </a:p>
+        </p:txBody>
+      </p:sp>
+      <p:sp>
+        <p:nvSpPr>
+          <p:cNvPr id="4" name="Slide Number Placeholder 3"/>
+          <p:cNvSpPr>
+            <a:spLocks noGrp="1"/>
+          </p:cNvSpPr>
+          <p:nvPr>
+            <p:ph type="sldNum" sz="quarter" idx="10"/>
+          </p:nvPr>
+        </p:nvSpPr>
+        <p:spPr/>
+        <p:txBody>
+          <a:bodyPr/>
+          <a:lstStyle/>
+          <a:p>
+            <a:fld id="{18BDFEC3-8487-43E8-A154-7C12CBC1FFF2}" type="slidenum">
+              <a:rPr lang="en-US"/>
+              <a:t>23</a:t>
+            </a:fld>
+            <a:endParaRPr lang="en-US"/>
+          </a:p>
+        </p:txBody>
+      </p:sp>
+    </p:spTree>
+  </p:cSld>
+</p:notes>
+</file>
+
+<file path=ppt/notesSlides/notesSlide16.xml><?xml version="1.0" encoding="utf-8"?>
+<p:notes xmlns:a="http://schemas.openxmlformats.org/drawingml/2006/main" xmlns:r="http://schemas.openxmlformats.org/officeDocument/2006/relationships" xmlns:p="http://schemas.openxmlformats.org/presentationml/2006/main">
+  <p:cSld>
+    <p:spTree>
+      <p:nvGrpSpPr>
+        <p:cNvPr id="1" name=""/>
+        <p:cNvGrpSpPr/>
+        <p:nvPr/>
+      </p:nvGrpSpPr>
+      <p:grpSpPr>
+        <a:xfrm>
+          <a:off x="0" y="0"/>
+          <a:ext cx="0" cy="0"/>
+          <a:chOff x="0" y="0"/>
+          <a:chExt cx="0" cy="0"/>
+        </a:xfrm>
+      </p:grpSpPr>
+      <p:sp>
+        <p:nvSpPr>
+          <p:cNvPr id="2" name="Slide Image Placeholder 1"/>
+          <p:cNvSpPr>
+            <a:spLocks noGrp="1" noRot="1" noChangeAspect="1"/>
+          </p:cNvSpPr>
+          <p:nvPr>
+            <p:ph type="sldImg"/>
+          </p:nvPr>
+        </p:nvSpPr>
+        <p:spPr/>
+      </p:sp>
+      <p:sp>
+        <p:nvSpPr>
+          <p:cNvPr id="3" name="Notes Placeholder 2"/>
+          <p:cNvSpPr>
+            <a:spLocks noGrp="1"/>
+          </p:cNvSpPr>
+          <p:nvPr>
+            <p:ph type="body" idx="1"/>
+          </p:nvPr>
+        </p:nvSpPr>
+        <p:spPr/>
+        <p:txBody>
+          <a:bodyPr/>
+          <a:lstStyle/>
+          <a:p>
+            <a:pPr lvl="0" indent="0" marL="0">
+              <a:buNone/>
+            </a:pPr>
+            <a:r>
+              <a:rPr/>
+              <a:t>To estimate bias, see how much the average of the bootstrapped estimates differs from the estimate based on the full sample.</a:t>
+            </a:r>
+          </a:p>
+          <a:p>
+            <a:pPr lvl="0" indent="0" marL="0">
+              <a:buNone/>
+            </a:pPr>
+          </a:p>
+          <a:p>
+            <a:pPr lvl="0" indent="0" marL="0">
+              <a:buNone/>
+            </a:pPr>
+            <a:r>
+              <a:rPr/>
+              <a:t>For what it’s worth, many people (including myself) consider concerns about bias to be overblown. There are times when a biased estimate can be quite serious, especially if the bias is caused by a flaw in the sampling process. But debates about whether you should divide n versus n-1 in the formula for variance are a bit silly.</a:t>
+            </a:r>
+          </a:p>
+          <a:p>
+            <a:pPr lvl="0" indent="0" marL="0">
+              <a:buNone/>
+            </a:pPr>
+          </a:p>
+          <a:p>
+            <a:pPr lvl="0" indent="0" marL="0">
+              <a:buNone/>
+            </a:pPr>
+            <a:r>
+              <a:rPr/>
+              <a:t>Furthermore, a small amount of bias in an estimator may be worth it if you can get less sampling error in return.</a:t>
+            </a:r>
+          </a:p>
+          <a:p>
+            <a:pPr lvl="0" indent="0" marL="0">
+              <a:buNone/>
+            </a:pPr>
+          </a:p>
+          <a:p>
+            <a:pPr lvl="0" indent="0" marL="0">
+              <a:buNone/>
+            </a:pPr>
+            <a:r>
+              <a:rPr/>
+              <a:t>There’s no correct answer about if and when you should adjust for bias, but I am presenting it here as a simple application of the bootstrap. In all candor, the use of the bootstrap for calculating standard errors, computing confidence intervals, and testing hypotheses are far more common uses of the bootstrap.</a:t>
+            </a:r>
+          </a:p>
+        </p:txBody>
+      </p:sp>
+      <p:sp>
+        <p:nvSpPr>
+          <p:cNvPr id="4" name="Slide Number Placeholder 3"/>
+          <p:cNvSpPr>
+            <a:spLocks noGrp="1"/>
+          </p:cNvSpPr>
+          <p:nvPr>
+            <p:ph type="sldNum" sz="quarter" idx="10"/>
+          </p:nvPr>
+        </p:nvSpPr>
+        <p:spPr/>
+        <p:txBody>
+          <a:bodyPr/>
+          <a:lstStyle/>
+          <a:p>
+            <a:fld id="{18BDFEC3-8487-43E8-A154-7C12CBC1FFF2}" type="slidenum">
+              <a:rPr lang="en-US"/>
+              <a:t>24</a:t>
+            </a:fld>
+            <a:endParaRPr lang="en-US"/>
+          </a:p>
+        </p:txBody>
+      </p:sp>
+    </p:spTree>
+  </p:cSld>
+</p:notes>
+</file>
+
+<file path=ppt/notesSlides/notesSlide17.xml><?xml version="1.0" encoding="utf-8"?>
+<p:notes xmlns:a="http://schemas.openxmlformats.org/drawingml/2006/main" xmlns:r="http://schemas.openxmlformats.org/officeDocument/2006/relationships" xmlns:p="http://schemas.openxmlformats.org/presentationml/2006/main">
+  <p:cSld>
+    <p:spTree>
+      <p:nvGrpSpPr>
+        <p:cNvPr id="1" name=""/>
+        <p:cNvGrpSpPr/>
+        <p:nvPr/>
+      </p:nvGrpSpPr>
+      <p:grpSpPr>
+        <a:xfrm>
+          <a:off x="0" y="0"/>
+          <a:ext cx="0" cy="0"/>
+          <a:chOff x="0" y="0"/>
+          <a:chExt cx="0" cy="0"/>
+        </a:xfrm>
+      </p:grpSpPr>
+      <p:sp>
+        <p:nvSpPr>
+          <p:cNvPr id="2" name="Slide Image Placeholder 1"/>
+          <p:cNvSpPr>
+            <a:spLocks noGrp="1" noRot="1" noChangeAspect="1"/>
+          </p:cNvSpPr>
+          <p:nvPr>
+            <p:ph type="sldImg"/>
+          </p:nvPr>
+        </p:nvSpPr>
+        <p:spPr/>
+      </p:sp>
+      <p:sp>
+        <p:nvSpPr>
+          <p:cNvPr id="3" name="Notes Placeholder 2"/>
+          <p:cNvSpPr>
+            <a:spLocks noGrp="1"/>
+          </p:cNvSpPr>
+          <p:nvPr>
+            <p:ph type="body" idx="1"/>
+          </p:nvPr>
+        </p:nvSpPr>
+        <p:spPr/>
+        <p:txBody>
+          <a:bodyPr/>
+          <a:lstStyle/>
+          <a:p>
+            <a:pPr lvl="0" indent="0" marL="0">
+              <a:buNone/>
+            </a:pPr>
+            <a:r>
+              <a:rPr/>
+              <a:t>You can use the standard deviation of the bootstrapped estimates as an estimate of the standard error of your statistic.</a:t>
+            </a:r>
+          </a:p>
+          <a:p>
+            <a:pPr lvl="0" indent="0" marL="0">
+              <a:buNone/>
+            </a:pPr>
+          </a:p>
+          <a:p>
+            <a:pPr lvl="0" indent="0" marL="0">
+              <a:buNone/>
+            </a:pPr>
+            <a:r>
+              <a:rPr/>
+              <a:t>We’ll talk next about confidence intervals and hypothesis tests. But the question arises: why would you want a bootstrap estimate of the standard error if not to use it in a confidence interval or a hypothesis test?</a:t>
+            </a:r>
+          </a:p>
+          <a:p>
+            <a:pPr lvl="0" indent="0" marL="0">
+              <a:buNone/>
+            </a:pPr>
+          </a:p>
+          <a:p>
+            <a:pPr lvl="0" indent="0" marL="0">
+              <a:buNone/>
+            </a:pPr>
+            <a:r>
+              <a:rPr/>
+              <a:t>Perhaps there is some value in getting the standard error using a classic approach and comparing it to the bootstrap estimate of the standard error. If the two are close, that gives you some reassurance that the classic approach is appropriate. If they differ, then examine things like whether the sample size is large enough to justify the normal approximation or if other assumptions that you need are justifiable.</a:t>
+            </a:r>
+          </a:p>
+        </p:txBody>
+      </p:sp>
+      <p:sp>
+        <p:nvSpPr>
+          <p:cNvPr id="4" name="Slide Number Placeholder 3"/>
+          <p:cNvSpPr>
+            <a:spLocks noGrp="1"/>
+          </p:cNvSpPr>
+          <p:nvPr>
+            <p:ph type="sldNum" sz="quarter" idx="10"/>
+          </p:nvPr>
+        </p:nvSpPr>
+        <p:spPr/>
+        <p:txBody>
+          <a:bodyPr/>
+          <a:lstStyle/>
+          <a:p>
+            <a:fld id="{18BDFEC3-8487-43E8-A154-7C12CBC1FFF2}" type="slidenum">
+              <a:rPr lang="en-US"/>
+              <a:t>25</a:t>
+            </a:fld>
+            <a:endParaRPr lang="en-US"/>
+          </a:p>
+        </p:txBody>
+      </p:sp>
+    </p:spTree>
+  </p:cSld>
+</p:notes>
+</file>
+
+<file path=ppt/notesSlides/notesSlide18.xml><?xml version="1.0" encoding="utf-8"?>
+<p:notes xmlns:a="http://schemas.openxmlformats.org/drawingml/2006/main" xmlns:r="http://schemas.openxmlformats.org/officeDocument/2006/relationships" xmlns:p="http://schemas.openxmlformats.org/presentationml/2006/main">
+  <p:cSld>
+    <p:spTree>
+      <p:nvGrpSpPr>
+        <p:cNvPr id="1" name=""/>
+        <p:cNvGrpSpPr/>
+        <p:nvPr/>
+      </p:nvGrpSpPr>
+      <p:grpSpPr>
+        <a:xfrm>
+          <a:off x="0" y="0"/>
+          <a:ext cx="0" cy="0"/>
+          <a:chOff x="0" y="0"/>
+          <a:chExt cx="0" cy="0"/>
+        </a:xfrm>
+      </p:grpSpPr>
+      <p:sp>
+        <p:nvSpPr>
+          <p:cNvPr id="2" name="Slide Image Placeholder 1"/>
+          <p:cNvSpPr>
+            <a:spLocks noGrp="1" noRot="1" noChangeAspect="1"/>
+          </p:cNvSpPr>
+          <p:nvPr>
+            <p:ph type="sldImg"/>
+          </p:nvPr>
+        </p:nvSpPr>
+        <p:spPr/>
+      </p:sp>
+      <p:sp>
+        <p:nvSpPr>
+          <p:cNvPr id="3" name="Notes Placeholder 2"/>
+          <p:cNvSpPr>
+            <a:spLocks noGrp="1"/>
+          </p:cNvSpPr>
+          <p:nvPr>
+            <p:ph type="body" idx="1"/>
+          </p:nvPr>
+        </p:nvSpPr>
+        <p:spPr/>
+        <p:txBody>
+          <a:bodyPr/>
+          <a:lstStyle/>
+          <a:p>
+            <a:pPr lvl="0" indent="0" marL="0">
+              <a:buNone/>
+            </a:pPr>
+            <a:r>
+              <a:rPr/>
+              <a:t>Every reference that I reviewed showed these equations and immediately apologized for their complexity. There appears to be little intuition that you can discern from these formulas. The formula for z-hat-0 is a bit easier to follow, perhaps. It is an adjustment for bias.</a:t>
+            </a:r>
+          </a:p>
+          <a:p>
+            <a:pPr lvl="0" indent="0" marL="0">
+              <a:buNone/>
+            </a:pPr>
+          </a:p>
+          <a:p>
+            <a:pPr lvl="0" indent="0" marL="0">
+              <a:buNone/>
+            </a:pPr>
+            <a:r>
+              <a:rPr/>
+              <a:t>The formula for a-hat is a bit trickier. Notice that it involves deviations from the mean raised to the third power, which seems to be akin to a measure of skewness.</a:t>
+            </a:r>
+          </a:p>
+          <a:p>
+            <a:pPr lvl="0" indent="0" marL="0">
+              <a:buNone/>
+            </a:pPr>
+          </a:p>
+          <a:p>
+            <a:pPr lvl="0" indent="0" marL="0">
+              <a:buNone/>
+            </a:pPr>
+            <a:r>
+              <a:rPr/>
+              <a:t>Dr. Efron refers to it as an acceleration, because it relates to the second derivative of something. Remember that in Calculus, the first derivative is analogous to speed and the second derivative is analogous to acceleration.</a:t>
+            </a:r>
+          </a:p>
+          <a:p>
+            <a:pPr lvl="0" indent="0" marL="0">
+              <a:buNone/>
+            </a:pPr>
+          </a:p>
+          <a:p>
+            <a:pPr lvl="0" indent="0" marL="0">
+              <a:buNone/>
+            </a:pPr>
+            <a:r>
+              <a:rPr/>
+              <a:t>If z-hat-sub-0 is equal to zero, there is no adjustment to the confidence interval based on bias.</a:t>
+            </a:r>
+          </a:p>
+          <a:p>
+            <a:pPr lvl="0" indent="0" marL="0">
+              <a:buNone/>
+            </a:pPr>
+          </a:p>
+          <a:p>
+            <a:pPr lvl="0" indent="0" marL="0">
+              <a:buNone/>
+            </a:pPr>
+            <a:r>
+              <a:rPr/>
+              <a:t>If a-hat is equal to zero, there is no adjustment to the confidence interval based on skewness.</a:t>
+            </a:r>
+          </a:p>
+        </p:txBody>
+      </p:sp>
+      <p:sp>
+        <p:nvSpPr>
+          <p:cNvPr id="4" name="Slide Number Placeholder 3"/>
+          <p:cNvSpPr>
+            <a:spLocks noGrp="1"/>
+          </p:cNvSpPr>
+          <p:nvPr>
+            <p:ph type="sldNum" sz="quarter" idx="10"/>
+          </p:nvPr>
+        </p:nvSpPr>
+        <p:spPr/>
+        <p:txBody>
+          <a:bodyPr/>
+          <a:lstStyle/>
+          <a:p>
+            <a:fld id="{18BDFEC3-8487-43E8-A154-7C12CBC1FFF2}" type="slidenum">
+              <a:rPr lang="en-US"/>
+              <a:t>29</a:t>
+            </a:fld>
+            <a:endParaRPr lang="en-US"/>
+          </a:p>
+        </p:txBody>
+      </p:sp>
+    </p:spTree>
+  </p:cSld>
+</p:notes>
+</file>
+
+<file path=ppt/notesSlides/notesSlide19.xml><?xml version="1.0" encoding="utf-8"?>
+<p:notes xmlns:a="http://schemas.openxmlformats.org/drawingml/2006/main" xmlns:r="http://schemas.openxmlformats.org/officeDocument/2006/relationships" xmlns:p="http://schemas.openxmlformats.org/presentationml/2006/main">
+  <p:cSld>
+    <p:spTree>
+      <p:nvGrpSpPr>
+        <p:cNvPr id="1" name=""/>
+        <p:cNvGrpSpPr/>
+        <p:nvPr/>
+      </p:nvGrpSpPr>
+      <p:grpSpPr>
+        <a:xfrm>
+          <a:off x="0" y="0"/>
+          <a:ext cx="0" cy="0"/>
+          <a:chOff x="0" y="0"/>
+          <a:chExt cx="0" cy="0"/>
+        </a:xfrm>
+      </p:grpSpPr>
+      <p:sp>
+        <p:nvSpPr>
+          <p:cNvPr id="2" name="Slide Image Placeholder 1"/>
+          <p:cNvSpPr>
+            <a:spLocks noGrp="1" noRot="1" noChangeAspect="1"/>
+          </p:cNvSpPr>
+          <p:nvPr>
+            <p:ph type="sldImg"/>
+          </p:nvPr>
+        </p:nvSpPr>
+        <p:spPr/>
+      </p:sp>
+      <p:sp>
+        <p:nvSpPr>
+          <p:cNvPr id="3" name="Notes Placeholder 2"/>
+          <p:cNvSpPr>
+            <a:spLocks noGrp="1"/>
+          </p:cNvSpPr>
+          <p:nvPr>
+            <p:ph type="body" idx="1"/>
+          </p:nvPr>
+        </p:nvSpPr>
+        <p:spPr/>
+        <p:txBody>
+          <a:bodyPr/>
+          <a:lstStyle/>
+          <a:p>
+            <a:pPr lvl="0" indent="0" marL="0">
+              <a:buNone/>
+            </a:pPr>
+            <a:r>
+              <a:rPr/>
+              <a:t>The percentiles that you select from the bootstrap distribution are no longer at alpha/2 and 1-alpha/2, but are moved to account for bias and skewness in the bootstrap distribution.</a:t>
+            </a:r>
+          </a:p>
+        </p:txBody>
+      </p:sp>
+      <p:sp>
+        <p:nvSpPr>
+          <p:cNvPr id="4" name="Slide Number Placeholder 3"/>
+          <p:cNvSpPr>
+            <a:spLocks noGrp="1"/>
+          </p:cNvSpPr>
+          <p:nvPr>
+            <p:ph type="sldNum" sz="quarter" idx="10"/>
+          </p:nvPr>
+        </p:nvSpPr>
+        <p:spPr/>
+        <p:txBody>
+          <a:bodyPr/>
+          <a:lstStyle/>
+          <a:p>
+            <a:fld id="{18BDFEC3-8487-43E8-A154-7C12CBC1FFF2}" type="slidenum">
+              <a:rPr lang="en-US"/>
+              <a:t>30</a:t>
             </a:fld>
             <a:endParaRPr lang="en-US"/>
           </a:p>
@@ -6435,105 +6839,21 @@
             <a:pPr lvl="0"/>
             <a:r>
               <a:rPr/>
-              <a:t>Purpose</a:t>
-            </a:r>
-          </a:p>
-          <a:p>
-            <a:pPr lvl="1"/>
-            <a:r>
-              <a:rPr/>
-              <a:t>Estimate bias</a:t>
-            </a:r>
-          </a:p>
-          <a:p>
-            <a:pPr lvl="1"/>
-            <a:r>
-              <a:rPr/>
-              <a:t>Calculate standard errors</a:t>
-            </a:r>
-          </a:p>
-          <a:p>
-            <a:pPr lvl="1"/>
-            <a:r>
-              <a:rPr/>
-              <a:t>Compute confidence intervals</a:t>
-            </a:r>
-          </a:p>
-          <a:p>
-            <a:pPr lvl="1"/>
-            <a:r>
-              <a:rPr/>
-              <a:t>Test hypotheses</a:t>
+              <a:t>Calculations</a:t>
             </a:r>
           </a:p>
           <a:p>
             <a:pPr lvl="0"/>
             <a:r>
               <a:rPr/>
-              <a:t>Resampling mechanics</a:t>
+              <a:t>Software</a:t>
             </a:r>
           </a:p>
           <a:p>
             <a:pPr lvl="0"/>
             <a:r>
               <a:rPr/>
-              <a:t>Calculations</a:t>
-            </a:r>
-          </a:p>
-          <a:p>
-            <a:pPr lvl="1"/>
-            <a:r>
-              <a:rPr/>
-              <a:t>Bias</a:t>
-            </a:r>
-          </a:p>
-          <a:p>
-            <a:pPr lvl="1"/>
-            <a:r>
-              <a:rPr/>
-              <a:t>Standard error</a:t>
-            </a:r>
-          </a:p>
-          <a:p>
-            <a:pPr lvl="1"/>
-            <a:r>
-              <a:rPr/>
-              <a:t>Percentile confidence interval</a:t>
-            </a:r>
-          </a:p>
-          <a:p>
-            <a:pPr lvl="1"/>
-            <a:r>
-              <a:rPr/>
-              <a:t>Bias corrected intervals</a:t>
-            </a:r>
-          </a:p>
-          <a:p>
-            <a:pPr lvl="0"/>
-            <a:r>
-              <a:rPr/>
-              <a:t>Software</a:t>
-            </a:r>
-          </a:p>
-          <a:p>
-            <a:pPr lvl="1"/>
-            <a:r>
-              <a:rPr/>
-              <a:t>SAS</a:t>
-            </a:r>
-          </a:p>
-          <a:p>
-            <a:pPr lvl="1"/>
-            <a:r>
-              <a:rPr/>
-              <a:t>Stata</a:t>
-            </a:r>
-          </a:p>
-          <a:p>
-            <a:pPr lvl="1"/>
-            <a:r>
-              <a:rPr/>
-              <a:t>R</a:t>
+              <a:t>Examples</a:t>
             </a:r>
           </a:p>
         </p:txBody>
@@ -7085,7 +7405,7 @@
             </a:pPr>
             <a:r>
               <a:rPr/>
-              <a:t>Estimate bias</a:t>
+              <a:t>Evaluate estimates on bootstrapped samples</a:t>
             </a:r>
           </a:p>
         </p:txBody>
@@ -7787,6 +8107,73 @@
                   </m:oMath>
                 </a14:m>
               </a:p>
+            </p:txBody>
+          </p:sp>
+        </mc:Choice>
+      </mc:AlternateContent>
+    </p:spTree>
+  </p:cSld>
+</p:sld>
+</file>
+
+<file path=ppt/slides/slide24.xml><?xml version="1.0" encoding="utf-8"?>
+<p:sld xmlns:a="http://schemas.openxmlformats.org/drawingml/2006/main" xmlns:r="http://schemas.openxmlformats.org/officeDocument/2006/relationships" xmlns:p="http://schemas.openxmlformats.org/presentationml/2006/main">
+  <p:cSld>
+    <p:spTree>
+      <p:nvGrpSpPr>
+        <p:cNvPr id="1" name=""/>
+        <p:cNvGrpSpPr/>
+        <p:nvPr/>
+      </p:nvGrpSpPr>
+      <p:grpSpPr>
+        <a:xfrm>
+          <a:off x="0" y="0"/>
+          <a:ext cx="0" cy="0"/>
+          <a:chOff x="0" y="0"/>
+          <a:chExt cx="0" cy="0"/>
+        </a:xfrm>
+      </p:grpSpPr>
+      <p:sp>
+        <p:nvSpPr>
+          <p:cNvPr id="2" name="Title 1"/>
+          <p:cNvSpPr>
+            <a:spLocks noGrp="1"/>
+          </p:cNvSpPr>
+          <p:nvPr>
+            <p:ph type="title"/>
+          </p:nvPr>
+        </p:nvSpPr>
+        <p:spPr/>
+        <p:txBody>
+          <a:bodyPr/>
+          <a:lstStyle/>
+          <a:p>
+            <a:pPr lvl="0" indent="0" marL="0">
+              <a:buNone/>
+            </a:pPr>
+            <a:r>
+              <a:rPr/>
+              <a:t>Estimate bias</a:t>
+            </a:r>
+          </a:p>
+        </p:txBody>
+      </p:sp>
+      <mc:AlternateContent xmlns:mc="http://schemas.openxmlformats.org/markup-compatibility/2006">
+        <mc:Choice xmlns:a14="http://schemas.microsoft.com/office/drawing/2010/main" Requires="a14">
+          <p:sp>
+            <p:nvSpPr>
+              <p:cNvPr id="3" name="Content Placeholder 2"/>
+              <p:cNvSpPr>
+                <a:spLocks noGrp="1"/>
+              </p:cNvSpPr>
+              <p:nvPr>
+                <p:ph idx="1"/>
+              </p:nvPr>
+            </p:nvSpPr>
+            <p:spPr/>
+            <p:txBody>
+              <a:bodyPr/>
+              <a:lstStyle/>
               <a:p>
                 <a:pPr lvl="0"/>
                 <a:r>
@@ -7798,6 +8185,59 @@
                 <a:pPr lvl="1"/>
                 <a14:m>
                   <m:oMath xmlns:m="http://schemas.openxmlformats.org/officeDocument/2006/math">
+                    <m:acc>
+                      <m:accPr>
+                        <m:chr m:val="‾"/>
+                      </m:accPr>
+                      <m:e>
+                        <m:r>
+                          <m:t>θ</m:t>
+                        </m:r>
+                      </m:e>
+                    </m:acc>
+                    <m:r>
+                      <m:rPr>
+                        <m:sty m:val="p"/>
+                      </m:rPr>
+                      <m:t>−</m:t>
+                    </m:r>
+                    <m:acc>
+                      <m:accPr>
+                        <m:chr m:val="̂"/>
+                      </m:accPr>
+                      <m:e>
+                        <m:r>
+                          <m:t>θ</m:t>
+                        </m:r>
+                      </m:e>
+                    </m:acc>
+                  </m:oMath>
+                </a14:m>
+              </a:p>
+              <a:p>
+                <a:pPr lvl="1"/>
+                <a:r>
+                  <a:rPr/>
+                  <a:t>where </a:t>
+                </a:r>
+                <a14:m>
+                  <m:oMath xmlns:m="http://schemas.openxmlformats.org/officeDocument/2006/math">
+                    <m:acc>
+                      <m:accPr>
+                        <m:chr m:val="‾"/>
+                      </m:accPr>
+                      <m:e>
+                        <m:r>
+                          <m:t>θ</m:t>
+                        </m:r>
+                      </m:e>
+                    </m:acc>
+                    <m:r>
+                      <m:rPr>
+                        <m:sty m:val="p"/>
+                      </m:rPr>
+                      <m:t>=</m:t>
+                    </m:r>
                     <m:f>
                       <m:fPr>
                         <m:type m:val="bar"/>
@@ -7871,22 +8311,6 @@
                         </m:sSup>
                       </m:e>
                     </m:nary>
-                    <m:r>
-                      <m:rPr>
-                        <m:sty m:val="p"/>
-                      </m:rPr>
-                      <m:t>−</m:t>
-                    </m:r>
-                    <m:acc>
-                      <m:accPr>
-                        <m:chr m:val="̂"/>
-                      </m:accPr>
-                      <m:e>
-                        <m:r>
-                          <m:t>θ</m:t>
-                        </m:r>
-                      </m:e>
-                    </m:acc>
                   </m:oMath>
                 </a14:m>
               </a:p>
@@ -7894,53 +8318,6 @@
           </p:sp>
         </mc:Choice>
       </mc:AlternateContent>
-    </p:spTree>
-  </p:cSld>
-</p:sld>
-</file>
-
-<file path=ppt/slides/slide24.xml><?xml version="1.0" encoding="utf-8"?>
-<p:sld xmlns:a="http://schemas.openxmlformats.org/drawingml/2006/main" xmlns:r="http://schemas.openxmlformats.org/officeDocument/2006/relationships" xmlns:p="http://schemas.openxmlformats.org/presentationml/2006/main">
-  <p:cSld>
-    <p:spTree>
-      <p:nvGrpSpPr>
-        <p:cNvPr id="1" name=""/>
-        <p:cNvGrpSpPr/>
-        <p:nvPr/>
-      </p:nvGrpSpPr>
-      <p:grpSpPr>
-        <a:xfrm>
-          <a:off x="0" y="0"/>
-          <a:ext cx="0" cy="0"/>
-          <a:chOff x="0" y="0"/>
-          <a:chExt cx="0" cy="0"/>
-        </a:xfrm>
-      </p:grpSpPr>
-      <p:sp>
-        <p:nvSpPr>
-          <p:cNvPr id="2" name="Title 1"/>
-          <p:cNvSpPr>
-            <a:spLocks noGrp="1"/>
-          </p:cNvSpPr>
-          <p:nvPr>
-            <p:ph type="title"/>
-          </p:nvPr>
-        </p:nvSpPr>
-        <p:spPr/>
-        <p:txBody>
-          <a:bodyPr/>
-          <a:lstStyle/>
-          <a:p>
-            <a:pPr lvl="0" indent="0" marL="0">
-              <a:buNone/>
-            </a:pPr>
-            <a:r>
-              <a:rPr/>
-              <a:t>Calculate standard errors</a:t>
-            </a:r>
-          </a:p>
-        </p:txBody>
-      </p:sp>
     </p:spTree>
   </p:cSld>
 </p:sld>
@@ -7983,11 +8360,170 @@
             </a:pPr>
             <a:r>
               <a:rPr/>
-              <a:t>Compute confidence intervals</a:t>
-            </a:r>
-          </a:p>
-        </p:txBody>
-      </p:sp>
+              <a:t>Calculate standard errors</a:t>
+            </a:r>
+          </a:p>
+        </p:txBody>
+      </p:sp>
+      <mc:AlternateContent xmlns:mc="http://schemas.openxmlformats.org/markup-compatibility/2006">
+        <mc:Choice xmlns:a14="http://schemas.microsoft.com/office/drawing/2010/main" Requires="a14">
+          <p:sp>
+            <p:nvSpPr>
+              <p:cNvPr id="3" name="Content Placeholder 2"/>
+              <p:cNvSpPr>
+                <a:spLocks noGrp="1"/>
+              </p:cNvSpPr>
+              <p:nvPr>
+                <p:ph idx="1"/>
+              </p:nvPr>
+            </p:nvSpPr>
+            <p:spPr/>
+            <p:txBody>
+              <a:bodyPr/>
+              <a:lstStyle/>
+              <a:p>
+                <a:pPr lvl="0"/>
+                <a:r>
+                  <a:rPr/>
+                  <a:t>Calculate the standard deviation of the bootstrap estimates</a:t>
+                </a:r>
+              </a:p>
+              <a:p>
+                <a:pPr lvl="1"/>
+                <a14:m>
+                  <m:oMath xmlns:m="http://schemas.openxmlformats.org/officeDocument/2006/math">
+                    <m:rad>
+                      <m:radPr>
+                        <m:degHide m:val="1"/>
+                      </m:radPr>
+                      <m:deg/>
+                      <m:e>
+                        <m:f>
+                          <m:fPr>
+                            <m:type m:val="bar"/>
+                          </m:fPr>
+                          <m:num>
+                            <m:r>
+                              <m:t>1</m:t>
+                            </m:r>
+                          </m:num>
+                          <m:den>
+                            <m:r>
+                              <m:t>B</m:t>
+                            </m:r>
+                            <m:r>
+                              <m:rPr>
+                                <m:sty m:val="p"/>
+                              </m:rPr>
+                              <m:t>−</m:t>
+                            </m:r>
+                            <m:r>
+                              <m:t>1</m:t>
+                            </m:r>
+                          </m:den>
+                        </m:f>
+                        <m:nary>
+                          <m:naryPr>
+                            <m:chr m:val="∑"/>
+                            <m:limLoc m:val="undOvr"/>
+                            <m:subHide m:val="0"/>
+                            <m:supHide m:val="0"/>
+                          </m:naryPr>
+                          <m:sub>
+                            <m:r>
+                              <m:t>b</m:t>
+                            </m:r>
+                            <m:r>
+                              <m:rPr>
+                                <m:sty m:val="p"/>
+                              </m:rPr>
+                              <m:t>=</m:t>
+                            </m:r>
+                            <m:r>
+                              <m:t>1</m:t>
+                            </m:r>
+                          </m:sub>
+                          <m:sup>
+                            <m:r>
+                              <m:t>B</m:t>
+                            </m:r>
+                          </m:sup>
+                          <m:e>
+                            <m:sSup>
+                              <m:e>
+                                <m:d>
+                                  <m:dPr>
+                                    <m:begChr m:val="("/>
+                                    <m:endChr m:val=")"/>
+                                    <m:sepChr m:val=""/>
+                                    <m:grow/>
+                                  </m:dPr>
+                                  <m:e>
+                                    <m:sSup>
+                                      <m:e>
+                                        <m:acc>
+                                          <m:accPr>
+                                            <m:chr m:val="̂"/>
+                                          </m:accPr>
+                                          <m:e>
+                                            <m:r>
+                                              <m:t>θ</m:t>
+                                            </m:r>
+                                          </m:e>
+                                        </m:acc>
+                                      </m:e>
+                                      <m:sup>
+                                        <m:d>
+                                          <m:dPr>
+                                            <m:begChr m:val="("/>
+                                            <m:endChr m:val=")"/>
+                                            <m:sepChr m:val=""/>
+                                            <m:grow/>
+                                          </m:dPr>
+                                          <m:e>
+                                            <m:r>
+                                              <m:t>b</m:t>
+                                            </m:r>
+                                          </m:e>
+                                        </m:d>
+                                      </m:sup>
+                                    </m:sSup>
+                                    <m:r>
+                                      <m:rPr>
+                                        <m:sty m:val="p"/>
+                                      </m:rPr>
+                                      <m:t>−</m:t>
+                                    </m:r>
+                                    <m:acc>
+                                      <m:accPr>
+                                        <m:chr m:val="‾"/>
+                                      </m:accPr>
+                                      <m:e>
+                                        <m:r>
+                                          <m:t>θ</m:t>
+                                        </m:r>
+                                      </m:e>
+                                    </m:acc>
+                                  </m:e>
+                                </m:d>
+                              </m:e>
+                              <m:sup>
+                                <m:r>
+                                  <m:t>2</m:t>
+                                </m:r>
+                              </m:sup>
+                            </m:sSup>
+                          </m:e>
+                        </m:nary>
+                      </m:e>
+                    </m:rad>
+                  </m:oMath>
+                </a14:m>
+              </a:p>
+            </p:txBody>
+          </p:sp>
+        </mc:Choice>
+      </mc:AlternateContent>
     </p:spTree>
   </p:cSld>
 </p:sld>
@@ -8030,7 +8566,44 @@
             </a:pPr>
             <a:r>
               <a:rPr/>
-              <a:t>Test hypotheses</a:t>
+              <a:t>Compute confidence intervals</a:t>
+            </a:r>
+          </a:p>
+        </p:txBody>
+      </p:sp>
+      <p:sp>
+        <p:nvSpPr>
+          <p:cNvPr id="3" name="Content Placeholder 2"/>
+          <p:cNvSpPr>
+            <a:spLocks noGrp="1"/>
+          </p:cNvSpPr>
+          <p:nvPr>
+            <p:ph idx="1"/>
+          </p:nvPr>
+        </p:nvSpPr>
+        <p:spPr/>
+        <p:txBody>
+          <a:bodyPr/>
+          <a:lstStyle/>
+          <a:p>
+            <a:pPr lvl="0"/>
+            <a:r>
+              <a:rPr/>
+              <a:t>Use bootstrap standard error</a:t>
+            </a:r>
+          </a:p>
+          <a:p>
+            <a:pPr lvl="0"/>
+            <a:r>
+              <a:rPr/>
+              <a:t>Use percentiles from the bootstrap distribution</a:t>
+            </a:r>
+          </a:p>
+          <a:p>
+            <a:pPr lvl="0"/>
+            <a:r>
+              <a:rPr/>
+              <a:t>Use bias corrected and adjusted percentiles</a:t>
             </a:r>
           </a:p>
         </p:txBody>
@@ -8077,51 +8650,7 @@
             </a:pPr>
             <a:r>
               <a:rPr/>
-              <a:t>Break #2</a:t>
-            </a:r>
-          </a:p>
-        </p:txBody>
-      </p:sp>
-      <p:sp>
-        <p:nvSpPr>
-          <p:cNvPr id="3" name="Content Placeholder 2"/>
-          <p:cNvSpPr>
-            <a:spLocks noGrp="1"/>
-          </p:cNvSpPr>
-          <p:nvPr>
-            <p:ph idx="1"/>
-          </p:nvPr>
-        </p:nvSpPr>
-        <p:spPr/>
-        <p:txBody>
-          <a:bodyPr/>
-          <a:lstStyle/>
-          <a:p>
-            <a:pPr lvl="0"/>
-            <a:r>
-              <a:rPr/>
-              <a:t>What you have learned</a:t>
-            </a:r>
-          </a:p>
-          <a:p>
-            <a:pPr lvl="1"/>
-            <a:r>
-              <a:rPr/>
-              <a:t>Purposes of the bootstrap</a:t>
-            </a:r>
-          </a:p>
-          <a:p>
-            <a:pPr lvl="0"/>
-            <a:r>
-              <a:rPr/>
-              <a:t>What’s coming next</a:t>
-            </a:r>
-          </a:p>
-          <a:p>
-            <a:pPr lvl="1"/>
-            <a:r>
-              <a:rPr/>
-              <a:t>Mechanics</a:t>
+              <a:t>Compute confidence intervals, bootstrap standard error</a:t>
             </a:r>
           </a:p>
         </p:txBody>
@@ -8168,79 +8697,7 @@
             </a:pPr>
             <a:r>
               <a:rPr/>
-              <a:t>Mechanics</a:t>
-            </a:r>
-          </a:p>
-        </p:txBody>
-      </p:sp>
-      <p:sp>
-        <p:nvSpPr>
-          <p:cNvPr id="3" name="Content Placeholder 2"/>
-          <p:cNvSpPr>
-            <a:spLocks noGrp="1"/>
-          </p:cNvSpPr>
-          <p:nvPr>
-            <p:ph idx="1"/>
-          </p:nvPr>
-        </p:nvSpPr>
-        <p:spPr/>
-        <p:txBody>
-          <a:bodyPr/>
-          <a:lstStyle/>
-          <a:p>
-            <a:pPr lvl="0"/>
-            <a:r>
-              <a:rPr/>
-              <a:t>Resampling</a:t>
-            </a:r>
-          </a:p>
-          <a:p>
-            <a:pPr lvl="0"/>
-            <a:r>
-              <a:rPr/>
-              <a:t>Bootstrap estimates</a:t>
-            </a:r>
-          </a:p>
-          <a:p>
-            <a:pPr lvl="0"/>
-            <a:r>
-              <a:rPr/>
-              <a:t>Bias calculation</a:t>
-            </a:r>
-          </a:p>
-          <a:p>
-            <a:pPr lvl="0"/>
-            <a:r>
-              <a:rPr/>
-              <a:t>Standard error calculation</a:t>
-            </a:r>
-          </a:p>
-          <a:p>
-            <a:pPr lvl="0"/>
-            <a:r>
-              <a:rPr/>
-              <a:t>Confidence interval</a:t>
-            </a:r>
-          </a:p>
-          <a:p>
-            <a:pPr lvl="1"/>
-            <a:r>
-              <a:rPr/>
-              <a:t>Percentile method</a:t>
-            </a:r>
-          </a:p>
-          <a:p>
-            <a:pPr lvl="1"/>
-            <a:r>
-              <a:rPr/>
-              <a:t>Bias corrected and adjusted method</a:t>
-            </a:r>
-          </a:p>
-          <a:p>
-            <a:pPr lvl="0"/>
-            <a:r>
-              <a:rPr/>
-              <a:t>Hypothesis tests</a:t>
+              <a:t>Compute confidence intervals, percentiles</a:t>
             </a:r>
           </a:p>
         </p:txBody>
@@ -8287,55 +8744,471 @@
             </a:pPr>
             <a:r>
               <a:rPr/>
-              <a:t>Break #3</a:t>
-            </a:r>
-          </a:p>
-        </p:txBody>
-      </p:sp>
-      <p:sp>
-        <p:nvSpPr>
-          <p:cNvPr id="3" name="Content Placeholder 2"/>
-          <p:cNvSpPr>
-            <a:spLocks noGrp="1"/>
-          </p:cNvSpPr>
-          <p:nvPr>
-            <p:ph idx="1"/>
-          </p:nvPr>
-        </p:nvSpPr>
-        <p:spPr/>
-        <p:txBody>
-          <a:bodyPr/>
-          <a:lstStyle/>
-          <a:p>
-            <a:pPr lvl="0"/>
-            <a:r>
-              <a:rPr/>
-              <a:t>What have you learned</a:t>
-            </a:r>
-          </a:p>
-          <a:p>
-            <a:pPr lvl="1"/>
-            <a:r>
-              <a:rPr/>
-              <a:t>Mechanics</a:t>
-            </a:r>
-          </a:p>
-          <a:p>
-            <a:pPr lvl="0"/>
-            <a:r>
-              <a:rPr/>
-              <a:t>What’s coming next</a:t>
-            </a:r>
-          </a:p>
-          <a:p>
-            <a:pPr lvl="1"/>
-            <a:r>
-              <a:rPr/>
-              <a:t>Software</a:t>
-            </a:r>
-          </a:p>
-        </p:txBody>
-      </p:sp>
+              <a:t>Compute confidence intervals, BCa</a:t>
+            </a:r>
+          </a:p>
+        </p:txBody>
+      </p:sp>
+      <mc:AlternateContent xmlns:mc="http://schemas.openxmlformats.org/markup-compatibility/2006">
+        <mc:Choice xmlns:a14="http://schemas.microsoft.com/office/drawing/2010/main" Requires="a14">
+          <p:sp>
+            <p:nvSpPr>
+              <p:cNvPr id="3" name="Content Placeholder 2"/>
+              <p:cNvSpPr>
+                <a:spLocks noGrp="1"/>
+              </p:cNvSpPr>
+              <p:nvPr>
+                <p:ph idx="1"/>
+              </p:nvPr>
+            </p:nvSpPr>
+            <p:spPr/>
+            <p:txBody>
+              <a:bodyPr/>
+              <a:lstStyle/>
+              <a:p>
+                <a:pPr lvl="0"/>
+                <a:r>
+                  <a:rPr/>
+                  <a:t>Bias adjustment (using bootstrap estimates)</a:t>
+                </a:r>
+              </a:p>
+              <a:p>
+                <a:pPr lvl="1"/>
+                <a14:m>
+                  <m:oMath xmlns:m="http://schemas.openxmlformats.org/officeDocument/2006/math">
+                    <m:sSub>
+                      <m:e>
+                        <m:acc>
+                          <m:accPr>
+                            <m:chr m:val="̂"/>
+                          </m:accPr>
+                          <m:e>
+                            <m:r>
+                              <m:t>z</m:t>
+                            </m:r>
+                          </m:e>
+                        </m:acc>
+                      </m:e>
+                      <m:sub>
+                        <m:r>
+                          <m:t>0</m:t>
+                        </m:r>
+                      </m:sub>
+                    </m:sSub>
+                    <m:r>
+                      <m:rPr>
+                        <m:sty m:val="p"/>
+                      </m:rPr>
+                      <m:t>=</m:t>
+                    </m:r>
+                    <m:sSup>
+                      <m:e>
+                        <m:r>
+                          <m:t>Φ</m:t>
+                        </m:r>
+                      </m:e>
+                      <m:sup>
+                        <m:r>
+                          <m:rPr>
+                            <m:sty m:val="p"/>
+                          </m:rPr>
+                          <m:t>−</m:t>
+                        </m:r>
+                        <m:r>
+                          <m:t>1</m:t>
+                        </m:r>
+                      </m:sup>
+                    </m:sSup>
+                    <m:d>
+                      <m:dPr>
+                        <m:begChr m:val="("/>
+                        <m:endChr m:val=")"/>
+                        <m:sepChr m:val=""/>
+                        <m:grow/>
+                      </m:dPr>
+                      <m:e>
+                        <m:f>
+                          <m:fPr>
+                            <m:type m:val="bar"/>
+                          </m:fPr>
+                          <m:num>
+                            <m:r>
+                              <m:t>1</m:t>
+                            </m:r>
+                          </m:num>
+                          <m:den>
+                            <m:r>
+                              <m:t>B</m:t>
+                            </m:r>
+                          </m:den>
+                        </m:f>
+                        <m:r>
+                          <m:t>H</m:t>
+                        </m:r>
+                        <m:d>
+                          <m:dPr>
+                            <m:begChr m:val="("/>
+                            <m:endChr m:val=")"/>
+                            <m:sepChr m:val=""/>
+                            <m:grow/>
+                          </m:dPr>
+                          <m:e>
+                            <m:sSup>
+                              <m:e>
+                                <m:acc>
+                                  <m:accPr>
+                                    <m:chr m:val="̂"/>
+                                  </m:accPr>
+                                  <m:e>
+                                    <m:r>
+                                      <m:t>θ</m:t>
+                                    </m:r>
+                                  </m:e>
+                                </m:acc>
+                              </m:e>
+                              <m:sup>
+                                <m:d>
+                                  <m:dPr>
+                                    <m:begChr m:val="("/>
+                                    <m:endChr m:val=")"/>
+                                    <m:sepChr m:val=""/>
+                                    <m:grow/>
+                                  </m:dPr>
+                                  <m:e>
+                                    <m:r>
+                                      <m:t>b</m:t>
+                                    </m:r>
+                                  </m:e>
+                                </m:d>
+                              </m:sup>
+                            </m:sSup>
+                            <m:r>
+                              <m:rPr>
+                                <m:sty m:val="p"/>
+                              </m:rPr>
+                              <m:t>−</m:t>
+                            </m:r>
+                            <m:acc>
+                              <m:accPr>
+                                <m:chr m:val="̂"/>
+                              </m:accPr>
+                              <m:e>
+                                <m:r>
+                                  <m:t>θ</m:t>
+                                </m:r>
+                              </m:e>
+                            </m:acc>
+                          </m:e>
+                        </m:d>
+                      </m:e>
+                    </m:d>
+                  </m:oMath>
+                </a14:m>
+              </a:p>
+              <a:p>
+                <a:pPr lvl="0"/>
+                <a:r>
+                  <a:rPr/>
+                  <a:t>Acceleration (using jackknife)</a:t>
+                </a:r>
+              </a:p>
+              <a:p>
+                <a:pPr lvl="1"/>
+                <a14:m>
+                  <m:oMath xmlns:m="http://schemas.openxmlformats.org/officeDocument/2006/math">
+                    <m:acc>
+                      <m:accPr>
+                        <m:chr m:val="̂"/>
+                      </m:accPr>
+                      <m:e>
+                        <m:r>
+                          <m:t>a</m:t>
+                        </m:r>
+                      </m:e>
+                    </m:acc>
+                    <m:r>
+                      <m:rPr>
+                        <m:sty m:val="p"/>
+                      </m:rPr>
+                      <m:t>=</m:t>
+                    </m:r>
+                    <m:f>
+                      <m:fPr>
+                        <m:type m:val="bar"/>
+                      </m:fPr>
+                      <m:num>
+                        <m:nary>
+                          <m:naryPr>
+                            <m:chr m:val="∑"/>
+                            <m:limLoc m:val="undOvr"/>
+                            <m:subHide m:val="0"/>
+                            <m:supHide m:val="0"/>
+                          </m:naryPr>
+                          <m:sub>
+                            <m:r>
+                              <m:t>i</m:t>
+                            </m:r>
+                            <m:r>
+                              <m:rPr>
+                                <m:sty m:val="p"/>
+                              </m:rPr>
+                              <m:t>=</m:t>
+                            </m:r>
+                            <m:r>
+                              <m:t>1</m:t>
+                            </m:r>
+                          </m:sub>
+                          <m:sup>
+                            <m:r>
+                              <m:t>n</m:t>
+                            </m:r>
+                          </m:sup>
+                          <m:e>
+                            <m:sSup>
+                              <m:e>
+                                <m:d>
+                                  <m:dPr>
+                                    <m:begChr m:val="("/>
+                                    <m:endChr m:val=")"/>
+                                    <m:sepChr m:val=""/>
+                                    <m:grow/>
+                                  </m:dPr>
+                                  <m:e>
+                                    <m:sSub>
+                                      <m:e>
+                                        <m:acc>
+                                          <m:accPr>
+                                            <m:chr m:val="̂"/>
+                                          </m:accPr>
+                                          <m:e>
+                                            <m:r>
+                                              <m:t>θ</m:t>
+                                            </m:r>
+                                          </m:e>
+                                        </m:acc>
+                                      </m:e>
+                                      <m:sub>
+                                        <m:d>
+                                          <m:dPr>
+                                            <m:begChr m:val="("/>
+                                            <m:endChr m:val=")"/>
+                                            <m:sepChr m:val=""/>
+                                            <m:grow/>
+                                          </m:dPr>
+                                          <m:e>
+                                            <m:r>
+                                              <m:rPr>
+                                                <m:sty m:val="p"/>
+                                              </m:rPr>
+                                              <m:t>.</m:t>
+                                            </m:r>
+                                          </m:e>
+                                        </m:d>
+                                      </m:sub>
+                                    </m:sSub>
+                                    <m:r>
+                                      <m:rPr>
+                                        <m:sty m:val="p"/>
+                                      </m:rPr>
+                                      <m:t>−</m:t>
+                                    </m:r>
+                                    <m:sSub>
+                                      <m:e>
+                                        <m:acc>
+                                          <m:accPr>
+                                            <m:chr m:val="̂"/>
+                                          </m:accPr>
+                                          <m:e>
+                                            <m:r>
+                                              <m:t>θ</m:t>
+                                            </m:r>
+                                          </m:e>
+                                        </m:acc>
+                                      </m:e>
+                                      <m:sub>
+                                        <m:d>
+                                          <m:dPr>
+                                            <m:begChr m:val="("/>
+                                            <m:endChr m:val=")"/>
+                                            <m:sepChr m:val=""/>
+                                            <m:grow/>
+                                          </m:dPr>
+                                          <m:e>
+                                            <m:r>
+                                              <m:t>i</m:t>
+                                            </m:r>
+                                          </m:e>
+                                        </m:d>
+                                      </m:sub>
+                                    </m:sSub>
+                                  </m:e>
+                                </m:d>
+                              </m:e>
+                              <m:sup>
+                                <m:r>
+                                  <m:t>3</m:t>
+                                </m:r>
+                              </m:sup>
+                            </m:sSup>
+                          </m:e>
+                        </m:nary>
+                      </m:num>
+                      <m:den>
+                        <m:r>
+                          <m:t>6</m:t>
+                        </m:r>
+                        <m:sSup>
+                          <m:e>
+                            <m:d>
+                              <m:dPr>
+                                <m:begChr m:val="("/>
+                                <m:endChr m:val=")"/>
+                                <m:sepChr m:val=""/>
+                                <m:grow/>
+                              </m:dPr>
+                              <m:e>
+                                <m:nary>
+                                  <m:naryPr>
+                                    <m:chr m:val="∑"/>
+                                    <m:limLoc m:val="undOvr"/>
+                                    <m:subHide m:val="0"/>
+                                    <m:supHide m:val="0"/>
+                                  </m:naryPr>
+                                  <m:sub>
+                                    <m:r>
+                                      <m:t>i</m:t>
+                                    </m:r>
+                                    <m:r>
+                                      <m:rPr>
+                                        <m:sty m:val="p"/>
+                                      </m:rPr>
+                                      <m:t>=</m:t>
+                                    </m:r>
+                                    <m:r>
+                                      <m:t>1</m:t>
+                                    </m:r>
+                                  </m:sub>
+                                  <m:sup>
+                                    <m:r>
+                                      <m:t>n</m:t>
+                                    </m:r>
+                                  </m:sup>
+                                  <m:e>
+                                    <m:sSup>
+                                      <m:e>
+                                        <m:d>
+                                          <m:dPr>
+                                            <m:begChr m:val="("/>
+                                            <m:endChr m:val=")"/>
+                                            <m:sepChr m:val=""/>
+                                            <m:grow/>
+                                          </m:dPr>
+                                          <m:e>
+                                            <m:sSub>
+                                              <m:e>
+                                                <m:acc>
+                                                  <m:accPr>
+                                                    <m:chr m:val="̂"/>
+                                                  </m:accPr>
+                                                  <m:e>
+                                                    <m:r>
+                                                      <m:t>θ</m:t>
+                                                    </m:r>
+                                                  </m:e>
+                                                </m:acc>
+                                              </m:e>
+                                              <m:sub>
+                                                <m:d>
+                                                  <m:dPr>
+                                                    <m:begChr m:val="("/>
+                                                    <m:endChr m:val=")"/>
+                                                    <m:sepChr m:val=""/>
+                                                    <m:grow/>
+                                                  </m:dPr>
+                                                  <m:e>
+                                                    <m:r>
+                                                      <m:rPr>
+                                                        <m:sty m:val="p"/>
+                                                      </m:rPr>
+                                                      <m:t>.</m:t>
+                                                    </m:r>
+                                                  </m:e>
+                                                </m:d>
+                                              </m:sub>
+                                            </m:sSub>
+                                            <m:r>
+                                              <m:rPr>
+                                                <m:sty m:val="p"/>
+                                              </m:rPr>
+                                              <m:t>−</m:t>
+                                            </m:r>
+                                            <m:sSub>
+                                              <m:e>
+                                                <m:acc>
+                                                  <m:accPr>
+                                                    <m:chr m:val="̂"/>
+                                                  </m:accPr>
+                                                  <m:e>
+                                                    <m:r>
+                                                      <m:t>θ</m:t>
+                                                    </m:r>
+                                                  </m:e>
+                                                </m:acc>
+                                              </m:e>
+                                              <m:sub>
+                                                <m:d>
+                                                  <m:dPr>
+                                                    <m:begChr m:val="("/>
+                                                    <m:endChr m:val=")"/>
+                                                    <m:sepChr m:val=""/>
+                                                    <m:grow/>
+                                                  </m:dPr>
+                                                  <m:e>
+                                                    <m:r>
+                                                      <m:t>i</m:t>
+                                                    </m:r>
+                                                  </m:e>
+                                                </m:d>
+                                              </m:sub>
+                                            </m:sSub>
+                                          </m:e>
+                                        </m:d>
+                                      </m:e>
+                                      <m:sup>
+                                        <m:r>
+                                          <m:t>2</m:t>
+                                        </m:r>
+                                      </m:sup>
+                                    </m:sSup>
+                                  </m:e>
+                                </m:nary>
+                              </m:e>
+                            </m:d>
+                          </m:e>
+                          <m:sup>
+                            <m:r>
+                              <m:t>3</m:t>
+                            </m:r>
+                            <m:r>
+                              <m:rPr>
+                                <m:sty m:val="p"/>
+                              </m:rPr>
+                              <m:t>/</m:t>
+                            </m:r>
+                            <m:r>
+                              <m:t>2</m:t>
+                            </m:r>
+                          </m:sup>
+                        </m:sSup>
+                      </m:den>
+                    </m:f>
+                  </m:oMath>
+                </a14:m>
+              </a:p>
+            </p:txBody>
+          </p:sp>
+        </mc:Choice>
+      </mc:AlternateContent>
     </p:spTree>
   </p:cSld>
 </p:sld>
@@ -8469,11 +9342,492 @@
             </a:pPr>
             <a:r>
               <a:rPr/>
-              <a:t>Software</a:t>
-            </a:r>
-          </a:p>
-        </p:txBody>
-      </p:sp>
+              <a:t>Compute confidence intervals, BCa</a:t>
+            </a:r>
+          </a:p>
+        </p:txBody>
+      </p:sp>
+      <mc:AlternateContent xmlns:mc="http://schemas.openxmlformats.org/markup-compatibility/2006">
+        <mc:Choice xmlns:a14="http://schemas.microsoft.com/office/drawing/2010/main" Requires="a14">
+          <p:sp>
+            <p:nvSpPr>
+              <p:cNvPr id="3" name="Content Placeholder 2"/>
+              <p:cNvSpPr>
+                <a:spLocks noGrp="1"/>
+              </p:cNvSpPr>
+              <p:nvPr>
+                <p:ph idx="1"/>
+              </p:nvPr>
+            </p:nvSpPr>
+            <p:spPr/>
+            <p:txBody>
+              <a:bodyPr/>
+              <a:lstStyle/>
+              <a:p>
+                <a:pPr lvl="0"/>
+                <a:r>
+                  <a:rPr/>
+                  <a:t>Replace </a:t>
+                </a:r>
+                <a14:m>
+                  <m:oMath xmlns:m="http://schemas.openxmlformats.org/officeDocument/2006/math">
+                    <m:r>
+                      <m:t>α</m:t>
+                    </m:r>
+                    <m:r>
+                      <m:rPr>
+                        <m:sty m:val="p"/>
+                      </m:rPr>
+                      <m:t>/</m:t>
+                    </m:r>
+                    <m:r>
+                      <m:t>2</m:t>
+                    </m:r>
+                  </m:oMath>
+                </a14:m>
+                <a:r>
+                  <a:rPr/>
+                  <a:t> with</a:t>
+                </a:r>
+              </a:p>
+              <a:p>
+                <a:pPr lvl="1"/>
+                <a14:m>
+                  <m:oMath xmlns:m="http://schemas.openxmlformats.org/officeDocument/2006/math">
+                    <m:sSup>
+                      <m:e>
+                        <m:r>
+                          <m:t>Φ</m:t>
+                        </m:r>
+                      </m:e>
+                      <m:sup>
+                        <m:r>
+                          <m:rPr>
+                            <m:sty m:val="p"/>
+                          </m:rPr>
+                          <m:t>−</m:t>
+                        </m:r>
+                        <m:r>
+                          <m:t>1</m:t>
+                        </m:r>
+                      </m:sup>
+                    </m:sSup>
+                    <m:d>
+                      <m:dPr>
+                        <m:begChr m:val="("/>
+                        <m:endChr m:val=")"/>
+                        <m:sepChr m:val=""/>
+                        <m:grow/>
+                      </m:dPr>
+                      <m:e>
+                        <m:sSub>
+                          <m:e>
+                            <m:acc>
+                              <m:accPr>
+                                <m:chr m:val="̂"/>
+                              </m:accPr>
+                              <m:e>
+                                <m:r>
+                                  <m:t>z</m:t>
+                                </m:r>
+                              </m:e>
+                            </m:acc>
+                          </m:e>
+                          <m:sub>
+                            <m:r>
+                              <m:t>0</m:t>
+                            </m:r>
+                          </m:sub>
+                        </m:sSub>
+                        <m:r>
+                          <m:rPr>
+                            <m:sty m:val="p"/>
+                          </m:rPr>
+                          <m:t>+</m:t>
+                        </m:r>
+                        <m:f>
+                          <m:fPr>
+                            <m:type m:val="bar"/>
+                          </m:fPr>
+                          <m:num>
+                            <m:sSub>
+                              <m:e>
+                                <m:acc>
+                                  <m:accPr>
+                                    <m:chr m:val="̂"/>
+                                  </m:accPr>
+                                  <m:e>
+                                    <m:r>
+                                      <m:t>z</m:t>
+                                    </m:r>
+                                  </m:e>
+                                </m:acc>
+                              </m:e>
+                              <m:sub>
+                                <m:r>
+                                  <m:t>0</m:t>
+                                </m:r>
+                              </m:sub>
+                            </m:sSub>
+                            <m:r>
+                              <m:rPr>
+                                <m:sty m:val="p"/>
+                              </m:rPr>
+                              <m:t>+</m:t>
+                            </m:r>
+                            <m:sSub>
+                              <m:e>
+                                <m:r>
+                                  <m:t>z</m:t>
+                                </m:r>
+                              </m:e>
+                              <m:sub>
+                                <m:r>
+                                  <m:t>α</m:t>
+                                </m:r>
+                                <m:r>
+                                  <m:rPr>
+                                    <m:sty m:val="p"/>
+                                  </m:rPr>
+                                  <m:t>/</m:t>
+                                </m:r>
+                                <m:r>
+                                  <m:t>2</m:t>
+                                </m:r>
+                              </m:sub>
+                            </m:sSub>
+                          </m:num>
+                          <m:den>
+                            <m:r>
+                              <m:t>1</m:t>
+                            </m:r>
+                            <m:r>
+                              <m:rPr>
+                                <m:sty m:val="p"/>
+                              </m:rPr>
+                              <m:t>−</m:t>
+                            </m:r>
+                            <m:acc>
+                              <m:accPr>
+                                <m:chr m:val="̂"/>
+                              </m:accPr>
+                              <m:e>
+                                <m:r>
+                                  <m:t>a</m:t>
+                                </m:r>
+                              </m:e>
+                            </m:acc>
+                            <m:d>
+                              <m:dPr>
+                                <m:begChr m:val="("/>
+                                <m:endChr m:val=")"/>
+                                <m:sepChr m:val=""/>
+                                <m:grow/>
+                              </m:dPr>
+                              <m:e>
+                                <m:sSub>
+                                  <m:e>
+                                    <m:acc>
+                                      <m:accPr>
+                                        <m:chr m:val="̂"/>
+                                      </m:accPr>
+                                      <m:e>
+                                        <m:r>
+                                          <m:t>z</m:t>
+                                        </m:r>
+                                      </m:e>
+                                    </m:acc>
+                                  </m:e>
+                                  <m:sub>
+                                    <m:r>
+                                      <m:t>0</m:t>
+                                    </m:r>
+                                  </m:sub>
+                                </m:sSub>
+                                <m:r>
+                                  <m:rPr>
+                                    <m:sty m:val="p"/>
+                                  </m:rPr>
+                                  <m:t>+</m:t>
+                                </m:r>
+                                <m:sSub>
+                                  <m:e>
+                                    <m:r>
+                                      <m:t>z</m:t>
+                                    </m:r>
+                                  </m:e>
+                                  <m:sub>
+                                    <m:r>
+                                      <m:t>α</m:t>
+                                    </m:r>
+                                    <m:r>
+                                      <m:rPr>
+                                        <m:sty m:val="p"/>
+                                      </m:rPr>
+                                      <m:t>/</m:t>
+                                    </m:r>
+                                    <m:r>
+                                      <m:t>2</m:t>
+                                    </m:r>
+                                  </m:sub>
+                                </m:sSub>
+                              </m:e>
+                            </m:d>
+                          </m:den>
+                        </m:f>
+                      </m:e>
+                    </m:d>
+                  </m:oMath>
+                </a14:m>
+              </a:p>
+              <a:p>
+                <a:pPr lvl="0"/>
+                <a:r>
+                  <a:rPr/>
+                  <a:t>Replace </a:t>
+                </a:r>
+                <a14:m>
+                  <m:oMath xmlns:m="http://schemas.openxmlformats.org/officeDocument/2006/math">
+                    <m:r>
+                      <m:t>1</m:t>
+                    </m:r>
+                    <m:r>
+                      <m:rPr>
+                        <m:sty m:val="p"/>
+                      </m:rPr>
+                      <m:t>−</m:t>
+                    </m:r>
+                    <m:r>
+                      <m:t>α</m:t>
+                    </m:r>
+                    <m:r>
+                      <m:rPr>
+                        <m:sty m:val="p"/>
+                      </m:rPr>
+                      <m:t>/</m:t>
+                    </m:r>
+                    <m:r>
+                      <m:t>2</m:t>
+                    </m:r>
+                  </m:oMath>
+                </a14:m>
+                <a:r>
+                  <a:rPr/>
+                  <a:t> with</a:t>
+                </a:r>
+              </a:p>
+              <a:p>
+                <a:pPr lvl="1"/>
+                <a14:m>
+                  <m:oMath xmlns:m="http://schemas.openxmlformats.org/officeDocument/2006/math">
+                    <m:sSup>
+                      <m:e>
+                        <m:r>
+                          <m:t>Φ</m:t>
+                        </m:r>
+                      </m:e>
+                      <m:sup>
+                        <m:r>
+                          <m:rPr>
+                            <m:sty m:val="p"/>
+                          </m:rPr>
+                          <m:t>−</m:t>
+                        </m:r>
+                        <m:r>
+                          <m:t>1</m:t>
+                        </m:r>
+                      </m:sup>
+                    </m:sSup>
+                    <m:d>
+                      <m:dPr>
+                        <m:begChr m:val="("/>
+                        <m:endChr m:val=")"/>
+                        <m:sepChr m:val=""/>
+                        <m:grow/>
+                      </m:dPr>
+                      <m:e>
+                        <m:sSub>
+                          <m:e>
+                            <m:acc>
+                              <m:accPr>
+                                <m:chr m:val="̂"/>
+                              </m:accPr>
+                              <m:e>
+                                <m:r>
+                                  <m:t>z</m:t>
+                                </m:r>
+                              </m:e>
+                            </m:acc>
+                          </m:e>
+                          <m:sub>
+                            <m:r>
+                              <m:t>0</m:t>
+                            </m:r>
+                          </m:sub>
+                        </m:sSub>
+                        <m:r>
+                          <m:rPr>
+                            <m:sty m:val="p"/>
+                          </m:rPr>
+                          <m:t>+</m:t>
+                        </m:r>
+                        <m:f>
+                          <m:fPr>
+                            <m:type m:val="bar"/>
+                          </m:fPr>
+                          <m:num>
+                            <m:sSub>
+                              <m:e>
+                                <m:acc>
+                                  <m:accPr>
+                                    <m:chr m:val="̂"/>
+                                  </m:accPr>
+                                  <m:e>
+                                    <m:r>
+                                      <m:t>z</m:t>
+                                    </m:r>
+                                  </m:e>
+                                </m:acc>
+                              </m:e>
+                              <m:sub>
+                                <m:r>
+                                  <m:t>0</m:t>
+                                </m:r>
+                              </m:sub>
+                            </m:sSub>
+                            <m:r>
+                              <m:rPr>
+                                <m:sty m:val="p"/>
+                              </m:rPr>
+                              <m:t>+</m:t>
+                            </m:r>
+                            <m:sSub>
+                              <m:e>
+                                <m:r>
+                                  <m:t>z</m:t>
+                                </m:r>
+                              </m:e>
+                              <m:sub>
+                                <m:r>
+                                  <m:t>1</m:t>
+                                </m:r>
+                                <m:r>
+                                  <m:rPr>
+                                    <m:sty m:val="p"/>
+                                  </m:rPr>
+                                  <m:t>−</m:t>
+                                </m:r>
+                                <m:r>
+                                  <m:t>α</m:t>
+                                </m:r>
+                                <m:r>
+                                  <m:rPr>
+                                    <m:sty m:val="p"/>
+                                  </m:rPr>
+                                  <m:t>/</m:t>
+                                </m:r>
+                                <m:r>
+                                  <m:t>2</m:t>
+                                </m:r>
+                              </m:sub>
+                            </m:sSub>
+                          </m:num>
+                          <m:den>
+                            <m:r>
+                              <m:t>1</m:t>
+                            </m:r>
+                            <m:r>
+                              <m:rPr>
+                                <m:sty m:val="p"/>
+                              </m:rPr>
+                              <m:t>−</m:t>
+                            </m:r>
+                            <m:acc>
+                              <m:accPr>
+                                <m:chr m:val="̂"/>
+                              </m:accPr>
+                              <m:e>
+                                <m:r>
+                                  <m:t>a</m:t>
+                                </m:r>
+                              </m:e>
+                            </m:acc>
+                            <m:d>
+                              <m:dPr>
+                                <m:begChr m:val="("/>
+                                <m:endChr m:val=")"/>
+                                <m:sepChr m:val=""/>
+                                <m:grow/>
+                              </m:dPr>
+                              <m:e>
+                                <m:sSub>
+                                  <m:e>
+                                    <m:acc>
+                                      <m:accPr>
+                                        <m:chr m:val="̂"/>
+                                      </m:accPr>
+                                      <m:e>
+                                        <m:r>
+                                          <m:t>z</m:t>
+                                        </m:r>
+                                      </m:e>
+                                    </m:acc>
+                                  </m:e>
+                                  <m:sub>
+                                    <m:r>
+                                      <m:t>0</m:t>
+                                    </m:r>
+                                  </m:sub>
+                                </m:sSub>
+                                <m:r>
+                                  <m:rPr>
+                                    <m:sty m:val="p"/>
+                                  </m:rPr>
+                                  <m:t>+</m:t>
+                                </m:r>
+                                <m:sSub>
+                                  <m:e>
+                                    <m:r>
+                                      <m:t>z</m:t>
+                                    </m:r>
+                                  </m:e>
+                                  <m:sub>
+                                    <m:r>
+                                      <m:t>1</m:t>
+                                    </m:r>
+                                    <m:r>
+                                      <m:rPr>
+                                        <m:sty m:val="p"/>
+                                      </m:rPr>
+                                      <m:t>−</m:t>
+                                    </m:r>
+                                    <m:r>
+                                      <m:t>α</m:t>
+                                    </m:r>
+                                    <m:r>
+                                      <m:rPr>
+                                        <m:sty m:val="p"/>
+                                      </m:rPr>
+                                      <m:t>/</m:t>
+                                    </m:r>
+                                    <m:r>
+                                      <m:t>2</m:t>
+                                    </m:r>
+                                  </m:sub>
+                                </m:sSub>
+                              </m:e>
+                            </m:d>
+                          </m:den>
+                        </m:f>
+                      </m:e>
+                    </m:d>
+                  </m:oMath>
+                </a14:m>
+              </a:p>
+            </p:txBody>
+          </p:sp>
+        </mc:Choice>
+      </mc:AlternateContent>
     </p:spTree>
   </p:cSld>
 </p:sld>
@@ -8516,41 +9870,41 @@
             </a:pPr>
             <a:r>
               <a:rPr/>
-              <a:t>Special issues</a:t>
-            </a:r>
-          </a:p>
-        </p:txBody>
-      </p:sp>
-      <p:sp>
-        <p:nvSpPr>
-          <p:cNvPr id="3" name="Content Placeholder 2"/>
-          <p:cNvSpPr>
-            <a:spLocks noGrp="1"/>
-          </p:cNvSpPr>
-          <p:nvPr>
-            <p:ph idx="1"/>
-          </p:nvPr>
-        </p:nvSpPr>
-        <p:spPr/>
-        <p:txBody>
-          <a:bodyPr/>
-          <a:lstStyle/>
-          <a:p>
-            <a:pPr lvl="0"/>
-            <a:r>
-              <a:rPr/>
-              <a:t>Time series</a:t>
-            </a:r>
-          </a:p>
-          <a:p>
-            <a:pPr lvl="0"/>
-            <a:r>
-              <a:rPr/>
-              <a:t>Regression models</a:t>
-            </a:r>
-          </a:p>
-        </p:txBody>
-      </p:sp>
+              <a:t>Percentiles with no adjustment</a:t>
+            </a:r>
+          </a:p>
+        </p:txBody>
+      </p:sp>
+      <p:pic>
+        <p:nvPicPr>
+          <p:cNvPr descr="bootstrap-slides_files/figure-pptx/unnamed-chunk-4-1.png" id="0" name="Picture 1"/>
+          <p:cNvPicPr>
+            <a:picLocks noGrp="1" noChangeAspect="1"/>
+          </p:cNvPicPr>
+          <p:nvPr/>
+        </p:nvPicPr>
+        <p:blipFill>
+          <a:blip r:embed="rId2"/>
+          <a:stretch>
+            <a:fillRect/>
+          </a:stretch>
+        </p:blipFill>
+        <p:spPr bwMode="auto">
+          <a:xfrm>
+            <a:off x="2451100" y="1193800"/>
+            <a:ext cx="4241800" cy="3390900"/>
+          </a:xfrm>
+          <a:prstGeom prst="rect">
+            <a:avLst/>
+          </a:prstGeom>
+          <a:noFill/>
+          <a:ln w="9525">
+            <a:noFill/>
+            <a:headEnd/>
+            <a:tailEnd/>
+          </a:ln>
+        </p:spPr>
+      </p:pic>
     </p:spTree>
   </p:cSld>
 </p:sld>
@@ -8593,7 +9947,208 @@
             </a:pPr>
             <a:r>
               <a:rPr/>
-              <a:t>Summary</a:t>
+              <a:t>Percentlies with bias adjustment</a:t>
+            </a:r>
+          </a:p>
+        </p:txBody>
+      </p:sp>
+      <p:pic>
+        <p:nvPicPr>
+          <p:cNvPr descr="bootstrap-slides_files/figure-pptx/unnamed-chunk-5-1.png" id="0" name="Picture 1"/>
+          <p:cNvPicPr>
+            <a:picLocks noGrp="1" noChangeAspect="1"/>
+          </p:cNvPicPr>
+          <p:nvPr/>
+        </p:nvPicPr>
+        <p:blipFill>
+          <a:blip r:embed="rId2"/>
+          <a:stretch>
+            <a:fillRect/>
+          </a:stretch>
+        </p:blipFill>
+        <p:spPr bwMode="auto">
+          <a:xfrm>
+            <a:off x="2451100" y="1193800"/>
+            <a:ext cx="4241800" cy="3390900"/>
+          </a:xfrm>
+          <a:prstGeom prst="rect">
+            <a:avLst/>
+          </a:prstGeom>
+          <a:noFill/>
+          <a:ln w="9525">
+            <a:noFill/>
+            <a:headEnd/>
+            <a:tailEnd/>
+          </a:ln>
+        </p:spPr>
+      </p:pic>
+    </p:spTree>
+  </p:cSld>
+</p:sld>
+</file>
+
+<file path=ppt/slides/slide33.xml><?xml version="1.0" encoding="utf-8"?>
+<p:sld xmlns:a="http://schemas.openxmlformats.org/drawingml/2006/main" xmlns:r="http://schemas.openxmlformats.org/officeDocument/2006/relationships" xmlns:p="http://schemas.openxmlformats.org/presentationml/2006/main">
+  <p:cSld>
+    <p:spTree>
+      <p:nvGrpSpPr>
+        <p:cNvPr id="1" name=""/>
+        <p:cNvGrpSpPr/>
+        <p:nvPr/>
+      </p:nvGrpSpPr>
+      <p:grpSpPr>
+        <a:xfrm>
+          <a:off x="0" y="0"/>
+          <a:ext cx="0" cy="0"/>
+          <a:chOff x="0" y="0"/>
+          <a:chExt cx="0" cy="0"/>
+        </a:xfrm>
+      </p:grpSpPr>
+      <p:sp>
+        <p:nvSpPr>
+          <p:cNvPr id="2" name="Title 1"/>
+          <p:cNvSpPr>
+            <a:spLocks noGrp="1"/>
+          </p:cNvSpPr>
+          <p:nvPr>
+            <p:ph type="title"/>
+          </p:nvPr>
+        </p:nvSpPr>
+        <p:spPr/>
+        <p:txBody>
+          <a:bodyPr/>
+          <a:lstStyle/>
+          <a:p>
+            <a:pPr lvl="0" indent="0" marL="0">
+              <a:buNone/>
+            </a:pPr>
+            <a:r>
+              <a:rPr/>
+              <a:t>Percentiles with acceleration adjustment</a:t>
+            </a:r>
+          </a:p>
+        </p:txBody>
+      </p:sp>
+      <p:pic>
+        <p:nvPicPr>
+          <p:cNvPr descr="bootstrap-slides_files/figure-pptx/unnamed-chunk-6-1.png" id="0" name="Picture 1"/>
+          <p:cNvPicPr>
+            <a:picLocks noGrp="1" noChangeAspect="1"/>
+          </p:cNvPicPr>
+          <p:nvPr/>
+        </p:nvPicPr>
+        <p:blipFill>
+          <a:blip r:embed="rId2"/>
+          <a:stretch>
+            <a:fillRect/>
+          </a:stretch>
+        </p:blipFill>
+        <p:spPr bwMode="auto">
+          <a:xfrm>
+            <a:off x="2451100" y="1193800"/>
+            <a:ext cx="4241800" cy="3390900"/>
+          </a:xfrm>
+          <a:prstGeom prst="rect">
+            <a:avLst/>
+          </a:prstGeom>
+          <a:noFill/>
+          <a:ln w="9525">
+            <a:noFill/>
+            <a:headEnd/>
+            <a:tailEnd/>
+          </a:ln>
+        </p:spPr>
+      </p:pic>
+    </p:spTree>
+  </p:cSld>
+</p:sld>
+</file>
+
+<file path=ppt/slides/slide34.xml><?xml version="1.0" encoding="utf-8"?>
+<p:sld xmlns:a="http://schemas.openxmlformats.org/drawingml/2006/main" xmlns:r="http://schemas.openxmlformats.org/officeDocument/2006/relationships" xmlns:p="http://schemas.openxmlformats.org/presentationml/2006/main">
+  <p:cSld>
+    <p:spTree>
+      <p:nvGrpSpPr>
+        <p:cNvPr id="1" name=""/>
+        <p:cNvGrpSpPr/>
+        <p:nvPr/>
+      </p:nvGrpSpPr>
+      <p:grpSpPr>
+        <a:xfrm>
+          <a:off x="0" y="0"/>
+          <a:ext cx="0" cy="0"/>
+          <a:chOff x="0" y="0"/>
+          <a:chExt cx="0" cy="0"/>
+        </a:xfrm>
+      </p:grpSpPr>
+      <p:sp>
+        <p:nvSpPr>
+          <p:cNvPr id="2" name="Title 1"/>
+          <p:cNvSpPr>
+            <a:spLocks noGrp="1"/>
+          </p:cNvSpPr>
+          <p:nvPr>
+            <p:ph type="title"/>
+          </p:nvPr>
+        </p:nvSpPr>
+        <p:spPr/>
+        <p:txBody>
+          <a:bodyPr/>
+          <a:lstStyle/>
+          <a:p>
+            <a:pPr lvl="0" indent="0" marL="0">
+              <a:buNone/>
+            </a:pPr>
+            <a:r>
+              <a:rPr/>
+              <a:t>Test hypotheses</a:t>
+            </a:r>
+          </a:p>
+        </p:txBody>
+      </p:sp>
+    </p:spTree>
+  </p:cSld>
+</p:sld>
+</file>
+
+<file path=ppt/slides/slide35.xml><?xml version="1.0" encoding="utf-8"?>
+<p:sld xmlns:a="http://schemas.openxmlformats.org/drawingml/2006/main" xmlns:r="http://schemas.openxmlformats.org/officeDocument/2006/relationships" xmlns:p="http://schemas.openxmlformats.org/presentationml/2006/main">
+  <p:cSld>
+    <p:spTree>
+      <p:nvGrpSpPr>
+        <p:cNvPr id="1" name=""/>
+        <p:cNvGrpSpPr/>
+        <p:nvPr/>
+      </p:nvGrpSpPr>
+      <p:grpSpPr>
+        <a:xfrm>
+          <a:off x="0" y="0"/>
+          <a:ext cx="0" cy="0"/>
+          <a:chOff x="0" y="0"/>
+          <a:chExt cx="0" cy="0"/>
+        </a:xfrm>
+      </p:grpSpPr>
+      <p:sp>
+        <p:nvSpPr>
+          <p:cNvPr id="2" name="Title 1"/>
+          <p:cNvSpPr>
+            <a:spLocks noGrp="1"/>
+          </p:cNvSpPr>
+          <p:nvPr>
+            <p:ph type="title"/>
+          </p:nvPr>
+        </p:nvSpPr>
+        <p:spPr/>
+        <p:txBody>
+          <a:bodyPr/>
+          <a:lstStyle/>
+          <a:p>
+            <a:pPr lvl="0" indent="0" marL="0">
+              <a:buNone/>
+            </a:pPr>
+            <a:r>
+              <a:rPr/>
+              <a:t>Break #2</a:t>
             </a:r>
           </a:p>
         </p:txBody>
@@ -8616,28 +10171,362 @@
             <a:pPr lvl="0"/>
             <a:r>
               <a:rPr/>
-              <a:t>History</a:t>
+              <a:t>What you have learned</a:t>
+            </a:r>
+          </a:p>
+          <a:p>
+            <a:pPr lvl="1"/>
+            <a:r>
+              <a:rPr/>
+              <a:t>Purposes of the bootstrap</a:t>
             </a:r>
           </a:p>
           <a:p>
             <a:pPr lvl="0"/>
             <a:r>
               <a:rPr/>
-              <a:t>Purpose</a:t>
-            </a:r>
-          </a:p>
+              <a:t>What’s coming next</a:t>
+            </a:r>
+          </a:p>
+          <a:p>
+            <a:pPr lvl="1"/>
+            <a:r>
+              <a:rPr/>
+              <a:t>Mechanics</a:t>
+            </a:r>
+          </a:p>
+        </p:txBody>
+      </p:sp>
+    </p:spTree>
+  </p:cSld>
+</p:sld>
+</file>
+
+<file path=ppt/slides/slide36.xml><?xml version="1.0" encoding="utf-8"?>
+<p:sld xmlns:a="http://schemas.openxmlformats.org/drawingml/2006/main" xmlns:r="http://schemas.openxmlformats.org/officeDocument/2006/relationships" xmlns:p="http://schemas.openxmlformats.org/presentationml/2006/main">
+  <p:cSld>
+    <p:spTree>
+      <p:nvGrpSpPr>
+        <p:cNvPr id="1" name=""/>
+        <p:cNvGrpSpPr/>
+        <p:nvPr/>
+      </p:nvGrpSpPr>
+      <p:grpSpPr>
+        <a:xfrm>
+          <a:off x="0" y="0"/>
+          <a:ext cx="0" cy="0"/>
+          <a:chOff x="0" y="0"/>
+          <a:chExt cx="0" cy="0"/>
+        </a:xfrm>
+      </p:grpSpPr>
+      <p:sp>
+        <p:nvSpPr>
+          <p:cNvPr id="2" name="Title 1"/>
+          <p:cNvSpPr>
+            <a:spLocks noGrp="1"/>
+          </p:cNvSpPr>
+          <p:nvPr>
+            <p:ph type="title"/>
+          </p:nvPr>
+        </p:nvSpPr>
+        <p:spPr/>
+        <p:txBody>
+          <a:bodyPr/>
+          <a:lstStyle/>
+          <a:p>
+            <a:pPr lvl="0" indent="0" marL="0">
+              <a:buNone/>
+            </a:pPr>
+            <a:r>
+              <a:rPr/>
+              <a:t>Mechanics</a:t>
+            </a:r>
+          </a:p>
+        </p:txBody>
+      </p:sp>
+      <p:sp>
+        <p:nvSpPr>
+          <p:cNvPr id="3" name="Content Placeholder 2"/>
+          <p:cNvSpPr>
+            <a:spLocks noGrp="1"/>
+          </p:cNvSpPr>
+          <p:nvPr>
+            <p:ph idx="1"/>
+          </p:nvPr>
+        </p:nvSpPr>
+        <p:spPr/>
+        <p:txBody>
+          <a:bodyPr/>
+          <a:lstStyle/>
           <a:p>
             <a:pPr lvl="0"/>
             <a:r>
               <a:rPr/>
-              <a:t>Calculations</a:t>
+              <a:t>Resampling</a:t>
             </a:r>
           </a:p>
           <a:p>
             <a:pPr lvl="0"/>
             <a:r>
               <a:rPr/>
+              <a:t>Bootstrap estimates</a:t>
+            </a:r>
+          </a:p>
+          <a:p>
+            <a:pPr lvl="0"/>
+            <a:r>
+              <a:rPr/>
+              <a:t>Bias calculation</a:t>
+            </a:r>
+          </a:p>
+          <a:p>
+            <a:pPr lvl="0"/>
+            <a:r>
+              <a:rPr/>
+              <a:t>Standard error calculation</a:t>
+            </a:r>
+          </a:p>
+          <a:p>
+            <a:pPr lvl="0"/>
+            <a:r>
+              <a:rPr/>
+              <a:t>Confidence interval</a:t>
+            </a:r>
+          </a:p>
+          <a:p>
+            <a:pPr lvl="1"/>
+            <a:r>
+              <a:rPr/>
+              <a:t>Percentile method</a:t>
+            </a:r>
+          </a:p>
+          <a:p>
+            <a:pPr lvl="1"/>
+            <a:r>
+              <a:rPr/>
+              <a:t>Bias corrected and adjusted method</a:t>
+            </a:r>
+          </a:p>
+          <a:p>
+            <a:pPr lvl="0"/>
+            <a:r>
+              <a:rPr/>
+              <a:t>Hypothesis tests</a:t>
+            </a:r>
+          </a:p>
+        </p:txBody>
+      </p:sp>
+    </p:spTree>
+  </p:cSld>
+</p:sld>
+</file>
+
+<file path=ppt/slides/slide37.xml><?xml version="1.0" encoding="utf-8"?>
+<p:sld xmlns:a="http://schemas.openxmlformats.org/drawingml/2006/main" xmlns:r="http://schemas.openxmlformats.org/officeDocument/2006/relationships" xmlns:p="http://schemas.openxmlformats.org/presentationml/2006/main">
+  <p:cSld>
+    <p:spTree>
+      <p:nvGrpSpPr>
+        <p:cNvPr id="1" name=""/>
+        <p:cNvGrpSpPr/>
+        <p:nvPr/>
+      </p:nvGrpSpPr>
+      <p:grpSpPr>
+        <a:xfrm>
+          <a:off x="0" y="0"/>
+          <a:ext cx="0" cy="0"/>
+          <a:chOff x="0" y="0"/>
+          <a:chExt cx="0" cy="0"/>
+        </a:xfrm>
+      </p:grpSpPr>
+      <p:sp>
+        <p:nvSpPr>
+          <p:cNvPr id="2" name="Title 1"/>
+          <p:cNvSpPr>
+            <a:spLocks noGrp="1"/>
+          </p:cNvSpPr>
+          <p:nvPr>
+            <p:ph type="title"/>
+          </p:nvPr>
+        </p:nvSpPr>
+        <p:spPr/>
+        <p:txBody>
+          <a:bodyPr/>
+          <a:lstStyle/>
+          <a:p>
+            <a:pPr lvl="0" indent="0" marL="0">
+              <a:buNone/>
+            </a:pPr>
+            <a:r>
+              <a:rPr/>
+              <a:t>Break #3</a:t>
+            </a:r>
+          </a:p>
+        </p:txBody>
+      </p:sp>
+      <p:sp>
+        <p:nvSpPr>
+          <p:cNvPr id="3" name="Content Placeholder 2"/>
+          <p:cNvSpPr>
+            <a:spLocks noGrp="1"/>
+          </p:cNvSpPr>
+          <p:nvPr>
+            <p:ph idx="1"/>
+          </p:nvPr>
+        </p:nvSpPr>
+        <p:spPr/>
+        <p:txBody>
+          <a:bodyPr/>
+          <a:lstStyle/>
+          <a:p>
+            <a:pPr lvl="0"/>
+            <a:r>
+              <a:rPr/>
+              <a:t>What have you learned</a:t>
+            </a:r>
+          </a:p>
+          <a:p>
+            <a:pPr lvl="1"/>
+            <a:r>
+              <a:rPr/>
+              <a:t>Mechanics</a:t>
+            </a:r>
+          </a:p>
+          <a:p>
+            <a:pPr lvl="0"/>
+            <a:r>
+              <a:rPr/>
+              <a:t>What’s coming next</a:t>
+            </a:r>
+          </a:p>
+          <a:p>
+            <a:pPr lvl="1"/>
+            <a:r>
+              <a:rPr/>
               <a:t>Software</a:t>
+            </a:r>
+          </a:p>
+        </p:txBody>
+      </p:sp>
+    </p:spTree>
+  </p:cSld>
+</p:sld>
+</file>
+
+<file path=ppt/slides/slide38.xml><?xml version="1.0" encoding="utf-8"?>
+<p:sld xmlns:a="http://schemas.openxmlformats.org/drawingml/2006/main" xmlns:r="http://schemas.openxmlformats.org/officeDocument/2006/relationships" xmlns:p="http://schemas.openxmlformats.org/presentationml/2006/main">
+  <p:cSld>
+    <p:spTree>
+      <p:nvGrpSpPr>
+        <p:cNvPr id="1" name=""/>
+        <p:cNvGrpSpPr/>
+        <p:nvPr/>
+      </p:nvGrpSpPr>
+      <p:grpSpPr>
+        <a:xfrm>
+          <a:off x="0" y="0"/>
+          <a:ext cx="0" cy="0"/>
+          <a:chOff x="0" y="0"/>
+          <a:chExt cx="0" cy="0"/>
+        </a:xfrm>
+      </p:grpSpPr>
+      <p:sp>
+        <p:nvSpPr>
+          <p:cNvPr id="2" name="Title 1"/>
+          <p:cNvSpPr>
+            <a:spLocks noGrp="1"/>
+          </p:cNvSpPr>
+          <p:nvPr>
+            <p:ph type="title"/>
+          </p:nvPr>
+        </p:nvSpPr>
+        <p:spPr/>
+        <p:txBody>
+          <a:bodyPr/>
+          <a:lstStyle/>
+          <a:p>
+            <a:pPr lvl="0" indent="0" marL="0">
+              <a:buNone/>
+            </a:pPr>
+            <a:r>
+              <a:rPr/>
+              <a:t>Software</a:t>
+            </a:r>
+          </a:p>
+        </p:txBody>
+      </p:sp>
+    </p:spTree>
+  </p:cSld>
+</p:sld>
+</file>
+
+<file path=ppt/slides/slide39.xml><?xml version="1.0" encoding="utf-8"?>
+<p:sld xmlns:a="http://schemas.openxmlformats.org/drawingml/2006/main" xmlns:r="http://schemas.openxmlformats.org/officeDocument/2006/relationships" xmlns:p="http://schemas.openxmlformats.org/presentationml/2006/main">
+  <p:cSld>
+    <p:spTree>
+      <p:nvGrpSpPr>
+        <p:cNvPr id="1" name=""/>
+        <p:cNvGrpSpPr/>
+        <p:nvPr/>
+      </p:nvGrpSpPr>
+      <p:grpSpPr>
+        <a:xfrm>
+          <a:off x="0" y="0"/>
+          <a:ext cx="0" cy="0"/>
+          <a:chOff x="0" y="0"/>
+          <a:chExt cx="0" cy="0"/>
+        </a:xfrm>
+      </p:grpSpPr>
+      <p:sp>
+        <p:nvSpPr>
+          <p:cNvPr id="2" name="Title 1"/>
+          <p:cNvSpPr>
+            <a:spLocks noGrp="1"/>
+          </p:cNvSpPr>
+          <p:nvPr>
+            <p:ph type="title"/>
+          </p:nvPr>
+        </p:nvSpPr>
+        <p:spPr/>
+        <p:txBody>
+          <a:bodyPr/>
+          <a:lstStyle/>
+          <a:p>
+            <a:pPr lvl="0" indent="0" marL="0">
+              <a:buNone/>
+            </a:pPr>
+            <a:r>
+              <a:rPr/>
+              <a:t>Special issues</a:t>
+            </a:r>
+          </a:p>
+        </p:txBody>
+      </p:sp>
+      <p:sp>
+        <p:nvSpPr>
+          <p:cNvPr id="3" name="Content Placeholder 2"/>
+          <p:cNvSpPr>
+            <a:spLocks noGrp="1"/>
+          </p:cNvSpPr>
+          <p:nvPr>
+            <p:ph idx="1"/>
+          </p:nvPr>
+        </p:nvSpPr>
+        <p:spPr/>
+        <p:txBody>
+          <a:bodyPr/>
+          <a:lstStyle/>
+          <a:p>
+            <a:pPr lvl="0"/>
+            <a:r>
+              <a:rPr/>
+              <a:t>Time series</a:t>
+            </a:r>
+          </a:p>
+          <a:p>
+            <a:pPr lvl="0"/>
+            <a:r>
+              <a:rPr/>
+              <a:t>Regression models</a:t>
             </a:r>
           </a:p>
         </p:txBody>
@@ -8745,6 +10634,97 @@
             <a:r>
               <a:rPr/>
               <a:t>Figure 1. Cover of book by Robert Serfling</a:t>
+            </a:r>
+          </a:p>
+        </p:txBody>
+      </p:sp>
+    </p:spTree>
+  </p:cSld>
+</p:sld>
+</file>
+
+<file path=ppt/slides/slide40.xml><?xml version="1.0" encoding="utf-8"?>
+<p:sld xmlns:a="http://schemas.openxmlformats.org/drawingml/2006/main" xmlns:r="http://schemas.openxmlformats.org/officeDocument/2006/relationships" xmlns:p="http://schemas.openxmlformats.org/presentationml/2006/main">
+  <p:cSld>
+    <p:spTree>
+      <p:nvGrpSpPr>
+        <p:cNvPr id="1" name=""/>
+        <p:cNvGrpSpPr/>
+        <p:nvPr/>
+      </p:nvGrpSpPr>
+      <p:grpSpPr>
+        <a:xfrm>
+          <a:off x="0" y="0"/>
+          <a:ext cx="0" cy="0"/>
+          <a:chOff x="0" y="0"/>
+          <a:chExt cx="0" cy="0"/>
+        </a:xfrm>
+      </p:grpSpPr>
+      <p:sp>
+        <p:nvSpPr>
+          <p:cNvPr id="2" name="Title 1"/>
+          <p:cNvSpPr>
+            <a:spLocks noGrp="1"/>
+          </p:cNvSpPr>
+          <p:nvPr>
+            <p:ph type="title"/>
+          </p:nvPr>
+        </p:nvSpPr>
+        <p:spPr/>
+        <p:txBody>
+          <a:bodyPr/>
+          <a:lstStyle/>
+          <a:p>
+            <a:pPr lvl="0" indent="0" marL="0">
+              <a:buNone/>
+            </a:pPr>
+            <a:r>
+              <a:rPr/>
+              <a:t>Summary</a:t>
+            </a:r>
+          </a:p>
+        </p:txBody>
+      </p:sp>
+      <p:sp>
+        <p:nvSpPr>
+          <p:cNvPr id="3" name="Content Placeholder 2"/>
+          <p:cNvSpPr>
+            <a:spLocks noGrp="1"/>
+          </p:cNvSpPr>
+          <p:nvPr>
+            <p:ph idx="1"/>
+          </p:nvPr>
+        </p:nvSpPr>
+        <p:spPr/>
+        <p:txBody>
+          <a:bodyPr/>
+          <a:lstStyle/>
+          <a:p>
+            <a:pPr lvl="0"/>
+            <a:r>
+              <a:rPr/>
+              <a:t>History</a:t>
+            </a:r>
+          </a:p>
+          <a:p>
+            <a:pPr lvl="0"/>
+            <a:r>
+              <a:rPr/>
+              <a:t>Purpose</a:t>
+            </a:r>
+          </a:p>
+          <a:p>
+            <a:pPr lvl="0"/>
+            <a:r>
+              <a:rPr/>
+              <a:t>Calculations</a:t>
+            </a:r>
+          </a:p>
+          <a:p>
+            <a:pPr lvl="0"/>
+            <a:r>
+              <a:rPr/>
+              <a:t>Software</a:t>
             </a:r>
           </a:p>
         </p:txBody>

</xml_diff>

<commit_message>
Started work on software examples in bootstrap talk
</commit_message>
<xml_diff>
--- a/bootstrap/src/bootstrap-slides.pptx
+++ b/bootstrap/src/bootstrap-slides.pptx
@@ -5,7 +5,7 @@
     <p:sldMasterId id="2147483648" r:id="rId1"/>
   </p:sldMasterIdLst>
   <p:notesMasterIdLst>
-    <p:notesMasterId r:id="rId42"/>
+    <p:notesMasterId r:id="rId45"/>
   </p:notesMasterIdLst>
   <p:sldIdLst>
     <p:sldId id="256" r:id="rId2"/>
@@ -48,6 +48,9 @@
     <p:sldId id="293" r:id="rId39"/>
     <p:sldId id="294" r:id="rId40"/>
     <p:sldId id="295" r:id="rId41"/>
+    <p:sldId id="296" r:id="rId42"/>
+    <p:sldId id="297" r:id="rId43"/>
+    <p:sldId id="298" r:id="rId44"/>
   </p:sldIdLst>
   <p:sldSz cx="9144000" cy="5143500" type="screen16x9"/>
   <p:notesSz cx="6858000" cy="9144000"/>
@@ -1609,7 +1612,21 @@
             </a:pPr>
             <a:r>
               <a:rPr/>
-              <a:t>Dr. Efron refers to it as an acceleration, because it relates to the second derivative of something. Remember that in Calculus, the first derivative is analogous to speed and the second derivative is analogous to acceleration.</a:t>
+              <a:t>Dr. Efron refers to it as an acceleration, because it relates to the second derivative of the score function. Don’t ask me what the score function represents. Also don’t ask me why the acceleration relies on a jackknife sample rather than a bootstrap sample.</a:t>
+            </a:r>
+          </a:p>
+          <a:p>
+            <a:pPr lvl="0" indent="0" marL="0">
+              <a:buNone/>
+            </a:pPr>
+          </a:p>
+          <a:p>
+            <a:pPr lvl="0" indent="0" marL="0">
+              <a:buNone/>
+            </a:pPr>
+            <a:r>
+              <a:rPr/>
+              <a:t>Remember that in Calculus, the first derivative is analogous to speed and the second derivative is analogous to acceleration.</a:t>
             </a:r>
           </a:p>
           <a:p>
@@ -1838,6 +1855,266 @@
             <a:fld id="{18BDFEC3-8487-43E8-A154-7C12CBC1FFF2}" type="slidenum">
               <a:rPr lang="en-US"/>
               <a:t>3</a:t>
+            </a:fld>
+            <a:endParaRPr lang="en-US"/>
+          </a:p>
+        </p:txBody>
+      </p:sp>
+    </p:spTree>
+  </p:cSld>
+</p:notes>
+</file>
+
+<file path=ppt/notesSlides/notesSlide20.xml><?xml version="1.0" encoding="utf-8"?>
+<p:notes xmlns:a="http://schemas.openxmlformats.org/drawingml/2006/main" xmlns:r="http://schemas.openxmlformats.org/officeDocument/2006/relationships" xmlns:p="http://schemas.openxmlformats.org/presentationml/2006/main">
+  <p:cSld>
+    <p:spTree>
+      <p:nvGrpSpPr>
+        <p:cNvPr id="1" name=""/>
+        <p:cNvGrpSpPr/>
+        <p:nvPr/>
+      </p:nvGrpSpPr>
+      <p:grpSpPr>
+        <a:xfrm>
+          <a:off x="0" y="0"/>
+          <a:ext cx="0" cy="0"/>
+          <a:chOff x="0" y="0"/>
+          <a:chExt cx="0" cy="0"/>
+        </a:xfrm>
+      </p:grpSpPr>
+      <p:sp>
+        <p:nvSpPr>
+          <p:cNvPr id="2" name="Slide Image Placeholder 1"/>
+          <p:cNvSpPr>
+            <a:spLocks noGrp="1" noRot="1" noChangeAspect="1"/>
+          </p:cNvSpPr>
+          <p:nvPr>
+            <p:ph type="sldImg"/>
+          </p:nvPr>
+        </p:nvSpPr>
+        <p:spPr/>
+      </p:sp>
+      <p:sp>
+        <p:nvSpPr>
+          <p:cNvPr id="3" name="Notes Placeholder 2"/>
+          <p:cNvSpPr>
+            <a:spLocks noGrp="1"/>
+          </p:cNvSpPr>
+          <p:nvPr>
+            <p:ph type="body" idx="1"/>
+          </p:nvPr>
+        </p:nvSpPr>
+        <p:spPr/>
+        <p:txBody>
+          <a:bodyPr/>
+          <a:lstStyle/>
+          <a:p>
+            <a:pPr lvl="0" indent="0" marL="0">
+              <a:buNone/>
+            </a:pPr>
+            <a:r>
+              <a:rPr/>
+              <a:t>Here’s a picture showing what the unadjusted percentiles look like for a 90% confidence interval. Z-0-hat is zero, so no bias adjustment and a-hat is also zero, so no adjustment for skewness. You would just choose the 5th and 95th percentiles of the bootstrapped estimates.</a:t>
+            </a:r>
+          </a:p>
+        </p:txBody>
+      </p:sp>
+      <p:sp>
+        <p:nvSpPr>
+          <p:cNvPr id="4" name="Slide Number Placeholder 3"/>
+          <p:cNvSpPr>
+            <a:spLocks noGrp="1"/>
+          </p:cNvSpPr>
+          <p:nvPr>
+            <p:ph type="sldNum" sz="quarter" idx="10"/>
+          </p:nvPr>
+        </p:nvSpPr>
+        <p:spPr/>
+        <p:txBody>
+          <a:bodyPr/>
+          <a:lstStyle/>
+          <a:p>
+            <a:fld id="{18BDFEC3-8487-43E8-A154-7C12CBC1FFF2}" type="slidenum">
+              <a:rPr lang="en-US"/>
+              <a:t>32</a:t>
+            </a:fld>
+            <a:endParaRPr lang="en-US"/>
+          </a:p>
+        </p:txBody>
+      </p:sp>
+    </p:spTree>
+  </p:cSld>
+</p:notes>
+</file>
+
+<file path=ppt/notesSlides/notesSlide21.xml><?xml version="1.0" encoding="utf-8"?>
+<p:notes xmlns:a="http://schemas.openxmlformats.org/drawingml/2006/main" xmlns:r="http://schemas.openxmlformats.org/officeDocument/2006/relationships" xmlns:p="http://schemas.openxmlformats.org/presentationml/2006/main">
+  <p:cSld>
+    <p:spTree>
+      <p:nvGrpSpPr>
+        <p:cNvPr id="1" name=""/>
+        <p:cNvGrpSpPr/>
+        <p:nvPr/>
+      </p:nvGrpSpPr>
+      <p:grpSpPr>
+        <a:xfrm>
+          <a:off x="0" y="0"/>
+          <a:ext cx="0" cy="0"/>
+          <a:chOff x="0" y="0"/>
+          <a:chExt cx="0" cy="0"/>
+        </a:xfrm>
+      </p:grpSpPr>
+      <p:sp>
+        <p:nvSpPr>
+          <p:cNvPr id="2" name="Slide Image Placeholder 1"/>
+          <p:cNvSpPr>
+            <a:spLocks noGrp="1" noRot="1" noChangeAspect="1"/>
+          </p:cNvSpPr>
+          <p:nvPr>
+            <p:ph type="sldImg"/>
+          </p:nvPr>
+        </p:nvSpPr>
+        <p:spPr/>
+      </p:sp>
+      <p:sp>
+        <p:nvSpPr>
+          <p:cNvPr id="3" name="Notes Placeholder 2"/>
+          <p:cNvSpPr>
+            <a:spLocks noGrp="1"/>
+          </p:cNvSpPr>
+          <p:nvPr>
+            <p:ph type="body" idx="1"/>
+          </p:nvPr>
+        </p:nvSpPr>
+        <p:spPr/>
+        <p:txBody>
+          <a:bodyPr/>
+          <a:lstStyle/>
+          <a:p>
+            <a:pPr lvl="0" indent="0" marL="0">
+              <a:buNone/>
+            </a:pPr>
+            <a:r>
+              <a:rPr/>
+              <a:t>A bias adjustments shifts the z values to the left or the right. In this hypothetical case, the z values are shifted left by 0.2 units, and instead of using the instead of the 5th and the 95th percentiles, you would use would be the 3.3 percentile and the 92.6 percentile.</a:t>
+            </a:r>
+          </a:p>
+        </p:txBody>
+      </p:sp>
+      <p:sp>
+        <p:nvSpPr>
+          <p:cNvPr id="4" name="Slide Number Placeholder 3"/>
+          <p:cNvSpPr>
+            <a:spLocks noGrp="1"/>
+          </p:cNvSpPr>
+          <p:nvPr>
+            <p:ph type="sldNum" sz="quarter" idx="10"/>
+          </p:nvPr>
+        </p:nvSpPr>
+        <p:spPr/>
+        <p:txBody>
+          <a:bodyPr/>
+          <a:lstStyle/>
+          <a:p>
+            <a:fld id="{18BDFEC3-8487-43E8-A154-7C12CBC1FFF2}" type="slidenum">
+              <a:rPr lang="en-US"/>
+              <a:t>34</a:t>
+            </a:fld>
+            <a:endParaRPr lang="en-US"/>
+          </a:p>
+        </p:txBody>
+      </p:sp>
+    </p:spTree>
+  </p:cSld>
+</p:notes>
+</file>
+
+<file path=ppt/notesSlides/notesSlide22.xml><?xml version="1.0" encoding="utf-8"?>
+<p:notes xmlns:a="http://schemas.openxmlformats.org/drawingml/2006/main" xmlns:r="http://schemas.openxmlformats.org/officeDocument/2006/relationships" xmlns:p="http://schemas.openxmlformats.org/presentationml/2006/main">
+  <p:cSld>
+    <p:spTree>
+      <p:nvGrpSpPr>
+        <p:cNvPr id="1" name=""/>
+        <p:cNvGrpSpPr/>
+        <p:nvPr/>
+      </p:nvGrpSpPr>
+      <p:grpSpPr>
+        <a:xfrm>
+          <a:off x="0" y="0"/>
+          <a:ext cx="0" cy="0"/>
+          <a:chOff x="0" y="0"/>
+          <a:chExt cx="0" cy="0"/>
+        </a:xfrm>
+      </p:grpSpPr>
+      <p:sp>
+        <p:nvSpPr>
+          <p:cNvPr id="2" name="Slide Image Placeholder 1"/>
+          <p:cNvSpPr>
+            <a:spLocks noGrp="1" noRot="1" noChangeAspect="1"/>
+          </p:cNvSpPr>
+          <p:nvPr>
+            <p:ph type="sldImg"/>
+          </p:nvPr>
+        </p:nvSpPr>
+        <p:spPr/>
+      </p:sp>
+      <p:sp>
+        <p:nvSpPr>
+          <p:cNvPr id="3" name="Notes Placeholder 2"/>
+          <p:cNvSpPr>
+            <a:spLocks noGrp="1"/>
+          </p:cNvSpPr>
+          <p:nvPr>
+            <p:ph type="body" idx="1"/>
+          </p:nvPr>
+        </p:nvSpPr>
+        <p:spPr/>
+        <p:txBody>
+          <a:bodyPr/>
+          <a:lstStyle/>
+          <a:p>
+            <a:pPr lvl="0" indent="0" marL="0">
+              <a:buNone/>
+            </a:pPr>
+            <a:r>
+              <a:rPr/>
+              <a:t>An adjustment for skewness also shifts the z values to the left or the right, though the shift is stronger on one side versus the other. In this hypothetical case, you would use would be the 2.9 percentile and the 92.7 percentile.</a:t>
+            </a:r>
+          </a:p>
+          <a:p>
+            <a:pPr lvl="0" indent="0" marL="0">
+              <a:buNone/>
+            </a:pPr>
+          </a:p>
+          <a:p>
+            <a:pPr lvl="0" indent="0" marL="0">
+              <a:buNone/>
+            </a:pPr>
+            <a:r>
+              <a:rPr/>
+              <a:t>These formulas are messy, and easy to get wrong, so I would recommend if you are programming from scratch that you stick one of the simpler approaches.</a:t>
+            </a:r>
+          </a:p>
+        </p:txBody>
+      </p:sp>
+      <p:sp>
+        <p:nvSpPr>
+          <p:cNvPr id="4" name="Slide Number Placeholder 3"/>
+          <p:cNvSpPr>
+            <a:spLocks noGrp="1"/>
+          </p:cNvSpPr>
+          <p:nvPr>
+            <p:ph type="sldNum" sz="quarter" idx="10"/>
+          </p:nvPr>
+        </p:nvSpPr>
+        <p:spPr/>
+        <p:txBody>
+          <a:bodyPr/>
+          <a:lstStyle/>
+          <a:p>
+            <a:fld id="{18BDFEC3-8487-43E8-A154-7C12CBC1FFF2}" type="slidenum">
+              <a:rPr lang="en-US"/>
+              <a:t>36</a:t>
             </a:fld>
             <a:endParaRPr lang="en-US"/>
           </a:p>
@@ -9929,59 +10206,25 @@
       </p:grpSpPr>
       <p:sp>
         <p:nvSpPr>
-          <p:cNvPr id="2" name="Title 1"/>
-          <p:cNvSpPr>
-            <a:spLocks noGrp="1"/>
-          </p:cNvSpPr>
-          <p:nvPr>
-            <p:ph type="title"/>
-          </p:nvPr>
-        </p:nvSpPr>
-        <p:spPr/>
-        <p:txBody>
-          <a:bodyPr/>
-          <a:lstStyle/>
-          <a:p>
-            <a:pPr lvl="0" indent="0" marL="0">
-              <a:buNone/>
-            </a:pPr>
-            <a:r>
-              <a:rPr/>
-              <a:t>Percentlies with bias adjustment</a:t>
-            </a:r>
-          </a:p>
-        </p:txBody>
-      </p:sp>
-      <p:pic>
-        <p:nvPicPr>
-          <p:cNvPr descr="bootstrap-slides_files/figure-pptx/unnamed-chunk-5-1.png" id="0" name="Picture 1"/>
-          <p:cNvPicPr>
-            <a:picLocks noGrp="1" noChangeAspect="1"/>
-          </p:cNvPicPr>
-          <p:nvPr/>
-        </p:nvPicPr>
-        <p:blipFill>
-          <a:blip r:embed="rId2"/>
-          <a:stretch>
-            <a:fillRect/>
-          </a:stretch>
-        </p:blipFill>
-        <p:spPr bwMode="auto">
-          <a:xfrm>
-            <a:off x="2451100" y="1193800"/>
-            <a:ext cx="4241800" cy="3390900"/>
-          </a:xfrm>
-          <a:prstGeom prst="rect">
-            <a:avLst/>
-          </a:prstGeom>
-          <a:noFill/>
-          <a:ln w="9525">
-            <a:noFill/>
-            <a:headEnd/>
-            <a:tailEnd/>
-          </a:ln>
-        </p:spPr>
-      </p:pic>
+          <p:cNvPr id="3" name="Content Placeholder 2"/>
+          <p:cNvSpPr>
+            <a:spLocks noGrp="1"/>
+          </p:cNvSpPr>
+          <p:nvPr>
+            <p:ph idx="1"/>
+          </p:nvPr>
+        </p:nvSpPr>
+        <p:spPr/>
+        <p:txBody>
+          <a:bodyPr/>
+          <a:lstStyle/>
+          <a:p>
+            <a:pPr lvl="0" indent="0" marL="0">
+              <a:buNone/>
+            </a:pPr>
+          </a:p>
+        </p:txBody>
+      </p:sp>
     </p:spTree>
   </p:cSld>
 </p:sld>
@@ -10024,14 +10267,14 @@
             </a:pPr>
             <a:r>
               <a:rPr/>
-              <a:t>Percentiles with acceleration adjustment</a:t>
+              <a:t>Percentlies with bias adjustment</a:t>
             </a:r>
           </a:p>
         </p:txBody>
       </p:sp>
       <p:pic>
         <p:nvPicPr>
-          <p:cNvPr descr="bootstrap-slides_files/figure-pptx/unnamed-chunk-6-1.png" id="0" name="Picture 1"/>
+          <p:cNvPr descr="bootstrap-slides_files/figure-pptx/unnamed-chunk-5-1.png" id="0" name="Picture 1"/>
           <p:cNvPicPr>
             <a:picLocks noGrp="1" noChangeAspect="1"/>
           </p:cNvPicPr>
@@ -10083,26 +10326,22 @@
       </p:grpSpPr>
       <p:sp>
         <p:nvSpPr>
-          <p:cNvPr id="2" name="Title 1"/>
-          <p:cNvSpPr>
-            <a:spLocks noGrp="1"/>
-          </p:cNvSpPr>
-          <p:nvPr>
-            <p:ph type="title"/>
-          </p:nvPr>
-        </p:nvSpPr>
-        <p:spPr/>
-        <p:txBody>
-          <a:bodyPr/>
-          <a:lstStyle/>
-          <a:p>
-            <a:pPr lvl="0" indent="0" marL="0">
-              <a:buNone/>
-            </a:pPr>
-            <a:r>
-              <a:rPr/>
-              <a:t>Test hypotheses</a:t>
-            </a:r>
+          <p:cNvPr id="3" name="Content Placeholder 2"/>
+          <p:cNvSpPr>
+            <a:spLocks noGrp="1"/>
+          </p:cNvSpPr>
+          <p:nvPr>
+            <p:ph idx="1"/>
+          </p:nvPr>
+        </p:nvSpPr>
+        <p:spPr/>
+        <p:txBody>
+          <a:bodyPr/>
+          <a:lstStyle/>
+          <a:p>
+            <a:pPr lvl="0" indent="0" marL="0">
+              <a:buNone/>
+            </a:pPr>
           </a:p>
         </p:txBody>
       </p:sp>
@@ -10148,55 +10387,41 @@
             </a:pPr>
             <a:r>
               <a:rPr/>
-              <a:t>Break #2</a:t>
-            </a:r>
-          </a:p>
-        </p:txBody>
-      </p:sp>
-      <p:sp>
-        <p:nvSpPr>
-          <p:cNvPr id="3" name="Content Placeholder 2"/>
-          <p:cNvSpPr>
-            <a:spLocks noGrp="1"/>
-          </p:cNvSpPr>
-          <p:nvPr>
-            <p:ph idx="1"/>
-          </p:nvPr>
-        </p:nvSpPr>
-        <p:spPr/>
-        <p:txBody>
-          <a:bodyPr/>
-          <a:lstStyle/>
-          <a:p>
-            <a:pPr lvl="0"/>
-            <a:r>
-              <a:rPr/>
-              <a:t>What you have learned</a:t>
-            </a:r>
-          </a:p>
-          <a:p>
-            <a:pPr lvl="1"/>
-            <a:r>
-              <a:rPr/>
-              <a:t>Purposes of the bootstrap</a:t>
-            </a:r>
-          </a:p>
-          <a:p>
-            <a:pPr lvl="0"/>
-            <a:r>
-              <a:rPr/>
-              <a:t>What’s coming next</a:t>
-            </a:r>
-          </a:p>
-          <a:p>
-            <a:pPr lvl="1"/>
-            <a:r>
-              <a:rPr/>
-              <a:t>Mechanics</a:t>
-            </a:r>
-          </a:p>
-        </p:txBody>
-      </p:sp>
+              <a:t>Percentiles with acceleration adjustment</a:t>
+            </a:r>
+          </a:p>
+        </p:txBody>
+      </p:sp>
+      <p:pic>
+        <p:nvPicPr>
+          <p:cNvPr descr="bootstrap-slides_files/figure-pptx/unnamed-chunk-6-1.png" id="0" name="Picture 1"/>
+          <p:cNvPicPr>
+            <a:picLocks noGrp="1" noChangeAspect="1"/>
+          </p:cNvPicPr>
+          <p:nvPr/>
+        </p:nvPicPr>
+        <p:blipFill>
+          <a:blip r:embed="rId2"/>
+          <a:stretch>
+            <a:fillRect/>
+          </a:stretch>
+        </p:blipFill>
+        <p:spPr bwMode="auto">
+          <a:xfrm>
+            <a:off x="2451100" y="1193800"/>
+            <a:ext cx="4241800" cy="3390900"/>
+          </a:xfrm>
+          <a:prstGeom prst="rect">
+            <a:avLst/>
+          </a:prstGeom>
+          <a:noFill/>
+          <a:ln w="9525">
+            <a:noFill/>
+            <a:headEnd/>
+            <a:tailEnd/>
+          </a:ln>
+        </p:spPr>
+      </p:pic>
     </p:spTree>
   </p:cSld>
 </p:sld>
@@ -10221,31 +10446,6 @@
       </p:grpSpPr>
       <p:sp>
         <p:nvSpPr>
-          <p:cNvPr id="2" name="Title 1"/>
-          <p:cNvSpPr>
-            <a:spLocks noGrp="1"/>
-          </p:cNvSpPr>
-          <p:nvPr>
-            <p:ph type="title"/>
-          </p:nvPr>
-        </p:nvSpPr>
-        <p:spPr/>
-        <p:txBody>
-          <a:bodyPr/>
-          <a:lstStyle/>
-          <a:p>
-            <a:pPr lvl="0" indent="0" marL="0">
-              <a:buNone/>
-            </a:pPr>
-            <a:r>
-              <a:rPr/>
-              <a:t>Mechanics</a:t>
-            </a:r>
-          </a:p>
-        </p:txBody>
-      </p:sp>
-      <p:sp>
-        <p:nvSpPr>
           <p:cNvPr id="3" name="Content Placeholder 2"/>
           <p:cNvSpPr>
             <a:spLocks noGrp="1"/>
@@ -10259,60 +10459,9 @@
           <a:bodyPr/>
           <a:lstStyle/>
           <a:p>
-            <a:pPr lvl="0"/>
-            <a:r>
-              <a:rPr/>
-              <a:t>Resampling</a:t>
-            </a:r>
-          </a:p>
-          <a:p>
-            <a:pPr lvl="0"/>
-            <a:r>
-              <a:rPr/>
-              <a:t>Bootstrap estimates</a:t>
-            </a:r>
-          </a:p>
-          <a:p>
-            <a:pPr lvl="0"/>
-            <a:r>
-              <a:rPr/>
-              <a:t>Bias calculation</a:t>
-            </a:r>
-          </a:p>
-          <a:p>
-            <a:pPr lvl="0"/>
-            <a:r>
-              <a:rPr/>
-              <a:t>Standard error calculation</a:t>
-            </a:r>
-          </a:p>
-          <a:p>
-            <a:pPr lvl="0"/>
-            <a:r>
-              <a:rPr/>
-              <a:t>Confidence interval</a:t>
-            </a:r>
-          </a:p>
-          <a:p>
-            <a:pPr lvl="1"/>
-            <a:r>
-              <a:rPr/>
-              <a:t>Percentile method</a:t>
-            </a:r>
-          </a:p>
-          <a:p>
-            <a:pPr lvl="1"/>
-            <a:r>
-              <a:rPr/>
-              <a:t>Bias corrected and adjusted method</a:t>
-            </a:r>
-          </a:p>
-          <a:p>
-            <a:pPr lvl="0"/>
-            <a:r>
-              <a:rPr/>
-              <a:t>Hypothesis tests</a:t>
-            </a:r>
+            <a:pPr lvl="0" indent="0" marL="0">
+              <a:buNone/>
+            </a:pPr>
           </a:p>
         </p:txBody>
       </p:sp>
@@ -10358,55 +10507,193 @@
             </a:pPr>
             <a:r>
               <a:rPr/>
-              <a:t>Break #3</a:t>
-            </a:r>
-          </a:p>
-        </p:txBody>
-      </p:sp>
-      <p:sp>
-        <p:nvSpPr>
-          <p:cNvPr id="3" name="Content Placeholder 2"/>
-          <p:cNvSpPr>
-            <a:spLocks noGrp="1"/>
-          </p:cNvSpPr>
-          <p:nvPr>
-            <p:ph idx="1"/>
-          </p:nvPr>
-        </p:nvSpPr>
-        <p:spPr/>
-        <p:txBody>
-          <a:bodyPr/>
-          <a:lstStyle/>
-          <a:p>
-            <a:pPr lvl="0"/>
-            <a:r>
-              <a:rPr/>
-              <a:t>What have you learned</a:t>
-            </a:r>
-          </a:p>
-          <a:p>
-            <a:pPr lvl="1"/>
-            <a:r>
-              <a:rPr/>
-              <a:t>Mechanics</a:t>
-            </a:r>
-          </a:p>
-          <a:p>
-            <a:pPr lvl="0"/>
-            <a:r>
-              <a:rPr/>
-              <a:t>What’s coming next</a:t>
-            </a:r>
-          </a:p>
-          <a:p>
-            <a:pPr lvl="1"/>
-            <a:r>
-              <a:rPr/>
-              <a:t>Software</a:t>
-            </a:r>
-          </a:p>
-        </p:txBody>
-      </p:sp>
+              <a:t>Test hypotheses</a:t>
+            </a:r>
+          </a:p>
+        </p:txBody>
+      </p:sp>
+      <mc:AlternateContent xmlns:mc="http://schemas.openxmlformats.org/markup-compatibility/2006">
+        <mc:Choice xmlns:a14="http://schemas.microsoft.com/office/drawing/2010/main" Requires="a14">
+          <p:sp>
+            <p:nvSpPr>
+              <p:cNvPr id="3" name="Content Placeholder 2"/>
+              <p:cNvSpPr>
+                <a:spLocks noGrp="1"/>
+              </p:cNvSpPr>
+              <p:nvPr>
+                <p:ph idx="1"/>
+              </p:nvPr>
+            </p:nvSpPr>
+            <p:spPr/>
+            <p:txBody>
+              <a:bodyPr/>
+              <a:lstStyle/>
+              <a:p>
+                <a:pPr lvl="0"/>
+                <a:r>
+                  <a:rPr/>
+                  <a:t>Test</a:t>
+                </a:r>
+              </a:p>
+              <a:p>
+                <a:pPr lvl="1"/>
+                <a14:m>
+                  <m:oMath xmlns:m="http://schemas.openxmlformats.org/officeDocument/2006/math">
+                    <m:sSub>
+                      <m:e>
+                        <m:r>
+                          <m:t>H</m:t>
+                        </m:r>
+                      </m:e>
+                      <m:sub>
+                        <m:r>
+                          <m:t>0</m:t>
+                        </m:r>
+                      </m:sub>
+                    </m:sSub>
+                    <m:r>
+                      <m:rPr>
+                        <m:sty m:val="p"/>
+                      </m:rPr>
+                      <m:t>:</m:t>
+                    </m:r>
+                    <m:r>
+                      <m:t> </m:t>
+                    </m:r>
+                    <m:r>
+                      <m:t>θ</m:t>
+                    </m:r>
+                    <m:r>
+                      <m:rPr>
+                        <m:sty m:val="p"/>
+                      </m:rPr>
+                      <m:t>=</m:t>
+                    </m:r>
+                    <m:r>
+                      <m:t>0</m:t>
+                    </m:r>
+                  </m:oMath>
+                </a14:m>
+              </a:p>
+              <a:p>
+                <a:pPr lvl="1"/>
+                <a14:m>
+                  <m:oMath xmlns:m="http://schemas.openxmlformats.org/officeDocument/2006/math">
+                    <m:sSub>
+                      <m:e>
+                        <m:r>
+                          <m:t>H</m:t>
+                        </m:r>
+                      </m:e>
+                      <m:sub>
+                        <m:r>
+                          <m:t>1</m:t>
+                        </m:r>
+                      </m:sub>
+                    </m:sSub>
+                    <m:r>
+                      <m:rPr>
+                        <m:sty m:val="p"/>
+                      </m:rPr>
+                      <m:t>:</m:t>
+                    </m:r>
+                    <m:r>
+                      <m:t> </m:t>
+                    </m:r>
+                    <m:r>
+                      <m:t>θ</m:t>
+                    </m:r>
+                    <m:r>
+                      <m:rPr>
+                        <m:sty m:val="p"/>
+                      </m:rPr>
+                      <m:t>&gt;</m:t>
+                    </m:r>
+                    <m:r>
+                      <m:t>0</m:t>
+                    </m:r>
+                  </m:oMath>
+                </a14:m>
+              </a:p>
+              <a:p>
+                <a:pPr lvl="0"/>
+                <a:r>
+                  <a:rPr/>
+                  <a:t>Reject </a:t>
+                </a:r>
+                <a14:m>
+                  <m:oMath xmlns:m="http://schemas.openxmlformats.org/officeDocument/2006/math">
+                    <m:sSub>
+                      <m:e>
+                        <m:r>
+                          <m:t>H</m:t>
+                        </m:r>
+                      </m:e>
+                      <m:sub>
+                        <m:r>
+                          <m:t>0</m:t>
+                        </m:r>
+                      </m:sub>
+                    </m:sSub>
+                  </m:oMath>
+                </a14:m>
+                <a:r>
+                  <a:rPr/>
+                  <a:t> if more than 1-</a:t>
+                </a:r>
+                <a14:m>
+                  <m:oMath xmlns:m="http://schemas.openxmlformats.org/officeDocument/2006/math">
+                    <m:r>
+                      <m:t>α</m:t>
+                    </m:r>
+                  </m:oMath>
+                </a14:m>
+                <a:r>
+                  <a:rPr/>
+                  <a:t> of the </a:t>
+                </a:r>
+                <a14:m>
+                  <m:oMath xmlns:m="http://schemas.openxmlformats.org/officeDocument/2006/math">
+                    <m:sSup>
+                      <m:e>
+                        <m:acc>
+                          <m:accPr>
+                            <m:chr m:val="̂"/>
+                          </m:accPr>
+                          <m:e>
+                            <m:r>
+                              <m:t>θ</m:t>
+                            </m:r>
+                          </m:e>
+                        </m:acc>
+                      </m:e>
+                      <m:sup>
+                        <m:d>
+                          <m:dPr>
+                            <m:begChr m:val="("/>
+                            <m:endChr m:val=")"/>
+                            <m:sepChr m:val=""/>
+                            <m:grow/>
+                          </m:dPr>
+                          <m:e>
+                            <m:r>
+                              <m:t>b</m:t>
+                            </m:r>
+                          </m:e>
+                        </m:d>
+                      </m:sup>
+                    </m:sSup>
+                  </m:oMath>
+                </a14:m>
+                <a:r>
+                  <a:rPr/>
+                  <a:t>’s are greater than 0.</a:t>
+                </a:r>
+              </a:p>
+            </p:txBody>
+          </p:sp>
+        </mc:Choice>
+      </mc:AlternateContent>
     </p:spTree>
   </p:cSld>
 </p:sld>
@@ -10449,7 +10736,51 @@
             </a:pPr>
             <a:r>
               <a:rPr/>
-              <a:t>Software</a:t>
+              <a:t>Break #2</a:t>
+            </a:r>
+          </a:p>
+        </p:txBody>
+      </p:sp>
+      <p:sp>
+        <p:nvSpPr>
+          <p:cNvPr id="3" name="Content Placeholder 2"/>
+          <p:cNvSpPr>
+            <a:spLocks noGrp="1"/>
+          </p:cNvSpPr>
+          <p:nvPr>
+            <p:ph idx="1"/>
+          </p:nvPr>
+        </p:nvSpPr>
+        <p:spPr/>
+        <p:txBody>
+          <a:bodyPr/>
+          <a:lstStyle/>
+          <a:p>
+            <a:pPr lvl="0"/>
+            <a:r>
+              <a:rPr/>
+              <a:t>What you have learned</a:t>
+            </a:r>
+          </a:p>
+          <a:p>
+            <a:pPr lvl="1"/>
+            <a:r>
+              <a:rPr/>
+              <a:t>Purposes of the bootstrap</a:t>
+            </a:r>
+          </a:p>
+          <a:p>
+            <a:pPr lvl="0"/>
+            <a:r>
+              <a:rPr/>
+              <a:t>What’s coming next</a:t>
+            </a:r>
+          </a:p>
+          <a:p>
+            <a:pPr lvl="1"/>
+            <a:r>
+              <a:rPr/>
+              <a:t>Mechanics</a:t>
             </a:r>
           </a:p>
         </p:txBody>
@@ -10496,7 +10827,7 @@
             </a:pPr>
             <a:r>
               <a:rPr/>
-              <a:t>Special issues</a:t>
+              <a:t>Mechanics</a:t>
             </a:r>
           </a:p>
         </p:txBody>
@@ -10519,14 +10850,56 @@
             <a:pPr lvl="0"/>
             <a:r>
               <a:rPr/>
-              <a:t>Time series</a:t>
+              <a:t>Resampling</a:t>
             </a:r>
           </a:p>
           <a:p>
             <a:pPr lvl="0"/>
             <a:r>
               <a:rPr/>
-              <a:t>Regression models</a:t>
+              <a:t>Bootstrap estimates</a:t>
+            </a:r>
+          </a:p>
+          <a:p>
+            <a:pPr lvl="0"/>
+            <a:r>
+              <a:rPr/>
+              <a:t>Bias calculation</a:t>
+            </a:r>
+          </a:p>
+          <a:p>
+            <a:pPr lvl="0"/>
+            <a:r>
+              <a:rPr/>
+              <a:t>Standard error calculation</a:t>
+            </a:r>
+          </a:p>
+          <a:p>
+            <a:pPr lvl="0"/>
+            <a:r>
+              <a:rPr/>
+              <a:t>Confidence interval</a:t>
+            </a:r>
+          </a:p>
+          <a:p>
+            <a:pPr lvl="1"/>
+            <a:r>
+              <a:rPr/>
+              <a:t>Percentile method</a:t>
+            </a:r>
+          </a:p>
+          <a:p>
+            <a:pPr lvl="1"/>
+            <a:r>
+              <a:rPr/>
+              <a:t>Bias corrected and adjusted method</a:t>
+            </a:r>
+          </a:p>
+          <a:p>
+            <a:pPr lvl="0"/>
+            <a:r>
+              <a:rPr/>
+              <a:t>Hypothesis tests</a:t>
             </a:r>
           </a:p>
         </p:txBody>
@@ -10644,6 +11017,221 @@
 </file>
 
 <file path=ppt/slides/slide40.xml><?xml version="1.0" encoding="utf-8"?>
+<p:sld xmlns:a="http://schemas.openxmlformats.org/drawingml/2006/main" xmlns:r="http://schemas.openxmlformats.org/officeDocument/2006/relationships" xmlns:p="http://schemas.openxmlformats.org/presentationml/2006/main">
+  <p:cSld>
+    <p:spTree>
+      <p:nvGrpSpPr>
+        <p:cNvPr id="1" name=""/>
+        <p:cNvGrpSpPr/>
+        <p:nvPr/>
+      </p:nvGrpSpPr>
+      <p:grpSpPr>
+        <a:xfrm>
+          <a:off x="0" y="0"/>
+          <a:ext cx="0" cy="0"/>
+          <a:chOff x="0" y="0"/>
+          <a:chExt cx="0" cy="0"/>
+        </a:xfrm>
+      </p:grpSpPr>
+      <p:sp>
+        <p:nvSpPr>
+          <p:cNvPr id="2" name="Title 1"/>
+          <p:cNvSpPr>
+            <a:spLocks noGrp="1"/>
+          </p:cNvSpPr>
+          <p:nvPr>
+            <p:ph type="title"/>
+          </p:nvPr>
+        </p:nvSpPr>
+        <p:spPr/>
+        <p:txBody>
+          <a:bodyPr/>
+          <a:lstStyle/>
+          <a:p>
+            <a:pPr lvl="0" indent="0" marL="0">
+              <a:buNone/>
+            </a:pPr>
+            <a:r>
+              <a:rPr/>
+              <a:t>Break #3</a:t>
+            </a:r>
+          </a:p>
+        </p:txBody>
+      </p:sp>
+      <p:sp>
+        <p:nvSpPr>
+          <p:cNvPr id="3" name="Content Placeholder 2"/>
+          <p:cNvSpPr>
+            <a:spLocks noGrp="1"/>
+          </p:cNvSpPr>
+          <p:nvPr>
+            <p:ph idx="1"/>
+          </p:nvPr>
+        </p:nvSpPr>
+        <p:spPr/>
+        <p:txBody>
+          <a:bodyPr/>
+          <a:lstStyle/>
+          <a:p>
+            <a:pPr lvl="0"/>
+            <a:r>
+              <a:rPr/>
+              <a:t>What have you learned</a:t>
+            </a:r>
+          </a:p>
+          <a:p>
+            <a:pPr lvl="1"/>
+            <a:r>
+              <a:rPr/>
+              <a:t>Mechanics</a:t>
+            </a:r>
+          </a:p>
+          <a:p>
+            <a:pPr lvl="0"/>
+            <a:r>
+              <a:rPr/>
+              <a:t>What’s coming next</a:t>
+            </a:r>
+          </a:p>
+          <a:p>
+            <a:pPr lvl="1"/>
+            <a:r>
+              <a:rPr/>
+              <a:t>Software</a:t>
+            </a:r>
+          </a:p>
+        </p:txBody>
+      </p:sp>
+    </p:spTree>
+  </p:cSld>
+</p:sld>
+</file>
+
+<file path=ppt/slides/slide41.xml><?xml version="1.0" encoding="utf-8"?>
+<p:sld xmlns:a="http://schemas.openxmlformats.org/drawingml/2006/main" xmlns:r="http://schemas.openxmlformats.org/officeDocument/2006/relationships" xmlns:p="http://schemas.openxmlformats.org/presentationml/2006/main">
+  <p:cSld>
+    <p:spTree>
+      <p:nvGrpSpPr>
+        <p:cNvPr id="1" name=""/>
+        <p:cNvGrpSpPr/>
+        <p:nvPr/>
+      </p:nvGrpSpPr>
+      <p:grpSpPr>
+        <a:xfrm>
+          <a:off x="0" y="0"/>
+          <a:ext cx="0" cy="0"/>
+          <a:chOff x="0" y="0"/>
+          <a:chExt cx="0" cy="0"/>
+        </a:xfrm>
+      </p:grpSpPr>
+      <p:sp>
+        <p:nvSpPr>
+          <p:cNvPr id="2" name="Title 1"/>
+          <p:cNvSpPr>
+            <a:spLocks noGrp="1"/>
+          </p:cNvSpPr>
+          <p:nvPr>
+            <p:ph type="title"/>
+          </p:nvPr>
+        </p:nvSpPr>
+        <p:spPr/>
+        <p:txBody>
+          <a:bodyPr/>
+          <a:lstStyle/>
+          <a:p>
+            <a:pPr lvl="0" indent="0" marL="0">
+              <a:buNone/>
+            </a:pPr>
+            <a:r>
+              <a:rPr/>
+              <a:t>Software</a:t>
+            </a:r>
+          </a:p>
+        </p:txBody>
+      </p:sp>
+    </p:spTree>
+  </p:cSld>
+</p:sld>
+</file>
+
+<file path=ppt/slides/slide42.xml><?xml version="1.0" encoding="utf-8"?>
+<p:sld xmlns:a="http://schemas.openxmlformats.org/drawingml/2006/main" xmlns:r="http://schemas.openxmlformats.org/officeDocument/2006/relationships" xmlns:p="http://schemas.openxmlformats.org/presentationml/2006/main">
+  <p:cSld>
+    <p:spTree>
+      <p:nvGrpSpPr>
+        <p:cNvPr id="1" name=""/>
+        <p:cNvGrpSpPr/>
+        <p:nvPr/>
+      </p:nvGrpSpPr>
+      <p:grpSpPr>
+        <a:xfrm>
+          <a:off x="0" y="0"/>
+          <a:ext cx="0" cy="0"/>
+          <a:chOff x="0" y="0"/>
+          <a:chExt cx="0" cy="0"/>
+        </a:xfrm>
+      </p:grpSpPr>
+      <p:sp>
+        <p:nvSpPr>
+          <p:cNvPr id="2" name="Title 1"/>
+          <p:cNvSpPr>
+            <a:spLocks noGrp="1"/>
+          </p:cNvSpPr>
+          <p:nvPr>
+            <p:ph type="title"/>
+          </p:nvPr>
+        </p:nvSpPr>
+        <p:spPr/>
+        <p:txBody>
+          <a:bodyPr/>
+          <a:lstStyle/>
+          <a:p>
+            <a:pPr lvl="0" indent="0" marL="0">
+              <a:buNone/>
+            </a:pPr>
+            <a:r>
+              <a:rPr/>
+              <a:t>Special issues</a:t>
+            </a:r>
+          </a:p>
+        </p:txBody>
+      </p:sp>
+      <p:sp>
+        <p:nvSpPr>
+          <p:cNvPr id="3" name="Content Placeholder 2"/>
+          <p:cNvSpPr>
+            <a:spLocks noGrp="1"/>
+          </p:cNvSpPr>
+          <p:nvPr>
+            <p:ph idx="1"/>
+          </p:nvPr>
+        </p:nvSpPr>
+        <p:spPr/>
+        <p:txBody>
+          <a:bodyPr/>
+          <a:lstStyle/>
+          <a:p>
+            <a:pPr lvl="0"/>
+            <a:r>
+              <a:rPr/>
+              <a:t>Time series</a:t>
+            </a:r>
+          </a:p>
+          <a:p>
+            <a:pPr lvl="0"/>
+            <a:r>
+              <a:rPr/>
+              <a:t>Regression models</a:t>
+            </a:r>
+          </a:p>
+        </p:txBody>
+      </p:sp>
+    </p:spTree>
+  </p:cSld>
+</p:sld>
+</file>
+
+<file path=ppt/slides/slide43.xml><?xml version="1.0" encoding="utf-8"?>
 <p:sld xmlns:a="http://schemas.openxmlformats.org/drawingml/2006/main" xmlns:r="http://schemas.openxmlformats.org/officeDocument/2006/relationships" xmlns:p="http://schemas.openxmlformats.org/presentationml/2006/main">
   <p:cSld>
     <p:spTree>

</xml_diff>

<commit_message>
Working draft of bootstrap slides
</commit_message>
<xml_diff>
--- a/bootstrap/src/bootstrap-slides.pptx
+++ b/bootstrap/src/bootstrap-slides.pptx
@@ -5,7 +5,7 @@
     <p:sldMasterId id="2147483648" r:id="rId1"/>
   </p:sldMasterIdLst>
   <p:notesMasterIdLst>
-    <p:notesMasterId r:id="rId72"/>
+    <p:notesMasterId r:id="rId74"/>
   </p:notesMasterIdLst>
   <p:sldIdLst>
     <p:sldId id="256" r:id="rId2"/>
@@ -78,6 +78,8 @@
     <p:sldId id="323" r:id="rId69"/>
     <p:sldId id="324" r:id="rId70"/>
     <p:sldId id="325" r:id="rId71"/>
+    <p:sldId id="326" r:id="rId72"/>
+    <p:sldId id="327" r:id="rId73"/>
   </p:sldIdLst>
   <p:sldSz cx="12192000" cy="6858000"/>
   <p:notesSz cx="6858000" cy="9144000"/>
@@ -677,7 +679,7 @@
             </a:pPr>
             <a:r>
               <a:rPr/>
-              <a:t>Then I will discuss some special cases where you might consider more complex forms of bootstrapping.</a:t>
+              <a:t>Then I will discuss some special settings where you might consider more complex forms of bootstrapping.</a:t>
             </a:r>
           </a:p>
         </p:txBody>
@@ -2849,7 +2851,7 @@
             </a:pPr>
             <a:r>
               <a:rPr/>
-              <a:t>Perhaps there is some value in getting the standard error using a classic approach and comparing it to the bootstrap estimate of the standard error. If the two are close, that gives you some reassurance that the classic approach is appropriate. If they differ, then examine things like whether the sample size is large enough to justify the normal approximation or if other assumptions that you need are justifiable.</a:t>
+              <a:t>Perhaps there is some value in getting the standard error using a classic approach and comparing it to the bootstrap estimate of the standard error. If the two are close, that gives you some reassurance that the classic approach is appropriate. If they differ, then examine things like whether the sample size is large enough to justify the normal approximation or if one of the assumptions that you need is questionable.</a:t>
             </a:r>
           </a:p>
         </p:txBody>
@@ -3329,7 +3331,7 @@
             </a:pPr>
             <a:r>
               <a:rPr/>
-              <a:t>The H function effectively counts the number of bootstrap estimates that are greater than the estimate based on the original data. Divide by the number of bootstrap samples to get a proportion. Phi inverse converts this proportion into a percentile from a standard normal distribution. If exactly half of the bootstrap estimates are greater than the estimate based on the original data, then you get a big fat zero which means no bias adjustment.</a:t>
+              <a:t>The H function effectively counts the number of bootstrap estimates that are less than the estimate based on the original data. Divide by the number of bootstrap samples to get a proportion. Phi inverse converts this proportion into a percentile from a standard normal distribution. If exactly half of the bootstrap estimates are greater than the estimate based on the original data, then you get a big fat zero which means no bias adjustment.</a:t>
             </a:r>
           </a:p>
           <a:p>
@@ -3933,21 +3935,21 @@
             </a:pPr>
             <a:r>
               <a:rPr/>
-              <a:t>If you want to program a bootstrap, you need to have enough familiarity with your statistical software to run a loop and extract specific values from the output.</a:t>
-            </a:r>
-          </a:p>
-          <a:p>
-            <a:pPr lvl="0" indent="0" marL="0">
-              <a:buNone/>
-            </a:pPr>
-          </a:p>
-          <a:p>
-            <a:pPr lvl="0" indent="0" marL="0">
-              <a:buNone/>
-            </a:pPr>
-            <a:r>
-              <a:rPr/>
-              <a:t>I want to show briefly, how to do a simple bootstrap in SAS, Stata, and R. It may be possible to do this in SPSS, but I am not familiar enough with SPSS to outline how the approach might work.</a:t>
+              <a:t>This image comes from a 1986 publication in Statistical Science by Bradley Efron and Robert Tibshirani.</a:t>
+            </a:r>
+          </a:p>
+          <a:p>
+            <a:pPr lvl="0" indent="0" marL="0">
+              <a:buNone/>
+            </a:pPr>
+          </a:p>
+          <a:p>
+            <a:pPr lvl="0" indent="0" marL="0">
+              <a:buNone/>
+            </a:pPr>
+            <a:r>
+              <a:rPr/>
+              <a:t>There are two curves shown here which show two different ways of measuring risk as a function of age. One estimate shows a flat level (same amount of risk) for anyone under 45 and the other shows an increase in risk for patients under 30. Which one is correct? The bootstrap can help answer this question.</a:t>
             </a:r>
           </a:p>
         </p:txBody>
@@ -3969,7 +3971,7 @@
           <a:p>
             <a:fld id="{18BDFEC3-8487-43E8-A154-7C12CBC1FFF2}" type="slidenum">
               <a:rPr lang="en-US"/>
-              <a:t>44</a:t>
+              <a:t>40</a:t>
             </a:fld>
             <a:endParaRPr lang="en-US"/>
           </a:p>
@@ -4029,35 +4031,21 @@
             </a:pPr>
             <a:r>
               <a:rPr/>
-              <a:t>This example is taken from the UCLA Statistical Methods and Data Analytics site. It pops up easily on a simple google search.</a:t>
-            </a:r>
-          </a:p>
-          <a:p>
-            <a:pPr lvl="0" indent="0" marL="0">
-              <a:buNone/>
-            </a:pPr>
-          </a:p>
-          <a:p>
-            <a:pPr lvl="0" indent="0" marL="0">
-              <a:buNone/>
-            </a:pPr>
-            <a:r>
-              <a:rPr/>
-              <a:t>The first statement tells SAS that it should take the output from the following procedure, pull out a particular number from the output called “FitStatistics” and store it in a dataset with the name t0.</a:t>
-            </a:r>
-          </a:p>
-          <a:p>
-            <a:pPr lvl="0" indent="0" marL="0">
-              <a:buNone/>
-            </a:pPr>
-          </a:p>
-          <a:p>
-            <a:pPr lvl="0" indent="0" marL="0">
-              <a:buNone/>
-            </a:pPr>
-            <a:r>
-              <a:rPr/>
-              <a:t>I’m guess that the “quit” statement is important here because of the way you are handling output with the ods statement.</a:t>
+              <a:t>The bootstrap curves show a few with an increase in risk at younger ages, but more showing a flat curve (same level of risk) and a few showing a further decrease in risk. So there is little evidence that risk increases for patients under 30.</a:t>
+            </a:r>
+          </a:p>
+          <a:p>
+            <a:pPr lvl="0" indent="0" marL="0">
+              <a:buNone/>
+            </a:pPr>
+          </a:p>
+          <a:p>
+            <a:pPr lvl="0" indent="0" marL="0">
+              <a:buNone/>
+            </a:pPr>
+            <a:r>
+              <a:rPr/>
+              <a:t>In contrast, every single bootstrap sample shows an increase in risk after 45 years of age. That trend is well supported by the data.</a:t>
             </a:r>
           </a:p>
         </p:txBody>
@@ -4079,7 +4067,7 @@
           <a:p>
             <a:fld id="{18BDFEC3-8487-43E8-A154-7C12CBC1FFF2}" type="slidenum">
               <a:rPr lang="en-US"/>
-              <a:t>45</a:t>
+              <a:t>41</a:t>
             </a:fld>
             <a:endParaRPr lang="en-US"/>
           </a:p>
@@ -4235,7 +4223,21 @@
             </a:pPr>
             <a:r>
               <a:rPr/>
-              <a:t>The data step here creates a dataset with the sole purpose of moving the r-squared value to a macro variable. The key function here is symput and if you are not familiar with it, check out the SAS documentation.</a:t>
+              <a:t>This figure is from a Scientific American article on the bootstrap.</a:t>
+            </a:r>
+          </a:p>
+          <a:p>
+            <a:pPr lvl="0" indent="0" marL="0">
+              <a:buNone/>
+            </a:pPr>
+          </a:p>
+          <a:p>
+            <a:pPr lvl="0" indent="0" marL="0">
+              <a:buNone/>
+            </a:pPr>
+            <a:r>
+              <a:rPr/>
+              <a:t>It shows countour curves fir to the map of the eastern United States. The upper left panel uses contours from the original data and the remaining panels represent contours drawn from bootstrap samples. It’s a bit hard to read at this resolution, but it looks like the contours are reasonably stable.</a:t>
             </a:r>
           </a:p>
         </p:txBody>
@@ -4257,7 +4259,7 @@
           <a:p>
             <a:fld id="{18BDFEC3-8487-43E8-A154-7C12CBC1FFF2}" type="slidenum">
               <a:rPr lang="en-US"/>
-              <a:t>46</a:t>
+              <a:t>42</a:t>
             </a:fld>
             <a:endParaRPr lang="en-US"/>
           </a:p>
@@ -4317,7 +4319,21 @@
             </a:pPr>
             <a:r>
               <a:rPr/>
-              <a:t>Although you could use a loop here, the surveyselect procedure allows you to create 500 bootstrap samples and store them all in a single dataset.</a:t>
+              <a:t>Although there are no formal justifications, there is general consensus in the research community that you would need about 50 to 100 bootstrap samples to estimate bais or compute a standard error. You need an order of magnitude more bootstrap samples (500 to 1,000) if you are computing confidence intervals or hypothesis tests.</a:t>
+            </a:r>
+          </a:p>
+          <a:p>
+            <a:pPr lvl="0" indent="0" marL="0">
+              <a:buNone/>
+            </a:pPr>
+          </a:p>
+          <a:p>
+            <a:pPr lvl="0" indent="0" marL="0">
+              <a:buNone/>
+            </a:pPr>
+            <a:r>
+              <a:rPr/>
+              <a:t>I have not seen any guidance on visualizations, but from a practical perspective you want to avoid so many bootstrap samples that the family of curves looks like a big black splotch. Around 10 to 50 seems to me to be about right.</a:t>
             </a:r>
           </a:p>
         </p:txBody>
@@ -4339,7 +4355,7 @@
           <a:p>
             <a:fld id="{18BDFEC3-8487-43E8-A154-7C12CBC1FFF2}" type="slidenum">
               <a:rPr lang="en-US"/>
-              <a:t>47</a:t>
+              <a:t>43</a:t>
             </a:fld>
             <a:endParaRPr lang="en-US"/>
           </a:p>
@@ -4399,7 +4415,7 @@
             </a:pPr>
             <a:r>
               <a:rPr/>
-              <a:t>Here is part of the output from surveyselect. The original dataset has 200 observations. We are creating 500 replicates using sampling with replacement. That creates a dataset of 100,000 observations.</a:t>
+              <a:t>You just saw the general algorithms for estimating bias, calculating standard errors, computing confidence intervals, testing hypotheses, and evaluating visualizations. Next you will see software applications in SAS, Stata, and R.</a:t>
             </a:r>
           </a:p>
         </p:txBody>
@@ -4421,7 +4437,7 @@
           <a:p>
             <a:fld id="{18BDFEC3-8487-43E8-A154-7C12CBC1FFF2}" type="slidenum">
               <a:rPr lang="en-US"/>
-              <a:t>48</a:t>
+              <a:t>44</a:t>
             </a:fld>
             <a:endParaRPr lang="en-US"/>
           </a:p>
@@ -4481,21 +4497,35 @@
             </a:pPr>
             <a:r>
               <a:rPr/>
-              <a:t>The ods statement on the first line of code on this slide tells SAS to look at the output from the following procedure and store the result in a dataset called t.</a:t>
-            </a:r>
-          </a:p>
-          <a:p>
-            <a:pPr lvl="0" indent="0" marL="0">
-              <a:buNone/>
-            </a:pPr>
-          </a:p>
-          <a:p>
-            <a:pPr lvl="0" indent="0" marL="0">
-              <a:buNone/>
-            </a:pPr>
-            <a:r>
-              <a:rPr/>
-              <a:t>The “by replicate” statement tells SAS to run a separate regression for each bootstrap sample.</a:t>
+              <a:t>If you want to program a bootstrap, you need to have enough familiarity with your statistical software to run a loop and extract specific values from the output. Looping in SAS, Stata, and R can be done explicitly, but often the code is simpler if you take advantage of some implicit looping.</a:t>
+            </a:r>
+          </a:p>
+          <a:p>
+            <a:pPr lvl="0" indent="0" marL="0">
+              <a:buNone/>
+            </a:pPr>
+          </a:p>
+          <a:p>
+            <a:pPr lvl="0" indent="0" marL="0">
+              <a:buNone/>
+            </a:pPr>
+            <a:r>
+              <a:rPr/>
+              <a:t>If the examples that follow seem a bit frightening, you might want to only use bootstraps that are completely automated for you. The advantage of the code shown on the following slides is that it allows you to apply a bootstrap in cases that are a little bit off in left field. In other words, cases that are different enough that no one has taken the trouble to fully automate them.</a:t>
+            </a:r>
+          </a:p>
+          <a:p>
+            <a:pPr lvl="0" indent="0" marL="0">
+              <a:buNone/>
+            </a:pPr>
+          </a:p>
+          <a:p>
+            <a:pPr lvl="0" indent="0" marL="0">
+              <a:buNone/>
+            </a:pPr>
+            <a:r>
+              <a:rPr/>
+              <a:t>I want to show briefly, how to do a simple bootstrap in SAS, Stata, and R. It may be possible to do this in SPSS, but I am not familiar enough with SPSS to outline how the approach might work.</a:t>
             </a:r>
           </a:p>
         </p:txBody>
@@ -4517,7 +4547,7 @@
           <a:p>
             <a:fld id="{18BDFEC3-8487-43E8-A154-7C12CBC1FFF2}" type="slidenum">
               <a:rPr lang="en-US"/>
-              <a:t>49</a:t>
+              <a:t>45</a:t>
             </a:fld>
             <a:endParaRPr lang="en-US"/>
           </a:p>
@@ -4577,7 +4607,35 @@
             </a:pPr>
             <a:r>
               <a:rPr/>
-              <a:t>The output stored in the dataset, however, is a string, and you have to convert it to a numeric value by adding zero. This is a classic SAS hack.</a:t>
+              <a:t>This example is taken from the UCLA Statistical Methods and Data Analytics site. It pops up easily on a simple google search. Try the search terms “ucla,” “bootstrap,” and “sas.”</a:t>
+            </a:r>
+          </a:p>
+          <a:p>
+            <a:pPr lvl="0" indent="0" marL="0">
+              <a:buNone/>
+            </a:pPr>
+          </a:p>
+          <a:p>
+            <a:pPr lvl="0" indent="0" marL="0">
+              <a:buNone/>
+            </a:pPr>
+            <a:r>
+              <a:rPr/>
+              <a:t>The first statement tells SAS that it should take the output from the following procedure, pull out a particular number from the output called “FitStatistics” and store it in a dataset with the name t0.</a:t>
+            </a:r>
+          </a:p>
+          <a:p>
+            <a:pPr lvl="0" indent="0" marL="0">
+              <a:buNone/>
+            </a:pPr>
+          </a:p>
+          <a:p>
+            <a:pPr lvl="0" indent="0" marL="0">
+              <a:buNone/>
+            </a:pPr>
+            <a:r>
+              <a:rPr/>
+              <a:t>I’m guess that the “quit” statement is important here because of the way you are handling output with the ods statement.</a:t>
             </a:r>
           </a:p>
         </p:txBody>
@@ -4599,7 +4657,7 @@
           <a:p>
             <a:fld id="{18BDFEC3-8487-43E8-A154-7C12CBC1FFF2}" type="slidenum">
               <a:rPr lang="en-US"/>
-              <a:t>50</a:t>
+              <a:t>46</a:t>
             </a:fld>
             <a:endParaRPr lang="en-US"/>
           </a:p>
@@ -4659,7 +4717,7 @@
             </a:pPr>
             <a:r>
               <a:rPr/>
-              <a:t>The first three lines are just a fancy way of getting from a 0.05 alpha level to selecting the 2.5 percentile and the 97.5 percentile.</a:t>
+              <a:t>The data step here creates a dataset with the sole purpose of moving the r-squared value from a dataset to a macro variable. The key function here is symput and if you are not familiar with it, check out the SAS documentation.</a:t>
             </a:r>
           </a:p>
         </p:txBody>
@@ -4681,7 +4739,7 @@
           <a:p>
             <a:fld id="{18BDFEC3-8487-43E8-A154-7C12CBC1FFF2}" type="slidenum">
               <a:rPr lang="en-US"/>
-              <a:t>51</a:t>
+              <a:t>47</a:t>
             </a:fld>
             <a:endParaRPr lang="en-US"/>
           </a:p>
@@ -4741,21 +4799,7 @@
             </a:pPr>
             <a:r>
               <a:rPr/>
-              <a:t>proc univariate produces the mean as well as the 2.5 and 97.5 percentiles. The pctlpre and pctlname make the variable names of the output dataset look nice.</a:t>
-            </a:r>
-          </a:p>
-          <a:p>
-            <a:pPr lvl="0" indent="0" marL="0">
-              <a:buNone/>
-            </a:pPr>
-          </a:p>
-          <a:p>
-            <a:pPr lvl="0" indent="0" marL="0">
-              <a:buNone/>
-            </a:pPr>
-            <a:r>
-              <a:rPr/>
-              <a:t>Although the folks at UCLA take great pains to make everything look nice, they should have used a noprint option for proc univariate to keep the output cleaner.</a:t>
+              <a:t>Although you could use a loop here, the surveyselect procedure allows you to create 500 bootstrap samples and store them all in a single dataset.</a:t>
             </a:r>
           </a:p>
         </p:txBody>
@@ -4777,7 +4821,7 @@
           <a:p>
             <a:fld id="{18BDFEC3-8487-43E8-A154-7C12CBC1FFF2}" type="slidenum">
               <a:rPr lang="en-US"/>
-              <a:t>52</a:t>
+              <a:t>48</a:t>
             </a:fld>
             <a:endParaRPr lang="en-US"/>
           </a:p>
@@ -4837,7 +4881,7 @@
             </a:pPr>
             <a:r>
               <a:rPr/>
-              <a:t>That &amp;r2bar is a macro variable of the estimate of R-squared from the original dataset. You subtract it from the mean of the bootstrap samples (r2hat) to get the estimated bias.</a:t>
+              <a:t>Here is part of the output from surveyselect. The original dataset has 200 observations. We are creating 500 replicates using sampling with replacement. That creates a dataset of 100,000 observations.</a:t>
             </a:r>
           </a:p>
         </p:txBody>
@@ -4859,7 +4903,7 @@
           <a:p>
             <a:fld id="{18BDFEC3-8487-43E8-A154-7C12CBC1FFF2}" type="slidenum">
               <a:rPr lang="en-US"/>
-              <a:t>53</a:t>
+              <a:t>49</a:t>
             </a:fld>
             <a:endParaRPr lang="en-US"/>
           </a:p>
@@ -4919,35 +4963,21 @@
             </a:pPr>
             <a:r>
               <a:rPr/>
-              <a:t>After all this careful work, you now have the original estimate of R-squared (52% after rounding), the estimated bias (less than 1%) and the confidence interval (44% to 60%).</a:t>
-            </a:r>
-          </a:p>
-          <a:p>
-            <a:pPr lvl="0" indent="0" marL="0">
-              <a:buNone/>
-            </a:pPr>
-          </a:p>
-          <a:p>
-            <a:pPr lvl="0" indent="0" marL="0">
-              <a:buNone/>
-            </a:pPr>
-            <a:r>
-              <a:rPr/>
-              <a:t>As a quick recap, knowledge of the output delivery system (ods) and macro variables were critical. Thankfully, you did not need a loop here, but familiarity with looping mechanisms in SAS is probably worth knowing for other bootstrap examples.</a:t>
-            </a:r>
-          </a:p>
-          <a:p>
-            <a:pPr lvl="0" indent="0" marL="0">
-              <a:buNone/>
-            </a:pPr>
-          </a:p>
-          <a:p>
-            <a:pPr lvl="0" indent="0" marL="0">
-              <a:buNone/>
-            </a:pPr>
-            <a:r>
-              <a:rPr/>
-              <a:t>If you want to learn more, Rick Wicklin of SAS Institute has a nice series of blog posts. Start with this one.</a:t>
+              <a:t>The ods statement on the first line of code on this slide tells SAS to look at the output from the following procedure and store the result in a dataset called t.</a:t>
+            </a:r>
+          </a:p>
+          <a:p>
+            <a:pPr lvl="0" indent="0" marL="0">
+              <a:buNone/>
+            </a:pPr>
+          </a:p>
+          <a:p>
+            <a:pPr lvl="0" indent="0" marL="0">
+              <a:buNone/>
+            </a:pPr>
+            <a:r>
+              <a:rPr/>
+              <a:t>The “by replicate” statement tells SAS to run a separate regression for each bootstrap sample.</a:t>
             </a:r>
           </a:p>
         </p:txBody>
@@ -4969,7 +4999,7 @@
           <a:p>
             <a:fld id="{18BDFEC3-8487-43E8-A154-7C12CBC1FFF2}" type="slidenum">
               <a:rPr lang="en-US"/>
-              <a:t>54</a:t>
+              <a:t>50</a:t>
             </a:fld>
             <a:endParaRPr lang="en-US"/>
           </a:p>
@@ -5029,21 +5059,7 @@
             </a:pPr>
             <a:r>
               <a:rPr/>
-              <a:t>I am not an expert on Stata, but it was created in 1985 about two decades later than SAS. So it did not have any holdovers from the restricted options available in the age of IBM mainframe computers.</a:t>
-            </a:r>
-          </a:p>
-          <a:p>
-            <a:pPr lvl="0" indent="0" marL="0">
-              <a:buNone/>
-            </a:pPr>
-          </a:p>
-          <a:p>
-            <a:pPr lvl="0" indent="0" marL="0">
-              <a:buNone/>
-            </a:pPr>
-            <a:r>
-              <a:rPr/>
-              <a:t>This example is taken from the UCLA Statistical Methods and Data Analytics site. It pops up easily on a simple google search.</a:t>
+              <a:t>The output stored in the dataset, however, is a string, and you have to convert it to a numeric value by adding zero. This is a classic SAS hack.</a:t>
             </a:r>
           </a:p>
         </p:txBody>
@@ -5065,7 +5081,7 @@
           <a:p>
             <a:fld id="{18BDFEC3-8487-43E8-A154-7C12CBC1FFF2}" type="slidenum">
               <a:rPr lang="en-US"/>
-              <a:t>55</a:t>
+              <a:t>51</a:t>
             </a:fld>
             <a:endParaRPr lang="en-US"/>
           </a:p>
@@ -5207,7 +5223,7 @@
             </a:pPr>
             <a:r>
               <a:rPr/>
-              <a:t>Here is the Stata code to get the estimates from the original data.</a:t>
+              <a:t>The first three lines are just a fancy way of getting from a 0.05 alpha level to selecting the 2.5 percentile and the 97.5 percentile.</a:t>
             </a:r>
           </a:p>
         </p:txBody>
@@ -5229,7 +5245,7 @@
           <a:p>
             <a:fld id="{18BDFEC3-8487-43E8-A154-7C12CBC1FFF2}" type="slidenum">
               <a:rPr lang="en-US"/>
-              <a:t>56</a:t>
+              <a:t>52</a:t>
             </a:fld>
             <a:endParaRPr lang="en-US"/>
           </a:p>
@@ -5289,7 +5305,21 @@
             </a:pPr>
             <a:r>
               <a:rPr/>
-              <a:t>Stata has a bootstrap function built-in. It is both a good thing and a bad thing. It is good in that it simplifies your code. It is bad in that it can only bootstrap on prespecified parts of the output. In fairness, this is also a limitation with the output delivery system in SAS. Both systems are pretty good at letting you pick out the pieces of the output that you are most interested in.</a:t>
+              <a:t>proc univariate produces the mean as well as the 2.5 and 97.5 percentiles. The pctlpre and pctlname make the variable names of the output dataset look nice.</a:t>
+            </a:r>
+          </a:p>
+          <a:p>
+            <a:pPr lvl="0" indent="0" marL="0">
+              <a:buNone/>
+            </a:pPr>
+          </a:p>
+          <a:p>
+            <a:pPr lvl="0" indent="0" marL="0">
+              <a:buNone/>
+            </a:pPr>
+            <a:r>
+              <a:rPr/>
+              <a:t>Although the folks at UCLA take great pains to make everything look nice, they should have used a noprint option for proc univariate to keep the output cleaner.</a:t>
             </a:r>
           </a:p>
         </p:txBody>
@@ -5311,7 +5341,7 @@
           <a:p>
             <a:fld id="{18BDFEC3-8487-43E8-A154-7C12CBC1FFF2}" type="slidenum">
               <a:rPr lang="en-US"/>
-              <a:t>57</a:t>
+              <a:t>53</a:t>
             </a:fld>
             <a:endParaRPr lang="en-US"/>
           </a:p>
@@ -5371,21 +5401,7 @@
             </a:pPr>
             <a:r>
               <a:rPr/>
-              <a:t>Here is the output. By default, it provides a confidence interval based on the bootstrap standard error, but you can get other confidence intervals as well.</a:t>
-            </a:r>
-          </a:p>
-          <a:p>
-            <a:pPr lvl="0" indent="0" marL="0">
-              <a:buNone/>
-            </a:pPr>
-          </a:p>
-          <a:p>
-            <a:pPr lvl="0" indent="0" marL="0">
-              <a:buNone/>
-            </a:pPr>
-            <a:r>
-              <a:rPr/>
-              <a:t>In this example, the original data produced a root mean squared error of 7.2 and the bootstrap 95% confidence interval goes from 6.7 to 7.7.</a:t>
+              <a:t>That &amp;r2bar is a macro variable of the estimate of R-squared from the original dataset. You subtract it from the mean of the bootstrap samples (r2hat) to get the estimated bias.</a:t>
             </a:r>
           </a:p>
         </p:txBody>
@@ -5407,7 +5423,7 @@
           <a:p>
             <a:fld id="{18BDFEC3-8487-43E8-A154-7C12CBC1FFF2}" type="slidenum">
               <a:rPr lang="en-US"/>
-              <a:t>58</a:t>
+              <a:t>54</a:t>
             </a:fld>
             <a:endParaRPr lang="en-US"/>
           </a:p>
@@ -5467,21 +5483,35 @@
             </a:pPr>
             <a:r>
               <a:rPr/>
-              <a:t>R was created in 1999, and relied on a modular approach that makes it ideal for bootstrapping. There is a special library that works for most cases, even some very exotic ones. Looping in R is easy as is extracting specific values.</a:t>
-            </a:r>
-          </a:p>
-          <a:p>
-            <a:pPr lvl="0" indent="0" marL="0">
-              <a:buNone/>
-            </a:pPr>
-          </a:p>
-          <a:p>
-            <a:pPr lvl="0" indent="0" marL="0">
-              <a:buNone/>
-            </a:pPr>
-            <a:r>
-              <a:rPr/>
-              <a:t>Again, I am using an example from the UCLA Statistical Methods and Data Analytics site. It pops up easily on a simple google search.</a:t>
+              <a:t>After all this careful work, you now have the original estimate of R-squared (52% after rounding), the estimated bias (less than 1%) and the confidence interval (44% to 60%).</a:t>
+            </a:r>
+          </a:p>
+          <a:p>
+            <a:pPr lvl="0" indent="0" marL="0">
+              <a:buNone/>
+            </a:pPr>
+          </a:p>
+          <a:p>
+            <a:pPr lvl="0" indent="0" marL="0">
+              <a:buNone/>
+            </a:pPr>
+            <a:r>
+              <a:rPr/>
+              <a:t>As a quick recap, knowledge of the output delivery system (ods) and macro variables were critical. Thankfully, you did not need a loop here, but familiarity with looping mechanisms in SAS is probably worth knowing for other bootstrap examples.</a:t>
+            </a:r>
+          </a:p>
+          <a:p>
+            <a:pPr lvl="0" indent="0" marL="0">
+              <a:buNone/>
+            </a:pPr>
+          </a:p>
+          <a:p>
+            <a:pPr lvl="0" indent="0" marL="0">
+              <a:buNone/>
+            </a:pPr>
+            <a:r>
+              <a:rPr/>
+              <a:t>If you want to learn more, Rick Wicklin of SAS Institute has a nice series of blog posts. Start with this one.</a:t>
             </a:r>
           </a:p>
         </p:txBody>
@@ -5503,7 +5533,7 @@
           <a:p>
             <a:fld id="{18BDFEC3-8487-43E8-A154-7C12CBC1FFF2}" type="slidenum">
               <a:rPr lang="en-US"/>
-              <a:t>59</a:t>
+              <a:t>55</a:t>
             </a:fld>
             <a:endParaRPr lang="en-US"/>
           </a:p>
@@ -5563,63 +5593,21 @@
             </a:pPr>
             <a:r>
               <a:rPr/>
-              <a:t>In more complex settings, you need to consider some modifications to the bootstrap. I have almost no experience in these settings and there is scant guidance in the published literature and on the web.</a:t>
-            </a:r>
-          </a:p>
-          <a:p>
-            <a:pPr lvl="0" indent="0" marL="0">
-              <a:buNone/>
-            </a:pPr>
-          </a:p>
-          <a:p>
-            <a:pPr lvl="0" indent="0" marL="0">
-              <a:buNone/>
-            </a:pPr>
-            <a:r>
-              <a:rPr/>
-              <a:t>If you find yourself in one of these settings, I would encourage you to find a few publications that use the bootstrap in a setting reasonably similar to yours and emulate their approach.</a:t>
-            </a:r>
-          </a:p>
-          <a:p>
-            <a:pPr lvl="0" indent="0" marL="0">
-              <a:buNone/>
-            </a:pPr>
-          </a:p>
-          <a:p>
-            <a:pPr lvl="0" indent="0" marL="0">
-              <a:buNone/>
-            </a:pPr>
-            <a:r>
-              <a:rPr/>
-              <a:t>I call this the “lemming school of research” which is a reference to the warning about peer pressure that almost every parent has nagged their children with (“If all your friends jumped off a cliff, would you jump off the cliff as well?”).</a:t>
-            </a:r>
-          </a:p>
-          <a:p>
-            <a:pPr lvl="0" indent="0" marL="0">
-              <a:buNone/>
-            </a:pPr>
-          </a:p>
-          <a:p>
-            <a:pPr lvl="0" indent="0" marL="0">
-              <a:buNone/>
-            </a:pPr>
-            <a:r>
-              <a:rPr/>
-              <a:t>It actually is not as bad as I make it sound. If a certain methodology has survived the peer reviewe process, that gives you a bit more confidence that you can survive the peer review process as well if you emulate their approach. There are no guarantees, of course, but this is perhaps an illustration of a more positive message: “there is safety in numbers.”</a:t>
-            </a:r>
-          </a:p>
-          <a:p>
-            <a:pPr lvl="0" indent="0" marL="0">
-              <a:buNone/>
-            </a:pPr>
-          </a:p>
-          <a:p>
-            <a:pPr lvl="0" indent="0" marL="0">
-              <a:buNone/>
-            </a:pPr>
-            <a:r>
-              <a:rPr/>
-              <a:t>The three settings I want to discuss are multiple groups, time series, and regression models.</a:t>
+              <a:t>I am not an expert on Stata, but it was created in 1985 about two decades later than SAS. So it did not have any holdovers from the restricted options available in the age of IBM mainframe computers.</a:t>
+            </a:r>
+          </a:p>
+          <a:p>
+            <a:pPr lvl="0" indent="0" marL="0">
+              <a:buNone/>
+            </a:pPr>
+          </a:p>
+          <a:p>
+            <a:pPr lvl="0" indent="0" marL="0">
+              <a:buNone/>
+            </a:pPr>
+            <a:r>
+              <a:rPr/>
+              <a:t>This example is taken from the UCLA Statistical Methods and Data Analytics site. It pops up easily on a simple google search. Try using the search terms “ucla,” “bootstrap,” and “stata.”</a:t>
             </a:r>
           </a:p>
         </p:txBody>
@@ -5641,7 +5629,7 @@
           <a:p>
             <a:fld id="{18BDFEC3-8487-43E8-A154-7C12CBC1FFF2}" type="slidenum">
               <a:rPr lang="en-US"/>
-              <a:t>64</a:t>
+              <a:t>56</a:t>
             </a:fld>
             <a:endParaRPr lang="en-US"/>
           </a:p>
@@ -5701,77 +5689,7 @@
             </a:pPr>
             <a:r>
               <a:rPr/>
-              <a:t>Suppose you have two or more groups and want to estimate a statistic across all of the groups. For example, you have a treatment and a control group and you want to estimate the difference in medians between the two groups.</a:t>
-            </a:r>
-          </a:p>
-          <a:p>
-            <a:pPr lvl="0" indent="0" marL="0">
-              <a:buNone/>
-            </a:pPr>
-          </a:p>
-          <a:p>
-            <a:pPr lvl="0" indent="0" marL="0">
-              <a:buNone/>
-            </a:pPr>
-            <a:r>
-              <a:rPr/>
-              <a:t>You have two options. The first is to apply a simple bootstrap. This allows the relative sizes in the groups to vary. If one of the groups has a small relative sample size, then you run a slight risk having zero observations in that group for one or more of your bootstrap samples.</a:t>
-            </a:r>
-          </a:p>
-          <a:p>
-            <a:pPr lvl="0" indent="0" marL="0">
-              <a:buNone/>
-            </a:pPr>
-          </a:p>
-          <a:p>
-            <a:pPr lvl="0" indent="0" marL="0">
-              <a:buNone/>
-            </a:pPr>
-            <a:r>
-              <a:rPr/>
-              <a:t>If the group sizes are all reasonably large, this is not a serious problem.</a:t>
-            </a:r>
-          </a:p>
-          <a:p>
-            <a:pPr lvl="0" indent="0" marL="0">
-              <a:buNone/>
-            </a:pPr>
-          </a:p>
-          <a:p>
-            <a:pPr lvl="0" indent="0" marL="0">
-              <a:buNone/>
-            </a:pPr>
-            <a:r>
-              <a:rPr/>
-              <a:t>An alternative is to use a stratified bootstrap sample. It’s easy enough to envision with two groups. Let’s say that the two groups have sample sizes n1 and n2. Sample n1 observation with replacement from the first group, sample with n2 observations with replacement from the second group and then combine.</a:t>
-            </a:r>
-          </a:p>
-          <a:p>
-            <a:pPr lvl="0" indent="0" marL="0">
-              <a:buNone/>
-            </a:pPr>
-          </a:p>
-          <a:p>
-            <a:pPr lvl="0" indent="0" marL="0">
-              <a:buNone/>
-            </a:pPr>
-            <a:r>
-              <a:rPr/>
-              <a:t>The stratified bootstrap answers a different question than the simple bootstrap. The simple bootstrap calculates uncertainty in a setting where you are collecting a single sample and that sample has a random number of subjects in each group. The stratified bootstrap calculates uncertainty where you are collecting samples from multiple groups, each with a fixed quota.</a:t>
-            </a:r>
-          </a:p>
-          <a:p>
-            <a:pPr lvl="0" indent="0" marL="0">
-              <a:buNone/>
-            </a:pPr>
-          </a:p>
-          <a:p>
-            <a:pPr lvl="0" indent="0" marL="0">
-              <a:buNone/>
-            </a:pPr>
-            <a:r>
-              <a:rPr/>
-              <a:t>Is this a huge difference? I’m not sure, but my guess is that it is not all that important except when one or more of the group sizes is small. By small, I mean 10 or less. I should note, however, that I have not seen an “official” guidance on this question.</a:t>
+              <a:t>Here is the Stata code to get the estimates from the original data.</a:t>
             </a:r>
           </a:p>
         </p:txBody>
@@ -5793,7 +5711,7 @@
           <a:p>
             <a:fld id="{18BDFEC3-8487-43E8-A154-7C12CBC1FFF2}" type="slidenum">
               <a:rPr lang="en-US"/>
-              <a:t>65</a:t>
+              <a:t>57</a:t>
             </a:fld>
             <a:endParaRPr lang="en-US"/>
           </a:p>
@@ -5853,63 +5771,7 @@
             </a:pPr>
             <a:r>
               <a:rPr/>
-              <a:t>There are special features of time series data that make them difficult to use with a simple bootstrap. The first and most obvious feature is that most time series have a nice neatly ordered pattern or even spacing over time. A bootstrap sample is going to have gaps in some places and multiple observations at the same time point.</a:t>
-            </a:r>
-          </a:p>
-          <a:p>
-            <a:pPr lvl="0" indent="0" marL="0">
-              <a:buNone/>
-            </a:pPr>
-          </a:p>
-          <a:p>
-            <a:pPr lvl="0" indent="0" marL="0">
-              <a:buNone/>
-            </a:pPr>
-            <a:r>
-              <a:rPr/>
-              <a:t>Most time series also exhibit serial correlation, seasonality, and/or temporal trends. These features are either seriously distorted or totally destroyed in a bootstrap sample.</a:t>
-            </a:r>
-          </a:p>
-          <a:p>
-            <a:pPr lvl="0" indent="0" marL="0">
-              <a:buNone/>
-            </a:pPr>
-          </a:p>
-          <a:p>
-            <a:pPr lvl="0" indent="0" marL="0">
-              <a:buNone/>
-            </a:pPr>
-            <a:r>
-              <a:rPr/>
-              <a:t>There are several possible solutions. One is to bootstrap consecutive blocks of observations. This preserves time series features within a block and appears to perform reasonably well.</a:t>
-            </a:r>
-          </a:p>
-          <a:p>
-            <a:pPr lvl="0" indent="0" marL="0">
-              <a:buNone/>
-            </a:pPr>
-          </a:p>
-          <a:p>
-            <a:pPr lvl="0" indent="0" marL="0">
-              <a:buNone/>
-            </a:pPr>
-            <a:r>
-              <a:rPr/>
-              <a:t>A second option is to remove any trend and decompose the time series into independent components, take a bootstrap sample of the independent components, and then recompose a new series from the bootstrap sample.</a:t>
-            </a:r>
-          </a:p>
-          <a:p>
-            <a:pPr lvl="0" indent="0" marL="0">
-              <a:buNone/>
-            </a:pPr>
-          </a:p>
-          <a:p>
-            <a:pPr lvl="0" indent="0" marL="0">
-              <a:buNone/>
-            </a:pPr>
-            <a:r>
-              <a:rPr/>
-              <a:t>The approach you take largely depends on the context of your problem and what statistic you are trying to characterize. For example, if you detrend the data and remove seasonality, then any bootstrapped estimate from the reconstructed time series will be fine if it is modeling a feature of the data other than the trend or seasonality.</a:t>
+              <a:t>Stata has a bootstrap function built-in. It is both a good thing and a bad thing. It is good in that it simplifies your code. It is bad in that it can only bootstrap on prespecified parts of the output. In fairness, this is also a limitation with the output delivery system in SAS. Both systems are pretty good at letting you pick out the pieces of the output that you are most interested in.</a:t>
             </a:r>
           </a:p>
         </p:txBody>
@@ -5931,7 +5793,7 @@
           <a:p>
             <a:fld id="{18BDFEC3-8487-43E8-A154-7C12CBC1FFF2}" type="slidenum">
               <a:rPr lang="en-US"/>
-              <a:t>66</a:t>
+              <a:t>58</a:t>
             </a:fld>
             <a:endParaRPr lang="en-US"/>
           </a:p>
@@ -5991,49 +5853,21 @@
             </a:pPr>
             <a:r>
               <a:rPr/>
-              <a:t>The regression model has some of the same issues as the setting with multiple groups described earlier. If some of the independent variables are very strongly correlated, you might end up with a setting where the correlation is exactly 1 for one or more of the bootstrap samples. This is not a serious issue unless you have both a strong correlation and a small sample size.</a:t>
-            </a:r>
-          </a:p>
-          <a:p>
-            <a:pPr lvl="0" indent="0" marL="0">
-              <a:buNone/>
-            </a:pPr>
-          </a:p>
-          <a:p>
-            <a:pPr lvl="0" indent="0" marL="0">
-              <a:buNone/>
-            </a:pPr>
-            <a:r>
-              <a:rPr/>
-              <a:t>But another consideration is that the bootstrap sample treats the independent variables as if they are selected randomly along with the dependent variable. This may be the case, but there are some datasets where the X values are fixed in advance and the dependent variable is the only thing being sampled.</a:t>
-            </a:r>
-          </a:p>
-          <a:p>
-            <a:pPr lvl="0" indent="0" marL="0">
-              <a:buNone/>
-            </a:pPr>
-          </a:p>
-          <a:p>
-            <a:pPr lvl="0" indent="0" marL="0">
-              <a:buNone/>
-            </a:pPr>
-            <a:r>
-              <a:rPr/>
-              <a:t>One possible solution is to compute the residuals and reconstruct a new dependent variable from the bootstrapped residuals.</a:t>
-            </a:r>
-          </a:p>
-          <a:p>
-            <a:pPr lvl="0" indent="0" marL="0">
-              <a:buNone/>
-            </a:pPr>
-          </a:p>
-          <a:p>
-            <a:pPr lvl="0" indent="0" marL="0">
-              <a:buNone/>
-            </a:pPr>
-            <a:r>
-              <a:rPr/>
-              <a:t>Context is important here. If you bootstrap the residuals, you can’t use the reconstructed dependent variable as an estimate of the regression slopes themselves. You could use them to reconstruct a statistic that is independent of those slopes.</a:t>
+              <a:t>Here is the output. By default, it provides a confidence interval based on the bootstrap standard error, but you can get other confidence intervals as well.</a:t>
+            </a:r>
+          </a:p>
+          <a:p>
+            <a:pPr lvl="0" indent="0" marL="0">
+              <a:buNone/>
+            </a:pPr>
+          </a:p>
+          <a:p>
+            <a:pPr lvl="0" indent="0" marL="0">
+              <a:buNone/>
+            </a:pPr>
+            <a:r>
+              <a:rPr/>
+              <a:t>In this example, the original data produced a root mean squared error of 7.2 and the bootstrap 95% confidence interval goes from 6.7 to 7.7.</a:t>
             </a:r>
           </a:p>
         </p:txBody>
@@ -6055,7 +5889,7 @@
           <a:p>
             <a:fld id="{18BDFEC3-8487-43E8-A154-7C12CBC1FFF2}" type="slidenum">
               <a:rPr lang="en-US"/>
-              <a:t>67</a:t>
+              <a:t>59</a:t>
             </a:fld>
             <a:endParaRPr lang="en-US"/>
           </a:p>
@@ -6115,21 +5949,35 @@
             </a:pPr>
             <a:r>
               <a:rPr/>
-              <a:t>The bootstrap performs well in settings where you do not have any theoretical results to guide your work. It also works well when the normal approximations that you rely on are questionable, either because the sample size is small or because the underlying distribution of the data is troublesome. By troublesome, I mean extreme skew or high probability of producing outliers. Both will tend to slow down the asymptotic approximation to normality.</a:t>
-            </a:r>
-          </a:p>
-          <a:p>
-            <a:pPr lvl="0" indent="0" marL="0">
-              <a:buNone/>
-            </a:pPr>
-          </a:p>
-          <a:p>
-            <a:pPr lvl="0" indent="0" marL="0">
-              <a:buNone/>
-            </a:pPr>
-            <a:r>
-              <a:rPr/>
-              <a:t>Keep in mind, though, that the bootstrap can’t compensate for a limited sample size. The confidence intervals may be valid, but often they will be so wide as to be meaningless. There’s a saying that you can’t squeeze blood from a turnip. That’s an attempt to explain that you can’t get something from nothing.</a:t>
+              <a:t>R was created in 1999, and relied on a modular approach that makes it ideal for bootstrapping. There is a special library that works for most cases, even some very exotic ones. Looping in R is easy as is extracting specific values.</a:t>
+            </a:r>
+          </a:p>
+          <a:p>
+            <a:pPr lvl="0" indent="0" marL="0">
+              <a:buNone/>
+            </a:pPr>
+          </a:p>
+          <a:p>
+            <a:pPr lvl="0" indent="0" marL="0">
+              <a:buNone/>
+            </a:pPr>
+            <a:r>
+              <a:rPr/>
+              <a:t>Again, I am using an example from the UCLA Statistical Methods and Data Analytics site. It pops up easily on a simple google search. Try using the search terms “ucla,” “bootstrap,” and “r”.</a:t>
+            </a:r>
+          </a:p>
+          <a:p>
+            <a:pPr lvl="0" indent="0" marL="0">
+              <a:buNone/>
+            </a:pPr>
+          </a:p>
+          <a:p>
+            <a:pPr lvl="0" indent="0" marL="0">
+              <a:buNone/>
+            </a:pPr>
+            <a:r>
+              <a:rPr/>
+              <a:t>By the way, one disadvantage of the R programming language is that a google search just using the term “r” is going to bring up a bunch of things related to the letter “r” other than just the R programming language. You don’t have as much trouble with SAS, although you might be routed to the Scandinavian Airlines website. Stockholm, anyone?</a:t>
             </a:r>
           </a:p>
         </p:txBody>
@@ -6151,7 +5999,7 @@
           <a:p>
             <a:fld id="{18BDFEC3-8487-43E8-A154-7C12CBC1FFF2}" type="slidenum">
               <a:rPr lang="en-US"/>
-              <a:t>69</a:t>
+              <a:t>60</a:t>
             </a:fld>
             <a:endParaRPr lang="en-US"/>
           </a:p>
@@ -6211,21 +6059,7 @@
             </a:pPr>
             <a:r>
               <a:rPr/>
-              <a:t>So we’ve covered the history of the bootstrap, illustrated some algorithms, showed how to compute a bootstrap in SAS, Stata, and R, and discussed some special issues where you might want to modify the bootstrap approach.</a:t>
-            </a:r>
-          </a:p>
-          <a:p>
-            <a:pPr lvl="0" indent="0" marL="0">
-              <a:buNone/>
-            </a:pPr>
-          </a:p>
-          <a:p>
-            <a:pPr lvl="0" indent="0" marL="0">
-              <a:buNone/>
-            </a:pPr>
-            <a:r>
-              <a:rPr/>
-              <a:t>I’d be glad to take any questions you might have.</a:t>
+              <a:t>You can read the data directly from the web.</a:t>
             </a:r>
           </a:p>
         </p:txBody>
@@ -6247,7 +6081,7 @@
           <a:p>
             <a:fld id="{18BDFEC3-8487-43E8-A154-7C12CBC1FFF2}" type="slidenum">
               <a:rPr lang="en-US"/>
-              <a:t>70</a:t>
+              <a:t>61</a:t>
             </a:fld>
             <a:endParaRPr lang="en-US"/>
           </a:p>
@@ -6438,6 +6272,1120 @@
 </p:notes>
 </file>
 
+<file path=ppt/notesSlides/notesSlide60.xml><?xml version="1.0" encoding="utf-8"?>
+<p:notes xmlns:a="http://schemas.openxmlformats.org/drawingml/2006/main" xmlns:r="http://schemas.openxmlformats.org/officeDocument/2006/relationships" xmlns:p="http://schemas.openxmlformats.org/presentationml/2006/main">
+  <p:cSld>
+    <p:spTree>
+      <p:nvGrpSpPr>
+        <p:cNvPr id="1" name=""/>
+        <p:cNvGrpSpPr/>
+        <p:nvPr/>
+      </p:nvGrpSpPr>
+      <p:grpSpPr>
+        <a:xfrm>
+          <a:off x="0" y="0"/>
+          <a:ext cx="0" cy="0"/>
+          <a:chOff x="0" y="0"/>
+          <a:chExt cx="0" cy="0"/>
+        </a:xfrm>
+      </p:grpSpPr>
+      <p:sp>
+        <p:nvSpPr>
+          <p:cNvPr id="2" name="Slide Image Placeholder 1"/>
+          <p:cNvSpPr>
+            <a:spLocks noGrp="1" noRot="1" noChangeAspect="1"/>
+          </p:cNvSpPr>
+          <p:nvPr>
+            <p:ph type="sldImg"/>
+          </p:nvPr>
+        </p:nvSpPr>
+        <p:spPr/>
+      </p:sp>
+      <p:sp>
+        <p:nvSpPr>
+          <p:cNvPr id="3" name="Notes Placeholder 2"/>
+          <p:cNvSpPr>
+            <a:spLocks noGrp="1"/>
+          </p:cNvSpPr>
+          <p:nvPr>
+            <p:ph type="body" idx="1"/>
+          </p:nvPr>
+        </p:nvSpPr>
+        <p:spPr/>
+        <p:txBody>
+          <a:bodyPr/>
+          <a:lstStyle/>
+          <a:p>
+            <a:pPr lvl="0" indent="0" marL="0">
+              <a:buNone/>
+            </a:pPr>
+            <a:r>
+              <a:rPr/>
+              <a:t>Define a function that takes your dataset and returns a single number. In this example, the single number is the correlation between two measures of knowledge. Plug this function into the boot function. This will prepare R=500 bootstrap samples and apply them to the function you just defined.</a:t>
+            </a:r>
+          </a:p>
+          <a:p>
+            <a:pPr lvl="0" indent="0" marL="0">
+              <a:buNone/>
+            </a:pPr>
+          </a:p>
+          <a:p>
+            <a:pPr lvl="0" indent="0" marL="0">
+              <a:buNone/>
+            </a:pPr>
+            <a:r>
+              <a:rPr/>
+              <a:t>By the way, I get a lot of questions: should I learn R or Python or SAS or Stata or something else. There’s very little reason to prefer one over the other, but here’s a small thing. In R, you can use a function like “boot” and have it evaluate another function like “hsb2.” This seamless integration of functions within functions provides a powerful yet easy to use approach for handling complex settings.</a:t>
+            </a:r>
+          </a:p>
+        </p:txBody>
+      </p:sp>
+      <p:sp>
+        <p:nvSpPr>
+          <p:cNvPr id="4" name="Slide Number Placeholder 3"/>
+          <p:cNvSpPr>
+            <a:spLocks noGrp="1"/>
+          </p:cNvSpPr>
+          <p:nvPr>
+            <p:ph type="sldNum" sz="quarter" idx="10"/>
+          </p:nvPr>
+        </p:nvSpPr>
+        <p:spPr/>
+        <p:txBody>
+          <a:bodyPr/>
+          <a:lstStyle/>
+          <a:p>
+            <a:fld id="{18BDFEC3-8487-43E8-A154-7C12CBC1FFF2}" type="slidenum">
+              <a:rPr lang="en-US"/>
+              <a:t>62</a:t>
+            </a:fld>
+            <a:endParaRPr lang="en-US"/>
+          </a:p>
+        </p:txBody>
+      </p:sp>
+    </p:spTree>
+  </p:cSld>
+</p:notes>
+</file>
+
+<file path=ppt/notesSlides/notesSlide61.xml><?xml version="1.0" encoding="utf-8"?>
+<p:notes xmlns:a="http://schemas.openxmlformats.org/drawingml/2006/main" xmlns:r="http://schemas.openxmlformats.org/officeDocument/2006/relationships" xmlns:p="http://schemas.openxmlformats.org/presentationml/2006/main">
+  <p:cSld>
+    <p:spTree>
+      <p:nvGrpSpPr>
+        <p:cNvPr id="1" name=""/>
+        <p:cNvGrpSpPr/>
+        <p:nvPr/>
+      </p:nvGrpSpPr>
+      <p:grpSpPr>
+        <a:xfrm>
+          <a:off x="0" y="0"/>
+          <a:ext cx="0" cy="0"/>
+          <a:chOff x="0" y="0"/>
+          <a:chExt cx="0" cy="0"/>
+        </a:xfrm>
+      </p:grpSpPr>
+      <p:sp>
+        <p:nvSpPr>
+          <p:cNvPr id="2" name="Slide Image Placeholder 1"/>
+          <p:cNvSpPr>
+            <a:spLocks noGrp="1" noRot="1" noChangeAspect="1"/>
+          </p:cNvSpPr>
+          <p:nvPr>
+            <p:ph type="sldImg"/>
+          </p:nvPr>
+        </p:nvSpPr>
+        <p:spPr/>
+      </p:sp>
+      <p:sp>
+        <p:nvSpPr>
+          <p:cNvPr id="3" name="Notes Placeholder 2"/>
+          <p:cNvSpPr>
+            <a:spLocks noGrp="1"/>
+          </p:cNvSpPr>
+          <p:nvPr>
+            <p:ph type="body" idx="1"/>
+          </p:nvPr>
+        </p:nvSpPr>
+        <p:spPr/>
+        <p:txBody>
+          <a:bodyPr/>
+          <a:lstStyle/>
+          <a:p>
+            <a:pPr lvl="0" indent="0" marL="0">
+              <a:buNone/>
+            </a:pPr>
+            <a:r>
+              <a:rPr/>
+              <a:t>Here are the results. The correlation from the orginal data is 0.62 (I’m rounding here). There is almost no bias and the standard error demonstrates that there is very little sampling error.</a:t>
+            </a:r>
+          </a:p>
+          <a:p>
+            <a:pPr lvl="0" indent="0" marL="0">
+              <a:buNone/>
+            </a:pPr>
+          </a:p>
+          <a:p>
+            <a:pPr lvl="0" indent="0" marL="0">
+              <a:buNone/>
+            </a:pPr>
+            <a:r>
+              <a:rPr/>
+              <a:t>You can get confidence intervals and hypothesis tests fairly easily as well. Go the the UCLA site for details.</a:t>
+            </a:r>
+          </a:p>
+        </p:txBody>
+      </p:sp>
+      <p:sp>
+        <p:nvSpPr>
+          <p:cNvPr id="4" name="Slide Number Placeholder 3"/>
+          <p:cNvSpPr>
+            <a:spLocks noGrp="1"/>
+          </p:cNvSpPr>
+          <p:nvPr>
+            <p:ph type="sldNum" sz="quarter" idx="10"/>
+          </p:nvPr>
+        </p:nvSpPr>
+        <p:spPr/>
+        <p:txBody>
+          <a:bodyPr/>
+          <a:lstStyle/>
+          <a:p>
+            <a:fld id="{18BDFEC3-8487-43E8-A154-7C12CBC1FFF2}" type="slidenum">
+              <a:rPr lang="en-US"/>
+              <a:t>63</a:t>
+            </a:fld>
+            <a:endParaRPr lang="en-US"/>
+          </a:p>
+        </p:txBody>
+      </p:sp>
+    </p:spTree>
+  </p:cSld>
+</p:notes>
+</file>
+
+<file path=ppt/notesSlides/notesSlide62.xml><?xml version="1.0" encoding="utf-8"?>
+<p:notes xmlns:a="http://schemas.openxmlformats.org/drawingml/2006/main" xmlns:r="http://schemas.openxmlformats.org/officeDocument/2006/relationships" xmlns:p="http://schemas.openxmlformats.org/presentationml/2006/main">
+  <p:cSld>
+    <p:spTree>
+      <p:nvGrpSpPr>
+        <p:cNvPr id="1" name=""/>
+        <p:cNvGrpSpPr/>
+        <p:nvPr/>
+      </p:nvGrpSpPr>
+      <p:grpSpPr>
+        <a:xfrm>
+          <a:off x="0" y="0"/>
+          <a:ext cx="0" cy="0"/>
+          <a:chOff x="0" y="0"/>
+          <a:chExt cx="0" cy="0"/>
+        </a:xfrm>
+      </p:grpSpPr>
+      <p:sp>
+        <p:nvSpPr>
+          <p:cNvPr id="2" name="Slide Image Placeholder 1"/>
+          <p:cNvSpPr>
+            <a:spLocks noGrp="1" noRot="1" noChangeAspect="1"/>
+          </p:cNvSpPr>
+          <p:nvPr>
+            <p:ph type="sldImg"/>
+          </p:nvPr>
+        </p:nvSpPr>
+        <p:spPr/>
+      </p:sp>
+      <p:sp>
+        <p:nvSpPr>
+          <p:cNvPr id="3" name="Notes Placeholder 2"/>
+          <p:cNvSpPr>
+            <a:spLocks noGrp="1"/>
+          </p:cNvSpPr>
+          <p:nvPr>
+            <p:ph type="body" idx="1"/>
+          </p:nvPr>
+        </p:nvSpPr>
+        <p:spPr/>
+        <p:txBody>
+          <a:bodyPr/>
+          <a:lstStyle/>
+          <a:p>
+            <a:pPr lvl="0" indent="0" marL="0">
+              <a:buNone/>
+            </a:pPr>
+            <a:r>
+              <a:rPr/>
+              <a:t>So you’ve seen how to apply the bootstrap in SAS, Stata, and R. Next, I want to discuss special settings where you might want to modify the bootstrap approach.</a:t>
+            </a:r>
+          </a:p>
+        </p:txBody>
+      </p:sp>
+      <p:sp>
+        <p:nvSpPr>
+          <p:cNvPr id="4" name="Slide Number Placeholder 3"/>
+          <p:cNvSpPr>
+            <a:spLocks noGrp="1"/>
+          </p:cNvSpPr>
+          <p:nvPr>
+            <p:ph type="sldNum" sz="quarter" idx="10"/>
+          </p:nvPr>
+        </p:nvSpPr>
+        <p:spPr/>
+        <p:txBody>
+          <a:bodyPr/>
+          <a:lstStyle/>
+          <a:p>
+            <a:fld id="{18BDFEC3-8487-43E8-A154-7C12CBC1FFF2}" type="slidenum">
+              <a:rPr lang="en-US"/>
+              <a:t>64</a:t>
+            </a:fld>
+            <a:endParaRPr lang="en-US"/>
+          </a:p>
+        </p:txBody>
+      </p:sp>
+    </p:spTree>
+  </p:cSld>
+</p:notes>
+</file>
+
+<file path=ppt/notesSlides/notesSlide63.xml><?xml version="1.0" encoding="utf-8"?>
+<p:notes xmlns:a="http://schemas.openxmlformats.org/drawingml/2006/main" xmlns:r="http://schemas.openxmlformats.org/officeDocument/2006/relationships" xmlns:p="http://schemas.openxmlformats.org/presentationml/2006/main">
+  <p:cSld>
+    <p:spTree>
+      <p:nvGrpSpPr>
+        <p:cNvPr id="1" name=""/>
+        <p:cNvGrpSpPr/>
+        <p:nvPr/>
+      </p:nvGrpSpPr>
+      <p:grpSpPr>
+        <a:xfrm>
+          <a:off x="0" y="0"/>
+          <a:ext cx="0" cy="0"/>
+          <a:chOff x="0" y="0"/>
+          <a:chExt cx="0" cy="0"/>
+        </a:xfrm>
+      </p:grpSpPr>
+      <p:sp>
+        <p:nvSpPr>
+          <p:cNvPr id="2" name="Slide Image Placeholder 1"/>
+          <p:cNvSpPr>
+            <a:spLocks noGrp="1" noRot="1" noChangeAspect="1"/>
+          </p:cNvSpPr>
+          <p:nvPr>
+            <p:ph type="sldImg"/>
+          </p:nvPr>
+        </p:nvSpPr>
+        <p:spPr/>
+      </p:sp>
+      <p:sp>
+        <p:nvSpPr>
+          <p:cNvPr id="3" name="Notes Placeholder 2"/>
+          <p:cNvSpPr>
+            <a:spLocks noGrp="1"/>
+          </p:cNvSpPr>
+          <p:nvPr>
+            <p:ph type="body" idx="1"/>
+          </p:nvPr>
+        </p:nvSpPr>
+        <p:spPr/>
+        <p:txBody>
+          <a:bodyPr/>
+          <a:lstStyle/>
+          <a:p>
+            <a:pPr lvl="0" indent="0" marL="0">
+              <a:buNone/>
+            </a:pPr>
+            <a:r>
+              <a:rPr/>
+              <a:t>In more complex settings, you need to consider some modifications to the bootstrap. I have almost no experience in these settings and there is scant guidance in the published literature and on the web.</a:t>
+            </a:r>
+          </a:p>
+          <a:p>
+            <a:pPr lvl="0" indent="0" marL="0">
+              <a:buNone/>
+            </a:pPr>
+          </a:p>
+          <a:p>
+            <a:pPr lvl="0" indent="0" marL="0">
+              <a:buNone/>
+            </a:pPr>
+            <a:r>
+              <a:rPr/>
+              <a:t>If you find yourself in one of these settings, I would encourage you to find a few publications that use the bootstrap in a setting reasonably similar to yours and emulate their approach.</a:t>
+            </a:r>
+          </a:p>
+          <a:p>
+            <a:pPr lvl="0" indent="0" marL="0">
+              <a:buNone/>
+            </a:pPr>
+          </a:p>
+          <a:p>
+            <a:pPr lvl="0" indent="0" marL="0">
+              <a:buNone/>
+            </a:pPr>
+            <a:r>
+              <a:rPr/>
+              <a:t>I call this the “lemming school of research” which is a reference to the warning about peer pressure that almost every parent has nagged their children with (“If all your friends jumped off a cliff, would you jump off the cliff as well?”).</a:t>
+            </a:r>
+          </a:p>
+          <a:p>
+            <a:pPr lvl="0" indent="0" marL="0">
+              <a:buNone/>
+            </a:pPr>
+          </a:p>
+          <a:p>
+            <a:pPr lvl="0" indent="0" marL="0">
+              <a:buNone/>
+            </a:pPr>
+            <a:r>
+              <a:rPr/>
+              <a:t>It actually is not as bad as I make it sound. If a certain methodology has survived the peer reviewe process, that gives you a bit more confidence that you can survive the peer review process as well if you emulate their approach. There are no guarantees, of course, but this is perhaps an illustration of a more positive message: “there is safety in numbers.”</a:t>
+            </a:r>
+          </a:p>
+          <a:p>
+            <a:pPr lvl="0" indent="0" marL="0">
+              <a:buNone/>
+            </a:pPr>
+          </a:p>
+          <a:p>
+            <a:pPr lvl="0" indent="0" marL="0">
+              <a:buNone/>
+            </a:pPr>
+            <a:r>
+              <a:rPr/>
+              <a:t>The three settings I want to discuss are multiple groups, time series, and regression models.</a:t>
+            </a:r>
+          </a:p>
+        </p:txBody>
+      </p:sp>
+      <p:sp>
+        <p:nvSpPr>
+          <p:cNvPr id="4" name="Slide Number Placeholder 3"/>
+          <p:cNvSpPr>
+            <a:spLocks noGrp="1"/>
+          </p:cNvSpPr>
+          <p:nvPr>
+            <p:ph type="sldNum" sz="quarter" idx="10"/>
+          </p:nvPr>
+        </p:nvSpPr>
+        <p:spPr/>
+        <p:txBody>
+          <a:bodyPr/>
+          <a:lstStyle/>
+          <a:p>
+            <a:fld id="{18BDFEC3-8487-43E8-A154-7C12CBC1FFF2}" type="slidenum">
+              <a:rPr lang="en-US"/>
+              <a:t>65</a:t>
+            </a:fld>
+            <a:endParaRPr lang="en-US"/>
+          </a:p>
+        </p:txBody>
+      </p:sp>
+    </p:spTree>
+  </p:cSld>
+</p:notes>
+</file>
+
+<file path=ppt/notesSlides/notesSlide64.xml><?xml version="1.0" encoding="utf-8"?>
+<p:notes xmlns:a="http://schemas.openxmlformats.org/drawingml/2006/main" xmlns:r="http://schemas.openxmlformats.org/officeDocument/2006/relationships" xmlns:p="http://schemas.openxmlformats.org/presentationml/2006/main">
+  <p:cSld>
+    <p:spTree>
+      <p:nvGrpSpPr>
+        <p:cNvPr id="1" name=""/>
+        <p:cNvGrpSpPr/>
+        <p:nvPr/>
+      </p:nvGrpSpPr>
+      <p:grpSpPr>
+        <a:xfrm>
+          <a:off x="0" y="0"/>
+          <a:ext cx="0" cy="0"/>
+          <a:chOff x="0" y="0"/>
+          <a:chExt cx="0" cy="0"/>
+        </a:xfrm>
+      </p:grpSpPr>
+      <p:sp>
+        <p:nvSpPr>
+          <p:cNvPr id="2" name="Slide Image Placeholder 1"/>
+          <p:cNvSpPr>
+            <a:spLocks noGrp="1" noRot="1" noChangeAspect="1"/>
+          </p:cNvSpPr>
+          <p:nvPr>
+            <p:ph type="sldImg"/>
+          </p:nvPr>
+        </p:nvSpPr>
+        <p:spPr/>
+      </p:sp>
+      <p:sp>
+        <p:nvSpPr>
+          <p:cNvPr id="3" name="Notes Placeholder 2"/>
+          <p:cNvSpPr>
+            <a:spLocks noGrp="1"/>
+          </p:cNvSpPr>
+          <p:nvPr>
+            <p:ph type="body" idx="1"/>
+          </p:nvPr>
+        </p:nvSpPr>
+        <p:spPr/>
+        <p:txBody>
+          <a:bodyPr/>
+          <a:lstStyle/>
+          <a:p>
+            <a:pPr lvl="0" indent="0" marL="0">
+              <a:buNone/>
+            </a:pPr>
+            <a:r>
+              <a:rPr/>
+              <a:t>Suppose you have two or more groups and want to estimate a statistic across all of the groups. For example, you have a treatment and a control group and you want to estimate the difference in medians between the two groups.</a:t>
+            </a:r>
+          </a:p>
+          <a:p>
+            <a:pPr lvl="0" indent="0" marL="0">
+              <a:buNone/>
+            </a:pPr>
+          </a:p>
+          <a:p>
+            <a:pPr lvl="0" indent="0" marL="0">
+              <a:buNone/>
+            </a:pPr>
+            <a:r>
+              <a:rPr/>
+              <a:t>You have two options. The first is to apply a simple bootstrap. This allows the relative sizes in the groups to vary. If one of the groups has a small relative sample size, then you run a slight risk having zero observations in that group for one or more of your bootstrap samples.</a:t>
+            </a:r>
+          </a:p>
+          <a:p>
+            <a:pPr lvl="0" indent="0" marL="0">
+              <a:buNone/>
+            </a:pPr>
+          </a:p>
+          <a:p>
+            <a:pPr lvl="0" indent="0" marL="0">
+              <a:buNone/>
+            </a:pPr>
+            <a:r>
+              <a:rPr/>
+              <a:t>If the group sizes are all reasonably large, this is not a serious problem.</a:t>
+            </a:r>
+          </a:p>
+          <a:p>
+            <a:pPr lvl="0" indent="0" marL="0">
+              <a:buNone/>
+            </a:pPr>
+          </a:p>
+          <a:p>
+            <a:pPr lvl="0" indent="0" marL="0">
+              <a:buNone/>
+            </a:pPr>
+            <a:r>
+              <a:rPr/>
+              <a:t>An alternative is to use a stratified bootstrap sample. It’s easy enough to envision with two groups. Let’s say that the two groups have sample sizes n1 and n2. Sample n1 observation with replacement from the first group, sample with n2 observations with replacement from the second group and then combine.</a:t>
+            </a:r>
+          </a:p>
+          <a:p>
+            <a:pPr lvl="0" indent="0" marL="0">
+              <a:buNone/>
+            </a:pPr>
+          </a:p>
+          <a:p>
+            <a:pPr lvl="0" indent="0" marL="0">
+              <a:buNone/>
+            </a:pPr>
+            <a:r>
+              <a:rPr/>
+              <a:t>The stratified bootstrap answers a different question than the simple bootstrap. The simple bootstrap calculates uncertainty in a setting where you are collecting a single sample and that sample has a random number of subjects in each group. The stratified bootstrap calculates uncertainty where you are collecting samples from multiple groups, each with a fixed quota.</a:t>
+            </a:r>
+          </a:p>
+          <a:p>
+            <a:pPr lvl="0" indent="0" marL="0">
+              <a:buNone/>
+            </a:pPr>
+          </a:p>
+          <a:p>
+            <a:pPr lvl="0" indent="0" marL="0">
+              <a:buNone/>
+            </a:pPr>
+            <a:r>
+              <a:rPr/>
+              <a:t>Is this a huge difference? I’m not sure, but my guess is that it is not all that important except when one or more of the group sizes is small. By small, I mean 10 or less. I should note, however, that I have not seen an “official” guidance on this question.</a:t>
+            </a:r>
+          </a:p>
+        </p:txBody>
+      </p:sp>
+      <p:sp>
+        <p:nvSpPr>
+          <p:cNvPr id="4" name="Slide Number Placeholder 3"/>
+          <p:cNvSpPr>
+            <a:spLocks noGrp="1"/>
+          </p:cNvSpPr>
+          <p:nvPr>
+            <p:ph type="sldNum" sz="quarter" idx="10"/>
+          </p:nvPr>
+        </p:nvSpPr>
+        <p:spPr/>
+        <p:txBody>
+          <a:bodyPr/>
+          <a:lstStyle/>
+          <a:p>
+            <a:fld id="{18BDFEC3-8487-43E8-A154-7C12CBC1FFF2}" type="slidenum">
+              <a:rPr lang="en-US"/>
+              <a:t>66</a:t>
+            </a:fld>
+            <a:endParaRPr lang="en-US"/>
+          </a:p>
+        </p:txBody>
+      </p:sp>
+    </p:spTree>
+  </p:cSld>
+</p:notes>
+</file>
+
+<file path=ppt/notesSlides/notesSlide65.xml><?xml version="1.0" encoding="utf-8"?>
+<p:notes xmlns:a="http://schemas.openxmlformats.org/drawingml/2006/main" xmlns:r="http://schemas.openxmlformats.org/officeDocument/2006/relationships" xmlns:p="http://schemas.openxmlformats.org/presentationml/2006/main">
+  <p:cSld>
+    <p:spTree>
+      <p:nvGrpSpPr>
+        <p:cNvPr id="1" name=""/>
+        <p:cNvGrpSpPr/>
+        <p:nvPr/>
+      </p:nvGrpSpPr>
+      <p:grpSpPr>
+        <a:xfrm>
+          <a:off x="0" y="0"/>
+          <a:ext cx="0" cy="0"/>
+          <a:chOff x="0" y="0"/>
+          <a:chExt cx="0" cy="0"/>
+        </a:xfrm>
+      </p:grpSpPr>
+      <p:sp>
+        <p:nvSpPr>
+          <p:cNvPr id="2" name="Slide Image Placeholder 1"/>
+          <p:cNvSpPr>
+            <a:spLocks noGrp="1" noRot="1" noChangeAspect="1"/>
+          </p:cNvSpPr>
+          <p:nvPr>
+            <p:ph type="sldImg"/>
+          </p:nvPr>
+        </p:nvSpPr>
+        <p:spPr/>
+      </p:sp>
+      <p:sp>
+        <p:nvSpPr>
+          <p:cNvPr id="3" name="Notes Placeholder 2"/>
+          <p:cNvSpPr>
+            <a:spLocks noGrp="1"/>
+          </p:cNvSpPr>
+          <p:nvPr>
+            <p:ph type="body" idx="1"/>
+          </p:nvPr>
+        </p:nvSpPr>
+        <p:spPr/>
+        <p:txBody>
+          <a:bodyPr/>
+          <a:lstStyle/>
+          <a:p>
+            <a:pPr lvl="0" indent="0" marL="0">
+              <a:buNone/>
+            </a:pPr>
+            <a:r>
+              <a:rPr/>
+              <a:t>There are special features of time series data that make them difficult to use with a simple bootstrap. The first and most obvious feature is that most time series have even spacing, a nice neatly ordered pattern over time. A bootstrap sample is going to have gaps in some places and multiple observations at the same time point.</a:t>
+            </a:r>
+          </a:p>
+          <a:p>
+            <a:pPr lvl="0" indent="0" marL="0">
+              <a:buNone/>
+            </a:pPr>
+          </a:p>
+          <a:p>
+            <a:pPr lvl="0" indent="0" marL="0">
+              <a:buNone/>
+            </a:pPr>
+            <a:r>
+              <a:rPr/>
+              <a:t>Most time series also exhibit serial correlation, seasonality, and/or temporal trends. These features are either seriously distorted or totally destroyed in a bootstrap sample.</a:t>
+            </a:r>
+          </a:p>
+          <a:p>
+            <a:pPr lvl="0" indent="0" marL="0">
+              <a:buNone/>
+            </a:pPr>
+          </a:p>
+          <a:p>
+            <a:pPr lvl="0" indent="0" marL="0">
+              <a:buNone/>
+            </a:pPr>
+            <a:r>
+              <a:rPr/>
+              <a:t>There are several possible solutions. One is to bootstrap consecutive blocks of observations. This preserves time series features within a block and appears to perform reasonably well.</a:t>
+            </a:r>
+          </a:p>
+          <a:p>
+            <a:pPr lvl="0" indent="0" marL="0">
+              <a:buNone/>
+            </a:pPr>
+          </a:p>
+          <a:p>
+            <a:pPr lvl="0" indent="0" marL="0">
+              <a:buNone/>
+            </a:pPr>
+            <a:r>
+              <a:rPr/>
+              <a:t>A second option is to remove any trend and decompose the time series into independent components, take a bootstrap sample of the independent components, and then recompose a new series from the bootstrap sample.</a:t>
+            </a:r>
+          </a:p>
+          <a:p>
+            <a:pPr lvl="0" indent="0" marL="0">
+              <a:buNone/>
+            </a:pPr>
+          </a:p>
+          <a:p>
+            <a:pPr lvl="0" indent="0" marL="0">
+              <a:buNone/>
+            </a:pPr>
+            <a:r>
+              <a:rPr/>
+              <a:t>The approach you take largely depends on the context of your problem and what statistic you are trying to characterize. For example, if you detrend the data and remove seasonality, then any bootstrapped estimate from the reconstructed time series will be fine if it is modeling a feature of the data other than the trend or seasonality.</a:t>
+            </a:r>
+          </a:p>
+        </p:txBody>
+      </p:sp>
+      <p:sp>
+        <p:nvSpPr>
+          <p:cNvPr id="4" name="Slide Number Placeholder 3"/>
+          <p:cNvSpPr>
+            <a:spLocks noGrp="1"/>
+          </p:cNvSpPr>
+          <p:nvPr>
+            <p:ph type="sldNum" sz="quarter" idx="10"/>
+          </p:nvPr>
+        </p:nvSpPr>
+        <p:spPr/>
+        <p:txBody>
+          <a:bodyPr/>
+          <a:lstStyle/>
+          <a:p>
+            <a:fld id="{18BDFEC3-8487-43E8-A154-7C12CBC1FFF2}" type="slidenum">
+              <a:rPr lang="en-US"/>
+              <a:t>67</a:t>
+            </a:fld>
+            <a:endParaRPr lang="en-US"/>
+          </a:p>
+        </p:txBody>
+      </p:sp>
+    </p:spTree>
+  </p:cSld>
+</p:notes>
+</file>
+
+<file path=ppt/notesSlides/notesSlide66.xml><?xml version="1.0" encoding="utf-8"?>
+<p:notes xmlns:a="http://schemas.openxmlformats.org/drawingml/2006/main" xmlns:r="http://schemas.openxmlformats.org/officeDocument/2006/relationships" xmlns:p="http://schemas.openxmlformats.org/presentationml/2006/main">
+  <p:cSld>
+    <p:spTree>
+      <p:nvGrpSpPr>
+        <p:cNvPr id="1" name=""/>
+        <p:cNvGrpSpPr/>
+        <p:nvPr/>
+      </p:nvGrpSpPr>
+      <p:grpSpPr>
+        <a:xfrm>
+          <a:off x="0" y="0"/>
+          <a:ext cx="0" cy="0"/>
+          <a:chOff x="0" y="0"/>
+          <a:chExt cx="0" cy="0"/>
+        </a:xfrm>
+      </p:grpSpPr>
+      <p:sp>
+        <p:nvSpPr>
+          <p:cNvPr id="2" name="Slide Image Placeholder 1"/>
+          <p:cNvSpPr>
+            <a:spLocks noGrp="1" noRot="1" noChangeAspect="1"/>
+          </p:cNvSpPr>
+          <p:nvPr>
+            <p:ph type="sldImg"/>
+          </p:nvPr>
+        </p:nvSpPr>
+        <p:spPr/>
+      </p:sp>
+      <p:sp>
+        <p:nvSpPr>
+          <p:cNvPr id="3" name="Notes Placeholder 2"/>
+          <p:cNvSpPr>
+            <a:spLocks noGrp="1"/>
+          </p:cNvSpPr>
+          <p:nvPr>
+            <p:ph type="body" idx="1"/>
+          </p:nvPr>
+        </p:nvSpPr>
+        <p:spPr/>
+        <p:txBody>
+          <a:bodyPr/>
+          <a:lstStyle/>
+          <a:p>
+            <a:pPr lvl="0" indent="0" marL="0">
+              <a:buNone/>
+            </a:pPr>
+            <a:r>
+              <a:rPr/>
+              <a:t>The regression model has some of the same issues as the setting with multiple groups described earlier. If some of the independent variables are very strongly correlated, you might end up with a setting where the correlation is exactly 1 for one or more of the bootstrap samples. This is not a serious issue unless you have both a strong correlation and a small sample size.</a:t>
+            </a:r>
+          </a:p>
+          <a:p>
+            <a:pPr lvl="0" indent="0" marL="0">
+              <a:buNone/>
+            </a:pPr>
+          </a:p>
+          <a:p>
+            <a:pPr lvl="0" indent="0" marL="0">
+              <a:buNone/>
+            </a:pPr>
+            <a:r>
+              <a:rPr/>
+              <a:t>But another consideration is that the bootstrap sample treats the independent variables as if they are selected randomly along with the dependent variable. This may be the case, but there are some datasets where the X values are fixed in advance and the dependent variable is the only thing being sampled.</a:t>
+            </a:r>
+          </a:p>
+          <a:p>
+            <a:pPr lvl="0" indent="0" marL="0">
+              <a:buNone/>
+            </a:pPr>
+          </a:p>
+          <a:p>
+            <a:pPr lvl="0" indent="0" marL="0">
+              <a:buNone/>
+            </a:pPr>
+            <a:r>
+              <a:rPr/>
+              <a:t>One possible solution is to compute the residuals and reconstruct a new dependent variable from the bootstrapped residuals.</a:t>
+            </a:r>
+          </a:p>
+          <a:p>
+            <a:pPr lvl="0" indent="0" marL="0">
+              <a:buNone/>
+            </a:pPr>
+          </a:p>
+          <a:p>
+            <a:pPr lvl="0" indent="0" marL="0">
+              <a:buNone/>
+            </a:pPr>
+            <a:r>
+              <a:rPr/>
+              <a:t>Context is important here. If you bootstrap the residuals, you can’t use the reconstructed dependent variable as an estimate of the regression slopes themselves. You could use them to reconstruct a statistic that is independent of those slopes.</a:t>
+            </a:r>
+          </a:p>
+        </p:txBody>
+      </p:sp>
+      <p:sp>
+        <p:nvSpPr>
+          <p:cNvPr id="4" name="Slide Number Placeholder 3"/>
+          <p:cNvSpPr>
+            <a:spLocks noGrp="1"/>
+          </p:cNvSpPr>
+          <p:nvPr>
+            <p:ph type="sldNum" sz="quarter" idx="10"/>
+          </p:nvPr>
+        </p:nvSpPr>
+        <p:spPr/>
+        <p:txBody>
+          <a:bodyPr/>
+          <a:lstStyle/>
+          <a:p>
+            <a:fld id="{18BDFEC3-8487-43E8-A154-7C12CBC1FFF2}" type="slidenum">
+              <a:rPr lang="en-US"/>
+              <a:t>68</a:t>
+            </a:fld>
+            <a:endParaRPr lang="en-US"/>
+          </a:p>
+        </p:txBody>
+      </p:sp>
+    </p:spTree>
+  </p:cSld>
+</p:notes>
+</file>
+
+<file path=ppt/notesSlides/notesSlide67.xml><?xml version="1.0" encoding="utf-8"?>
+<p:notes xmlns:a="http://schemas.openxmlformats.org/drawingml/2006/main" xmlns:r="http://schemas.openxmlformats.org/officeDocument/2006/relationships" xmlns:p="http://schemas.openxmlformats.org/presentationml/2006/main">
+  <p:cSld>
+    <p:spTree>
+      <p:nvGrpSpPr>
+        <p:cNvPr id="1" name=""/>
+        <p:cNvGrpSpPr/>
+        <p:nvPr/>
+      </p:nvGrpSpPr>
+      <p:grpSpPr>
+        <a:xfrm>
+          <a:off x="0" y="0"/>
+          <a:ext cx="0" cy="0"/>
+          <a:chOff x="0" y="0"/>
+          <a:chExt cx="0" cy="0"/>
+        </a:xfrm>
+      </p:grpSpPr>
+      <p:sp>
+        <p:nvSpPr>
+          <p:cNvPr id="2" name="Slide Image Placeholder 1"/>
+          <p:cNvSpPr>
+            <a:spLocks noGrp="1" noRot="1" noChangeAspect="1"/>
+          </p:cNvSpPr>
+          <p:nvPr>
+            <p:ph type="sldImg"/>
+          </p:nvPr>
+        </p:nvSpPr>
+        <p:spPr/>
+      </p:sp>
+      <p:sp>
+        <p:nvSpPr>
+          <p:cNvPr id="3" name="Notes Placeholder 2"/>
+          <p:cNvSpPr>
+            <a:spLocks noGrp="1"/>
+          </p:cNvSpPr>
+          <p:nvPr>
+            <p:ph type="body" idx="1"/>
+          </p:nvPr>
+        </p:nvSpPr>
+        <p:spPr/>
+        <p:txBody>
+          <a:bodyPr/>
+          <a:lstStyle/>
+          <a:p>
+            <a:pPr lvl="0" indent="0" marL="0">
+              <a:buNone/>
+            </a:pPr>
+            <a:r>
+              <a:rPr/>
+              <a:t>Although the bootstrap works in a very broad range of settings, it can fail miserably in certain cases. Weird distributions like the Cauchy distribution which have no finite moment are going to cause problems. Also troublesome are statistics at or near the extremes of the data. The range, for example, is a statistic where the bootstrap does not perform well.</a:t>
+            </a:r>
+          </a:p>
+          <a:p>
+            <a:pPr lvl="0" indent="0" marL="0">
+              <a:buNone/>
+            </a:pPr>
+          </a:p>
+          <a:p>
+            <a:pPr lvl="0" indent="0" marL="0">
+              <a:buNone/>
+            </a:pPr>
+            <a:r>
+              <a:rPr/>
+              <a:t>We’ve also talked about settings where a simple bootstrap does not perform well and may need some modification. This includes setting with multiple groups and small sample sizes, time series models, and regression models.</a:t>
+            </a:r>
+          </a:p>
+        </p:txBody>
+      </p:sp>
+      <p:sp>
+        <p:nvSpPr>
+          <p:cNvPr id="4" name="Slide Number Placeholder 3"/>
+          <p:cNvSpPr>
+            <a:spLocks noGrp="1"/>
+          </p:cNvSpPr>
+          <p:nvPr>
+            <p:ph type="sldNum" sz="quarter" idx="10"/>
+          </p:nvPr>
+        </p:nvSpPr>
+        <p:spPr/>
+        <p:txBody>
+          <a:bodyPr/>
+          <a:lstStyle/>
+          <a:p>
+            <a:fld id="{18BDFEC3-8487-43E8-A154-7C12CBC1FFF2}" type="slidenum">
+              <a:rPr lang="en-US"/>
+              <a:t>69</a:t>
+            </a:fld>
+            <a:endParaRPr lang="en-US"/>
+          </a:p>
+        </p:txBody>
+      </p:sp>
+    </p:spTree>
+  </p:cSld>
+</p:notes>
+</file>
+
+<file path=ppt/notesSlides/notesSlide68.xml><?xml version="1.0" encoding="utf-8"?>
+<p:notes xmlns:a="http://schemas.openxmlformats.org/drawingml/2006/main" xmlns:r="http://schemas.openxmlformats.org/officeDocument/2006/relationships" xmlns:p="http://schemas.openxmlformats.org/presentationml/2006/main">
+  <p:cSld>
+    <p:spTree>
+      <p:nvGrpSpPr>
+        <p:cNvPr id="1" name=""/>
+        <p:cNvGrpSpPr/>
+        <p:nvPr/>
+      </p:nvGrpSpPr>
+      <p:grpSpPr>
+        <a:xfrm>
+          <a:off x="0" y="0"/>
+          <a:ext cx="0" cy="0"/>
+          <a:chOff x="0" y="0"/>
+          <a:chExt cx="0" cy="0"/>
+        </a:xfrm>
+      </p:grpSpPr>
+      <p:sp>
+        <p:nvSpPr>
+          <p:cNvPr id="2" name="Slide Image Placeholder 1"/>
+          <p:cNvSpPr>
+            <a:spLocks noGrp="1" noRot="1" noChangeAspect="1"/>
+          </p:cNvSpPr>
+          <p:nvPr>
+            <p:ph type="sldImg"/>
+          </p:nvPr>
+        </p:nvSpPr>
+        <p:spPr/>
+      </p:sp>
+      <p:sp>
+        <p:nvSpPr>
+          <p:cNvPr id="3" name="Notes Placeholder 2"/>
+          <p:cNvSpPr>
+            <a:spLocks noGrp="1"/>
+          </p:cNvSpPr>
+          <p:nvPr>
+            <p:ph type="body" idx="1"/>
+          </p:nvPr>
+        </p:nvSpPr>
+        <p:spPr/>
+        <p:txBody>
+          <a:bodyPr/>
+          <a:lstStyle/>
+          <a:p>
+            <a:pPr lvl="0" indent="0" marL="0">
+              <a:buNone/>
+            </a:pPr>
+            <a:r>
+              <a:rPr/>
+              <a:t>The bootstrap performs well in settings where you do not have any theoretical results to guide your work. It also works well when the normal approximations that you rely on are questionable, either because the sample size is small or because the underlying distribution of the data is troublesome. By troublesome, I mean extreme skew or high probability of producing outliers. Both will tend to slow down the asymptotic approximation to normality.</a:t>
+            </a:r>
+          </a:p>
+          <a:p>
+            <a:pPr lvl="0" indent="0" marL="0">
+              <a:buNone/>
+            </a:pPr>
+          </a:p>
+          <a:p>
+            <a:pPr lvl="0" indent="0" marL="0">
+              <a:buNone/>
+            </a:pPr>
+            <a:r>
+              <a:rPr/>
+              <a:t>Keep in mind, though, that the bootstrap can’t compensate for a limited sample size. The confidence intervals may be valid, but often they will be so wide as to be meaningless. There’s a saying that you can’t squeeze blood from a turnip. That’s an attempt to explain that you can’t get something from nothing.</a:t>
+            </a:r>
+          </a:p>
+        </p:txBody>
+      </p:sp>
+      <p:sp>
+        <p:nvSpPr>
+          <p:cNvPr id="4" name="Slide Number Placeholder 3"/>
+          <p:cNvSpPr>
+            <a:spLocks noGrp="1"/>
+          </p:cNvSpPr>
+          <p:nvPr>
+            <p:ph type="sldNum" sz="quarter" idx="10"/>
+          </p:nvPr>
+        </p:nvSpPr>
+        <p:spPr/>
+        <p:txBody>
+          <a:bodyPr/>
+          <a:lstStyle/>
+          <a:p>
+            <a:fld id="{18BDFEC3-8487-43E8-A154-7C12CBC1FFF2}" type="slidenum">
+              <a:rPr lang="en-US"/>
+              <a:t>70</a:t>
+            </a:fld>
+            <a:endParaRPr lang="en-US"/>
+          </a:p>
+        </p:txBody>
+      </p:sp>
+    </p:spTree>
+  </p:cSld>
+</p:notes>
+</file>
+
+<file path=ppt/notesSlides/notesSlide69.xml><?xml version="1.0" encoding="utf-8"?>
+<p:notes xmlns:a="http://schemas.openxmlformats.org/drawingml/2006/main" xmlns:r="http://schemas.openxmlformats.org/officeDocument/2006/relationships" xmlns:p="http://schemas.openxmlformats.org/presentationml/2006/main">
+  <p:cSld>
+    <p:spTree>
+      <p:nvGrpSpPr>
+        <p:cNvPr id="1" name=""/>
+        <p:cNvGrpSpPr/>
+        <p:nvPr/>
+      </p:nvGrpSpPr>
+      <p:grpSpPr>
+        <a:xfrm>
+          <a:off x="0" y="0"/>
+          <a:ext cx="0" cy="0"/>
+          <a:chOff x="0" y="0"/>
+          <a:chExt cx="0" cy="0"/>
+        </a:xfrm>
+      </p:grpSpPr>
+      <p:sp>
+        <p:nvSpPr>
+          <p:cNvPr id="2" name="Slide Image Placeholder 1"/>
+          <p:cNvSpPr>
+            <a:spLocks noGrp="1" noRot="1" noChangeAspect="1"/>
+          </p:cNvSpPr>
+          <p:nvPr>
+            <p:ph type="sldImg"/>
+          </p:nvPr>
+        </p:nvSpPr>
+        <p:spPr/>
+      </p:sp>
+      <p:sp>
+        <p:nvSpPr>
+          <p:cNvPr id="3" name="Notes Placeholder 2"/>
+          <p:cNvSpPr>
+            <a:spLocks noGrp="1"/>
+          </p:cNvSpPr>
+          <p:nvPr>
+            <p:ph type="body" idx="1"/>
+          </p:nvPr>
+        </p:nvSpPr>
+        <p:spPr/>
+        <p:txBody>
+          <a:bodyPr/>
+          <a:lstStyle/>
+          <a:p>
+            <a:pPr lvl="0" indent="0" marL="0">
+              <a:buNone/>
+            </a:pPr>
+            <a:r>
+              <a:rPr/>
+              <a:t>So we’ve covered the history of the bootstrap, illustrated some algorithms, showed how to compute a bootstrap in SAS, Stata, and R, and discussed some special issues where you might want to modify the bootstrap approach.</a:t>
+            </a:r>
+          </a:p>
+          <a:p>
+            <a:pPr lvl="0" indent="0" marL="0">
+              <a:buNone/>
+            </a:pPr>
+          </a:p>
+          <a:p>
+            <a:pPr lvl="0" indent="0" marL="0">
+              <a:buNone/>
+            </a:pPr>
+            <a:r>
+              <a:rPr/>
+              <a:t>I’d be glad to take any questions you might have.</a:t>
+            </a:r>
+          </a:p>
+        </p:txBody>
+      </p:sp>
+      <p:sp>
+        <p:nvSpPr>
+          <p:cNvPr id="4" name="Slide Number Placeholder 3"/>
+          <p:cNvSpPr>
+            <a:spLocks noGrp="1"/>
+          </p:cNvSpPr>
+          <p:nvPr>
+            <p:ph type="sldNum" sz="quarter" idx="10"/>
+          </p:nvPr>
+        </p:nvSpPr>
+        <p:spPr/>
+        <p:txBody>
+          <a:bodyPr/>
+          <a:lstStyle/>
+          <a:p>
+            <a:fld id="{18BDFEC3-8487-43E8-A154-7C12CBC1FFF2}" type="slidenum">
+              <a:rPr lang="en-US"/>
+              <a:t>71</a:t>
+            </a:fld>
+            <a:endParaRPr lang="en-US"/>
+          </a:p>
+        </p:txBody>
+      </p:sp>
+    </p:spTree>
+  </p:cSld>
+</p:notes>
+</file>
+
 <file path=ppt/notesSlides/notesSlide7.xml><?xml version="1.0" encoding="utf-8"?>
 <p:notes xmlns:a="http://schemas.openxmlformats.org/drawingml/2006/main" xmlns:r="http://schemas.openxmlformats.org/officeDocument/2006/relationships" xmlns:p="http://schemas.openxmlformats.org/presentationml/2006/main">
   <p:cSld>
@@ -6524,6 +7472,116 @@
             <a:fld id="{18BDFEC3-8487-43E8-A154-7C12CBC1FFF2}" type="slidenum">
               <a:rPr lang="en-US"/>
               <a:t>8</a:t>
+            </a:fld>
+            <a:endParaRPr lang="en-US"/>
+          </a:p>
+        </p:txBody>
+      </p:sp>
+    </p:spTree>
+  </p:cSld>
+</p:notes>
+</file>
+
+<file path=ppt/notesSlides/notesSlide70.xml><?xml version="1.0" encoding="utf-8"?>
+<p:notes xmlns:a="http://schemas.openxmlformats.org/drawingml/2006/main" xmlns:r="http://schemas.openxmlformats.org/officeDocument/2006/relationships" xmlns:p="http://schemas.openxmlformats.org/presentationml/2006/main">
+  <p:cSld>
+    <p:spTree>
+      <p:nvGrpSpPr>
+        <p:cNvPr id="1" name=""/>
+        <p:cNvGrpSpPr/>
+        <p:nvPr/>
+      </p:nvGrpSpPr>
+      <p:grpSpPr>
+        <a:xfrm>
+          <a:off x="0" y="0"/>
+          <a:ext cx="0" cy="0"/>
+          <a:chOff x="0" y="0"/>
+          <a:chExt cx="0" cy="0"/>
+        </a:xfrm>
+      </p:grpSpPr>
+      <p:sp>
+        <p:nvSpPr>
+          <p:cNvPr id="2" name="Slide Image Placeholder 1"/>
+          <p:cNvSpPr>
+            <a:spLocks noGrp="1" noRot="1" noChangeAspect="1"/>
+          </p:cNvSpPr>
+          <p:nvPr>
+            <p:ph type="sldImg"/>
+          </p:nvPr>
+        </p:nvSpPr>
+        <p:spPr/>
+      </p:sp>
+      <p:sp>
+        <p:nvSpPr>
+          <p:cNvPr id="3" name="Notes Placeholder 2"/>
+          <p:cNvSpPr>
+            <a:spLocks noGrp="1"/>
+          </p:cNvSpPr>
+          <p:nvPr>
+            <p:ph type="body" idx="1"/>
+          </p:nvPr>
+        </p:nvSpPr>
+        <p:spPr/>
+        <p:txBody>
+          <a:bodyPr/>
+          <a:lstStyle/>
+          <a:p>
+            <a:pPr lvl="0" indent="0" marL="0">
+              <a:buNone/>
+            </a:pPr>
+            <a:r>
+              <a:rPr/>
+              <a:t>https://www.vanderbilt.edu/psychological_sciences/graduate/programs/quantitative-methods/quantitative-content/diaconis_efron_1983.pdf</a:t>
+            </a:r>
+          </a:p>
+          <a:p>
+            <a:pPr lvl="0" indent="0" marL="0">
+              <a:buNone/>
+            </a:pPr>
+          </a:p>
+          <a:p>
+            <a:pPr lvl="0" indent="0" marL="0">
+              <a:buNone/>
+            </a:pPr>
+            <a:r>
+              <a:rPr/>
+              <a:t>http://users.cla.umn.edu/~nwaller/prelim/efronbootjackcrossv.pdf</a:t>
+            </a:r>
+          </a:p>
+          <a:p>
+            <a:pPr lvl="0" indent="0" marL="0">
+              <a:buNone/>
+            </a:pPr>
+          </a:p>
+          <a:p>
+            <a:pPr lvl="0" indent="0" marL="0">
+              <a:buNone/>
+            </a:pPr>
+            <a:r>
+              <a:rPr/>
+              <a:t>http://www.nielsen.sites.oasis.unc.edu/soci709/cdocs/efron.pdf</a:t>
+            </a:r>
+          </a:p>
+        </p:txBody>
+      </p:sp>
+      <p:sp>
+        <p:nvSpPr>
+          <p:cNvPr id="4" name="Slide Number Placeholder 3"/>
+          <p:cNvSpPr>
+            <a:spLocks noGrp="1"/>
+          </p:cNvSpPr>
+          <p:nvPr>
+            <p:ph type="sldNum" sz="quarter" idx="10"/>
+          </p:nvPr>
+        </p:nvSpPr>
+        <p:spPr/>
+        <p:txBody>
+          <a:bodyPr/>
+          <a:lstStyle/>
+          <a:p>
+            <a:fld id="{18BDFEC3-8487-43E8-A154-7C12CBC1FFF2}" type="slidenum">
+              <a:rPr lang="en-US"/>
+              <a:t>72</a:t>
             </a:fld>
             <a:endParaRPr lang="en-US"/>
           </a:p>
@@ -10163,7 +11221,7 @@
             </a:pPr>
             <a:r>
               <a:rPr/>
-              <a:t>Figure 1. Photograph of Bradley Efron with President Bush</a:t>
+              <a:t>Figure 3. Photograph of Bradley Efron with President Bush</a:t>
             </a:r>
           </a:p>
         </p:txBody>
@@ -10588,7 +11646,7 @@
             </a:pPr>
             <a:r>
               <a:rPr/>
-              <a:t>Figure 1. Histogram of bootstrapped estimates</a:t>
+              <a:t>Figure 4. Histogram of bootstrapped estimates</a:t>
             </a:r>
           </a:p>
         </p:txBody>
@@ -10695,7 +11753,7 @@
             </a:pPr>
             <a:r>
               <a:rPr/>
-              <a:t>Figure 1. An example of a cumulative density function</a:t>
+              <a:t>Figure 5. An example of a cumulative density function</a:t>
             </a:r>
           </a:p>
         </p:txBody>
@@ -10802,7 +11860,7 @@
             </a:pPr>
             <a:r>
               <a:rPr/>
-              <a:t>Figure 1. Using random uniform values to simulate data from a cumulative distribution function</a:t>
+              <a:t>Figure 6. Using random uniform values to simulate data from a cumulative distribution function</a:t>
             </a:r>
           </a:p>
         </p:txBody>
@@ -10909,7 +11967,7 @@
             </a:pPr>
             <a:r>
               <a:rPr/>
-              <a:t>Figure 1. Estimate of cumulative density function from the data</a:t>
+              <a:t>Figure 7. Estimate of cumulative density function from the data</a:t>
             </a:r>
           </a:p>
         </p:txBody>
@@ -11000,7 +12058,7 @@
             <a:pPr lvl="0"/>
             <a:r>
               <a:rPr/>
-              <a:t>Examples</a:t>
+              <a:t>Special settings</a:t>
             </a:r>
           </a:p>
         </p:txBody>
@@ -11107,7 +12165,7 @@
             </a:pPr>
             <a:r>
               <a:rPr/>
-              <a:t>Figure 1. Random uniform values converted into a bootstrap</a:t>
+              <a:t>Figure 8. Random uniform values converted into a bootstrap</a:t>
             </a:r>
           </a:p>
         </p:txBody>
@@ -11214,7 +12272,7 @@
             </a:pPr>
             <a:r>
               <a:rPr/>
-              <a:t>Figure 1. Image of a bootstrap</a:t>
+              <a:t>Figure 9. Image of a bootstrap</a:t>
             </a:r>
           </a:p>
         </p:txBody>
@@ -11419,7 +12477,7 @@
             </a:pPr>
             <a:r>
               <a:rPr/>
-              <a:t>Figure 1. Illustration of a regression tree</a:t>
+              <a:t>Figure 10. Illustration of a regression tree</a:t>
             </a:r>
           </a:p>
         </p:txBody>
@@ -11526,7 +12584,7 @@
             </a:pPr>
             <a:r>
               <a:rPr/>
-              <a:t>Figure 1. Image of a classification tree</a:t>
+              <a:t>Figure 11. Image of a classification tree</a:t>
             </a:r>
           </a:p>
         </p:txBody>
@@ -13797,6 +14855,27 @@
                         </m:r>
                       </m:sup>
                     </m:sSup>
+                    <m:r>
+                      <m:rPr>
+                        <m:sty m:val="p"/>
+                      </m:rPr>
+                      <m:t>(</m:t>
+                    </m:r>
+                    <m:f>
+                      <m:fPr>
+                        <m:type m:val="bar"/>
+                      </m:fPr>
+                      <m:num>
+                        <m:r>
+                          <m:t>1</m:t>
+                        </m:r>
+                      </m:num>
+                      <m:den>
+                        <m:r>
+                          <m:t>B</m:t>
+                        </m:r>
+                      </m:den>
+                    </m:f>
                     <m:d>
                       <m:dPr>
                         <m:begChr m:val="("/>
@@ -13805,21 +14884,6 @@
                         <m:grow/>
                       </m:dPr>
                       <m:e>
-                        <m:f>
-                          <m:fPr>
-                            <m:type m:val="bar"/>
-                          </m:fPr>
-                          <m:num>
-                            <m:r>
-                              <m:t>1</m:t>
-                            </m:r>
-                          </m:num>
-                          <m:den>
-                            <m:r>
-                              <m:t>B</m:t>
-                            </m:r>
-                          </m:den>
-                        </m:f>
                         <m:r>
                           <m:t>H</m:t>
                         </m:r>
@@ -13831,6 +14895,22 @@
                             <m:grow/>
                           </m:dPr>
                           <m:e>
+                            <m:acc>
+                              <m:accPr>
+                                <m:chr m:val="̂"/>
+                              </m:accPr>
+                              <m:e>
+                                <m:r>
+                                  <m:t>θ</m:t>
+                                </m:r>
+                              </m:e>
+                            </m:acc>
+                            <m:r>
+                              <m:rPr>
+                                <m:sty m:val="p"/>
+                              </m:rPr>
+                              <m:t>−</m:t>
+                            </m:r>
                             <m:sSup>
                               <m:e>
                                 <m:acc>
@@ -13860,22 +14940,6 @@
                                 </m:d>
                               </m:sup>
                             </m:sSup>
-                            <m:r>
-                              <m:rPr>
-                                <m:sty m:val="p"/>
-                              </m:rPr>
-                              <m:t>−</m:t>
-                            </m:r>
-                            <m:acc>
-                              <m:accPr>
-                                <m:chr m:val="̂"/>
-                              </m:accPr>
-                              <m:e>
-                                <m:r>
-                                  <m:t>θ</m:t>
-                                </m:r>
-                              </m:e>
-                            </m:acc>
                           </m:e>
                         </m:d>
                       </m:e>
@@ -13891,7 +14955,47 @@
                 <a:pPr lvl="2"/>
                 <a:r>
                   <a:rPr/>
-                  <a:t>H(x)=1 for zero or positive values, 0 for negative values</a:t>
+                  <a:t>H(x)=1 for </a:t>
+                </a:r>
+                <a14:m>
+                  <m:oMath xmlns:m="http://schemas.openxmlformats.org/officeDocument/2006/math">
+                    <m:r>
+                      <m:t>x</m:t>
+                    </m:r>
+                    <m:r>
+                      <m:rPr>
+                        <m:sty m:val="p"/>
+                      </m:rPr>
+                      <m:t>≥</m:t>
+                    </m:r>
+                    <m:r>
+                      <m:t>0</m:t>
+                    </m:r>
+                  </m:oMath>
+                </a14:m>
+                <a:r>
+                  <a:rPr/>
+                  <a:t>, 0 for </a:t>
+                </a:r>
+                <a14:m>
+                  <m:oMath xmlns:m="http://schemas.openxmlformats.org/officeDocument/2006/math">
+                    <m:r>
+                      <m:t>x</m:t>
+                    </m:r>
+                    <m:r>
+                      <m:rPr>
+                        <m:sty m:val="p"/>
+                      </m:rPr>
+                      <m:t>&lt;</m:t>
+                    </m:r>
+                    <m:r>
+                      <m:t>0</m:t>
+                    </m:r>
+                  </m:oMath>
+                </a14:m>
+                <a:r>
+                  <a:rPr/>
+                  <a:t>.</a:t>
                 </a:r>
               </a:p>
               <a:p>
@@ -14857,7 +15961,7 @@
             </a:pPr>
             <a:r>
               <a:rPr/>
-              <a:t>Figure 1. Graph of unadjusted percentiles</a:t>
+              <a:t>Figure 12. Graph of unadjusted percentiles</a:t>
             </a:r>
           </a:p>
         </p:txBody>
@@ -14964,7 +16068,7 @@
             </a:pPr>
             <a:r>
               <a:rPr/>
-              <a:t>Figure 1. Percentiles with bias adjustment</a:t>
+              <a:t>Figure 13. Percentiles with bias adjustment</a:t>
             </a:r>
           </a:p>
         </p:txBody>
@@ -15071,7 +16175,7 @@
             </a:pPr>
             <a:r>
               <a:rPr/>
-              <a:t>Figure 1. Histogram of bootstrapped estimates</a:t>
+              <a:t>Figure 14. Histogram of bootstrapped estimates</a:t>
             </a:r>
           </a:p>
         </p:txBody>
@@ -15148,27 +16252,43 @@
               </a:p>
               <a:p>
                 <a:pPr lvl="1"/>
-                <a:r>
-                  <a:rPr/>
-                  <a:t>$H_0: </a:t>
-                </a:r>
                 <a14:m>
                   <m:oMath xmlns:m="http://schemas.openxmlformats.org/officeDocument/2006/math">
+                    <m:sSub>
+                      <m:e>
+                        <m:r>
+                          <m:t>H</m:t>
+                        </m:r>
+                      </m:e>
+                      <m:sub>
+                        <m:r>
+                          <m:t>0</m:t>
+                        </m:r>
+                      </m:sub>
+                    </m:sSub>
                     <m:r>
-                      <m:t>g</m:t>
+                      <m:rPr>
+                        <m:sty m:val="p"/>
+                      </m:rPr>
+                      <m:t>:</m:t>
                     </m:r>
                     <m:r>
-                      <m:t>e</m:t>
+                      <m:t> </m:t>
                     </m:r>
                     <m:r>
-                      <m:t>q</m:t>
+                      <m:t>θ</m:t>
+                    </m:r>
+                    <m:r>
+                      <m:rPr>
+                        <m:sty m:val="p"/>
+                      </m:rPr>
+                      <m:t>≤</m:t>
+                    </m:r>
+                    <m:r>
+                      <m:t>0</m:t>
                     </m:r>
                   </m:oMath>
                 </a14:m>
-                <a:r>
-                  <a:rPr/>
-                  <a:t> =0$</a:t>
-                </a:r>
               </a:p>
               <a:p>
                 <a:pPr lvl="1"/>
@@ -15445,29 +16565,29 @@
             </a:pPr>
             <a:r>
               <a:rPr/>
-              <a:t>Visualization (1/2)</a:t>
+              <a:t>Visualization (1/3)</a:t>
             </a:r>
           </a:p>
         </p:txBody>
       </p:sp>
       <p:pic>
         <p:nvPicPr>
-          <p:cNvPr descr="fig:  ../images/transplant-curves.png" id="0" name="Picture 1"/>
+          <p:cNvPr descr="fig:  ../images/transplant-curves-00.png" id="0" name="Picture 1"/>
           <p:cNvPicPr>
             <a:picLocks noGrp="1" noChangeAspect="1"/>
           </p:cNvPicPr>
           <p:nvPr/>
         </p:nvPicPr>
         <p:blipFill>
-          <a:blip r:embed="rId2"/>
+          <a:blip r:embed="rId3"/>
           <a:stretch>
             <a:fillRect/>
           </a:stretch>
         </p:blipFill>
         <p:spPr bwMode="auto">
           <a:xfrm>
-            <a:off x="4064000" y="1600200"/>
-            <a:ext cx="4064000" cy="4013200"/>
+            <a:off x="3619500" y="1600200"/>
+            <a:ext cx="4953000" cy="4013200"/>
           </a:xfrm>
           <a:prstGeom prst="rect">
             <a:avLst/>
@@ -15505,7 +16625,7 @@
             </a:pPr>
             <a:r>
               <a:rPr/>
-              <a:t>Figure 1. Age changes in risk for heart transplant patients</a:t>
+              <a:t>Figure 15. Age changes in risk for heart transplant patients</a:t>
             </a:r>
           </a:p>
         </p:txBody>
@@ -15552,29 +16672,29 @@
             </a:pPr>
             <a:r>
               <a:rPr/>
-              <a:t>Visualization (2/2)</a:t>
+              <a:t>Visualization (2/3)</a:t>
             </a:r>
           </a:p>
         </p:txBody>
       </p:sp>
       <p:pic>
         <p:nvPicPr>
-          <p:cNvPr descr="fig:  ../images/bootstrap-map.png" id="0" name="Picture 1"/>
+          <p:cNvPr descr="fig:  ../images/transplant-curves.png" id="0" name="Picture 1"/>
           <p:cNvPicPr>
             <a:picLocks noGrp="1" noChangeAspect="1"/>
           </p:cNvPicPr>
           <p:nvPr/>
         </p:nvPicPr>
         <p:blipFill>
-          <a:blip r:embed="rId2"/>
+          <a:blip r:embed="rId3"/>
           <a:stretch>
             <a:fillRect/>
           </a:stretch>
         </p:blipFill>
         <p:spPr bwMode="auto">
           <a:xfrm>
-            <a:off x="3962400" y="1600200"/>
-            <a:ext cx="4267200" cy="4013200"/>
+            <a:off x="4064000" y="1600200"/>
+            <a:ext cx="4064000" cy="4013200"/>
           </a:xfrm>
           <a:prstGeom prst="rect">
             <a:avLst/>
@@ -15612,7 +16732,7 @@
             </a:pPr>
             <a:r>
               <a:rPr/>
-              <a:t>Figure 1. Map</a:t>
+              <a:t>Figure 16. Age changes in risk using bootstrap samples</a:t>
             </a:r>
           </a:p>
         </p:txBody>
@@ -15659,44 +16779,67 @@
             </a:pPr>
             <a:r>
               <a:rPr/>
-              <a:t>How many bootstraps?</a:t>
-            </a:r>
-          </a:p>
-        </p:txBody>
-      </p:sp>
-      <p:sp>
-        <p:nvSpPr>
-          <p:cNvPr id="3" name="Content Placeholder 2"/>
-          <p:cNvSpPr>
-            <a:spLocks noGrp="1"/>
-          </p:cNvSpPr>
-          <p:nvPr>
-            <p:ph idx="1"/>
-          </p:nvPr>
-        </p:nvSpPr>
-        <p:spPr/>
-        <p:txBody>
-          <a:bodyPr/>
-          <a:lstStyle/>
-          <a:p>
-            <a:pPr lvl="0"/>
-            <a:r>
-              <a:rPr/>
-              <a:t>For visualization: 10 to 50</a:t>
-            </a:r>
-          </a:p>
-          <a:p>
-            <a:pPr lvl="0"/>
-            <a:r>
-              <a:rPr/>
-              <a:t>For estimating a standard error: 50 to 100</a:t>
-            </a:r>
-          </a:p>
-          <a:p>
-            <a:pPr lvl="0"/>
-            <a:r>
-              <a:rPr/>
-              <a:t>For confidence intervals and hypothesis tests: 500 to 1000</a:t>
+              <a:t>Visualization (3/3)</a:t>
+            </a:r>
+          </a:p>
+        </p:txBody>
+      </p:sp>
+      <p:pic>
+        <p:nvPicPr>
+          <p:cNvPr descr="fig:  ../images/bootstrap-map.png" id="0" name="Picture 1"/>
+          <p:cNvPicPr>
+            <a:picLocks noGrp="1" noChangeAspect="1"/>
+          </p:cNvPicPr>
+          <p:nvPr/>
+        </p:nvPicPr>
+        <p:blipFill>
+          <a:blip r:embed="rId3"/>
+          <a:stretch>
+            <a:fillRect/>
+          </a:stretch>
+        </p:blipFill>
+        <p:spPr bwMode="auto">
+          <a:xfrm>
+            <a:off x="3962400" y="1600200"/>
+            <a:ext cx="4267200" cy="4013200"/>
+          </a:xfrm>
+          <a:prstGeom prst="rect">
+            <a:avLst/>
+          </a:prstGeom>
+          <a:noFill/>
+          <a:ln w="9525">
+            <a:noFill/>
+            <a:headEnd/>
+            <a:tailEnd/>
+          </a:ln>
+        </p:spPr>
+      </p:pic>
+      <p:sp>
+        <p:nvSpPr>
+          <p:cNvPr id="1" name="TextBox 3"/>
+          <p:cNvSpPr txBox="1"/>
+          <p:nvPr/>
+        </p:nvSpPr>
+        <p:spPr>
+          <a:xfrm>
+            <a:off x="609600" y="5613400"/>
+            <a:ext cx="10972800" cy="508000"/>
+          </a:xfrm>
+          <a:prstGeom prst="rect">
+            <a:avLst/>
+          </a:prstGeom>
+          <a:noFill/>
+        </p:spPr>
+        <p:txBody>
+          <a:bodyPr/>
+          <a:lstStyle/>
+          <a:p>
+            <a:pPr lvl="0" indent="0" marL="0" algn="ctr">
+              <a:buNone/>
+            </a:pPr>
+            <a:r>
+              <a:rPr/>
+              <a:t>Figure 17. Map</a:t>
             </a:r>
           </a:p>
         </p:txBody>
@@ -15743,7 +16886,7 @@
             </a:pPr>
             <a:r>
               <a:rPr/>
-              <a:t>Break #2</a:t>
+              <a:t>How many bootstraps?</a:t>
             </a:r>
           </a:p>
         </p:txBody>
@@ -15766,28 +16909,21 @@
             <a:pPr lvl="0"/>
             <a:r>
               <a:rPr/>
-              <a:t>What you have learned</a:t>
-            </a:r>
-          </a:p>
-          <a:p>
-            <a:pPr lvl="1"/>
-            <a:r>
-              <a:rPr/>
-              <a:t>Purposes of the bootstrap</a:t>
+              <a:t>For estimating bias or a standard error: 50 to 100</a:t>
             </a:r>
           </a:p>
           <a:p>
             <a:pPr lvl="0"/>
             <a:r>
               <a:rPr/>
-              <a:t>What’s coming next</a:t>
-            </a:r>
-          </a:p>
-          <a:p>
-            <a:pPr lvl="1"/>
-            <a:r>
-              <a:rPr/>
-              <a:t>Software</a:t>
+              <a:t>For confidence intervals or hypothesis tests: 500 to 1,000</a:t>
+            </a:r>
+          </a:p>
+          <a:p>
+            <a:pPr lvl="0"/>
+            <a:r>
+              <a:rPr/>
+              <a:t>For visualization: 10 to 50</a:t>
             </a:r>
           </a:p>
         </p:txBody>
@@ -15834,72 +16970,51 @@
             </a:pPr>
             <a:r>
               <a:rPr/>
+              <a:t>Break #2</a:t>
+            </a:r>
+          </a:p>
+        </p:txBody>
+      </p:sp>
+      <p:sp>
+        <p:nvSpPr>
+          <p:cNvPr id="3" name="Content Placeholder 2"/>
+          <p:cNvSpPr>
+            <a:spLocks noGrp="1"/>
+          </p:cNvSpPr>
+          <p:nvPr>
+            <p:ph idx="1"/>
+          </p:nvPr>
+        </p:nvSpPr>
+        <p:spPr/>
+        <p:txBody>
+          <a:bodyPr/>
+          <a:lstStyle/>
+          <a:p>
+            <a:pPr lvl="0"/>
+            <a:r>
+              <a:rPr/>
+              <a:t>What you have learned</a:t>
+            </a:r>
+          </a:p>
+          <a:p>
+            <a:pPr lvl="1"/>
+            <a:r>
+              <a:rPr/>
+              <a:t>Algorithms</a:t>
+            </a:r>
+          </a:p>
+          <a:p>
+            <a:pPr lvl="0"/>
+            <a:r>
+              <a:rPr/>
+              <a:t>What’s coming next</a:t>
+            </a:r>
+          </a:p>
+          <a:p>
+            <a:pPr lvl="1"/>
+            <a:r>
+              <a:rPr/>
               <a:t>Software</a:t>
-            </a:r>
-          </a:p>
-        </p:txBody>
-      </p:sp>
-      <p:sp>
-        <p:nvSpPr>
-          <p:cNvPr id="3" name="Content Placeholder 2"/>
-          <p:cNvSpPr>
-            <a:spLocks noGrp="1"/>
-          </p:cNvSpPr>
-          <p:nvPr>
-            <p:ph idx="1"/>
-          </p:nvPr>
-        </p:nvSpPr>
-        <p:spPr/>
-        <p:txBody>
-          <a:bodyPr/>
-          <a:lstStyle/>
-          <a:p>
-            <a:pPr lvl="0"/>
-            <a:r>
-              <a:rPr/>
-              <a:t>You should know</a:t>
-            </a:r>
-          </a:p>
-          <a:p>
-            <a:pPr lvl="1"/>
-            <a:r>
-              <a:rPr/>
-              <a:t>How to loop (explicitly or implicitly)</a:t>
-            </a:r>
-          </a:p>
-          <a:p>
-            <a:pPr lvl="1"/>
-            <a:r>
-              <a:rPr/>
-              <a:t>How to extract specific values from the output</a:t>
-            </a:r>
-          </a:p>
-          <a:p>
-            <a:pPr lvl="0"/>
-            <a:r>
-              <a:rPr/>
-              <a:t>Examples</a:t>
-            </a:r>
-          </a:p>
-          <a:p>
-            <a:pPr lvl="1"/>
-            <a:r>
-              <a:rPr/>
-              <a:t>SAS</a:t>
-            </a:r>
-          </a:p>
-          <a:p>
-            <a:pPr lvl="1"/>
-            <a:r>
-              <a:rPr/>
-              <a:t>Stata</a:t>
-            </a:r>
-          </a:p>
-          <a:p>
-            <a:pPr lvl="1"/>
-            <a:r>
-              <a:rPr/>
-              <a:t>R</a:t>
             </a:r>
           </a:p>
         </p:txBody>
@@ -15946,7 +17061,7 @@
             </a:pPr>
             <a:r>
               <a:rPr/>
-              <a:t>Bootstrap in SAS (1/10)</a:t>
+              <a:t>Software</a:t>
             </a:r>
           </a:p>
         </p:txBody>
@@ -15969,29 +17084,56 @@
             <a:pPr lvl="0"/>
             <a:r>
               <a:rPr/>
-              <a:t>Example taken from UCLA Statistical Methods and Data Analytics site</a:t>
+              <a:t>You should know</a:t>
             </a:r>
           </a:p>
           <a:p>
             <a:pPr lvl="1"/>
             <a:r>
               <a:rPr/>
-              <a:t>Google ucla bootstrap sas</a:t>
-            </a:r>
-          </a:p>
-          <a:p>
-            <a:pPr lvl="0" indent="0">
-              <a:buNone/>
-            </a:pPr>
-            <a:r>
-              <a:rPr>
-                <a:latin typeface="Courier"/>
-              </a:rPr>
-              <a:t>ods output FitStatistics = t0;
-proc reg data = hsb2;
-  model read = female math write ses;
-run;
-quit;</a:t>
+              <a:t>How to loop (explicitly or implicitly)</a:t>
+            </a:r>
+          </a:p>
+          <a:p>
+            <a:pPr lvl="1"/>
+            <a:r>
+              <a:rPr/>
+              <a:t>How to extract specific values from the output</a:t>
+            </a:r>
+          </a:p>
+          <a:p>
+            <a:pPr lvl="0"/>
+            <a:r>
+              <a:rPr/>
+              <a:t>Why you should (should not) program a bootstrap</a:t>
+            </a:r>
+          </a:p>
+          <a:p>
+            <a:pPr lvl="0"/>
+            <a:r>
+              <a:rPr/>
+              <a:t>Examples</a:t>
+            </a:r>
+          </a:p>
+          <a:p>
+            <a:pPr lvl="1"/>
+            <a:r>
+              <a:rPr/>
+              <a:t>SAS</a:t>
+            </a:r>
+          </a:p>
+          <a:p>
+            <a:pPr lvl="1"/>
+            <a:r>
+              <a:rPr/>
+              <a:t>Stata</a:t>
+            </a:r>
+          </a:p>
+          <a:p>
+            <a:pPr lvl="1"/>
+            <a:r>
+              <a:rPr/>
+              <a:t>R</a:t>
             </a:r>
           </a:p>
         </p:txBody>
@@ -16038,7 +17180,7 @@
             </a:pPr>
             <a:r>
               <a:rPr/>
-              <a:t>Bootstrap in SAS (2/10)</a:t>
+              <a:t>Bootstrap in SAS (1/10)</a:t>
             </a:r>
           </a:p>
         </p:txBody>
@@ -16057,6 +17199,13 @@
         <p:txBody>
           <a:bodyPr/>
           <a:lstStyle/>
+          <a:p>
+            <a:pPr lvl="0"/>
+            <a:r>
+              <a:rPr/>
+              <a:t>Example taken from UCLA Statistical Methods and Data Analytics site</a:t>
+            </a:r>
+          </a:p>
           <a:p>
             <a:pPr lvl="0" indent="0">
               <a:buNone/>
@@ -16065,12 +17214,11 @@
               <a:rPr>
                 <a:latin typeface="Courier"/>
               </a:rPr>
-              <a:t>*store the estimated r-square;
-data _null_;
- set t0;
- if label2 =  "R-Square" then 
- call symput('r2bar', cvalue2);
-run;</a:t>
+              <a:t>ods output FitStatistics = t0;
+proc reg data = hsb2;
+  model read = female math write ses;
+run;
+quit;</a:t>
             </a:r>
           </a:p>
         </p:txBody>
@@ -16117,7 +17265,7 @@
             </a:pPr>
             <a:r>
               <a:rPr/>
-              <a:t>Bootstrap in SAS (3/10)</a:t>
+              <a:t>Bootstrap in SAS (2/10)</a:t>
             </a:r>
           </a:p>
         </p:txBody>
@@ -16144,12 +17292,12 @@
               <a:rPr>
                 <a:latin typeface="Courier"/>
               </a:rPr>
-              <a:t>%let rep = 500;
-proc surveyselect data= hsb2 out=bootsample
-     seed = 1347 method = urs
-     samprate = 1 outhits rep = &amp;rep;
-run;
-ods listing close;</a:t>
+              <a:t>*store the estimated r-square;
+data _null_;
+ set t0;
+ if label2 =  "R-Square" then 
+ call symput('r2bar', cvalue2);
+run;</a:t>
             </a:r>
           </a:p>
         </p:txBody>
@@ -16196,7 +17344,7 @@
             </a:pPr>
             <a:r>
               <a:rPr/>
-              <a:t>Bootstrap in SAS (4/10)</a:t>
+              <a:t>Bootstrap in SAS (3/10)</a:t>
             </a:r>
           </a:p>
         </p:txBody>
@@ -16223,12 +17371,12 @@
               <a:rPr>
                 <a:latin typeface="Courier"/>
               </a:rPr>
-              <a:t>Sample Size                       200
-Expected Number of Hits             1
-Sampling Weight                     1
-Number of Replicates              500
-Total Sample Size              100000
-Output Data Set            BOOTSAMPLE</a:t>
+              <a:t>%let rep = 500;
+proc surveyselect data= hsb2 out=bootsample
+     seed = 1347 method = urs
+     samprate = 1 outhits rep = &amp;rep;
+run;
+ods listing close;</a:t>
             </a:r>
           </a:p>
         </p:txBody>
@@ -16275,7 +17423,7 @@
             </a:pPr>
             <a:r>
               <a:rPr/>
-              <a:t>Bootstrap in SAS (5/10)</a:t>
+              <a:t>Bootstrap in SAS (4/10)</a:t>
             </a:r>
           </a:p>
         </p:txBody>
@@ -16302,12 +17450,12 @@
               <a:rPr>
                 <a:latin typeface="Courier"/>
               </a:rPr>
-              <a:t>ods output  FitStatistics = t (where = (label2 =  "R-Square"));
-proc reg data = bootsample;
-  by replicate;
-  model read = female math write ses;
-run;
-quit;</a:t>
+              <a:t>Sample Size                       200
+Expected Number of Hits             1
+Sampling Weight                     1
+Number of Replicates              500
+Total Sample Size              100000
+Output Data Set            BOOTSAMPLE</a:t>
             </a:r>
           </a:p>
         </p:txBody>
@@ -16705,7 +17853,7 @@
             </a:pPr>
             <a:r>
               <a:rPr/>
-              <a:t>Bootstrap in SAS (6/10)</a:t>
+              <a:t>Bootstrap in SAS (5/10)</a:t>
             </a:r>
           </a:p>
         </p:txBody>
@@ -16732,11 +17880,12 @@
               <a:rPr>
                 <a:latin typeface="Courier"/>
               </a:rPr>
-              <a:t>* converting character type to numeric type;
-data t1;
-  set t;
-  r2 = cvalue2 + 0;
-run;</a:t>
+              <a:t>ods output  FitStatistics = t (where = (label2 =  "R-Square"));
+proc reg data = bootsample;
+  by replicate;
+  model read = female math write ses;
+run;
+quit;</a:t>
             </a:r>
           </a:p>
         </p:txBody>
@@ -16783,7 +17932,7 @@
             </a:pPr>
             <a:r>
               <a:rPr/>
-              <a:t>Bootstrap in SAS (7/10)</a:t>
+              <a:t>Bootstrap in SAS (6/10)</a:t>
             </a:r>
           </a:p>
         </p:txBody>
@@ -16810,9 +17959,11 @@
               <a:rPr>
                 <a:latin typeface="Courier"/>
               </a:rPr>
-              <a:t>%let alphalev = .05;
-%let a1 = %sysevalf(&amp;alphalev/2*100);
-%let a2 = %sysevalf((1 - &amp;alphalev/2)*100);</a:t>
+              <a:t>* converting character type to numeric type;
+data t1;
+  set t;
+  r2 = cvalue2 + 0;
+run;</a:t>
             </a:r>
           </a:p>
         </p:txBody>
@@ -16859,7 +18010,7 @@
             </a:pPr>
             <a:r>
               <a:rPr/>
-              <a:t>Bootstrap in SAS (8/10)</a:t>
+              <a:t>Bootstrap in SAS (7/10)</a:t>
             </a:r>
           </a:p>
         </p:txBody>
@@ -16886,11 +18037,9 @@
               <a:rPr>
                 <a:latin typeface="Courier"/>
               </a:rPr>
-              <a:t>* creating confidence interval, percentile method;
-proc univariate data = t1 alpha = .05;
-  var r2;
-  output out=pmethod mean = r2hat pctlpts=&amp;a1 &amp;a2 pctlpre = p pctlname = _lb _ub ;
-run;</a:t>
+              <a:t>%let alphalev = .05;
+%let a1 = %sysevalf(&amp;alphalev/2*100);
+%let a2 = %sysevalf((1 - &amp;alphalev/2)*100);</a:t>
             </a:r>
           </a:p>
         </p:txBody>
@@ -16937,7 +18086,7 @@
             </a:pPr>
             <a:r>
               <a:rPr/>
-              <a:t>Bootstrap in SAS (9/10)</a:t>
+              <a:t>Bootstrap in SAS (8/10)</a:t>
             </a:r>
           </a:p>
         </p:txBody>
@@ -16964,12 +18113,11 @@
               <a:rPr>
                 <a:latin typeface="Courier"/>
               </a:rPr>
-              <a:t>data t2;
-  set pmethod;
-  bias = r2hat - &amp;r2bar;
-  r2 = &amp;r2bar;
-run;
-ods listing;</a:t>
+              <a:t>* creating confidence interval, percentile method;
+proc univariate data = t1 alpha = .05;
+  var r2;
+  output out=pmethod mean = r2hat pctlpts=&amp;a1 &amp;a2 pctlpre = p pctlname = _lb _ub ;
+run;</a:t>
             </a:r>
           </a:p>
         </p:txBody>
@@ -17016,7 +18164,7 @@
             </a:pPr>
             <a:r>
               <a:rPr/>
-              <a:t>Bootstrap in SAS (10/10)</a:t>
+              <a:t>Bootstrap in SAS (9/10)</a:t>
             </a:r>
           </a:p>
         </p:txBody>
@@ -17043,11 +18191,12 @@
               <a:rPr>
                 <a:latin typeface="Courier"/>
               </a:rPr>
-              <a:t>proc print data  = t2;
-  var r2 bias p_lb p_ub;
+              <a:t>data t2;
+  set pmethod;
+  bias = r2hat - &amp;r2bar;
+  r2 = &amp;r2bar;
 run;
-Obs      r2        bias       p_lb     p_ub
- 1     0.5189    .0066164    0.436    0.6017</a:t>
+ods listing;</a:t>
             </a:r>
           </a:p>
         </p:txBody>
@@ -17094,7 +18243,7 @@
             </a:pPr>
             <a:r>
               <a:rPr/>
-              <a:t>Bootstrap in Stata (1/4)</a:t>
+              <a:t>Bootstrap in SAS (10/10)</a:t>
             </a:r>
           </a:p>
         </p:txBody>
@@ -17114,38 +18263,20 @@
           <a:bodyPr/>
           <a:lstStyle/>
           <a:p>
-            <a:pPr lvl="0"/>
-            <a:r>
-              <a:rPr/>
-              <a:t>A bit easier</a:t>
-            </a:r>
-          </a:p>
-          <a:p>
-            <a:pPr lvl="1"/>
-            <a:r>
-              <a:rPr/>
-              <a:t>Built-in bootstrap command</a:t>
-            </a:r>
-          </a:p>
-          <a:p>
-            <a:pPr lvl="1"/>
-            <a:r>
-              <a:rPr/>
-              <a:t>Simpler handling of output</a:t>
-            </a:r>
-          </a:p>
-          <a:p>
-            <a:pPr lvl="0"/>
-            <a:r>
-              <a:rPr/>
-              <a:t>Example taken from UCLA Statistical Methods and Data Analytics site</a:t>
-            </a:r>
-          </a:p>
-          <a:p>
-            <a:pPr lvl="1"/>
-            <a:r>
-              <a:rPr/>
-              <a:t>Google ucla bootstrap stata</a:t>
+            <a:pPr lvl="0" indent="0">
+              <a:buNone/>
+            </a:pPr>
+            <a:r>
+              <a:rPr>
+                <a:latin typeface="Courier"/>
+              </a:rPr>
+              <a:t>proc print data  = t2;
+  var r2 bias p_lb p_ub;
+run;
+Obs        r2        bias   
+ 1     0.5189    .0066164 
+         p_lb      p_ub
+        0.436    0.6017     </a:t>
             </a:r>
           </a:p>
         </p:txBody>
@@ -17192,7 +18323,7 @@
             </a:pPr>
             <a:r>
               <a:rPr/>
-              <a:t>Bootstrap in Stata (2/4)</a:t>
+              <a:t>Bootstrap in Stata (1/4)</a:t>
             </a:r>
           </a:p>
         </p:txBody>
@@ -17212,15 +18343,31 @@
           <a:bodyPr/>
           <a:lstStyle/>
           <a:p>
-            <a:pPr lvl="0" indent="0">
-              <a:buNone/>
-            </a:pPr>
-            <a:r>
-              <a:rPr>
-                <a:latin typeface="Courier"/>
-              </a:rPr>
-              <a:t>use http://statistics.ats.ucla.edu/stat/stata/notes/hsb2, clear
-regress read female math write ses</a:t>
+            <a:pPr lvl="0"/>
+            <a:r>
+              <a:rPr/>
+              <a:t>A bit easier</a:t>
+            </a:r>
+          </a:p>
+          <a:p>
+            <a:pPr lvl="1"/>
+            <a:r>
+              <a:rPr/>
+              <a:t>Built-in bootstrap command</a:t>
+            </a:r>
+          </a:p>
+          <a:p>
+            <a:pPr lvl="1"/>
+            <a:r>
+              <a:rPr/>
+              <a:t>Simpler handling of output</a:t>
+            </a:r>
+          </a:p>
+          <a:p>
+            <a:pPr lvl="0"/>
+            <a:r>
+              <a:rPr/>
+              <a:t>Example taken from UCLA Statistical Methods and Data Analytics site</a:t>
             </a:r>
           </a:p>
         </p:txBody>
@@ -17267,7 +18414,7 @@
             </a:pPr>
             <a:r>
               <a:rPr/>
-              <a:t>Bootstrap in Stata (3/4)</a:t>
+              <a:t>Bootstrap in Stata (2/4)</a:t>
             </a:r>
           </a:p>
         </p:txBody>
@@ -17294,7 +18441,8 @@
               <a:rPr>
                 <a:latin typeface="Courier"/>
               </a:rPr>
-              <a:t>bootstrap rmse=e(rmse), reps(100) seed(12345): regress read female math write ses</a:t>
+              <a:t>use http://statistics.ats.ucla.edu/stat/stata/notes/hsb2, clear
+regress read female math write ses</a:t>
             </a:r>
           </a:p>
         </p:txBody>
@@ -17341,7 +18489,7 @@
             </a:pPr>
             <a:r>
               <a:rPr/>
-              <a:t>Bootstrap in Stata (4/4)</a:t>
+              <a:t>Bootstrap in Stata (3/4)</a:t>
             </a:r>
           </a:p>
         </p:txBody>
@@ -17368,19 +18516,7 @@
               <a:rPr>
                 <a:latin typeface="Courier"/>
               </a:rPr>
-              <a:t>---------------------------------------
-             |   Observed   Bootstrap 
-             |      Coef.   Std. Err. 
--------------+------------------------
-        rmse |   7.184202   .2594069  
---------------------------------------
---------------------------------------
-                    Normal-based
- z    P&gt;|z|     [95% Conf. Interval]
---------------------------------------
-27.69   0.000     6.675774     7.69263
---------------------------------------
-</a:t>
+              <a:t>bootstrap rmse=e(rmse), reps(100) seed(12345): regress read female math write ses</a:t>
             </a:r>
           </a:p>
         </p:txBody>
@@ -17427,7 +18563,7 @@
             </a:pPr>
             <a:r>
               <a:rPr/>
-              <a:t>Bootstrap in R (1/4)</a:t>
+              <a:t>Bootstrap in Stata (4/4)</a:t>
             </a:r>
           </a:p>
         </p:txBody>
@@ -17447,45 +18583,20 @@
           <a:bodyPr/>
           <a:lstStyle/>
           <a:p>
-            <a:pPr lvl="0"/>
-            <a:r>
-              <a:rPr/>
-              <a:t>Easiest and most flexible choice</a:t>
-            </a:r>
-          </a:p>
-          <a:p>
-            <a:pPr lvl="1"/>
-            <a:r>
-              <a:rPr/>
-              <a:t>Special library</a:t>
-            </a:r>
-          </a:p>
-          <a:p>
-            <a:pPr lvl="1"/>
-            <a:r>
-              <a:rPr/>
-              <a:t>Simple looping stuctures</a:t>
-            </a:r>
-          </a:p>
-          <a:p>
-            <a:pPr lvl="1"/>
-            <a:r>
-              <a:rPr/>
-              <a:t>Easy to extract specific values</a:t>
-            </a:r>
-          </a:p>
-          <a:p>
-            <a:pPr lvl="0"/>
-            <a:r>
-              <a:rPr/>
-              <a:t>Example taken from UCLA Statistical Methods and Data Analytics site</a:t>
-            </a:r>
-          </a:p>
-          <a:p>
-            <a:pPr lvl="1"/>
-            <a:r>
-              <a:rPr/>
-              <a:t>Google ucla bootstrap r</a:t>
+            <a:pPr lvl="0" indent="0">
+              <a:buNone/>
+            </a:pPr>
+            <a:r>
+              <a:rPr>
+                <a:latin typeface="Courier"/>
+              </a:rPr>
+              <a:t>                 Observed   Bootstrap 
+                    Coef.   Std. Err. 
+        rmse     7.184202   .2594069  
+                    Normal-based
+ z      P&gt;|z|     [95% Conf. Interval]
+27.69   0.000     6.675774     7.69263
+</a:t>
             </a:r>
           </a:p>
         </p:txBody>
@@ -17823,7 +18934,7 @@
             </a:pPr>
             <a:r>
               <a:rPr/>
-              <a:t>Bootstrap in R (2/4)</a:t>
+              <a:t>Bootstrap in R (1/4)</a:t>
             </a:r>
           </a:p>
         </p:txBody>
@@ -17843,15 +18954,38 @@
           <a:bodyPr/>
           <a:lstStyle/>
           <a:p>
-            <a:pPr lvl="0" indent="0">
-              <a:buNone/>
-            </a:pPr>
-            <a:r>
-              <a:rPr>
-                <a:latin typeface="Courier"/>
-              </a:rPr>
-              <a:t>library(boot)
-hsb2 &lt;- read.table("https://stats.idre.ucla.edu/stat/data/hsb2.csv", sep=",", header=T)</a:t>
+            <a:pPr lvl="0"/>
+            <a:r>
+              <a:rPr/>
+              <a:t>Easiest and most flexible choice</a:t>
+            </a:r>
+          </a:p>
+          <a:p>
+            <a:pPr lvl="1"/>
+            <a:r>
+              <a:rPr/>
+              <a:t>Special library</a:t>
+            </a:r>
+          </a:p>
+          <a:p>
+            <a:pPr lvl="1"/>
+            <a:r>
+              <a:rPr/>
+              <a:t>Simple looping stuctures</a:t>
+            </a:r>
+          </a:p>
+          <a:p>
+            <a:pPr lvl="1"/>
+            <a:r>
+              <a:rPr/>
+              <a:t>Easy to extract specific values</a:t>
+            </a:r>
+          </a:p>
+          <a:p>
+            <a:pPr lvl="0"/>
+            <a:r>
+              <a:rPr/>
+              <a:t>Example taken from UCLA Statistical Methods and Data Analytics site</a:t>
             </a:r>
           </a:p>
         </p:txBody>
@@ -17898,7 +19032,7 @@
             </a:pPr>
             <a:r>
               <a:rPr/>
-              <a:t>Bootstrap in R (3/4)</a:t>
+              <a:t>Bootstrap in R (2/4)</a:t>
             </a:r>
           </a:p>
         </p:txBody>
@@ -17925,12 +19059,8 @@
               <a:rPr>
                 <a:latin typeface="Courier"/>
               </a:rPr>
-              <a:t>fc &lt;- function(d, i){
-    d2 &lt;- d[i,]
-    return(cor(d2$write, d2$math))
-}
-set.seed(626)
-bootcorr &lt;- boot(hsb2, fc, R=500)</a:t>
+              <a:t>library(boot)
+hsb2 &lt;- read.table("https://stats.idre.ucla.edu/stat/data/hsb2.csv", sep=",", header=T)</a:t>
             </a:r>
           </a:p>
         </p:txBody>
@@ -17977,7 +19107,7 @@
             </a:pPr>
             <a:r>
               <a:rPr/>
-              <a:t>Bootstrap in R (4/4)</a:t>
+              <a:t>Bootstrap in R (3/4)</a:t>
             </a:r>
           </a:p>
         </p:txBody>
@@ -18004,9 +19134,12 @@
               <a:rPr>
                 <a:latin typeface="Courier"/>
               </a:rPr>
-              <a:t>Bootstrap Statistics :
-     original       bias    std. error
-t1* 0.6174493 -0.001528707  0.04020362</a:t>
+              <a:t>fc &lt;- function(d, i){
+    d2 &lt;- d[i,]
+    return(cor(d2$write, d2$math))
+}
+set.seed(626)
+bootcorr &lt;- boot(hsb2, fc, R=500)</a:t>
             </a:r>
           </a:p>
         </p:txBody>
@@ -18053,7 +19186,7 @@
             </a:pPr>
             <a:r>
               <a:rPr/>
-              <a:t>Break #3</a:t>
+              <a:t>Bootstrap in R (4/4)</a:t>
             </a:r>
           </a:p>
         </p:txBody>
@@ -18073,31 +19206,16 @@
           <a:bodyPr/>
           <a:lstStyle/>
           <a:p>
-            <a:pPr lvl="0"/>
-            <a:r>
-              <a:rPr/>
-              <a:t>What have you learned</a:t>
-            </a:r>
-          </a:p>
-          <a:p>
-            <a:pPr lvl="1"/>
-            <a:r>
-              <a:rPr/>
-              <a:t>Software</a:t>
-            </a:r>
-          </a:p>
-          <a:p>
-            <a:pPr lvl="0"/>
-            <a:r>
-              <a:rPr/>
-              <a:t>What’s coming next</a:t>
-            </a:r>
-          </a:p>
-          <a:p>
-            <a:pPr lvl="1"/>
-            <a:r>
-              <a:rPr/>
-              <a:t>Special issues</a:t>
+            <a:pPr lvl="0" indent="0">
+              <a:buNone/>
+            </a:pPr>
+            <a:r>
+              <a:rPr>
+                <a:latin typeface="Courier"/>
+              </a:rPr>
+              <a:t>Bootstrap Statistics :
+     original       bias    std. error
+t1* 0.6174493 -0.001528707  0.04020362</a:t>
             </a:r>
           </a:p>
         </p:txBody>
@@ -18144,7 +19262,7 @@
             </a:pPr>
             <a:r>
               <a:rPr/>
-              <a:t>Special issues</a:t>
+              <a:t>Break #3</a:t>
             </a:r>
           </a:p>
         </p:txBody>
@@ -18167,21 +19285,28 @@
             <a:pPr lvl="0"/>
             <a:r>
               <a:rPr/>
-              <a:t>Multiple groups</a:t>
+              <a:t>What have you learned</a:t>
+            </a:r>
+          </a:p>
+          <a:p>
+            <a:pPr lvl="1"/>
+            <a:r>
+              <a:rPr/>
+              <a:t>Software</a:t>
             </a:r>
           </a:p>
           <a:p>
             <a:pPr lvl="0"/>
             <a:r>
               <a:rPr/>
-              <a:t>Time series</a:t>
-            </a:r>
-          </a:p>
-          <a:p>
-            <a:pPr lvl="0"/>
-            <a:r>
-              <a:rPr/>
-              <a:t>Regression models</a:t>
+              <a:t>What’s coming next</a:t>
+            </a:r>
+          </a:p>
+          <a:p>
+            <a:pPr lvl="1"/>
+            <a:r>
+              <a:rPr/>
+              <a:t>Special settings</a:t>
             </a:r>
           </a:p>
         </p:txBody>
@@ -18228,44 +19353,44 @@
             </a:pPr>
             <a:r>
               <a:rPr/>
+              <a:t>Special settings</a:t>
+            </a:r>
+          </a:p>
+        </p:txBody>
+      </p:sp>
+      <p:sp>
+        <p:nvSpPr>
+          <p:cNvPr id="3" name="Content Placeholder 2"/>
+          <p:cNvSpPr>
+            <a:spLocks noGrp="1"/>
+          </p:cNvSpPr>
+          <p:nvPr>
+            <p:ph idx="1"/>
+          </p:nvPr>
+        </p:nvSpPr>
+        <p:spPr/>
+        <p:txBody>
+          <a:bodyPr/>
+          <a:lstStyle/>
+          <a:p>
+            <a:pPr lvl="0"/>
+            <a:r>
+              <a:rPr/>
               <a:t>Multiple groups</a:t>
             </a:r>
           </a:p>
-        </p:txBody>
-      </p:sp>
-      <p:sp>
-        <p:nvSpPr>
-          <p:cNvPr id="3" name="Content Placeholder 2"/>
-          <p:cNvSpPr>
-            <a:spLocks noGrp="1"/>
-          </p:cNvSpPr>
-          <p:nvPr>
-            <p:ph idx="1"/>
-          </p:nvPr>
-        </p:nvSpPr>
-        <p:spPr/>
-        <p:txBody>
-          <a:bodyPr/>
-          <a:lstStyle/>
           <a:p>
             <a:pPr lvl="0"/>
             <a:r>
               <a:rPr/>
-              <a:t>Do you allow the group sizes to vary?</a:t>
+              <a:t>Time series</a:t>
             </a:r>
           </a:p>
           <a:p>
             <a:pPr lvl="0"/>
             <a:r>
               <a:rPr/>
-              <a:t>Stratified bootstrap</a:t>
-            </a:r>
-          </a:p>
-          <a:p>
-            <a:pPr lvl="1"/>
-            <a:r>
-              <a:rPr/>
-              <a:t>Two group example</a:t>
+              <a:t>Regression models</a:t>
             </a:r>
           </a:p>
         </p:txBody>
@@ -18312,7 +19437,7 @@
             </a:pPr>
             <a:r>
               <a:rPr/>
-              <a:t>Time series</a:t>
+              <a:t>Multiple groups</a:t>
             </a:r>
           </a:p>
         </p:txBody>
@@ -18335,56 +19460,21 @@
             <a:pPr lvl="0"/>
             <a:r>
               <a:rPr/>
-              <a:t>Simple bootstrap destroys important features of time series models</a:t>
+              <a:t>Do you allow the group sizes to vary?</a:t>
+            </a:r>
+          </a:p>
+          <a:p>
+            <a:pPr lvl="0"/>
+            <a:r>
+              <a:rPr/>
+              <a:t>Stratified bootstrap</a:t>
             </a:r>
           </a:p>
           <a:p>
             <a:pPr lvl="1"/>
             <a:r>
               <a:rPr/>
-              <a:t>Evenly spaced observations</a:t>
-            </a:r>
-          </a:p>
-          <a:p>
-            <a:pPr lvl="1"/>
-            <a:r>
-              <a:rPr/>
-              <a:t>Serial correlation</a:t>
-            </a:r>
-          </a:p>
-          <a:p>
-            <a:pPr lvl="1"/>
-            <a:r>
-              <a:rPr/>
-              <a:t>Seasonality</a:t>
-            </a:r>
-          </a:p>
-          <a:p>
-            <a:pPr lvl="1"/>
-            <a:r>
-              <a:rPr/>
-              <a:t>Temporal trends</a:t>
-            </a:r>
-          </a:p>
-          <a:p>
-            <a:pPr lvl="0"/>
-            <a:r>
-              <a:rPr/>
-              <a:t>Solutions</a:t>
-            </a:r>
-          </a:p>
-          <a:p>
-            <a:pPr lvl="1"/>
-            <a:r>
-              <a:rPr/>
-              <a:t>Bootstrap blocks of consecutive observations</a:t>
-            </a:r>
-          </a:p>
-          <a:p>
-            <a:pPr lvl="1"/>
-            <a:r>
-              <a:rPr/>
-              <a:t>Detrend/decompose the time series</a:t>
+              <a:t>Two group example</a:t>
             </a:r>
           </a:p>
         </p:txBody>
@@ -18431,7 +19521,7 @@
             </a:pPr>
             <a:r>
               <a:rPr/>
-              <a:t>Regression models</a:t>
+              <a:t>Time series</a:t>
             </a:r>
           </a:p>
         </p:txBody>
@@ -18454,21 +19544,56 @@
             <a:pPr lvl="0"/>
             <a:r>
               <a:rPr/>
-              <a:t>Subsample may have perfect collinearity</a:t>
+              <a:t>Simple bootstrap destroys important features of time series models</a:t>
+            </a:r>
+          </a:p>
+          <a:p>
+            <a:pPr lvl="1"/>
+            <a:r>
+              <a:rPr/>
+              <a:t>Evenly spaced observations</a:t>
+            </a:r>
+          </a:p>
+          <a:p>
+            <a:pPr lvl="1"/>
+            <a:r>
+              <a:rPr/>
+              <a:t>Serial correlation</a:t>
+            </a:r>
+          </a:p>
+          <a:p>
+            <a:pPr lvl="1"/>
+            <a:r>
+              <a:rPr/>
+              <a:t>Seasonality</a:t>
+            </a:r>
+          </a:p>
+          <a:p>
+            <a:pPr lvl="1"/>
+            <a:r>
+              <a:rPr/>
+              <a:t>Temporal trends</a:t>
             </a:r>
           </a:p>
           <a:p>
             <a:pPr lvl="0"/>
             <a:r>
               <a:rPr/>
-              <a:t>Are the independent variables fixed or random?</a:t>
-            </a:r>
-          </a:p>
-          <a:p>
-            <a:pPr lvl="0"/>
-            <a:r>
-              <a:rPr/>
-              <a:t>Solution: bootstrap residuals</a:t>
+              <a:t>Solutions</a:t>
+            </a:r>
+          </a:p>
+          <a:p>
+            <a:pPr lvl="1"/>
+            <a:r>
+              <a:rPr/>
+              <a:t>Bootstrap blocks of consecutive observations</a:t>
+            </a:r>
+          </a:p>
+          <a:p>
+            <a:pPr lvl="1"/>
+            <a:r>
+              <a:rPr/>
+              <a:t>Detrend/decompose the time series</a:t>
             </a:r>
           </a:p>
         </p:txBody>
@@ -18515,7 +19640,7 @@
             </a:pPr>
             <a:r>
               <a:rPr/>
-              <a:t>Final bits of advice (1/2)</a:t>
+              <a:t>Regression models</a:t>
             </a:r>
           </a:p>
         </p:txBody>
@@ -18538,56 +19663,21 @@
             <a:pPr lvl="0"/>
             <a:r>
               <a:rPr/>
-              <a:t>Situations where the bootstrap performs poorly</a:t>
-            </a:r>
-          </a:p>
-          <a:p>
-            <a:pPr lvl="1"/>
-            <a:r>
-              <a:rPr/>
-              <a:t>Small sample size</a:t>
-            </a:r>
-          </a:p>
-          <a:p>
-            <a:pPr lvl="1"/>
-            <a:r>
-              <a:rPr/>
-              <a:t>Data from “weird” distributions</a:t>
-            </a:r>
-          </a:p>
-          <a:p>
-            <a:pPr lvl="1"/>
-            <a:r>
-              <a:rPr/>
-              <a:t>Statistics at or near the extremes</a:t>
+              <a:t>Subsample may have perfect collinearity</a:t>
             </a:r>
           </a:p>
           <a:p>
             <a:pPr lvl="0"/>
             <a:r>
               <a:rPr/>
-              <a:t>Situations where a simple bootstrap performs poorly</a:t>
-            </a:r>
-          </a:p>
-          <a:p>
-            <a:pPr lvl="1"/>
-            <a:r>
-              <a:rPr/>
-              <a:t>Multiple groups with small sample sizes</a:t>
-            </a:r>
-          </a:p>
-          <a:p>
-            <a:pPr lvl="1"/>
-            <a:r>
-              <a:rPr/>
-              <a:t>Time series models</a:t>
-            </a:r>
-          </a:p>
-          <a:p>
-            <a:pPr lvl="1"/>
-            <a:r>
-              <a:rPr/>
-              <a:t>Complex regression models</a:t>
+              <a:t>Are the independent variables fixed or random?</a:t>
+            </a:r>
+          </a:p>
+          <a:p>
+            <a:pPr lvl="0"/>
+            <a:r>
+              <a:rPr/>
+              <a:t>Solution: bootstrap residuals</a:t>
             </a:r>
           </a:p>
         </p:txBody>
@@ -18634,7 +19724,7 @@
             </a:pPr>
             <a:r>
               <a:rPr/>
-              <a:t>Final bits of advice (2/2)</a:t>
+              <a:t>Final bits of advice (1/2)</a:t>
             </a:r>
           </a:p>
         </p:txBody>
@@ -18657,35 +19747,49 @@
             <a:pPr lvl="0"/>
             <a:r>
               <a:rPr/>
-              <a:t>Situations where the bootstrap performs well</a:t>
+              <a:t>Situations where the bootstrap performs poorly</a:t>
             </a:r>
           </a:p>
           <a:p>
             <a:pPr lvl="1"/>
             <a:r>
               <a:rPr/>
-              <a:t>Statistics with no known theoretical results</a:t>
+              <a:t>Data from “weird” distributions</a:t>
             </a:r>
           </a:p>
           <a:p>
             <a:pPr lvl="1"/>
             <a:r>
               <a:rPr/>
-              <a:t>Statistics where approximations are questionable</a:t>
+              <a:t>Statistics at or near the extremes</a:t>
             </a:r>
           </a:p>
           <a:p>
             <a:pPr lvl="0"/>
             <a:r>
               <a:rPr/>
-              <a:t>But you can’t squeeze blood from a turnip.</a:t>
+              <a:t>Situations where a simple bootstrap performs poorly</a:t>
             </a:r>
           </a:p>
           <a:p>
             <a:pPr lvl="1"/>
             <a:r>
               <a:rPr/>
-              <a:t>Very small sample sizes are still very small sample sizes</a:t>
+              <a:t>Multiple groups with small sample sizes</a:t>
+            </a:r>
+          </a:p>
+          <a:p>
+            <a:pPr lvl="1"/>
+            <a:r>
+              <a:rPr/>
+              <a:t>Time series models</a:t>
+            </a:r>
+          </a:p>
+          <a:p>
+            <a:pPr lvl="1"/>
+            <a:r>
+              <a:rPr/>
+              <a:t>Regression models</a:t>
             </a:r>
           </a:p>
         </p:txBody>
@@ -19026,6 +20130,104 @@
             </a:pPr>
             <a:r>
               <a:rPr/>
+              <a:t>Final bits of advice (2/2)</a:t>
+            </a:r>
+          </a:p>
+        </p:txBody>
+      </p:sp>
+      <p:sp>
+        <p:nvSpPr>
+          <p:cNvPr id="3" name="Content Placeholder 2"/>
+          <p:cNvSpPr>
+            <a:spLocks noGrp="1"/>
+          </p:cNvSpPr>
+          <p:nvPr>
+            <p:ph idx="1"/>
+          </p:nvPr>
+        </p:nvSpPr>
+        <p:spPr/>
+        <p:txBody>
+          <a:bodyPr/>
+          <a:lstStyle/>
+          <a:p>
+            <a:pPr lvl="0"/>
+            <a:r>
+              <a:rPr/>
+              <a:t>Situations where the bootstrap performs well</a:t>
+            </a:r>
+          </a:p>
+          <a:p>
+            <a:pPr lvl="1"/>
+            <a:r>
+              <a:rPr/>
+              <a:t>Statistics with no known theoretical results</a:t>
+            </a:r>
+          </a:p>
+          <a:p>
+            <a:pPr lvl="1"/>
+            <a:r>
+              <a:rPr/>
+              <a:t>Statistics where approximations are questionable</a:t>
+            </a:r>
+          </a:p>
+          <a:p>
+            <a:pPr lvl="0"/>
+            <a:r>
+              <a:rPr/>
+              <a:t>But you can’t squeeze blood from a turnip.</a:t>
+            </a:r>
+          </a:p>
+          <a:p>
+            <a:pPr lvl="1"/>
+            <a:r>
+              <a:rPr/>
+              <a:t>Very small sample sizes are still very small sample sizes</a:t>
+            </a:r>
+          </a:p>
+        </p:txBody>
+      </p:sp>
+    </p:spTree>
+  </p:cSld>
+</p:sld>
+</file>
+
+<file path=ppt/slides/slide71.xml><?xml version="1.0" encoding="utf-8"?>
+<p:sld xmlns:a="http://schemas.openxmlformats.org/drawingml/2006/main" xmlns:r="http://schemas.openxmlformats.org/officeDocument/2006/relationships" xmlns:p="http://schemas.openxmlformats.org/presentationml/2006/main">
+  <p:cSld>
+    <p:spTree>
+      <p:nvGrpSpPr>
+        <p:cNvPr id="1" name=""/>
+        <p:cNvGrpSpPr/>
+        <p:nvPr/>
+      </p:nvGrpSpPr>
+      <p:grpSpPr>
+        <a:xfrm>
+          <a:off x="0" y="0"/>
+          <a:ext cx="0" cy="0"/>
+          <a:chOff x="0" y="0"/>
+          <a:chExt cx="0" cy="0"/>
+        </a:xfrm>
+      </p:grpSpPr>
+      <p:sp>
+        <p:nvSpPr>
+          <p:cNvPr id="2" name="Title 1"/>
+          <p:cNvSpPr>
+            <a:spLocks noGrp="1"/>
+          </p:cNvSpPr>
+          <p:nvPr>
+            <p:ph type="title"/>
+          </p:nvPr>
+        </p:nvSpPr>
+        <p:spPr/>
+        <p:txBody>
+          <a:bodyPr/>
+          <a:lstStyle/>
+          <a:p>
+            <a:pPr lvl="0" indent="0" marL="0">
+              <a:buNone/>
+            </a:pPr>
+            <a:r>
+              <a:rPr/>
               <a:t>Summary</a:t>
             </a:r>
           </a:p>
@@ -19070,7 +20272,97 @@
             <a:pPr lvl="0"/>
             <a:r>
               <a:rPr/>
-              <a:t>Special issues</a:t>
+              <a:t>Special settings</a:t>
+            </a:r>
+          </a:p>
+        </p:txBody>
+      </p:sp>
+    </p:spTree>
+  </p:cSld>
+</p:sld>
+</file>
+
+<file path=ppt/slides/slide72.xml><?xml version="1.0" encoding="utf-8"?>
+<p:sld xmlns:a="http://schemas.openxmlformats.org/drawingml/2006/main" xmlns:r="http://schemas.openxmlformats.org/officeDocument/2006/relationships" xmlns:p="http://schemas.openxmlformats.org/presentationml/2006/main">
+  <p:cSld>
+    <p:spTree>
+      <p:nvGrpSpPr>
+        <p:cNvPr id="1" name=""/>
+        <p:cNvGrpSpPr/>
+        <p:nvPr/>
+      </p:nvGrpSpPr>
+      <p:grpSpPr>
+        <a:xfrm>
+          <a:off x="0" y="0"/>
+          <a:ext cx="0" cy="0"/>
+          <a:chOff x="0" y="0"/>
+          <a:chExt cx="0" cy="0"/>
+        </a:xfrm>
+      </p:grpSpPr>
+      <p:sp>
+        <p:nvSpPr>
+          <p:cNvPr id="2" name="Title 1"/>
+          <p:cNvSpPr>
+            <a:spLocks noGrp="1"/>
+          </p:cNvSpPr>
+          <p:nvPr>
+            <p:ph type="title"/>
+          </p:nvPr>
+        </p:nvSpPr>
+        <p:spPr/>
+        <p:txBody>
+          <a:bodyPr/>
+          <a:lstStyle/>
+          <a:p>
+            <a:pPr lvl="0" indent="0" marL="0">
+              <a:buNone/>
+            </a:pPr>
+            <a:r>
+              <a:rPr/>
+              <a:t>Bibliography</a:t>
+            </a:r>
+          </a:p>
+        </p:txBody>
+      </p:sp>
+      <p:sp>
+        <p:nvSpPr>
+          <p:cNvPr id="3" name="Content Placeholder 2"/>
+          <p:cNvSpPr>
+            <a:spLocks noGrp="1"/>
+          </p:cNvSpPr>
+          <p:nvPr>
+            <p:ph idx="1"/>
+          </p:nvPr>
+        </p:nvSpPr>
+        <p:spPr/>
+        <p:txBody>
+          <a:bodyPr/>
+          <a:lstStyle/>
+          <a:p>
+            <a:pPr lvl="0" indent="0" marL="0">
+              <a:buNone/>
+            </a:pPr>
+            <a:r>
+              <a:rPr/>
+              <a:t>Persi Diaconis, Bradley Efron. Computer-intensive Methods in Statistics. Scientific American, 1983, 248(5), 116-130.</a:t>
+            </a:r>
+          </a:p>
+          <a:p>
+            <a:pPr lvl="0" indent="0" marL="0">
+              <a:buNone/>
+            </a:pPr>
+            <a:r>
+              <a:rPr/>
+              <a:t>Bradley Efron, Gail Gong. A Leisurely Look at the Bootstrap, Jackknife, and Cross-Validation. The American Statistician, 1983, 37(1), 36-48.</a:t>
+            </a:r>
+          </a:p>
+          <a:p>
+            <a:pPr lvl="0" indent="0" marL="0">
+              <a:buNone/>
+            </a:pPr>
+            <a:r>
+              <a:rPr/>
+              <a:t>Bradley Efron, Robert Tibshirani. Bootstrap Methods for Standard Errors, Confidence Intervals, and Other Measures of Statistical Accuracy. Statistical Science, 1986, 1(1), 54-75.</a:t>
             </a:r>
           </a:p>
         </p:txBody>
@@ -19177,7 +20469,7 @@
             </a:pPr>
             <a:r>
               <a:rPr/>
-              <a:t>Figure 1. Image of a jackknife</a:t>
+              <a:t>Figure 2. Image of a jackknife</a:t>
             </a:r>
           </a:p>
         </p:txBody>

</xml_diff>

<commit_message>
Finalized SPSS example in boostrap-slides
</commit_message>
<xml_diff>
--- a/bootstrap/src/bootstrap-slides.pptx
+++ b/bootstrap/src/bootstrap-slides.pptx
@@ -5,7 +5,7 @@
     <p:sldMasterId id="2147483648" r:id="rId1"/>
   </p:sldMasterIdLst>
   <p:notesMasterIdLst>
-    <p:notesMasterId r:id="rId80"/>
+    <p:notesMasterId r:id="rId82"/>
   </p:notesMasterIdLst>
   <p:sldIdLst>
     <p:sldId id="256" r:id="rId2"/>
@@ -86,6 +86,8 @@
     <p:sldId id="331" r:id="rId77"/>
     <p:sldId id="332" r:id="rId78"/>
     <p:sldId id="333" r:id="rId79"/>
+    <p:sldId id="334" r:id="rId80"/>
+    <p:sldId id="335" r:id="rId81"/>
   </p:sldIdLst>
   <p:sldSz cx="12192000" cy="6858000"/>
   <p:notesSz cx="6858000" cy="9144000"/>
@@ -6433,6 +6435,20 @@
             </a:pPr>
             <a:r>
               <a:rPr/>
+              <a:t>https://www.ibm.com/products/spss-bootstrapping</a:t>
+            </a:r>
+          </a:p>
+          <a:p>
+            <a:pPr lvl="0" indent="0" marL="0">
+              <a:buNone/>
+            </a:pPr>
+          </a:p>
+          <a:p>
+            <a:pPr lvl="0" indent="0" marL="0">
+              <a:buNone/>
+            </a:pPr>
+            <a:r>
+              <a:rPr/>
               <a:t>SPSS has a special add-on for bootstrapping. Thanks to Karen Grace-Martin for finding this. It is a separate license from SPSS, so you may or may not have it. I did not get a chance to investigate this in any detail, but it looks to work similarly to Stata. You find a place with standard errors and/or confidence intervals are computed in the main SPSS package and if you have the add-on package, you can request that the traditional standard errors and confidence intervals be replaced with bootstrap standard errors and confidence intervals.</a:t>
             </a:r>
           </a:p>
@@ -6483,7 +6499,7 @@
           <a:p>
             <a:fld id="{18BDFEC3-8487-43E8-A154-7C12CBC1FFF2}" type="slidenum">
               <a:rPr lang="en-US"/>
-              <a:t>69</a:t>
+              <a:t>68</a:t>
             </a:fld>
             <a:endParaRPr lang="en-US"/>
           </a:p>
@@ -6543,7 +6559,7 @@
             </a:pPr>
             <a:r>
               <a:rPr/>
-              <a:t>So you’ve seen how to apply the bootstrap in SAS, Stata, and R. Next, I want to discuss special settings where you might want to modify the bootstrap approach.</a:t>
+              <a:t>If you use the menus in SPSS rather than syntax, you may notice a button that reads “Bootstrap”. This is one such menu, after selecting ANALYZE | CORRELATE |BIVARIATE.</a:t>
             </a:r>
           </a:p>
         </p:txBody>
@@ -6565,7 +6581,7 @@
           <a:p>
             <a:fld id="{18BDFEC3-8487-43E8-A154-7C12CBC1FFF2}" type="slidenum">
               <a:rPr lang="en-US"/>
-              <a:t>70</a:t>
+              <a:t>69</a:t>
             </a:fld>
             <a:endParaRPr lang="en-US"/>
           </a:p>
@@ -6625,63 +6641,7 @@
             </a:pPr>
             <a:r>
               <a:rPr/>
-              <a:t>In more complex settings, you need to consider some modifications to the bootstrap. I have almost no experience in these settings and there is scant guidance in the published literature and on the web.</a:t>
-            </a:r>
-          </a:p>
-          <a:p>
-            <a:pPr lvl="0" indent="0" marL="0">
-              <a:buNone/>
-            </a:pPr>
-          </a:p>
-          <a:p>
-            <a:pPr lvl="0" indent="0" marL="0">
-              <a:buNone/>
-            </a:pPr>
-            <a:r>
-              <a:rPr/>
-              <a:t>If you find yourself in one of these settings, I would encourage you to find a few publications that use the bootstrap in a setting reasonably similar to yours and emulate their approach.</a:t>
-            </a:r>
-          </a:p>
-          <a:p>
-            <a:pPr lvl="0" indent="0" marL="0">
-              <a:buNone/>
-            </a:pPr>
-          </a:p>
-          <a:p>
-            <a:pPr lvl="0" indent="0" marL="0">
-              <a:buNone/>
-            </a:pPr>
-            <a:r>
-              <a:rPr/>
-              <a:t>I call this the “lemming school of research” which is a reference to the warning about peer pressure that almost every parent has nagged their children with (“If all your friends jumped off a cliff, would you jump off the cliff as well?”).</a:t>
-            </a:r>
-          </a:p>
-          <a:p>
-            <a:pPr lvl="0" indent="0" marL="0">
-              <a:buNone/>
-            </a:pPr>
-          </a:p>
-          <a:p>
-            <a:pPr lvl="0" indent="0" marL="0">
-              <a:buNone/>
-            </a:pPr>
-            <a:r>
-              <a:rPr/>
-              <a:t>It actually is not as bad as I make it sound. If a certain methodology has survived the peer review process, that gives you a bit more confidence that you can survive the peer review process as well if you emulate their approach. There are no guarantees, of course, but this is perhaps an illustration of a more positive message: “there is safety in numbers.”</a:t>
-            </a:r>
-          </a:p>
-          <a:p>
-            <a:pPr lvl="0" indent="0" marL="0">
-              <a:buNone/>
-            </a:pPr>
-          </a:p>
-          <a:p>
-            <a:pPr lvl="0" indent="0" marL="0">
-              <a:buNone/>
-            </a:pPr>
-            <a:r>
-              <a:rPr/>
-              <a:t>The three settings I want to discuss are multiple groups, time series, and regression models.</a:t>
+              <a:t>When you click on that button a new dialog box appears. Generally, the default options are good at least 90% of the time.</a:t>
             </a:r>
           </a:p>
         </p:txBody>
@@ -6703,7 +6663,7 @@
           <a:p>
             <a:fld id="{18BDFEC3-8487-43E8-A154-7C12CBC1FFF2}" type="slidenum">
               <a:rPr lang="en-US"/>
-              <a:t>71</a:t>
+              <a:t>70</a:t>
             </a:fld>
             <a:endParaRPr lang="en-US"/>
           </a:p>
@@ -6763,77 +6723,7 @@
             </a:pPr>
             <a:r>
               <a:rPr/>
-              <a:t>Suppose you have two or more groups and want to estimate a statistic across all of the groups. For example, you have a treatment and a control group and you want to estimate the difference in medians between the two groups.</a:t>
-            </a:r>
-          </a:p>
-          <a:p>
-            <a:pPr lvl="0" indent="0" marL="0">
-              <a:buNone/>
-            </a:pPr>
-          </a:p>
-          <a:p>
-            <a:pPr lvl="0" indent="0" marL="0">
-              <a:buNone/>
-            </a:pPr>
-            <a:r>
-              <a:rPr/>
-              <a:t>You have two options. The first is to apply a simple bootstrap. This allows the relative sizes in the groups to vary. If one of the groups has a small relative sample size, then you run a slight risk having zero observations in that group for one or more of your bootstrap samples.</a:t>
-            </a:r>
-          </a:p>
-          <a:p>
-            <a:pPr lvl="0" indent="0" marL="0">
-              <a:buNone/>
-            </a:pPr>
-          </a:p>
-          <a:p>
-            <a:pPr lvl="0" indent="0" marL="0">
-              <a:buNone/>
-            </a:pPr>
-            <a:r>
-              <a:rPr/>
-              <a:t>If the group sizes are all reasonably large, this is not a serious problem.</a:t>
-            </a:r>
-          </a:p>
-          <a:p>
-            <a:pPr lvl="0" indent="0" marL="0">
-              <a:buNone/>
-            </a:pPr>
-          </a:p>
-          <a:p>
-            <a:pPr lvl="0" indent="0" marL="0">
-              <a:buNone/>
-            </a:pPr>
-            <a:r>
-              <a:rPr/>
-              <a:t>An alternative is to use a stratified bootstrap sample. It’s easy enough to envision with two groups. Let’s say that the two groups have sample sizes n1 and n2. Sample n1 observation with replacement from the first group, sample with n2 observations with replacement from the second group and then combine.</a:t>
-            </a:r>
-          </a:p>
-          <a:p>
-            <a:pPr lvl="0" indent="0" marL="0">
-              <a:buNone/>
-            </a:pPr>
-          </a:p>
-          <a:p>
-            <a:pPr lvl="0" indent="0" marL="0">
-              <a:buNone/>
-            </a:pPr>
-            <a:r>
-              <a:rPr/>
-              <a:t>The stratified bootstrap answers a different question than the simple bootstrap. The simple bootstrap calculates uncertainty in a setting where you are collecting a single sample and that sample has a random number of subjects in each group. The stratified bootstrap calculates uncertainty where you are collecting samples from multiple groups, each with a fixed quota.</a:t>
-            </a:r>
-          </a:p>
-          <a:p>
-            <a:pPr lvl="0" indent="0" marL="0">
-              <a:buNone/>
-            </a:pPr>
-          </a:p>
-          <a:p>
-            <a:pPr lvl="0" indent="0" marL="0">
-              <a:buNone/>
-            </a:pPr>
-            <a:r>
-              <a:rPr/>
-              <a:t>Is this a huge difference? I’m not sure, but my guess is that it is not all that important except when one or more of the group sizes is small. By small, I mean 10 or less. I should note, however, that I have not seen an “official” guidance on this question.</a:t>
+              <a:t>This is the output that SPSS produces.</a:t>
             </a:r>
           </a:p>
         </p:txBody>
@@ -6855,7 +6745,7 @@
           <a:p>
             <a:fld id="{18BDFEC3-8487-43E8-A154-7C12CBC1FFF2}" type="slidenum">
               <a:rPr lang="en-US"/>
-              <a:t>72</a:t>
+              <a:t>71</a:t>
             </a:fld>
             <a:endParaRPr lang="en-US"/>
           </a:p>
@@ -6915,63 +6805,7 @@
             </a:pPr>
             <a:r>
               <a:rPr/>
-              <a:t>There are special features of time series data that make them difficult to use with a simple bootstrap. The first and most obvious feature is that most time series have even spacing, a nice neatly ordered pattern over time. A bootstrap sample is going to have gaps in some places and multiple observations at the same time point.</a:t>
-            </a:r>
-          </a:p>
-          <a:p>
-            <a:pPr lvl="0" indent="0" marL="0">
-              <a:buNone/>
-            </a:pPr>
-          </a:p>
-          <a:p>
-            <a:pPr lvl="0" indent="0" marL="0">
-              <a:buNone/>
-            </a:pPr>
-            <a:r>
-              <a:rPr/>
-              <a:t>Most time series also exhibit serial correlation, seasonality, and/or temporal trends. These features are either seriously distorted or totally destroyed in a bootstrap sample.</a:t>
-            </a:r>
-          </a:p>
-          <a:p>
-            <a:pPr lvl="0" indent="0" marL="0">
-              <a:buNone/>
-            </a:pPr>
-          </a:p>
-          <a:p>
-            <a:pPr lvl="0" indent="0" marL="0">
-              <a:buNone/>
-            </a:pPr>
-            <a:r>
-              <a:rPr/>
-              <a:t>There are several possible solutions. One is to bootstrap consecutive blocks of observations. This preserves time series features within a block and appears to perform reasonably well.</a:t>
-            </a:r>
-          </a:p>
-          <a:p>
-            <a:pPr lvl="0" indent="0" marL="0">
-              <a:buNone/>
-            </a:pPr>
-          </a:p>
-          <a:p>
-            <a:pPr lvl="0" indent="0" marL="0">
-              <a:buNone/>
-            </a:pPr>
-            <a:r>
-              <a:rPr/>
-              <a:t>A second option is to remove any trend and decompose the time series into independent components, take a bootstrap sample of the independent components, and then recompose a new series from the bootstrap sample.</a:t>
-            </a:r>
-          </a:p>
-          <a:p>
-            <a:pPr lvl="0" indent="0" marL="0">
-              <a:buNone/>
-            </a:pPr>
-          </a:p>
-          <a:p>
-            <a:pPr lvl="0" indent="0" marL="0">
-              <a:buNone/>
-            </a:pPr>
-            <a:r>
-              <a:rPr/>
-              <a:t>The approach you take largely depends on the context of your problem and what statistic you are trying to characterize. For example, if you detrend the data and remove seasonality, then any bootstrapped estimate from the reconstructed time series will be fine if it is modeling a feature of the data other than the trend or seasonality.</a:t>
+              <a:t>So you’ve seen how to apply the bootstrap in SAS, Stata, and R. Next, I want to discuss special settings where you might want to modify the bootstrap approach.</a:t>
             </a:r>
           </a:p>
         </p:txBody>
@@ -6993,7 +6827,7 @@
           <a:p>
             <a:fld id="{18BDFEC3-8487-43E8-A154-7C12CBC1FFF2}" type="slidenum">
               <a:rPr lang="en-US"/>
-              <a:t>73</a:t>
+              <a:t>72</a:t>
             </a:fld>
             <a:endParaRPr lang="en-US"/>
           </a:p>
@@ -7053,49 +6887,63 @@
             </a:pPr>
             <a:r>
               <a:rPr/>
-              <a:t>The regression model has some of the same issues as the setting with multiple groups described earlier. If some of the independent variables are very strongly correlated, you might end up with a setting where the correlation is exactly 1 for one or more of the bootstrap samples. This is not a serious issue unless you have both a strong correlation and a small sample size.</a:t>
-            </a:r>
-          </a:p>
-          <a:p>
-            <a:pPr lvl="0" indent="0" marL="0">
-              <a:buNone/>
-            </a:pPr>
-          </a:p>
-          <a:p>
-            <a:pPr lvl="0" indent="0" marL="0">
-              <a:buNone/>
-            </a:pPr>
-            <a:r>
-              <a:rPr/>
-              <a:t>But another consideration is that the bootstrap sample treats the independent variables as if they are selected randomly along with the dependent variable. This may be the case, but there are some datasets where the X values are fixed in advance and the dependent variable is the only thing being sampled.</a:t>
-            </a:r>
-          </a:p>
-          <a:p>
-            <a:pPr lvl="0" indent="0" marL="0">
-              <a:buNone/>
-            </a:pPr>
-          </a:p>
-          <a:p>
-            <a:pPr lvl="0" indent="0" marL="0">
-              <a:buNone/>
-            </a:pPr>
-            <a:r>
-              <a:rPr/>
-              <a:t>One possible solution is to compute the residuals and reconstruct a new dependent variable from the bootstrapped residuals.</a:t>
-            </a:r>
-          </a:p>
-          <a:p>
-            <a:pPr lvl="0" indent="0" marL="0">
-              <a:buNone/>
-            </a:pPr>
-          </a:p>
-          <a:p>
-            <a:pPr lvl="0" indent="0" marL="0">
-              <a:buNone/>
-            </a:pPr>
-            <a:r>
-              <a:rPr/>
-              <a:t>Context is important here. If you bootstrap the residuals, you can’t use the reconstructed dependent variable as an estimate of the regression slopes themselves. You could use them to reconstruct a statistic that is independent of those slopes.</a:t>
+              <a:t>In more complex settings, you need to consider some modifications to the bootstrap. I have almost no experience in these settings and there is scant guidance in the published literature and on the web.</a:t>
+            </a:r>
+          </a:p>
+          <a:p>
+            <a:pPr lvl="0" indent="0" marL="0">
+              <a:buNone/>
+            </a:pPr>
+          </a:p>
+          <a:p>
+            <a:pPr lvl="0" indent="0" marL="0">
+              <a:buNone/>
+            </a:pPr>
+            <a:r>
+              <a:rPr/>
+              <a:t>If you find yourself in one of these settings, I would encourage you to find a few publications that use the bootstrap in a setting reasonably similar to yours and emulate their approach.</a:t>
+            </a:r>
+          </a:p>
+          <a:p>
+            <a:pPr lvl="0" indent="0" marL="0">
+              <a:buNone/>
+            </a:pPr>
+          </a:p>
+          <a:p>
+            <a:pPr lvl="0" indent="0" marL="0">
+              <a:buNone/>
+            </a:pPr>
+            <a:r>
+              <a:rPr/>
+              <a:t>I call this the “lemming school of research” which is a reference to the warning about peer pressure that almost every parent has nagged their children with (“If all your friends jumped off a cliff, would you jump off the cliff as well?”).</a:t>
+            </a:r>
+          </a:p>
+          <a:p>
+            <a:pPr lvl="0" indent="0" marL="0">
+              <a:buNone/>
+            </a:pPr>
+          </a:p>
+          <a:p>
+            <a:pPr lvl="0" indent="0" marL="0">
+              <a:buNone/>
+            </a:pPr>
+            <a:r>
+              <a:rPr/>
+              <a:t>It actually is not as bad as I make it sound. If a certain methodology has survived the peer review process, that gives you a bit more confidence that you can survive the peer review process as well if you emulate their approach. There are no guarantees, of course, but this is perhaps an illustration of a more positive message: “there is safety in numbers.”</a:t>
+            </a:r>
+          </a:p>
+          <a:p>
+            <a:pPr lvl="0" indent="0" marL="0">
+              <a:buNone/>
+            </a:pPr>
+          </a:p>
+          <a:p>
+            <a:pPr lvl="0" indent="0" marL="0">
+              <a:buNone/>
+            </a:pPr>
+            <a:r>
+              <a:rPr/>
+              <a:t>The three settings I want to discuss are multiple groups, time series, and regression models.</a:t>
             </a:r>
           </a:p>
         </p:txBody>
@@ -7117,7 +6965,7 @@
           <a:p>
             <a:fld id="{18BDFEC3-8487-43E8-A154-7C12CBC1FFF2}" type="slidenum">
               <a:rPr lang="en-US"/>
-              <a:t>74</a:t>
+              <a:t>73</a:t>
             </a:fld>
             <a:endParaRPr lang="en-US"/>
           </a:p>
@@ -7177,21 +7025,77 @@
             </a:pPr>
             <a:r>
               <a:rPr/>
-              <a:t>Although the bootstrap works in a very broad range of settings, it can fail miserably in certain cases. Weird distributions like the Cauchy distribution which have no finite moment are going to cause problems. Also troublesome are statistics at or near the extremes of the data. The range, for example, is a statistic where the bootstrap does not perform well.</a:t>
-            </a:r>
-          </a:p>
-          <a:p>
-            <a:pPr lvl="0" indent="0" marL="0">
-              <a:buNone/>
-            </a:pPr>
-          </a:p>
-          <a:p>
-            <a:pPr lvl="0" indent="0" marL="0">
-              <a:buNone/>
-            </a:pPr>
-            <a:r>
-              <a:rPr/>
-              <a:t>We’ve also talked about settings where a simple bootstrap does not perform well and may need some modification. This includes setting with multiple groups and small sample sizes, time series models, and regression models.</a:t>
+              <a:t>Suppose you have two or more groups and want to estimate a statistic across all of the groups. For example, you have a treatment and a control group and you want to estimate the difference in medians between the two groups.</a:t>
+            </a:r>
+          </a:p>
+          <a:p>
+            <a:pPr lvl="0" indent="0" marL="0">
+              <a:buNone/>
+            </a:pPr>
+          </a:p>
+          <a:p>
+            <a:pPr lvl="0" indent="0" marL="0">
+              <a:buNone/>
+            </a:pPr>
+            <a:r>
+              <a:rPr/>
+              <a:t>You have two options. The first is to apply a simple bootstrap. This allows the relative sizes in the groups to vary. If one of the groups has a small relative sample size, then you run a slight risk having zero observations in that group for one or more of your bootstrap samples.</a:t>
+            </a:r>
+          </a:p>
+          <a:p>
+            <a:pPr lvl="0" indent="0" marL="0">
+              <a:buNone/>
+            </a:pPr>
+          </a:p>
+          <a:p>
+            <a:pPr lvl="0" indent="0" marL="0">
+              <a:buNone/>
+            </a:pPr>
+            <a:r>
+              <a:rPr/>
+              <a:t>If the group sizes are all reasonably large, this is not a serious problem.</a:t>
+            </a:r>
+          </a:p>
+          <a:p>
+            <a:pPr lvl="0" indent="0" marL="0">
+              <a:buNone/>
+            </a:pPr>
+          </a:p>
+          <a:p>
+            <a:pPr lvl="0" indent="0" marL="0">
+              <a:buNone/>
+            </a:pPr>
+            <a:r>
+              <a:rPr/>
+              <a:t>An alternative is to use a stratified bootstrap sample. It’s easy enough to envision with two groups. Let’s say that the two groups have sample sizes n1 and n2. Sample n1 observation with replacement from the first group, sample with n2 observations with replacement from the second group and then combine.</a:t>
+            </a:r>
+          </a:p>
+          <a:p>
+            <a:pPr lvl="0" indent="0" marL="0">
+              <a:buNone/>
+            </a:pPr>
+          </a:p>
+          <a:p>
+            <a:pPr lvl="0" indent="0" marL="0">
+              <a:buNone/>
+            </a:pPr>
+            <a:r>
+              <a:rPr/>
+              <a:t>The stratified bootstrap answers a different question than the simple bootstrap. The simple bootstrap calculates uncertainty in a setting where you are collecting a single sample and that sample has a random number of subjects in each group. The stratified bootstrap calculates uncertainty where you are collecting samples from multiple groups, each with a fixed quota.</a:t>
+            </a:r>
+          </a:p>
+          <a:p>
+            <a:pPr lvl="0" indent="0" marL="0">
+              <a:buNone/>
+            </a:pPr>
+          </a:p>
+          <a:p>
+            <a:pPr lvl="0" indent="0" marL="0">
+              <a:buNone/>
+            </a:pPr>
+            <a:r>
+              <a:rPr/>
+              <a:t>Is this a huge difference? I’m not sure, but my guess is that it is not all that important except when one or more of the group sizes is small. By small, I mean 10 or less. I should note, however, that I have not seen an “official” guidance on this question.</a:t>
             </a:r>
           </a:p>
         </p:txBody>
@@ -7213,7 +7117,7 @@
           <a:p>
             <a:fld id="{18BDFEC3-8487-43E8-A154-7C12CBC1FFF2}" type="slidenum">
               <a:rPr lang="en-US"/>
-              <a:t>75</a:t>
+              <a:t>74</a:t>
             </a:fld>
             <a:endParaRPr lang="en-US"/>
           </a:p>
@@ -7383,21 +7287,63 @@
             </a:pPr>
             <a:r>
               <a:rPr/>
-              <a:t>The bootstrap performs well in settings where you do not have any theoretical results to guide your work. It also works well when the normal approximations that you rely on are questionable, either because the sample size is small or because the underlying distribution of the data is troublesome. By troublesome, I mean extreme skew or high probability of producing outliers. Both will tend to slow down the asymptotic approximation to normality.</a:t>
-            </a:r>
-          </a:p>
-          <a:p>
-            <a:pPr lvl="0" indent="0" marL="0">
-              <a:buNone/>
-            </a:pPr>
-          </a:p>
-          <a:p>
-            <a:pPr lvl="0" indent="0" marL="0">
-              <a:buNone/>
-            </a:pPr>
-            <a:r>
-              <a:rPr/>
-              <a:t>Keep in mind, though, that the bootstrap can’t compensate for a limited sample size. The confidence intervals may be valid, but often they will be so wide as to be meaningless. There’s a saying that you can’t squeeze blood from a turnip. That’s an attempt to explain that you can’t get something from nothing.</a:t>
+              <a:t>There are special features of time series data that make them difficult to use with a simple bootstrap. The first and most obvious feature is that most time series have even spacing, a nice neatly ordered pattern over time. A bootstrap sample is going to have gaps in some places and multiple observations at the same time point.</a:t>
+            </a:r>
+          </a:p>
+          <a:p>
+            <a:pPr lvl="0" indent="0" marL="0">
+              <a:buNone/>
+            </a:pPr>
+          </a:p>
+          <a:p>
+            <a:pPr lvl="0" indent="0" marL="0">
+              <a:buNone/>
+            </a:pPr>
+            <a:r>
+              <a:rPr/>
+              <a:t>Most time series also exhibit serial correlation, seasonality, and/or temporal trends. These features are either seriously distorted or totally destroyed in a bootstrap sample.</a:t>
+            </a:r>
+          </a:p>
+          <a:p>
+            <a:pPr lvl="0" indent="0" marL="0">
+              <a:buNone/>
+            </a:pPr>
+          </a:p>
+          <a:p>
+            <a:pPr lvl="0" indent="0" marL="0">
+              <a:buNone/>
+            </a:pPr>
+            <a:r>
+              <a:rPr/>
+              <a:t>There are several possible solutions. One is to bootstrap consecutive blocks of observations. This preserves time series features within a block and appears to perform reasonably well.</a:t>
+            </a:r>
+          </a:p>
+          <a:p>
+            <a:pPr lvl="0" indent="0" marL="0">
+              <a:buNone/>
+            </a:pPr>
+          </a:p>
+          <a:p>
+            <a:pPr lvl="0" indent="0" marL="0">
+              <a:buNone/>
+            </a:pPr>
+            <a:r>
+              <a:rPr/>
+              <a:t>A second option is to remove any trend and decompose the time series into independent components, take a bootstrap sample of the independent components, and then recompose a new series from the bootstrap sample.</a:t>
+            </a:r>
+          </a:p>
+          <a:p>
+            <a:pPr lvl="0" indent="0" marL="0">
+              <a:buNone/>
+            </a:pPr>
+          </a:p>
+          <a:p>
+            <a:pPr lvl="0" indent="0" marL="0">
+              <a:buNone/>
+            </a:pPr>
+            <a:r>
+              <a:rPr/>
+              <a:t>The approach you take largely depends on the context of your problem and what statistic you are trying to characterize. For example, if you detrend the data and remove seasonality, then any bootstrapped estimate from the reconstructed time series will be fine if it is modeling a feature of the data other than the trend or seasonality.</a:t>
             </a:r>
           </a:p>
         </p:txBody>
@@ -7419,7 +7365,7 @@
           <a:p>
             <a:fld id="{18BDFEC3-8487-43E8-A154-7C12CBC1FFF2}" type="slidenum">
               <a:rPr lang="en-US"/>
-              <a:t>76</a:t>
+              <a:t>75</a:t>
             </a:fld>
             <a:endParaRPr lang="en-US"/>
           </a:p>
@@ -7479,21 +7425,49 @@
             </a:pPr>
             <a:r>
               <a:rPr/>
-              <a:t>So we’ve covered the history of the bootstrap, illustrated some algorithms, showed how to compute a bootstrap in SAS, Stata, and R, and discussed some special issues where you might want to modify the bootstrap approach.</a:t>
-            </a:r>
-          </a:p>
-          <a:p>
-            <a:pPr lvl="0" indent="0" marL="0">
-              <a:buNone/>
-            </a:pPr>
-          </a:p>
-          <a:p>
-            <a:pPr lvl="0" indent="0" marL="0">
-              <a:buNone/>
-            </a:pPr>
-            <a:r>
-              <a:rPr/>
-              <a:t>I’d be glad to take any questions you might have.</a:t>
+              <a:t>The regression model has some of the same issues as the setting with multiple groups described earlier. If some of the independent variables are very strongly correlated, you might end up with a setting where the correlation is exactly 1 for one or more of the bootstrap samples. This is not a serious issue unless you have both a strong correlation and a small sample size.</a:t>
+            </a:r>
+          </a:p>
+          <a:p>
+            <a:pPr lvl="0" indent="0" marL="0">
+              <a:buNone/>
+            </a:pPr>
+          </a:p>
+          <a:p>
+            <a:pPr lvl="0" indent="0" marL="0">
+              <a:buNone/>
+            </a:pPr>
+            <a:r>
+              <a:rPr/>
+              <a:t>But another consideration is that the bootstrap sample treats the independent variables as if they are selected randomly along with the dependent variable. This may be the case, but there are some datasets where the X values are fixed in advance and the dependent variable is the only thing being sampled.</a:t>
+            </a:r>
+          </a:p>
+          <a:p>
+            <a:pPr lvl="0" indent="0" marL="0">
+              <a:buNone/>
+            </a:pPr>
+          </a:p>
+          <a:p>
+            <a:pPr lvl="0" indent="0" marL="0">
+              <a:buNone/>
+            </a:pPr>
+            <a:r>
+              <a:rPr/>
+              <a:t>One possible solution is to compute the residuals and reconstruct a new dependent variable from the bootstrapped residuals.</a:t>
+            </a:r>
+          </a:p>
+          <a:p>
+            <a:pPr lvl="0" indent="0" marL="0">
+              <a:buNone/>
+            </a:pPr>
+          </a:p>
+          <a:p>
+            <a:pPr lvl="0" indent="0" marL="0">
+              <a:buNone/>
+            </a:pPr>
+            <a:r>
+              <a:rPr/>
+              <a:t>Context is important here. If you bootstrap the residuals, you can’t use the reconstructed dependent variable as an estimate of the regression slopes themselves. You could use them to reconstruct a statistic that is independent of those slopes.</a:t>
             </a:r>
           </a:p>
         </p:txBody>
@@ -7515,7 +7489,7 @@
           <a:p>
             <a:fld id="{18BDFEC3-8487-43E8-A154-7C12CBC1FFF2}" type="slidenum">
               <a:rPr lang="en-US"/>
-              <a:t>77</a:t>
+              <a:t>76</a:t>
             </a:fld>
             <a:endParaRPr lang="en-US"/>
           </a:p>
@@ -7575,35 +7549,117 @@
             </a:pPr>
             <a:r>
               <a:rPr/>
-              <a:t>https://www.vanderbilt.edu/psychological_sciences/graduate/programs/quantitative-methods/quantitative-content/diaconis_efron_1983.pdf</a:t>
-            </a:r>
-          </a:p>
-          <a:p>
-            <a:pPr lvl="0" indent="0" marL="0">
-              <a:buNone/>
-            </a:pPr>
-          </a:p>
-          <a:p>
-            <a:pPr lvl="0" indent="0" marL="0">
-              <a:buNone/>
-            </a:pPr>
-            <a:r>
-              <a:rPr/>
-              <a:t>http://users.cla.umn.edu/~nwaller/prelim/efronbootjackcrossv.pdf</a:t>
-            </a:r>
-          </a:p>
-          <a:p>
-            <a:pPr lvl="0" indent="0" marL="0">
-              <a:buNone/>
-            </a:pPr>
-          </a:p>
-          <a:p>
-            <a:pPr lvl="0" indent="0" marL="0">
-              <a:buNone/>
-            </a:pPr>
-            <a:r>
-              <a:rPr/>
-              <a:t>http://www.nielsen.sites.oasis.unc.edu/soci709/cdocs/efron.pdf</a:t>
+              <a:t>Although the bootstrap works in a very broad range of settings, it can fail miserably in certain cases. Weird distributions like the Cauchy distribution which have no finite moment are going to cause problems. Also troublesome are statistics at or near the extremes of the data. The range, for example, is a statistic where the bootstrap does not perform well.</a:t>
+            </a:r>
+          </a:p>
+          <a:p>
+            <a:pPr lvl="0" indent="0" marL="0">
+              <a:buNone/>
+            </a:pPr>
+          </a:p>
+          <a:p>
+            <a:pPr lvl="0" indent="0" marL="0">
+              <a:buNone/>
+            </a:pPr>
+            <a:r>
+              <a:rPr/>
+              <a:t>We’ve also talked about settings where a simple bootstrap does not perform well and may need some modification. This includes setting with multiple groups and small sample sizes, time series models, and regression models.</a:t>
+            </a:r>
+          </a:p>
+        </p:txBody>
+      </p:sp>
+      <p:sp>
+        <p:nvSpPr>
+          <p:cNvPr id="4" name="Slide Number Placeholder 3"/>
+          <p:cNvSpPr>
+            <a:spLocks noGrp="1"/>
+          </p:cNvSpPr>
+          <p:nvPr>
+            <p:ph type="sldNum" sz="quarter" idx="10"/>
+          </p:nvPr>
+        </p:nvSpPr>
+        <p:spPr/>
+        <p:txBody>
+          <a:bodyPr/>
+          <a:lstStyle/>
+          <a:p>
+            <a:fld id="{18BDFEC3-8487-43E8-A154-7C12CBC1FFF2}" type="slidenum">
+              <a:rPr lang="en-US"/>
+              <a:t>77</a:t>
+            </a:fld>
+            <a:endParaRPr lang="en-US"/>
+          </a:p>
+        </p:txBody>
+      </p:sp>
+    </p:spTree>
+  </p:cSld>
+</p:notes>
+</file>
+
+<file path=ppt/notesSlides/notesSlide73.xml><?xml version="1.0" encoding="utf-8"?>
+<p:notes xmlns:a="http://schemas.openxmlformats.org/drawingml/2006/main" xmlns:r="http://schemas.openxmlformats.org/officeDocument/2006/relationships" xmlns:p="http://schemas.openxmlformats.org/presentationml/2006/main">
+  <p:cSld>
+    <p:spTree>
+      <p:nvGrpSpPr>
+        <p:cNvPr id="1" name=""/>
+        <p:cNvGrpSpPr/>
+        <p:nvPr/>
+      </p:nvGrpSpPr>
+      <p:grpSpPr>
+        <a:xfrm>
+          <a:off x="0" y="0"/>
+          <a:ext cx="0" cy="0"/>
+          <a:chOff x="0" y="0"/>
+          <a:chExt cx="0" cy="0"/>
+        </a:xfrm>
+      </p:grpSpPr>
+      <p:sp>
+        <p:nvSpPr>
+          <p:cNvPr id="2" name="Slide Image Placeholder 1"/>
+          <p:cNvSpPr>
+            <a:spLocks noGrp="1" noRot="1" noChangeAspect="1"/>
+          </p:cNvSpPr>
+          <p:nvPr>
+            <p:ph type="sldImg"/>
+          </p:nvPr>
+        </p:nvSpPr>
+        <p:spPr/>
+      </p:sp>
+      <p:sp>
+        <p:nvSpPr>
+          <p:cNvPr id="3" name="Notes Placeholder 2"/>
+          <p:cNvSpPr>
+            <a:spLocks noGrp="1"/>
+          </p:cNvSpPr>
+          <p:nvPr>
+            <p:ph type="body" idx="1"/>
+          </p:nvPr>
+        </p:nvSpPr>
+        <p:spPr/>
+        <p:txBody>
+          <a:bodyPr/>
+          <a:lstStyle/>
+          <a:p>
+            <a:pPr lvl="0" indent="0" marL="0">
+              <a:buNone/>
+            </a:pPr>
+            <a:r>
+              <a:rPr/>
+              <a:t>The bootstrap performs well in settings where you do not have any theoretical results to guide your work. It also works well when the normal approximations that you rely on are questionable, either because the sample size is small or because the underlying distribution of the data is troublesome. By troublesome, I mean extreme skew or high probability of producing outliers. Both will tend to slow down the asymptotic approximation to normality.</a:t>
+            </a:r>
+          </a:p>
+          <a:p>
+            <a:pPr lvl="0" indent="0" marL="0">
+              <a:buNone/>
+            </a:pPr>
+          </a:p>
+          <a:p>
+            <a:pPr lvl="0" indent="0" marL="0">
+              <a:buNone/>
+            </a:pPr>
+            <a:r>
+              <a:rPr/>
+              <a:t>Keep in mind, though, that the bootstrap can’t compensate for a limited sample size. The confidence intervals may be valid, but often they will be so wide as to be meaningless. There’s a saying that you can’t squeeze blood from a turnip. That’s an attempt to explain that you can’t get something from nothing.</a:t>
             </a:r>
           </a:p>
         </p:txBody>
@@ -7626,6 +7682,212 @@
             <a:fld id="{18BDFEC3-8487-43E8-A154-7C12CBC1FFF2}" type="slidenum">
               <a:rPr lang="en-US"/>
               <a:t>78</a:t>
+            </a:fld>
+            <a:endParaRPr lang="en-US"/>
+          </a:p>
+        </p:txBody>
+      </p:sp>
+    </p:spTree>
+  </p:cSld>
+</p:notes>
+</file>
+
+<file path=ppt/notesSlides/notesSlide74.xml><?xml version="1.0" encoding="utf-8"?>
+<p:notes xmlns:a="http://schemas.openxmlformats.org/drawingml/2006/main" xmlns:r="http://schemas.openxmlformats.org/officeDocument/2006/relationships" xmlns:p="http://schemas.openxmlformats.org/presentationml/2006/main">
+  <p:cSld>
+    <p:spTree>
+      <p:nvGrpSpPr>
+        <p:cNvPr id="1" name=""/>
+        <p:cNvGrpSpPr/>
+        <p:nvPr/>
+      </p:nvGrpSpPr>
+      <p:grpSpPr>
+        <a:xfrm>
+          <a:off x="0" y="0"/>
+          <a:ext cx="0" cy="0"/>
+          <a:chOff x="0" y="0"/>
+          <a:chExt cx="0" cy="0"/>
+        </a:xfrm>
+      </p:grpSpPr>
+      <p:sp>
+        <p:nvSpPr>
+          <p:cNvPr id="2" name="Slide Image Placeholder 1"/>
+          <p:cNvSpPr>
+            <a:spLocks noGrp="1" noRot="1" noChangeAspect="1"/>
+          </p:cNvSpPr>
+          <p:nvPr>
+            <p:ph type="sldImg"/>
+          </p:nvPr>
+        </p:nvSpPr>
+        <p:spPr/>
+      </p:sp>
+      <p:sp>
+        <p:nvSpPr>
+          <p:cNvPr id="3" name="Notes Placeholder 2"/>
+          <p:cNvSpPr>
+            <a:spLocks noGrp="1"/>
+          </p:cNvSpPr>
+          <p:nvPr>
+            <p:ph type="body" idx="1"/>
+          </p:nvPr>
+        </p:nvSpPr>
+        <p:spPr/>
+        <p:txBody>
+          <a:bodyPr/>
+          <a:lstStyle/>
+          <a:p>
+            <a:pPr lvl="0" indent="0" marL="0">
+              <a:buNone/>
+            </a:pPr>
+            <a:r>
+              <a:rPr/>
+              <a:t>So we’ve covered the history of the bootstrap, illustrated some algorithms, showed how to compute a bootstrap in SAS, Stata, and R, and discussed some special issues where you might want to modify the bootstrap approach.</a:t>
+            </a:r>
+          </a:p>
+          <a:p>
+            <a:pPr lvl="0" indent="0" marL="0">
+              <a:buNone/>
+            </a:pPr>
+          </a:p>
+          <a:p>
+            <a:pPr lvl="0" indent="0" marL="0">
+              <a:buNone/>
+            </a:pPr>
+            <a:r>
+              <a:rPr/>
+              <a:t>I’d be glad to take any questions you might have.</a:t>
+            </a:r>
+          </a:p>
+        </p:txBody>
+      </p:sp>
+      <p:sp>
+        <p:nvSpPr>
+          <p:cNvPr id="4" name="Slide Number Placeholder 3"/>
+          <p:cNvSpPr>
+            <a:spLocks noGrp="1"/>
+          </p:cNvSpPr>
+          <p:nvPr>
+            <p:ph type="sldNum" sz="quarter" idx="10"/>
+          </p:nvPr>
+        </p:nvSpPr>
+        <p:spPr/>
+        <p:txBody>
+          <a:bodyPr/>
+          <a:lstStyle/>
+          <a:p>
+            <a:fld id="{18BDFEC3-8487-43E8-A154-7C12CBC1FFF2}" type="slidenum">
+              <a:rPr lang="en-US"/>
+              <a:t>79</a:t>
+            </a:fld>
+            <a:endParaRPr lang="en-US"/>
+          </a:p>
+        </p:txBody>
+      </p:sp>
+    </p:spTree>
+  </p:cSld>
+</p:notes>
+</file>
+
+<file path=ppt/notesSlides/notesSlide75.xml><?xml version="1.0" encoding="utf-8"?>
+<p:notes xmlns:a="http://schemas.openxmlformats.org/drawingml/2006/main" xmlns:r="http://schemas.openxmlformats.org/officeDocument/2006/relationships" xmlns:p="http://schemas.openxmlformats.org/presentationml/2006/main">
+  <p:cSld>
+    <p:spTree>
+      <p:nvGrpSpPr>
+        <p:cNvPr id="1" name=""/>
+        <p:cNvGrpSpPr/>
+        <p:nvPr/>
+      </p:nvGrpSpPr>
+      <p:grpSpPr>
+        <a:xfrm>
+          <a:off x="0" y="0"/>
+          <a:ext cx="0" cy="0"/>
+          <a:chOff x="0" y="0"/>
+          <a:chExt cx="0" cy="0"/>
+        </a:xfrm>
+      </p:grpSpPr>
+      <p:sp>
+        <p:nvSpPr>
+          <p:cNvPr id="2" name="Slide Image Placeholder 1"/>
+          <p:cNvSpPr>
+            <a:spLocks noGrp="1" noRot="1" noChangeAspect="1"/>
+          </p:cNvSpPr>
+          <p:nvPr>
+            <p:ph type="sldImg"/>
+          </p:nvPr>
+        </p:nvSpPr>
+        <p:spPr/>
+      </p:sp>
+      <p:sp>
+        <p:nvSpPr>
+          <p:cNvPr id="3" name="Notes Placeholder 2"/>
+          <p:cNvSpPr>
+            <a:spLocks noGrp="1"/>
+          </p:cNvSpPr>
+          <p:nvPr>
+            <p:ph type="body" idx="1"/>
+          </p:nvPr>
+        </p:nvSpPr>
+        <p:spPr/>
+        <p:txBody>
+          <a:bodyPr/>
+          <a:lstStyle/>
+          <a:p>
+            <a:pPr lvl="0" indent="0" marL="0">
+              <a:buNone/>
+            </a:pPr>
+            <a:r>
+              <a:rPr/>
+              <a:t>https://www.vanderbilt.edu/psychological_sciences/graduate/programs/quantitative-methods/quantitative-content/diaconis_efron_1983.pdf</a:t>
+            </a:r>
+          </a:p>
+          <a:p>
+            <a:pPr lvl="0" indent="0" marL="0">
+              <a:buNone/>
+            </a:pPr>
+          </a:p>
+          <a:p>
+            <a:pPr lvl="0" indent="0" marL="0">
+              <a:buNone/>
+            </a:pPr>
+            <a:r>
+              <a:rPr/>
+              <a:t>http://users.cla.umn.edu/~nwaller/prelim/efronbootjackcrossv.pdf</a:t>
+            </a:r>
+          </a:p>
+          <a:p>
+            <a:pPr lvl="0" indent="0" marL="0">
+              <a:buNone/>
+            </a:pPr>
+          </a:p>
+          <a:p>
+            <a:pPr lvl="0" indent="0" marL="0">
+              <a:buNone/>
+            </a:pPr>
+            <a:r>
+              <a:rPr/>
+              <a:t>http://www.nielsen.sites.oasis.unc.edu/soci709/cdocs/efron.pdf</a:t>
+            </a:r>
+          </a:p>
+        </p:txBody>
+      </p:sp>
+      <p:sp>
+        <p:nvSpPr>
+          <p:cNvPr id="4" name="Slide Number Placeholder 3"/>
+          <p:cNvSpPr>
+            <a:spLocks noGrp="1"/>
+          </p:cNvSpPr>
+          <p:nvPr>
+            <p:ph type="sldNum" sz="quarter" idx="10"/>
+          </p:nvPr>
+        </p:nvSpPr>
+        <p:spPr/>
+        <p:txBody>
+          <a:bodyPr/>
+          <a:lstStyle/>
+          <a:p>
+            <a:fld id="{18BDFEC3-8487-43E8-A154-7C12CBC1FFF2}" type="slidenum">
+              <a:rPr lang="en-US"/>
+              <a:t>80</a:t>
             </a:fld>
             <a:endParaRPr lang="en-US"/>
           </a:p>
@@ -19511,21 +19773,21 @@
             </a:pPr>
             <a:r>
               <a:rPr/>
-              <a:t>Bootstrap in SPSS</a:t>
+              <a:t>Bootstrap in SPSS (1/4)</a:t>
             </a:r>
           </a:p>
         </p:txBody>
       </p:sp>
       <p:pic>
         <p:nvPicPr>
-          <p:cNvPr descr="../images/spss-bootstrapping.png" id="0" name="Picture 1"/>
+          <p:cNvPr descr="../images/spss-bootstrap1.png" id="0" name="Picture 1"/>
           <p:cNvPicPr>
             <a:picLocks noGrp="1" noChangeAspect="1"/>
           </p:cNvPicPr>
           <p:nvPr/>
         </p:nvPicPr>
         <p:blipFill>
-          <a:blip r:embed="rId2"/>
+          <a:blip r:embed="rId3"/>
           <a:stretch>
             <a:fillRect/>
           </a:stretch>
@@ -19570,31 +19832,59 @@
       </p:grpSpPr>
       <p:sp>
         <p:nvSpPr>
-          <p:cNvPr id="3" name="Content Placeholder 2"/>
-          <p:cNvSpPr>
-            <a:spLocks noGrp="1"/>
-          </p:cNvSpPr>
-          <p:nvPr>
-            <p:ph idx="1"/>
-          </p:nvPr>
-        </p:nvSpPr>
-        <p:spPr/>
-        <p:txBody>
-          <a:bodyPr/>
-          <a:lstStyle/>
-          <a:p>
-            <a:pPr lvl="0" indent="0" marL="0">
-              <a:buNone/>
-            </a:pPr>
-            <a:r>
-              <a:rPr>
-                <a:hlinkClick r:id="rId3"/>
-              </a:rPr>
-              <a:t>https://www.ibm.com/products/spss-bootstrapping</a:t>
-            </a:r>
-          </a:p>
-        </p:txBody>
-      </p:sp>
+          <p:cNvPr id="2" name="Title 1"/>
+          <p:cNvSpPr>
+            <a:spLocks noGrp="1"/>
+          </p:cNvSpPr>
+          <p:nvPr>
+            <p:ph type="title"/>
+          </p:nvPr>
+        </p:nvSpPr>
+        <p:spPr/>
+        <p:txBody>
+          <a:bodyPr/>
+          <a:lstStyle/>
+          <a:p>
+            <a:pPr lvl="0" indent="0" marL="0">
+              <a:buNone/>
+            </a:pPr>
+            <a:r>
+              <a:rPr/>
+              <a:t>Bootstrap in SPSS (2/4)</a:t>
+            </a:r>
+          </a:p>
+        </p:txBody>
+      </p:sp>
+      <p:pic>
+        <p:nvPicPr>
+          <p:cNvPr descr="../images/spss-bootstrap2.png" id="0" name="Picture 1"/>
+          <p:cNvPicPr>
+            <a:picLocks noGrp="1" noChangeAspect="1"/>
+          </p:cNvPicPr>
+          <p:nvPr/>
+        </p:nvPicPr>
+        <p:blipFill>
+          <a:blip r:embed="rId3"/>
+          <a:stretch>
+            <a:fillRect/>
+          </a:stretch>
+        </p:blipFill>
+        <p:spPr bwMode="auto">
+          <a:xfrm>
+            <a:off x="2667000" y="1600200"/>
+            <a:ext cx="6858000" cy="4521200"/>
+          </a:xfrm>
+          <a:prstGeom prst="rect">
+            <a:avLst/>
+          </a:prstGeom>
+          <a:noFill/>
+          <a:ln w="9525">
+            <a:noFill/>
+            <a:headEnd/>
+            <a:tailEnd/>
+          </a:ln>
+        </p:spPr>
+      </p:pic>
     </p:spTree>
   </p:cSld>
 </p:sld>
@@ -19744,55 +20034,41 @@
             </a:pPr>
             <a:r>
               <a:rPr/>
-              <a:t>Break #3</a:t>
-            </a:r>
-          </a:p>
-        </p:txBody>
-      </p:sp>
-      <p:sp>
-        <p:nvSpPr>
-          <p:cNvPr id="3" name="Content Placeholder 2"/>
-          <p:cNvSpPr>
-            <a:spLocks noGrp="1"/>
-          </p:cNvSpPr>
-          <p:nvPr>
-            <p:ph idx="1"/>
-          </p:nvPr>
-        </p:nvSpPr>
-        <p:spPr/>
-        <p:txBody>
-          <a:bodyPr/>
-          <a:lstStyle/>
-          <a:p>
-            <a:pPr lvl="0"/>
-            <a:r>
-              <a:rPr/>
-              <a:t>What have you learned</a:t>
-            </a:r>
-          </a:p>
-          <a:p>
-            <a:pPr lvl="1"/>
-            <a:r>
-              <a:rPr/>
-              <a:t>Software</a:t>
-            </a:r>
-          </a:p>
-          <a:p>
-            <a:pPr lvl="0"/>
-            <a:r>
-              <a:rPr/>
-              <a:t>What’s coming next</a:t>
-            </a:r>
-          </a:p>
-          <a:p>
-            <a:pPr lvl="1"/>
-            <a:r>
-              <a:rPr/>
-              <a:t>Special settings</a:t>
-            </a:r>
-          </a:p>
-        </p:txBody>
-      </p:sp>
+              <a:t>Bootstrap in SPSS (3/4)</a:t>
+            </a:r>
+          </a:p>
+        </p:txBody>
+      </p:sp>
+      <p:pic>
+        <p:nvPicPr>
+          <p:cNvPr descr="../images/spss-bootstrap3.png" id="0" name="Picture 1"/>
+          <p:cNvPicPr>
+            <a:picLocks noGrp="1" noChangeAspect="1"/>
+          </p:cNvPicPr>
+          <p:nvPr/>
+        </p:nvPicPr>
+        <p:blipFill>
+          <a:blip r:embed="rId3"/>
+          <a:stretch>
+            <a:fillRect/>
+          </a:stretch>
+        </p:blipFill>
+        <p:spPr bwMode="auto">
+          <a:xfrm>
+            <a:off x="4356100" y="1600200"/>
+            <a:ext cx="3479800" cy="4521200"/>
+          </a:xfrm>
+          <a:prstGeom prst="rect">
+            <a:avLst/>
+          </a:prstGeom>
+          <a:noFill/>
+          <a:ln w="9525">
+            <a:noFill/>
+            <a:headEnd/>
+            <a:tailEnd/>
+          </a:ln>
+        </p:spPr>
+      </p:pic>
     </p:spTree>
   </p:cSld>
 </p:sld>
@@ -19835,48 +20111,41 @@
             </a:pPr>
             <a:r>
               <a:rPr/>
-              <a:t>Special settings</a:t>
-            </a:r>
-          </a:p>
-        </p:txBody>
-      </p:sp>
-      <p:sp>
-        <p:nvSpPr>
-          <p:cNvPr id="3" name="Content Placeholder 2"/>
-          <p:cNvSpPr>
-            <a:spLocks noGrp="1"/>
-          </p:cNvSpPr>
-          <p:nvPr>
-            <p:ph idx="1"/>
-          </p:nvPr>
-        </p:nvSpPr>
-        <p:spPr/>
-        <p:txBody>
-          <a:bodyPr/>
-          <a:lstStyle/>
-          <a:p>
-            <a:pPr lvl="0"/>
-            <a:r>
-              <a:rPr/>
-              <a:t>Multiple groups</a:t>
-            </a:r>
-          </a:p>
-          <a:p>
-            <a:pPr lvl="0"/>
-            <a:r>
-              <a:rPr/>
-              <a:t>Time series</a:t>
-            </a:r>
-          </a:p>
-          <a:p>
-            <a:pPr lvl="0"/>
-            <a:r>
-              <a:rPr/>
-              <a:t>Regression models</a:t>
-            </a:r>
-          </a:p>
-        </p:txBody>
-      </p:sp>
+              <a:t>Bootstrap in SPSS (4/4)</a:t>
+            </a:r>
+          </a:p>
+        </p:txBody>
+      </p:sp>
+      <p:pic>
+        <p:nvPicPr>
+          <p:cNvPr descr="../images/spss-bootstrap4.png" id="0" name="Picture 1"/>
+          <p:cNvPicPr>
+            <a:picLocks noGrp="1" noChangeAspect="1"/>
+          </p:cNvPicPr>
+          <p:nvPr/>
+        </p:nvPicPr>
+        <p:blipFill>
+          <a:blip r:embed="rId3"/>
+          <a:stretch>
+            <a:fillRect/>
+          </a:stretch>
+        </p:blipFill>
+        <p:spPr bwMode="auto">
+          <a:xfrm>
+            <a:off x="2857500" y="1600200"/>
+            <a:ext cx="6464300" cy="4521200"/>
+          </a:xfrm>
+          <a:prstGeom prst="rect">
+            <a:avLst/>
+          </a:prstGeom>
+          <a:noFill/>
+          <a:ln w="9525">
+            <a:noFill/>
+            <a:headEnd/>
+            <a:tailEnd/>
+          </a:ln>
+        </p:spPr>
+      </p:pic>
     </p:spTree>
   </p:cSld>
 </p:sld>
@@ -19919,7 +20188,7 @@
             </a:pPr>
             <a:r>
               <a:rPr/>
-              <a:t>Multiple groups</a:t>
+              <a:t>Break #3</a:t>
             </a:r>
           </a:p>
         </p:txBody>
@@ -19942,21 +20211,28 @@
             <a:pPr lvl="0"/>
             <a:r>
               <a:rPr/>
-              <a:t>Do you allow the group sizes to vary?</a:t>
+              <a:t>What have you learned</a:t>
+            </a:r>
+          </a:p>
+          <a:p>
+            <a:pPr lvl="1"/>
+            <a:r>
+              <a:rPr/>
+              <a:t>Software</a:t>
             </a:r>
           </a:p>
           <a:p>
             <a:pPr lvl="0"/>
             <a:r>
               <a:rPr/>
-              <a:t>Stratified bootstrap</a:t>
+              <a:t>What’s coming next</a:t>
             </a:r>
           </a:p>
           <a:p>
             <a:pPr lvl="1"/>
             <a:r>
               <a:rPr/>
-              <a:t>Two group example</a:t>
+              <a:t>Special settings</a:t>
             </a:r>
           </a:p>
         </p:txBody>
@@ -20003,79 +20279,44 @@
             </a:pPr>
             <a:r>
               <a:rPr/>
+              <a:t>Special settings</a:t>
+            </a:r>
+          </a:p>
+        </p:txBody>
+      </p:sp>
+      <p:sp>
+        <p:nvSpPr>
+          <p:cNvPr id="3" name="Content Placeholder 2"/>
+          <p:cNvSpPr>
+            <a:spLocks noGrp="1"/>
+          </p:cNvSpPr>
+          <p:nvPr>
+            <p:ph idx="1"/>
+          </p:nvPr>
+        </p:nvSpPr>
+        <p:spPr/>
+        <p:txBody>
+          <a:bodyPr/>
+          <a:lstStyle/>
+          <a:p>
+            <a:pPr lvl="0"/>
+            <a:r>
+              <a:rPr/>
+              <a:t>Multiple groups</a:t>
+            </a:r>
+          </a:p>
+          <a:p>
+            <a:pPr lvl="0"/>
+            <a:r>
+              <a:rPr/>
               <a:t>Time series</a:t>
             </a:r>
           </a:p>
-        </p:txBody>
-      </p:sp>
-      <p:sp>
-        <p:nvSpPr>
-          <p:cNvPr id="3" name="Content Placeholder 2"/>
-          <p:cNvSpPr>
-            <a:spLocks noGrp="1"/>
-          </p:cNvSpPr>
-          <p:nvPr>
-            <p:ph idx="1"/>
-          </p:nvPr>
-        </p:nvSpPr>
-        <p:spPr/>
-        <p:txBody>
-          <a:bodyPr/>
-          <a:lstStyle/>
           <a:p>
             <a:pPr lvl="0"/>
             <a:r>
               <a:rPr/>
-              <a:t>Simple bootstrap destroys important features of time series models</a:t>
-            </a:r>
-          </a:p>
-          <a:p>
-            <a:pPr lvl="1"/>
-            <a:r>
-              <a:rPr/>
-              <a:t>Evenly spaced observations</a:t>
-            </a:r>
-          </a:p>
-          <a:p>
-            <a:pPr lvl="1"/>
-            <a:r>
-              <a:rPr/>
-              <a:t>Serial correlation</a:t>
-            </a:r>
-          </a:p>
-          <a:p>
-            <a:pPr lvl="1"/>
-            <a:r>
-              <a:rPr/>
-              <a:t>Seasonality</a:t>
-            </a:r>
-          </a:p>
-          <a:p>
-            <a:pPr lvl="1"/>
-            <a:r>
-              <a:rPr/>
-              <a:t>Temporal trends</a:t>
-            </a:r>
-          </a:p>
-          <a:p>
-            <a:pPr lvl="0"/>
-            <a:r>
-              <a:rPr/>
-              <a:t>Solutions</a:t>
-            </a:r>
-          </a:p>
-          <a:p>
-            <a:pPr lvl="1"/>
-            <a:r>
-              <a:rPr/>
-              <a:t>Bootstrap blocks of consecutive observations</a:t>
-            </a:r>
-          </a:p>
-          <a:p>
-            <a:pPr lvl="1"/>
-            <a:r>
-              <a:rPr/>
-              <a:t>Detrend/decompose the time series</a:t>
+              <a:t>Regression models</a:t>
             </a:r>
           </a:p>
         </p:txBody>
@@ -20122,7 +20363,7 @@
             </a:pPr>
             <a:r>
               <a:rPr/>
-              <a:t>Regression models</a:t>
+              <a:t>Multiple groups</a:t>
             </a:r>
           </a:p>
         </p:txBody>
@@ -20145,21 +20386,21 @@
             <a:pPr lvl="0"/>
             <a:r>
               <a:rPr/>
-              <a:t>Subsample may have perfect collinearity</a:t>
+              <a:t>Do you allow the group sizes to vary?</a:t>
             </a:r>
           </a:p>
           <a:p>
             <a:pPr lvl="0"/>
             <a:r>
               <a:rPr/>
-              <a:t>Are the independent variables fixed or random?</a:t>
-            </a:r>
-          </a:p>
-          <a:p>
-            <a:pPr lvl="0"/>
-            <a:r>
-              <a:rPr/>
-              <a:t>Solution: bootstrap residuals</a:t>
+              <a:t>Stratified bootstrap</a:t>
+            </a:r>
+          </a:p>
+          <a:p>
+            <a:pPr lvl="1"/>
+            <a:r>
+              <a:rPr/>
+              <a:t>Two group example</a:t>
             </a:r>
           </a:p>
         </p:txBody>
@@ -20206,7 +20447,7 @@
             </a:pPr>
             <a:r>
               <a:rPr/>
-              <a:t>Final bits of advice (1/2)</a:t>
+              <a:t>Time series</a:t>
             </a:r>
           </a:p>
         </p:txBody>
@@ -20229,49 +20470,56 @@
             <a:pPr lvl="0"/>
             <a:r>
               <a:rPr/>
-              <a:t>Situations where the bootstrap performs poorly</a:t>
+              <a:t>Simple bootstrap destroys important features of time series models</a:t>
             </a:r>
           </a:p>
           <a:p>
             <a:pPr lvl="1"/>
             <a:r>
               <a:rPr/>
-              <a:t>Data from “weird” distributions</a:t>
+              <a:t>Evenly spaced observations</a:t>
             </a:r>
           </a:p>
           <a:p>
             <a:pPr lvl="1"/>
             <a:r>
               <a:rPr/>
-              <a:t>Statistics at or near the extremes</a:t>
+              <a:t>Serial correlation</a:t>
+            </a:r>
+          </a:p>
+          <a:p>
+            <a:pPr lvl="1"/>
+            <a:r>
+              <a:rPr/>
+              <a:t>Seasonality</a:t>
+            </a:r>
+          </a:p>
+          <a:p>
+            <a:pPr lvl="1"/>
+            <a:r>
+              <a:rPr/>
+              <a:t>Temporal trends</a:t>
             </a:r>
           </a:p>
           <a:p>
             <a:pPr lvl="0"/>
             <a:r>
               <a:rPr/>
-              <a:t>Situations where a simple bootstrap performs poorly</a:t>
+              <a:t>Solutions</a:t>
             </a:r>
           </a:p>
           <a:p>
             <a:pPr lvl="1"/>
             <a:r>
               <a:rPr/>
-              <a:t>Multiple groups with small sample sizes</a:t>
+              <a:t>Bootstrap blocks of consecutive observations</a:t>
             </a:r>
           </a:p>
           <a:p>
             <a:pPr lvl="1"/>
             <a:r>
               <a:rPr/>
-              <a:t>Time series models</a:t>
-            </a:r>
-          </a:p>
-          <a:p>
-            <a:pPr lvl="1"/>
-            <a:r>
-              <a:rPr/>
-              <a:t>Regression models</a:t>
+              <a:t>Detrend/decompose the time series</a:t>
             </a:r>
           </a:p>
         </p:txBody>
@@ -20318,7 +20566,7 @@
             </a:pPr>
             <a:r>
               <a:rPr/>
-              <a:t>Final bits of advice (2/2)</a:t>
+              <a:t>Regression models</a:t>
             </a:r>
           </a:p>
         </p:txBody>
@@ -20341,35 +20589,21 @@
             <a:pPr lvl="0"/>
             <a:r>
               <a:rPr/>
-              <a:t>Situations where the bootstrap performs well</a:t>
-            </a:r>
-          </a:p>
-          <a:p>
-            <a:pPr lvl="1"/>
-            <a:r>
-              <a:rPr/>
-              <a:t>Statistics with no known theoretical results</a:t>
-            </a:r>
-          </a:p>
-          <a:p>
-            <a:pPr lvl="1"/>
-            <a:r>
-              <a:rPr/>
-              <a:t>Statistics where approximations are questionable</a:t>
+              <a:t>Subsample may have perfect collinearity</a:t>
             </a:r>
           </a:p>
           <a:p>
             <a:pPr lvl="0"/>
             <a:r>
               <a:rPr/>
-              <a:t>But you can’t squeeze blood from a turnip.</a:t>
-            </a:r>
-          </a:p>
-          <a:p>
-            <a:pPr lvl="1"/>
-            <a:r>
-              <a:rPr/>
-              <a:t>Very small sample sizes are still very small sample sizes</a:t>
+              <a:t>Are the independent variables fixed or random?</a:t>
+            </a:r>
+          </a:p>
+          <a:p>
+            <a:pPr lvl="0"/>
+            <a:r>
+              <a:rPr/>
+              <a:t>Solution: bootstrap residuals</a:t>
             </a:r>
           </a:p>
         </p:txBody>
@@ -20416,7 +20650,7 @@
             </a:pPr>
             <a:r>
               <a:rPr/>
-              <a:t>Summary</a:t>
+              <a:t>Final bits of advice (1/2)</a:t>
             </a:r>
           </a:p>
         </p:txBody>
@@ -20439,28 +20673,49 @@
             <a:pPr lvl="0"/>
             <a:r>
               <a:rPr/>
-              <a:t>History</a:t>
+              <a:t>Situations where the bootstrap performs poorly</a:t>
+            </a:r>
+          </a:p>
+          <a:p>
+            <a:pPr lvl="1"/>
+            <a:r>
+              <a:rPr/>
+              <a:t>Data from “weird” distributions</a:t>
+            </a:r>
+          </a:p>
+          <a:p>
+            <a:pPr lvl="1"/>
+            <a:r>
+              <a:rPr/>
+              <a:t>Statistics at or near the extremes</a:t>
             </a:r>
           </a:p>
           <a:p>
             <a:pPr lvl="0"/>
             <a:r>
               <a:rPr/>
-              <a:t>Algorithms</a:t>
-            </a:r>
-          </a:p>
-          <a:p>
-            <a:pPr lvl="0"/>
-            <a:r>
-              <a:rPr/>
-              <a:t>Software</a:t>
-            </a:r>
-          </a:p>
-          <a:p>
-            <a:pPr lvl="0"/>
-            <a:r>
-              <a:rPr/>
-              <a:t>Special settings</a:t>
+              <a:t>Situations where a simple bootstrap performs poorly</a:t>
+            </a:r>
+          </a:p>
+          <a:p>
+            <a:pPr lvl="1"/>
+            <a:r>
+              <a:rPr/>
+              <a:t>Multiple groups with small sample sizes</a:t>
+            </a:r>
+          </a:p>
+          <a:p>
+            <a:pPr lvl="1"/>
+            <a:r>
+              <a:rPr/>
+              <a:t>Time series models</a:t>
+            </a:r>
+          </a:p>
+          <a:p>
+            <a:pPr lvl="1"/>
+            <a:r>
+              <a:rPr/>
+              <a:t>Regression models</a:t>
             </a:r>
           </a:p>
         </p:txBody>
@@ -20507,7 +20762,7 @@
             </a:pPr>
             <a:r>
               <a:rPr/>
-              <a:t>Bibliography</a:t>
+              <a:t>Final bits of advice (2/2)</a:t>
             </a:r>
           </a:p>
         </p:txBody>
@@ -20527,30 +20782,129 @@
           <a:bodyPr/>
           <a:lstStyle/>
           <a:p>
-            <a:pPr lvl="0" indent="0" marL="0">
-              <a:buNone/>
-            </a:pPr>
-            <a:r>
-              <a:rPr/>
-              <a:t>Persi Diaconis, Bradley Efron. Computer-intensive Methods in Statistics. Scientific American, 1983, 248(5), 116-130.</a:t>
-            </a:r>
-          </a:p>
-          <a:p>
-            <a:pPr lvl="0" indent="0" marL="0">
-              <a:buNone/>
-            </a:pPr>
-            <a:r>
-              <a:rPr/>
-              <a:t>Bradley Efron, Gail Gong. A Leisurely Look at the Bootstrap, Jackknife, and Cross-Validation. The American Statistician, 1983, 37(1), 36-48.</a:t>
-            </a:r>
-          </a:p>
-          <a:p>
-            <a:pPr lvl="0" indent="0" marL="0">
-              <a:buNone/>
-            </a:pPr>
-            <a:r>
-              <a:rPr/>
-              <a:t>Bradley Efron, Robert Tibshirani. Bootstrap Methods for Standard Errors, Confidence Intervals, and Other Measures of Statistical Accuracy. Statistical Science, 1986, 1(1), 54-75.</a:t>
+            <a:pPr lvl="0"/>
+            <a:r>
+              <a:rPr/>
+              <a:t>Situations where the bootstrap performs well</a:t>
+            </a:r>
+          </a:p>
+          <a:p>
+            <a:pPr lvl="1"/>
+            <a:r>
+              <a:rPr/>
+              <a:t>Statistics with no known theoretical results</a:t>
+            </a:r>
+          </a:p>
+          <a:p>
+            <a:pPr lvl="1"/>
+            <a:r>
+              <a:rPr/>
+              <a:t>Statistics where approximations are questionable</a:t>
+            </a:r>
+          </a:p>
+          <a:p>
+            <a:pPr lvl="0"/>
+            <a:r>
+              <a:rPr/>
+              <a:t>But you can’t squeeze blood from a turnip.</a:t>
+            </a:r>
+          </a:p>
+          <a:p>
+            <a:pPr lvl="1"/>
+            <a:r>
+              <a:rPr/>
+              <a:t>Very small sample sizes are still very small sample sizes</a:t>
+            </a:r>
+          </a:p>
+        </p:txBody>
+      </p:sp>
+    </p:spTree>
+  </p:cSld>
+</p:sld>
+</file>
+
+<file path=ppt/slides/slide79.xml><?xml version="1.0" encoding="utf-8"?>
+<p:sld xmlns:a="http://schemas.openxmlformats.org/drawingml/2006/main" xmlns:r="http://schemas.openxmlformats.org/officeDocument/2006/relationships" xmlns:p="http://schemas.openxmlformats.org/presentationml/2006/main">
+  <p:cSld>
+    <p:spTree>
+      <p:nvGrpSpPr>
+        <p:cNvPr id="1" name=""/>
+        <p:cNvGrpSpPr/>
+        <p:nvPr/>
+      </p:nvGrpSpPr>
+      <p:grpSpPr>
+        <a:xfrm>
+          <a:off x="0" y="0"/>
+          <a:ext cx="0" cy="0"/>
+          <a:chOff x="0" y="0"/>
+          <a:chExt cx="0" cy="0"/>
+        </a:xfrm>
+      </p:grpSpPr>
+      <p:sp>
+        <p:nvSpPr>
+          <p:cNvPr id="2" name="Title 1"/>
+          <p:cNvSpPr>
+            <a:spLocks noGrp="1"/>
+          </p:cNvSpPr>
+          <p:nvPr>
+            <p:ph type="title"/>
+          </p:nvPr>
+        </p:nvSpPr>
+        <p:spPr/>
+        <p:txBody>
+          <a:bodyPr/>
+          <a:lstStyle/>
+          <a:p>
+            <a:pPr lvl="0" indent="0" marL="0">
+              <a:buNone/>
+            </a:pPr>
+            <a:r>
+              <a:rPr/>
+              <a:t>Summary</a:t>
+            </a:r>
+          </a:p>
+        </p:txBody>
+      </p:sp>
+      <p:sp>
+        <p:nvSpPr>
+          <p:cNvPr id="3" name="Content Placeholder 2"/>
+          <p:cNvSpPr>
+            <a:spLocks noGrp="1"/>
+          </p:cNvSpPr>
+          <p:nvPr>
+            <p:ph idx="1"/>
+          </p:nvPr>
+        </p:nvSpPr>
+        <p:spPr/>
+        <p:txBody>
+          <a:bodyPr/>
+          <a:lstStyle/>
+          <a:p>
+            <a:pPr lvl="0"/>
+            <a:r>
+              <a:rPr/>
+              <a:t>History</a:t>
+            </a:r>
+          </a:p>
+          <a:p>
+            <a:pPr lvl="0"/>
+            <a:r>
+              <a:rPr/>
+              <a:t>Algorithms</a:t>
+            </a:r>
+          </a:p>
+          <a:p>
+            <a:pPr lvl="0"/>
+            <a:r>
+              <a:rPr/>
+              <a:t>Software</a:t>
+            </a:r>
+          </a:p>
+          <a:p>
+            <a:pPr lvl="0"/>
+            <a:r>
+              <a:rPr/>
+              <a:t>Special settings</a:t>
             </a:r>
           </a:p>
         </p:txBody>
@@ -20843,6 +21197,96 @@
           </p:sp>
         </mc:Choice>
       </mc:AlternateContent>
+    </p:spTree>
+  </p:cSld>
+</p:sld>
+</file>
+
+<file path=ppt/slides/slide80.xml><?xml version="1.0" encoding="utf-8"?>
+<p:sld xmlns:a="http://schemas.openxmlformats.org/drawingml/2006/main" xmlns:r="http://schemas.openxmlformats.org/officeDocument/2006/relationships" xmlns:p="http://schemas.openxmlformats.org/presentationml/2006/main">
+  <p:cSld>
+    <p:spTree>
+      <p:nvGrpSpPr>
+        <p:cNvPr id="1" name=""/>
+        <p:cNvGrpSpPr/>
+        <p:nvPr/>
+      </p:nvGrpSpPr>
+      <p:grpSpPr>
+        <a:xfrm>
+          <a:off x="0" y="0"/>
+          <a:ext cx="0" cy="0"/>
+          <a:chOff x="0" y="0"/>
+          <a:chExt cx="0" cy="0"/>
+        </a:xfrm>
+      </p:grpSpPr>
+      <p:sp>
+        <p:nvSpPr>
+          <p:cNvPr id="2" name="Title 1"/>
+          <p:cNvSpPr>
+            <a:spLocks noGrp="1"/>
+          </p:cNvSpPr>
+          <p:nvPr>
+            <p:ph type="title"/>
+          </p:nvPr>
+        </p:nvSpPr>
+        <p:spPr/>
+        <p:txBody>
+          <a:bodyPr/>
+          <a:lstStyle/>
+          <a:p>
+            <a:pPr lvl="0" indent="0" marL="0">
+              <a:buNone/>
+            </a:pPr>
+            <a:r>
+              <a:rPr/>
+              <a:t>Bibliography</a:t>
+            </a:r>
+          </a:p>
+        </p:txBody>
+      </p:sp>
+      <p:sp>
+        <p:nvSpPr>
+          <p:cNvPr id="3" name="Content Placeholder 2"/>
+          <p:cNvSpPr>
+            <a:spLocks noGrp="1"/>
+          </p:cNvSpPr>
+          <p:nvPr>
+            <p:ph idx="1"/>
+          </p:nvPr>
+        </p:nvSpPr>
+        <p:spPr/>
+        <p:txBody>
+          <a:bodyPr/>
+          <a:lstStyle/>
+          <a:p>
+            <a:pPr lvl="0" indent="0" marL="0">
+              <a:buNone/>
+            </a:pPr>
+            <a:r>
+              <a:rPr/>
+              <a:t>Persi Diaconis, Bradley Efron. Computer-intensive Methods in Statistics. Scientific American, 1983, 248(5), 116-130.</a:t>
+            </a:r>
+          </a:p>
+          <a:p>
+            <a:pPr lvl="0" indent="0" marL="0">
+              <a:buNone/>
+            </a:pPr>
+            <a:r>
+              <a:rPr/>
+              <a:t>Bradley Efron, Gail Gong. A Leisurely Look at the Bootstrap, Jackknife, and Cross-Validation. The American Statistician, 1983, 37(1), 36-48.</a:t>
+            </a:r>
+          </a:p>
+          <a:p>
+            <a:pPr lvl="0" indent="0" marL="0">
+              <a:buNone/>
+            </a:pPr>
+            <a:r>
+              <a:rPr/>
+              <a:t>Bradley Efron, Robert Tibshirani. Bootstrap Methods for Standard Errors, Confidence Intervals, and Other Measures of Statistical Accuracy. Statistical Science, 1986, 1(1), 54-75.</a:t>
+            </a:r>
+          </a:p>
+        </p:txBody>
+      </p:sp>
     </p:spTree>
   </p:cSld>
 </p:sld>

</xml_diff>

<commit_message>
Cleaned up code formatting in bootstrap-slides
</commit_message>
<xml_diff>
--- a/bootstrap/src/bootstrap-slides.pptx
+++ b/bootstrap/src/bootstrap-slides.pptx
@@ -6447,7 +6447,7 @@
             </a:pPr>
             <a:r>
               <a:rPr/>
-              <a:t>According to their website, you can use this module to “etimate standard errors and confidence intervals of a population parameter such as a mean, median, proportion, odds ratio, correlation coefficient, regression coefficient or others. Control the numbers of bootstrap samples, set a random number seed and indicate whether a simple or stratified method is appropriate.”</a:t>
+              <a:t>According to their website, you can use this module to “estimate standard errors and confidence intervals of a population parameter such as a mean, median, proportion, odds ratio, correlation coefficient, regression coefficient or others. Control the numbers of bootstrap samples, set a random number seed and indicate whether a simple or stratified method is appropriate.”</a:t>
             </a:r>
           </a:p>
           <a:p>
@@ -18329,7 +18329,8 @@
               <a:rPr>
                 <a:latin typeface="Courier"/>
               </a:rPr>
-              <a:t>ods output  FitStatistics = t (where = (label2 =  "R-Square"));
+              <a:t>ods output
+  FitStatistics = t (where = (label2 =  "R-Square"));
 proc reg data = bootsample;
   by replicate;
   model read = female math write ses;
@@ -18487,8 +18488,10 @@
                 <a:latin typeface="Courier"/>
               </a:rPr>
               <a:t>%let alphalev = .05;
-%let a1 = %sysevalf(&amp;alphalev/2*100);
-%let a2 = %sysevalf((1 - &amp;alphalev/2)*100);</a:t>
+%let a1 = 
+  %sysevalf(&amp;alphalev/2*100);
+%let a2 = 
+  %sysevalf((1 - &amp;alphalev/2)*100);</a:t>
             </a:r>
           </a:p>
         </p:txBody>

</xml_diff>